<commit_message>
Added origin normalization | Added example presentation for subs
</commit_message>
<xml_diff>
--- a/experiment/RUN_ME/stimuli/instructions presentation.pptx
+++ b/experiment/RUN_ME/stimuli/instructions presentation.pptx
@@ -260,7 +260,7 @@
           <a:p>
             <a:fld id="{F999E2B6-E0C8-4E2F-B37B-1FC830B33272}" type="datetimeFigureOut">
               <a:rPr lang="en-US" smtClean="0"/>
-              <a:t>2/16/2021</a:t>
+              <a:t>3/7/2021</a:t>
             </a:fld>
             <a:endParaRPr lang="en-US"/>
           </a:p>
@@ -428,7 +428,7 @@
           <a:p>
             <a:fld id="{F999E2B6-E0C8-4E2F-B37B-1FC830B33272}" type="datetimeFigureOut">
               <a:rPr lang="en-US" smtClean="0"/>
-              <a:t>2/16/2021</a:t>
+              <a:t>3/7/2021</a:t>
             </a:fld>
             <a:endParaRPr lang="en-US"/>
           </a:p>
@@ -606,7 +606,7 @@
           <a:p>
             <a:fld id="{F999E2B6-E0C8-4E2F-B37B-1FC830B33272}" type="datetimeFigureOut">
               <a:rPr lang="en-US" smtClean="0"/>
-              <a:t>2/16/2021</a:t>
+              <a:t>3/7/2021</a:t>
             </a:fld>
             <a:endParaRPr lang="en-US"/>
           </a:p>
@@ -774,7 +774,7 @@
           <a:p>
             <a:fld id="{F999E2B6-E0C8-4E2F-B37B-1FC830B33272}" type="datetimeFigureOut">
               <a:rPr lang="en-US" smtClean="0"/>
-              <a:t>2/16/2021</a:t>
+              <a:t>3/7/2021</a:t>
             </a:fld>
             <a:endParaRPr lang="en-US"/>
           </a:p>
@@ -1019,7 +1019,7 @@
           <a:p>
             <a:fld id="{F999E2B6-E0C8-4E2F-B37B-1FC830B33272}" type="datetimeFigureOut">
               <a:rPr lang="en-US" smtClean="0"/>
-              <a:t>2/16/2021</a:t>
+              <a:t>3/7/2021</a:t>
             </a:fld>
             <a:endParaRPr lang="en-US"/>
           </a:p>
@@ -1248,7 +1248,7 @@
           <a:p>
             <a:fld id="{F999E2B6-E0C8-4E2F-B37B-1FC830B33272}" type="datetimeFigureOut">
               <a:rPr lang="en-US" smtClean="0"/>
-              <a:t>2/16/2021</a:t>
+              <a:t>3/7/2021</a:t>
             </a:fld>
             <a:endParaRPr lang="en-US"/>
           </a:p>
@@ -1612,7 +1612,7 @@
           <a:p>
             <a:fld id="{F999E2B6-E0C8-4E2F-B37B-1FC830B33272}" type="datetimeFigureOut">
               <a:rPr lang="en-US" smtClean="0"/>
-              <a:t>2/16/2021</a:t>
+              <a:t>3/7/2021</a:t>
             </a:fld>
             <a:endParaRPr lang="en-US"/>
           </a:p>
@@ -1729,7 +1729,7 @@
           <a:p>
             <a:fld id="{F999E2B6-E0C8-4E2F-B37B-1FC830B33272}" type="datetimeFigureOut">
               <a:rPr lang="en-US" smtClean="0"/>
-              <a:t>2/16/2021</a:t>
+              <a:t>3/7/2021</a:t>
             </a:fld>
             <a:endParaRPr lang="en-US"/>
           </a:p>
@@ -1824,7 +1824,7 @@
           <a:p>
             <a:fld id="{F999E2B6-E0C8-4E2F-B37B-1FC830B33272}" type="datetimeFigureOut">
               <a:rPr lang="en-US" smtClean="0"/>
-              <a:t>2/16/2021</a:t>
+              <a:t>3/7/2021</a:t>
             </a:fld>
             <a:endParaRPr lang="en-US"/>
           </a:p>
@@ -2099,7 +2099,7 @@
           <a:p>
             <a:fld id="{F999E2B6-E0C8-4E2F-B37B-1FC830B33272}" type="datetimeFigureOut">
               <a:rPr lang="en-US" smtClean="0"/>
-              <a:t>2/16/2021</a:t>
+              <a:t>3/7/2021</a:t>
             </a:fld>
             <a:endParaRPr lang="en-US"/>
           </a:p>
@@ -2351,7 +2351,7 @@
           <a:p>
             <a:fld id="{F999E2B6-E0C8-4E2F-B37B-1FC830B33272}" type="datetimeFigureOut">
               <a:rPr lang="en-US" smtClean="0"/>
-              <a:t>2/16/2021</a:t>
+              <a:t>3/7/2021</a:t>
             </a:fld>
             <a:endParaRPr lang="en-US"/>
           </a:p>
@@ -2562,7 +2562,7 @@
           <a:p>
             <a:fld id="{F999E2B6-E0C8-4E2F-B37B-1FC830B33272}" type="datetimeFigureOut">
               <a:rPr lang="en-US" smtClean="0"/>
-              <a:t>2/16/2021</a:t>
+              <a:t>3/7/2021</a:t>
             </a:fld>
             <a:endParaRPr lang="en-US"/>
           </a:p>
@@ -3060,7 +3060,7 @@
           <p:cNvPr id="2" name="Table 2">
             <a:extLst>
               <a:ext uri="{FF2B5EF4-FFF2-40B4-BE49-F238E27FC236}">
-                <a16:creationId xmlns:a16="http://schemas.microsoft.com/office/drawing/2014/main" xmlns="" id="{9768F41E-FF16-4CA0-9061-785C57DCD75D}"/>
+                <a16:creationId xmlns:a16="http://schemas.microsoft.com/office/drawing/2014/main" id="{9768F41E-FF16-4CA0-9061-785C57DCD75D}"/>
               </a:ext>
             </a:extLst>
           </p:cNvPr>
@@ -3089,28 +3089,28 @@
                 <a:gridCol w="3048000">
                   <a:extLst>
                     <a:ext uri="{9D8B030D-6E8A-4147-A177-3AD203B41FA5}">
-                      <a16:colId xmlns:a16="http://schemas.microsoft.com/office/drawing/2014/main" xmlns="" val="371563066"/>
+                      <a16:colId xmlns:a16="http://schemas.microsoft.com/office/drawing/2014/main" val="371563066"/>
                     </a:ext>
                   </a:extLst>
                 </a:gridCol>
                 <a:gridCol w="3048000">
                   <a:extLst>
                     <a:ext uri="{9D8B030D-6E8A-4147-A177-3AD203B41FA5}">
-                      <a16:colId xmlns:a16="http://schemas.microsoft.com/office/drawing/2014/main" xmlns="" val="2688513847"/>
+                      <a16:colId xmlns:a16="http://schemas.microsoft.com/office/drawing/2014/main" val="2688513847"/>
                     </a:ext>
                   </a:extLst>
                 </a:gridCol>
                 <a:gridCol w="3048000">
                   <a:extLst>
                     <a:ext uri="{9D8B030D-6E8A-4147-A177-3AD203B41FA5}">
-                      <a16:colId xmlns:a16="http://schemas.microsoft.com/office/drawing/2014/main" xmlns="" val="2201978408"/>
+                      <a16:colId xmlns:a16="http://schemas.microsoft.com/office/drawing/2014/main" val="2201978408"/>
                     </a:ext>
                   </a:extLst>
                 </a:gridCol>
                 <a:gridCol w="3048000">
                   <a:extLst>
                     <a:ext uri="{9D8B030D-6E8A-4147-A177-3AD203B41FA5}">
-                      <a16:colId xmlns:a16="http://schemas.microsoft.com/office/drawing/2014/main" xmlns="" val="2181931161"/>
+                      <a16:colId xmlns:a16="http://schemas.microsoft.com/office/drawing/2014/main" val="2181931161"/>
                     </a:ext>
                   </a:extLst>
                 </a:gridCol>
@@ -3286,7 +3286,7 @@
                 </a:tc>
                 <a:extLst>
                   <a:ext uri="{0D108BD9-81ED-4DB2-BD59-A6C34878D82A}">
-                    <a16:rowId xmlns:a16="http://schemas.microsoft.com/office/drawing/2014/main" xmlns="" val="2258008607"/>
+                    <a16:rowId xmlns:a16="http://schemas.microsoft.com/office/drawing/2014/main" val="2258008607"/>
                   </a:ext>
                 </a:extLst>
               </a:tr>
@@ -3494,7 +3494,7 @@
                 </a:tc>
                 <a:extLst>
                   <a:ext uri="{0D108BD9-81ED-4DB2-BD59-A6C34878D82A}">
-                    <a16:rowId xmlns:a16="http://schemas.microsoft.com/office/drawing/2014/main" xmlns="" val="3004479924"/>
+                    <a16:rowId xmlns:a16="http://schemas.microsoft.com/office/drawing/2014/main" val="3004479924"/>
                   </a:ext>
                 </a:extLst>
               </a:tr>
@@ -3507,7 +3507,7 @@
           <p:cNvPr id="6" name="Content Placeholder 2">
             <a:extLst>
               <a:ext uri="{FF2B5EF4-FFF2-40B4-BE49-F238E27FC236}">
-                <a16:creationId xmlns:a16="http://schemas.microsoft.com/office/drawing/2014/main" xmlns="" id="{747102BF-A698-444E-B693-3BC2E2F22350}"/>
+                <a16:creationId xmlns:a16="http://schemas.microsoft.com/office/drawing/2014/main" id="{747102BF-A698-444E-B693-3BC2E2F22350}"/>
               </a:ext>
             </a:extLst>
           </p:cNvPr>
@@ -3752,7 +3752,7 @@
           <p:cNvPr id="6" name="Content Placeholder 2">
             <a:extLst>
               <a:ext uri="{FF2B5EF4-FFF2-40B4-BE49-F238E27FC236}">
-                <a16:creationId xmlns:a16="http://schemas.microsoft.com/office/drawing/2014/main" xmlns="" id="{747102BF-A698-444E-B693-3BC2E2F22350}"/>
+                <a16:creationId xmlns:a16="http://schemas.microsoft.com/office/drawing/2014/main" id="{747102BF-A698-444E-B693-3BC2E2F22350}"/>
               </a:ext>
             </a:extLst>
           </p:cNvPr>
@@ -3994,7 +3994,7 @@
           <p:cNvPr id="6" name="Content Placeholder 2">
             <a:extLst>
               <a:ext uri="{FF2B5EF4-FFF2-40B4-BE49-F238E27FC236}">
-                <a16:creationId xmlns:a16="http://schemas.microsoft.com/office/drawing/2014/main" xmlns="" id="{747102BF-A698-444E-B693-3BC2E2F22350}"/>
+                <a16:creationId xmlns:a16="http://schemas.microsoft.com/office/drawing/2014/main" id="{747102BF-A698-444E-B693-3BC2E2F22350}"/>
               </a:ext>
             </a:extLst>
           </p:cNvPr>
@@ -4236,7 +4236,7 @@
           <p:cNvPr id="6" name="Content Placeholder 2">
             <a:extLst>
               <a:ext uri="{FF2B5EF4-FFF2-40B4-BE49-F238E27FC236}">
-                <a16:creationId xmlns:a16="http://schemas.microsoft.com/office/drawing/2014/main" xmlns="" id="{747102BF-A698-444E-B693-3BC2E2F22350}"/>
+                <a16:creationId xmlns:a16="http://schemas.microsoft.com/office/drawing/2014/main" id="{747102BF-A698-444E-B693-3BC2E2F22350}"/>
               </a:ext>
             </a:extLst>
           </p:cNvPr>
@@ -4488,7 +4488,7 @@
           <p:cNvPr id="6" name="Content Placeholder 2">
             <a:extLst>
               <a:ext uri="{FF2B5EF4-FFF2-40B4-BE49-F238E27FC236}">
-                <a16:creationId xmlns:a16="http://schemas.microsoft.com/office/drawing/2014/main" xmlns="" id="{747102BF-A698-444E-B693-3BC2E2F22350}"/>
+                <a16:creationId xmlns:a16="http://schemas.microsoft.com/office/drawing/2014/main" id="{747102BF-A698-444E-B693-3BC2E2F22350}"/>
               </a:ext>
             </a:extLst>
           </p:cNvPr>
@@ -4751,7 +4751,7 @@
           <p:cNvPr id="6" name="Content Placeholder 2">
             <a:extLst>
               <a:ext uri="{FF2B5EF4-FFF2-40B4-BE49-F238E27FC236}">
-                <a16:creationId xmlns:a16="http://schemas.microsoft.com/office/drawing/2014/main" xmlns="" id="{747102BF-A698-444E-B693-3BC2E2F22350}"/>
+                <a16:creationId xmlns:a16="http://schemas.microsoft.com/office/drawing/2014/main" id="{747102BF-A698-444E-B693-3BC2E2F22350}"/>
               </a:ext>
             </a:extLst>
           </p:cNvPr>
@@ -4996,7 +4996,7 @@
           <p:cNvPr id="6" name="Content Placeholder 2">
             <a:extLst>
               <a:ext uri="{FF2B5EF4-FFF2-40B4-BE49-F238E27FC236}">
-                <a16:creationId xmlns:a16="http://schemas.microsoft.com/office/drawing/2014/main" xmlns="" id="{747102BF-A698-444E-B693-3BC2E2F22350}"/>
+                <a16:creationId xmlns:a16="http://schemas.microsoft.com/office/drawing/2014/main" id="{747102BF-A698-444E-B693-3BC2E2F22350}"/>
               </a:ext>
             </a:extLst>
           </p:cNvPr>
@@ -5203,7 +5203,7 @@
           <p:cNvPr id="5" name="Table 4">
             <a:extLst>
               <a:ext uri="{FF2B5EF4-FFF2-40B4-BE49-F238E27FC236}">
-                <a16:creationId xmlns:a16="http://schemas.microsoft.com/office/drawing/2014/main" xmlns="" id="{9CAF9F99-453D-44F1-88EC-228F7966FFE4}"/>
+                <a16:creationId xmlns:a16="http://schemas.microsoft.com/office/drawing/2014/main" id="{9CAF9F99-453D-44F1-88EC-228F7966FFE4}"/>
               </a:ext>
             </a:extLst>
           </p:cNvPr>
@@ -5232,7 +5232,7 @@
                 <a:gridCol w="9076266">
                   <a:extLst>
                     <a:ext uri="{9D8B030D-6E8A-4147-A177-3AD203B41FA5}">
-                      <a16:colId xmlns:a16="http://schemas.microsoft.com/office/drawing/2014/main" xmlns="" val="371563066"/>
+                      <a16:colId xmlns:a16="http://schemas.microsoft.com/office/drawing/2014/main" val="371563066"/>
                     </a:ext>
                   </a:extLst>
                 </a:gridCol>
@@ -5245,7 +5245,7 @@
                     <a:p>
                       <a:pPr algn="ctr" rtl="1"/>
                       <a:r>
-                        <a:rPr lang="en-US" sz="7200" b="1" dirty="0" smtClean="0">
+                        <a:rPr lang="en-US" sz="7200" b="1" dirty="0">
                           <a:solidFill>
                             <a:srgbClr val="709CC0"/>
                           </a:solidFill>
@@ -5287,7 +5287,7 @@
                 </a:tc>
                 <a:extLst>
                   <a:ext uri="{0D108BD9-81ED-4DB2-BD59-A6C34878D82A}">
-                    <a16:rowId xmlns:a16="http://schemas.microsoft.com/office/drawing/2014/main" xmlns="" val="10001"/>
+                    <a16:rowId xmlns:a16="http://schemas.microsoft.com/office/drawing/2014/main" val="10001"/>
                   </a:ext>
                 </a:extLst>
               </a:tr>
@@ -5338,7 +5338,7 @@
           <p:cNvPr id="6" name="Content Placeholder 2">
             <a:extLst>
               <a:ext uri="{FF2B5EF4-FFF2-40B4-BE49-F238E27FC236}">
-                <a16:creationId xmlns:a16="http://schemas.microsoft.com/office/drawing/2014/main" xmlns="" id="{747102BF-A698-444E-B693-3BC2E2F22350}"/>
+                <a16:creationId xmlns:a16="http://schemas.microsoft.com/office/drawing/2014/main" id="{747102BF-A698-444E-B693-3BC2E2F22350}"/>
               </a:ext>
             </a:extLst>
           </p:cNvPr>
@@ -5545,7 +5545,7 @@
           <p:cNvPr id="5" name="Table 4">
             <a:extLst>
               <a:ext uri="{FF2B5EF4-FFF2-40B4-BE49-F238E27FC236}">
-                <a16:creationId xmlns:a16="http://schemas.microsoft.com/office/drawing/2014/main" xmlns="" id="{9CAF9F99-453D-44F1-88EC-228F7966FFE4}"/>
+                <a16:creationId xmlns:a16="http://schemas.microsoft.com/office/drawing/2014/main" id="{9CAF9F99-453D-44F1-88EC-228F7966FFE4}"/>
               </a:ext>
             </a:extLst>
           </p:cNvPr>
@@ -5574,14 +5574,14 @@
                 <a:gridCol w="4521200">
                   <a:extLst>
                     <a:ext uri="{9D8B030D-6E8A-4147-A177-3AD203B41FA5}">
-                      <a16:colId xmlns:a16="http://schemas.microsoft.com/office/drawing/2014/main" xmlns="" val="371563066"/>
+                      <a16:colId xmlns:a16="http://schemas.microsoft.com/office/drawing/2014/main" val="371563066"/>
                     </a:ext>
                   </a:extLst>
                 </a:gridCol>
                 <a:gridCol w="4555066">
                   <a:extLst>
                     <a:ext uri="{9D8B030D-6E8A-4147-A177-3AD203B41FA5}">
-                      <a16:colId xmlns:a16="http://schemas.microsoft.com/office/drawing/2014/main" xmlns="" val="2181931161"/>
+                      <a16:colId xmlns:a16="http://schemas.microsoft.com/office/drawing/2014/main" val="2181931161"/>
                     </a:ext>
                   </a:extLst>
                 </a:gridCol>
@@ -5716,7 +5716,7 @@
                 </a:tc>
                 <a:extLst>
                   <a:ext uri="{0D108BD9-81ED-4DB2-BD59-A6C34878D82A}">
-                    <a16:rowId xmlns:a16="http://schemas.microsoft.com/office/drawing/2014/main" xmlns="" val="10001"/>
+                    <a16:rowId xmlns:a16="http://schemas.microsoft.com/office/drawing/2014/main" val="10001"/>
                   </a:ext>
                 </a:extLst>
               </a:tr>
@@ -5767,7 +5767,7 @@
           <p:cNvPr id="6" name="Content Placeholder 2">
             <a:extLst>
               <a:ext uri="{FF2B5EF4-FFF2-40B4-BE49-F238E27FC236}">
-                <a16:creationId xmlns:a16="http://schemas.microsoft.com/office/drawing/2014/main" xmlns="" id="{747102BF-A698-444E-B693-3BC2E2F22350}"/>
+                <a16:creationId xmlns:a16="http://schemas.microsoft.com/office/drawing/2014/main" id="{747102BF-A698-444E-B693-3BC2E2F22350}"/>
               </a:ext>
             </a:extLst>
           </p:cNvPr>
@@ -5974,7 +5974,7 @@
           <p:cNvPr id="5" name="Table 4">
             <a:extLst>
               <a:ext uri="{FF2B5EF4-FFF2-40B4-BE49-F238E27FC236}">
-                <a16:creationId xmlns:a16="http://schemas.microsoft.com/office/drawing/2014/main" xmlns="" id="{9CAF9F99-453D-44F1-88EC-228F7966FFE4}"/>
+                <a16:creationId xmlns:a16="http://schemas.microsoft.com/office/drawing/2014/main" id="{9CAF9F99-453D-44F1-88EC-228F7966FFE4}"/>
               </a:ext>
             </a:extLst>
           </p:cNvPr>
@@ -6003,14 +6003,14 @@
                 <a:gridCol w="4521200">
                   <a:extLst>
                     <a:ext uri="{9D8B030D-6E8A-4147-A177-3AD203B41FA5}">
-                      <a16:colId xmlns:a16="http://schemas.microsoft.com/office/drawing/2014/main" xmlns="" val="371563066"/>
+                      <a16:colId xmlns:a16="http://schemas.microsoft.com/office/drawing/2014/main" val="371563066"/>
                     </a:ext>
                   </a:extLst>
                 </a:gridCol>
                 <a:gridCol w="4555066">
                   <a:extLst>
                     <a:ext uri="{9D8B030D-6E8A-4147-A177-3AD203B41FA5}">
-                      <a16:colId xmlns:a16="http://schemas.microsoft.com/office/drawing/2014/main" xmlns="" val="2181931161"/>
+                      <a16:colId xmlns:a16="http://schemas.microsoft.com/office/drawing/2014/main" val="2181931161"/>
                     </a:ext>
                   </a:extLst>
                 </a:gridCol>
@@ -6146,7 +6146,7 @@
                 </a:tc>
                 <a:extLst>
                   <a:ext uri="{0D108BD9-81ED-4DB2-BD59-A6C34878D82A}">
-                    <a16:rowId xmlns:a16="http://schemas.microsoft.com/office/drawing/2014/main" xmlns="" val="10001"/>
+                    <a16:rowId xmlns:a16="http://schemas.microsoft.com/office/drawing/2014/main" val="10001"/>
                   </a:ext>
                 </a:extLst>
               </a:tr>
@@ -6357,7 +6357,7 @@
           <p:cNvPr id="6" name="Content Placeholder 2">
             <a:extLst>
               <a:ext uri="{FF2B5EF4-FFF2-40B4-BE49-F238E27FC236}">
-                <a16:creationId xmlns:a16="http://schemas.microsoft.com/office/drawing/2014/main" xmlns="" id="{747102BF-A698-444E-B693-3BC2E2F22350}"/>
+                <a16:creationId xmlns:a16="http://schemas.microsoft.com/office/drawing/2014/main" id="{747102BF-A698-444E-B693-3BC2E2F22350}"/>
               </a:ext>
             </a:extLst>
           </p:cNvPr>
@@ -6614,15 +6614,7 @@
             </a:pPr>
             <a:r>
               <a:rPr lang="he-IL" sz="3200" dirty="0"/>
-              <a:t>אחר כך תנסו לזהות </a:t>
-            </a:r>
-            <a:r>
-              <a:rPr lang="he-IL" sz="3200" b="1" dirty="0"/>
-              <a:t>מהר ככל האפשר </a:t>
-            </a:r>
-            <a:r>
-              <a:rPr lang="he-IL" sz="3200" dirty="0"/>
-              <a:t>את המילה הממוסכת (זאת שהוצגה </a:t>
+              <a:t>אחר כך תנסו לזהות את המילה הממוסכת (זאת שהוצגה </a:t>
             </a:r>
             <a:r>
               <a:rPr lang="he-IL" sz="3200" b="1" u="sng" dirty="0"/>
@@ -6640,7 +6632,7 @@
             </a:pPr>
             <a:r>
               <a:rPr lang="he-IL" sz="3200" dirty="0"/>
-              <a:t>לבסוף תצטרכו לדרג (ללא מגבלת זמן) עד כמה ראיתם את המילה הממוסכת מ1 עד 4:</a:t>
+              <a:t>לבסוף תצטרכו לדרג עד כמה ראיתם את המילה הממוסכת מ1 עד 4:</a:t>
             </a:r>
           </a:p>
           <a:p>
@@ -6739,7 +6731,7 @@
           <p:cNvPr id="6" name="Content Placeholder 2">
             <a:extLst>
               <a:ext uri="{FF2B5EF4-FFF2-40B4-BE49-F238E27FC236}">
-                <a16:creationId xmlns:a16="http://schemas.microsoft.com/office/drawing/2014/main" xmlns="" id="{747102BF-A698-444E-B693-3BC2E2F22350}"/>
+                <a16:creationId xmlns:a16="http://schemas.microsoft.com/office/drawing/2014/main" id="{747102BF-A698-444E-B693-3BC2E2F22350}"/>
               </a:ext>
             </a:extLst>
           </p:cNvPr>
@@ -6991,7 +6983,7 @@
           <p:cNvPr id="6" name="Content Placeholder 2">
             <a:extLst>
               <a:ext uri="{FF2B5EF4-FFF2-40B4-BE49-F238E27FC236}">
-                <a16:creationId xmlns:a16="http://schemas.microsoft.com/office/drawing/2014/main" xmlns="" id="{747102BF-A698-444E-B693-3BC2E2F22350}"/>
+                <a16:creationId xmlns:a16="http://schemas.microsoft.com/office/drawing/2014/main" id="{747102BF-A698-444E-B693-3BC2E2F22350}"/>
               </a:ext>
             </a:extLst>
           </p:cNvPr>
@@ -7233,7 +7225,7 @@
           <p:cNvPr id="6" name="Content Placeholder 2">
             <a:extLst>
               <a:ext uri="{FF2B5EF4-FFF2-40B4-BE49-F238E27FC236}">
-                <a16:creationId xmlns:a16="http://schemas.microsoft.com/office/drawing/2014/main" xmlns="" id="{747102BF-A698-444E-B693-3BC2E2F22350}"/>
+                <a16:creationId xmlns:a16="http://schemas.microsoft.com/office/drawing/2014/main" id="{747102BF-A698-444E-B693-3BC2E2F22350}"/>
               </a:ext>
             </a:extLst>
           </p:cNvPr>
@@ -7485,7 +7477,7 @@
           <p:cNvPr id="6" name="Content Placeholder 2">
             <a:extLst>
               <a:ext uri="{FF2B5EF4-FFF2-40B4-BE49-F238E27FC236}">
-                <a16:creationId xmlns:a16="http://schemas.microsoft.com/office/drawing/2014/main" xmlns="" id="{747102BF-A698-444E-B693-3BC2E2F22350}"/>
+                <a16:creationId xmlns:a16="http://schemas.microsoft.com/office/drawing/2014/main" id="{747102BF-A698-444E-B693-3BC2E2F22350}"/>
               </a:ext>
             </a:extLst>
           </p:cNvPr>
@@ -7695,7 +7687,7 @@
           <p:cNvPr id="5" name="Table 4">
             <a:extLst>
               <a:ext uri="{FF2B5EF4-FFF2-40B4-BE49-F238E27FC236}">
-                <a16:creationId xmlns:a16="http://schemas.microsoft.com/office/drawing/2014/main" xmlns="" id="{9CAF9F99-453D-44F1-88EC-228F7966FFE4}"/>
+                <a16:creationId xmlns:a16="http://schemas.microsoft.com/office/drawing/2014/main" id="{9CAF9F99-453D-44F1-88EC-228F7966FFE4}"/>
               </a:ext>
             </a:extLst>
           </p:cNvPr>
@@ -7724,14 +7716,14 @@
                 <a:gridCol w="4521200">
                   <a:extLst>
                     <a:ext uri="{9D8B030D-6E8A-4147-A177-3AD203B41FA5}">
-                      <a16:colId xmlns:a16="http://schemas.microsoft.com/office/drawing/2014/main" xmlns="" val="371563066"/>
+                      <a16:colId xmlns:a16="http://schemas.microsoft.com/office/drawing/2014/main" val="371563066"/>
                     </a:ext>
                   </a:extLst>
                 </a:gridCol>
                 <a:gridCol w="4555066">
                   <a:extLst>
                     <a:ext uri="{9D8B030D-6E8A-4147-A177-3AD203B41FA5}">
-                      <a16:colId xmlns:a16="http://schemas.microsoft.com/office/drawing/2014/main" xmlns="" val="2181931161"/>
+                      <a16:colId xmlns:a16="http://schemas.microsoft.com/office/drawing/2014/main" val="2181931161"/>
                     </a:ext>
                   </a:extLst>
                 </a:gridCol>
@@ -7869,7 +7861,7 @@
                 </a:tc>
                 <a:extLst>
                   <a:ext uri="{0D108BD9-81ED-4DB2-BD59-A6C34878D82A}">
-                    <a16:rowId xmlns:a16="http://schemas.microsoft.com/office/drawing/2014/main" xmlns="" val="2258008607"/>
+                    <a16:rowId xmlns:a16="http://schemas.microsoft.com/office/drawing/2014/main" val="2258008607"/>
                   </a:ext>
                 </a:extLst>
               </a:tr>
@@ -7882,7 +7874,7 @@
           <p:cNvPr id="7" name="Table 6">
             <a:extLst>
               <a:ext uri="{FF2B5EF4-FFF2-40B4-BE49-F238E27FC236}">
-                <a16:creationId xmlns:a16="http://schemas.microsoft.com/office/drawing/2014/main" xmlns="" id="{9CAF9F99-453D-44F1-88EC-228F7966FFE4}"/>
+                <a16:creationId xmlns:a16="http://schemas.microsoft.com/office/drawing/2014/main" id="{9CAF9F99-453D-44F1-88EC-228F7966FFE4}"/>
               </a:ext>
             </a:extLst>
           </p:cNvPr>
@@ -7911,14 +7903,14 @@
                 <a:gridCol w="4521200">
                   <a:extLst>
                     <a:ext uri="{9D8B030D-6E8A-4147-A177-3AD203B41FA5}">
-                      <a16:colId xmlns:a16="http://schemas.microsoft.com/office/drawing/2014/main" xmlns="" val="371563066"/>
+                      <a16:colId xmlns:a16="http://schemas.microsoft.com/office/drawing/2014/main" val="371563066"/>
                     </a:ext>
                   </a:extLst>
                 </a:gridCol>
                 <a:gridCol w="4555066">
                   <a:extLst>
                     <a:ext uri="{9D8B030D-6E8A-4147-A177-3AD203B41FA5}">
-                      <a16:colId xmlns:a16="http://schemas.microsoft.com/office/drawing/2014/main" xmlns="" val="2181931161"/>
+                      <a16:colId xmlns:a16="http://schemas.microsoft.com/office/drawing/2014/main" val="2181931161"/>
                     </a:ext>
                   </a:extLst>
                 </a:gridCol>
@@ -8070,7 +8062,7 @@
                 </a:tc>
                 <a:extLst>
                   <a:ext uri="{0D108BD9-81ED-4DB2-BD59-A6C34878D82A}">
-                    <a16:rowId xmlns:a16="http://schemas.microsoft.com/office/drawing/2014/main" xmlns="" val="10001"/>
+                    <a16:rowId xmlns:a16="http://schemas.microsoft.com/office/drawing/2014/main" val="10001"/>
                   </a:ext>
                 </a:extLst>
               </a:tr>
@@ -8121,7 +8113,7 @@
           <p:cNvPr id="5" name="Content Placeholder 2">
             <a:extLst>
               <a:ext uri="{FF2B5EF4-FFF2-40B4-BE49-F238E27FC236}">
-                <a16:creationId xmlns:a16="http://schemas.microsoft.com/office/drawing/2014/main" xmlns="" id="{747102BF-A698-444E-B693-3BC2E2F22350}"/>
+                <a16:creationId xmlns:a16="http://schemas.microsoft.com/office/drawing/2014/main" id="{747102BF-A698-444E-B693-3BC2E2F22350}"/>
               </a:ext>
             </a:extLst>
           </p:cNvPr>
@@ -8350,7 +8342,7 @@
           <p:cNvPr id="7" name="Table 6">
             <a:extLst>
               <a:ext uri="{FF2B5EF4-FFF2-40B4-BE49-F238E27FC236}">
-                <a16:creationId xmlns:a16="http://schemas.microsoft.com/office/drawing/2014/main" xmlns="" id="{9CAF9F99-453D-44F1-88EC-228F7966FFE4}"/>
+                <a16:creationId xmlns:a16="http://schemas.microsoft.com/office/drawing/2014/main" id="{9CAF9F99-453D-44F1-88EC-228F7966FFE4}"/>
               </a:ext>
             </a:extLst>
           </p:cNvPr>
@@ -8379,14 +8371,14 @@
                 <a:gridCol w="4521200">
                   <a:extLst>
                     <a:ext uri="{9D8B030D-6E8A-4147-A177-3AD203B41FA5}">
-                      <a16:colId xmlns:a16="http://schemas.microsoft.com/office/drawing/2014/main" xmlns="" val="371563066"/>
+                      <a16:colId xmlns:a16="http://schemas.microsoft.com/office/drawing/2014/main" val="371563066"/>
                     </a:ext>
                   </a:extLst>
                 </a:gridCol>
                 <a:gridCol w="4555066">
                   <a:extLst>
                     <a:ext uri="{9D8B030D-6E8A-4147-A177-3AD203B41FA5}">
-                      <a16:colId xmlns:a16="http://schemas.microsoft.com/office/drawing/2014/main" xmlns="" val="2181931161"/>
+                      <a16:colId xmlns:a16="http://schemas.microsoft.com/office/drawing/2014/main" val="2181931161"/>
                     </a:ext>
                   </a:extLst>
                 </a:gridCol>
@@ -8548,7 +8540,7 @@
                 </a:tc>
                 <a:extLst>
                   <a:ext uri="{0D108BD9-81ED-4DB2-BD59-A6C34878D82A}">
-                    <a16:rowId xmlns:a16="http://schemas.microsoft.com/office/drawing/2014/main" xmlns="" val="2258008607"/>
+                    <a16:rowId xmlns:a16="http://schemas.microsoft.com/office/drawing/2014/main" val="2258008607"/>
                   </a:ext>
                 </a:extLst>
               </a:tr>
@@ -8561,7 +8553,7 @@
           <p:cNvPr id="8" name="Table 7">
             <a:extLst>
               <a:ext uri="{FF2B5EF4-FFF2-40B4-BE49-F238E27FC236}">
-                <a16:creationId xmlns:a16="http://schemas.microsoft.com/office/drawing/2014/main" xmlns="" id="{9CAF9F99-453D-44F1-88EC-228F7966FFE4}"/>
+                <a16:creationId xmlns:a16="http://schemas.microsoft.com/office/drawing/2014/main" id="{9CAF9F99-453D-44F1-88EC-228F7966FFE4}"/>
               </a:ext>
             </a:extLst>
           </p:cNvPr>
@@ -8590,14 +8582,14 @@
                 <a:gridCol w="4521200">
                   <a:extLst>
                     <a:ext uri="{9D8B030D-6E8A-4147-A177-3AD203B41FA5}">
-                      <a16:colId xmlns:a16="http://schemas.microsoft.com/office/drawing/2014/main" xmlns="" val="371563066"/>
+                      <a16:colId xmlns:a16="http://schemas.microsoft.com/office/drawing/2014/main" val="371563066"/>
                     </a:ext>
                   </a:extLst>
                 </a:gridCol>
                 <a:gridCol w="4555066">
                   <a:extLst>
                     <a:ext uri="{9D8B030D-6E8A-4147-A177-3AD203B41FA5}">
-                      <a16:colId xmlns:a16="http://schemas.microsoft.com/office/drawing/2014/main" xmlns="" val="2181931161"/>
+                      <a16:colId xmlns:a16="http://schemas.microsoft.com/office/drawing/2014/main" val="2181931161"/>
                     </a:ext>
                   </a:extLst>
                 </a:gridCol>
@@ -8749,7 +8741,7 @@
                 </a:tc>
                 <a:extLst>
                   <a:ext uri="{0D108BD9-81ED-4DB2-BD59-A6C34878D82A}">
-                    <a16:rowId xmlns:a16="http://schemas.microsoft.com/office/drawing/2014/main" xmlns="" val="10001"/>
+                    <a16:rowId xmlns:a16="http://schemas.microsoft.com/office/drawing/2014/main" val="10001"/>
                   </a:ext>
                 </a:extLst>
               </a:tr>
@@ -8800,7 +8792,7 @@
           <p:cNvPr id="6" name="Content Placeholder 2">
             <a:extLst>
               <a:ext uri="{FF2B5EF4-FFF2-40B4-BE49-F238E27FC236}">
-                <a16:creationId xmlns:a16="http://schemas.microsoft.com/office/drawing/2014/main" xmlns="" id="{747102BF-A698-444E-B693-3BC2E2F22350}"/>
+                <a16:creationId xmlns:a16="http://schemas.microsoft.com/office/drawing/2014/main" id="{747102BF-A698-444E-B693-3BC2E2F22350}"/>
               </a:ext>
             </a:extLst>
           </p:cNvPr>
@@ -9007,7 +8999,7 @@
           <p:cNvPr id="5" name="Table 4">
             <a:extLst>
               <a:ext uri="{FF2B5EF4-FFF2-40B4-BE49-F238E27FC236}">
-                <a16:creationId xmlns:a16="http://schemas.microsoft.com/office/drawing/2014/main" xmlns="" id="{9CAF9F99-453D-44F1-88EC-228F7966FFE4}"/>
+                <a16:creationId xmlns:a16="http://schemas.microsoft.com/office/drawing/2014/main" id="{9CAF9F99-453D-44F1-88EC-228F7966FFE4}"/>
               </a:ext>
             </a:extLst>
           </p:cNvPr>
@@ -9036,14 +9028,14 @@
                 <a:gridCol w="4521200">
                   <a:extLst>
                     <a:ext uri="{9D8B030D-6E8A-4147-A177-3AD203B41FA5}">
-                      <a16:colId xmlns:a16="http://schemas.microsoft.com/office/drawing/2014/main" xmlns="" val="371563066"/>
+                      <a16:colId xmlns:a16="http://schemas.microsoft.com/office/drawing/2014/main" val="371563066"/>
                     </a:ext>
                   </a:extLst>
                 </a:gridCol>
                 <a:gridCol w="4555066">
                   <a:extLst>
                     <a:ext uri="{9D8B030D-6E8A-4147-A177-3AD203B41FA5}">
-                      <a16:colId xmlns:a16="http://schemas.microsoft.com/office/drawing/2014/main" xmlns="" val="2181931161"/>
+                      <a16:colId xmlns:a16="http://schemas.microsoft.com/office/drawing/2014/main" val="2181931161"/>
                     </a:ext>
                   </a:extLst>
                 </a:gridCol>
@@ -9195,7 +9187,7 @@
                 </a:tc>
                 <a:extLst>
                   <a:ext uri="{0D108BD9-81ED-4DB2-BD59-A6C34878D82A}">
-                    <a16:rowId xmlns:a16="http://schemas.microsoft.com/office/drawing/2014/main" xmlns="" val="10001"/>
+                    <a16:rowId xmlns:a16="http://schemas.microsoft.com/office/drawing/2014/main" val="10001"/>
                   </a:ext>
                 </a:extLst>
               </a:tr>

</xml_diff>

<commit_message>
Added parameters | Changed wait stim duration to 3/4 refrate
</commit_message>
<xml_diff>
--- a/experiment/RUN_ME/stimuli/instructions presentation.pptx
+++ b/experiment/RUN_ME/stimuli/instructions presentation.pptx
@@ -19,12 +19,13 @@
     <p:sldId id="309" r:id="rId13"/>
     <p:sldId id="306" r:id="rId14"/>
     <p:sldId id="299" r:id="rId15"/>
-    <p:sldId id="312" r:id="rId16"/>
-    <p:sldId id="315" r:id="rId17"/>
-    <p:sldId id="313" r:id="rId18"/>
-    <p:sldId id="314" r:id="rId19"/>
-    <p:sldId id="310" r:id="rId20"/>
-    <p:sldId id="311" r:id="rId21"/>
+    <p:sldId id="316" r:id="rId16"/>
+    <p:sldId id="312" r:id="rId17"/>
+    <p:sldId id="315" r:id="rId18"/>
+    <p:sldId id="313" r:id="rId19"/>
+    <p:sldId id="314" r:id="rId20"/>
+    <p:sldId id="310" r:id="rId21"/>
+    <p:sldId id="311" r:id="rId22"/>
   </p:sldIdLst>
   <p:sldSz cx="12192000" cy="6858000"/>
   <p:notesSz cx="6858000" cy="9144000"/>
@@ -260,7 +261,7 @@
           <a:p>
             <a:fld id="{F999E2B6-E0C8-4E2F-B37B-1FC830B33272}" type="datetimeFigureOut">
               <a:rPr lang="en-US" smtClean="0"/>
-              <a:t>3/7/2021</a:t>
+              <a:t>3/14/2021</a:t>
             </a:fld>
             <a:endParaRPr lang="en-US"/>
           </a:p>
@@ -428,7 +429,7 @@
           <a:p>
             <a:fld id="{F999E2B6-E0C8-4E2F-B37B-1FC830B33272}" type="datetimeFigureOut">
               <a:rPr lang="en-US" smtClean="0"/>
-              <a:t>3/7/2021</a:t>
+              <a:t>3/14/2021</a:t>
             </a:fld>
             <a:endParaRPr lang="en-US"/>
           </a:p>
@@ -606,7 +607,7 @@
           <a:p>
             <a:fld id="{F999E2B6-E0C8-4E2F-B37B-1FC830B33272}" type="datetimeFigureOut">
               <a:rPr lang="en-US" smtClean="0"/>
-              <a:t>3/7/2021</a:t>
+              <a:t>3/14/2021</a:t>
             </a:fld>
             <a:endParaRPr lang="en-US"/>
           </a:p>
@@ -774,7 +775,7 @@
           <a:p>
             <a:fld id="{F999E2B6-E0C8-4E2F-B37B-1FC830B33272}" type="datetimeFigureOut">
               <a:rPr lang="en-US" smtClean="0"/>
-              <a:t>3/7/2021</a:t>
+              <a:t>3/14/2021</a:t>
             </a:fld>
             <a:endParaRPr lang="en-US"/>
           </a:p>
@@ -1019,7 +1020,7 @@
           <a:p>
             <a:fld id="{F999E2B6-E0C8-4E2F-B37B-1FC830B33272}" type="datetimeFigureOut">
               <a:rPr lang="en-US" smtClean="0"/>
-              <a:t>3/7/2021</a:t>
+              <a:t>3/14/2021</a:t>
             </a:fld>
             <a:endParaRPr lang="en-US"/>
           </a:p>
@@ -1248,7 +1249,7 @@
           <a:p>
             <a:fld id="{F999E2B6-E0C8-4E2F-B37B-1FC830B33272}" type="datetimeFigureOut">
               <a:rPr lang="en-US" smtClean="0"/>
-              <a:t>3/7/2021</a:t>
+              <a:t>3/14/2021</a:t>
             </a:fld>
             <a:endParaRPr lang="en-US"/>
           </a:p>
@@ -1612,7 +1613,7 @@
           <a:p>
             <a:fld id="{F999E2B6-E0C8-4E2F-B37B-1FC830B33272}" type="datetimeFigureOut">
               <a:rPr lang="en-US" smtClean="0"/>
-              <a:t>3/7/2021</a:t>
+              <a:t>3/14/2021</a:t>
             </a:fld>
             <a:endParaRPr lang="en-US"/>
           </a:p>
@@ -1729,7 +1730,7 @@
           <a:p>
             <a:fld id="{F999E2B6-E0C8-4E2F-B37B-1FC830B33272}" type="datetimeFigureOut">
               <a:rPr lang="en-US" smtClean="0"/>
-              <a:t>3/7/2021</a:t>
+              <a:t>3/14/2021</a:t>
             </a:fld>
             <a:endParaRPr lang="en-US"/>
           </a:p>
@@ -1824,7 +1825,7 @@
           <a:p>
             <a:fld id="{F999E2B6-E0C8-4E2F-B37B-1FC830B33272}" type="datetimeFigureOut">
               <a:rPr lang="en-US" smtClean="0"/>
-              <a:t>3/7/2021</a:t>
+              <a:t>3/14/2021</a:t>
             </a:fld>
             <a:endParaRPr lang="en-US"/>
           </a:p>
@@ -2099,7 +2100,7 @@
           <a:p>
             <a:fld id="{F999E2B6-E0C8-4E2F-B37B-1FC830B33272}" type="datetimeFigureOut">
               <a:rPr lang="en-US" smtClean="0"/>
-              <a:t>3/7/2021</a:t>
+              <a:t>3/14/2021</a:t>
             </a:fld>
             <a:endParaRPr lang="en-US"/>
           </a:p>
@@ -2351,7 +2352,7 @@
           <a:p>
             <a:fld id="{F999E2B6-E0C8-4E2F-B37B-1FC830B33272}" type="datetimeFigureOut">
               <a:rPr lang="en-US" smtClean="0"/>
-              <a:t>3/7/2021</a:t>
+              <a:t>3/14/2021</a:t>
             </a:fld>
             <a:endParaRPr lang="en-US"/>
           </a:p>
@@ -2562,7 +2563,7 @@
           <a:p>
             <a:fld id="{F999E2B6-E0C8-4E2F-B37B-1FC830B33272}" type="datetimeFigureOut">
               <a:rPr lang="en-US" smtClean="0"/>
-              <a:t>3/7/2021</a:t>
+              <a:t>3/14/2021</a:t>
             </a:fld>
             <a:endParaRPr lang="en-US"/>
           </a:p>
@@ -3060,7 +3061,7 @@
           <p:cNvPr id="2" name="Table 2">
             <a:extLst>
               <a:ext uri="{FF2B5EF4-FFF2-40B4-BE49-F238E27FC236}">
-                <a16:creationId xmlns:a16="http://schemas.microsoft.com/office/drawing/2014/main" id="{9768F41E-FF16-4CA0-9061-785C57DCD75D}"/>
+                <a16:creationId xmlns:a16="http://schemas.microsoft.com/office/drawing/2014/main" xmlns="" id="{9768F41E-FF16-4CA0-9061-785C57DCD75D}"/>
               </a:ext>
             </a:extLst>
           </p:cNvPr>
@@ -3089,28 +3090,28 @@
                 <a:gridCol w="3048000">
                   <a:extLst>
                     <a:ext uri="{9D8B030D-6E8A-4147-A177-3AD203B41FA5}">
-                      <a16:colId xmlns:a16="http://schemas.microsoft.com/office/drawing/2014/main" val="371563066"/>
+                      <a16:colId xmlns:a16="http://schemas.microsoft.com/office/drawing/2014/main" xmlns="" val="371563066"/>
                     </a:ext>
                   </a:extLst>
                 </a:gridCol>
                 <a:gridCol w="3048000">
                   <a:extLst>
                     <a:ext uri="{9D8B030D-6E8A-4147-A177-3AD203B41FA5}">
-                      <a16:colId xmlns:a16="http://schemas.microsoft.com/office/drawing/2014/main" val="2688513847"/>
+                      <a16:colId xmlns:a16="http://schemas.microsoft.com/office/drawing/2014/main" xmlns="" val="2688513847"/>
                     </a:ext>
                   </a:extLst>
                 </a:gridCol>
                 <a:gridCol w="3048000">
                   <a:extLst>
                     <a:ext uri="{9D8B030D-6E8A-4147-A177-3AD203B41FA5}">
-                      <a16:colId xmlns:a16="http://schemas.microsoft.com/office/drawing/2014/main" val="2201978408"/>
+                      <a16:colId xmlns:a16="http://schemas.microsoft.com/office/drawing/2014/main" xmlns="" val="2201978408"/>
                     </a:ext>
                   </a:extLst>
                 </a:gridCol>
                 <a:gridCol w="3048000">
                   <a:extLst>
                     <a:ext uri="{9D8B030D-6E8A-4147-A177-3AD203B41FA5}">
-                      <a16:colId xmlns:a16="http://schemas.microsoft.com/office/drawing/2014/main" val="2181931161"/>
+                      <a16:colId xmlns:a16="http://schemas.microsoft.com/office/drawing/2014/main" xmlns="" val="2181931161"/>
                     </a:ext>
                   </a:extLst>
                 </a:gridCol>
@@ -3286,7 +3287,7 @@
                 </a:tc>
                 <a:extLst>
                   <a:ext uri="{0D108BD9-81ED-4DB2-BD59-A6C34878D82A}">
-                    <a16:rowId xmlns:a16="http://schemas.microsoft.com/office/drawing/2014/main" val="2258008607"/>
+                    <a16:rowId xmlns:a16="http://schemas.microsoft.com/office/drawing/2014/main" xmlns="" val="2258008607"/>
                   </a:ext>
                 </a:extLst>
               </a:tr>
@@ -3494,7 +3495,7 @@
                 </a:tc>
                 <a:extLst>
                   <a:ext uri="{0D108BD9-81ED-4DB2-BD59-A6C34878D82A}">
-                    <a16:rowId xmlns:a16="http://schemas.microsoft.com/office/drawing/2014/main" val="3004479924"/>
+                    <a16:rowId xmlns:a16="http://schemas.microsoft.com/office/drawing/2014/main" xmlns="" val="3004479924"/>
                   </a:ext>
                 </a:extLst>
               </a:tr>
@@ -3507,7 +3508,7 @@
           <p:cNvPr id="6" name="Content Placeholder 2">
             <a:extLst>
               <a:ext uri="{FF2B5EF4-FFF2-40B4-BE49-F238E27FC236}">
-                <a16:creationId xmlns:a16="http://schemas.microsoft.com/office/drawing/2014/main" id="{747102BF-A698-444E-B693-3BC2E2F22350}"/>
+                <a16:creationId xmlns:a16="http://schemas.microsoft.com/office/drawing/2014/main" xmlns="" id="{747102BF-A698-444E-B693-3BC2E2F22350}"/>
               </a:ext>
             </a:extLst>
           </p:cNvPr>
@@ -3752,7 +3753,7 @@
           <p:cNvPr id="6" name="Content Placeholder 2">
             <a:extLst>
               <a:ext uri="{FF2B5EF4-FFF2-40B4-BE49-F238E27FC236}">
-                <a16:creationId xmlns:a16="http://schemas.microsoft.com/office/drawing/2014/main" id="{747102BF-A698-444E-B693-3BC2E2F22350}"/>
+                <a16:creationId xmlns:a16="http://schemas.microsoft.com/office/drawing/2014/main" xmlns="" id="{747102BF-A698-444E-B693-3BC2E2F22350}"/>
               </a:ext>
             </a:extLst>
           </p:cNvPr>
@@ -3994,7 +3995,7 @@
           <p:cNvPr id="6" name="Content Placeholder 2">
             <a:extLst>
               <a:ext uri="{FF2B5EF4-FFF2-40B4-BE49-F238E27FC236}">
-                <a16:creationId xmlns:a16="http://schemas.microsoft.com/office/drawing/2014/main" id="{747102BF-A698-444E-B693-3BC2E2F22350}"/>
+                <a16:creationId xmlns:a16="http://schemas.microsoft.com/office/drawing/2014/main" xmlns="" id="{747102BF-A698-444E-B693-3BC2E2F22350}"/>
               </a:ext>
             </a:extLst>
           </p:cNvPr>
@@ -4236,7 +4237,7 @@
           <p:cNvPr id="6" name="Content Placeholder 2">
             <a:extLst>
               <a:ext uri="{FF2B5EF4-FFF2-40B4-BE49-F238E27FC236}">
-                <a16:creationId xmlns:a16="http://schemas.microsoft.com/office/drawing/2014/main" id="{747102BF-A698-444E-B693-3BC2E2F22350}"/>
+                <a16:creationId xmlns:a16="http://schemas.microsoft.com/office/drawing/2014/main" xmlns="" id="{747102BF-A698-444E-B693-3BC2E2F22350}"/>
               </a:ext>
             </a:extLst>
           </p:cNvPr>
@@ -4488,7 +4489,7 @@
           <p:cNvPr id="6" name="Content Placeholder 2">
             <a:extLst>
               <a:ext uri="{FF2B5EF4-FFF2-40B4-BE49-F238E27FC236}">
-                <a16:creationId xmlns:a16="http://schemas.microsoft.com/office/drawing/2014/main" id="{747102BF-A698-444E-B693-3BC2E2F22350}"/>
+                <a16:creationId xmlns:a16="http://schemas.microsoft.com/office/drawing/2014/main" xmlns="" id="{747102BF-A698-444E-B693-3BC2E2F22350}"/>
               </a:ext>
             </a:extLst>
           </p:cNvPr>
@@ -4751,7 +4752,7 @@
           <p:cNvPr id="6" name="Content Placeholder 2">
             <a:extLst>
               <a:ext uri="{FF2B5EF4-FFF2-40B4-BE49-F238E27FC236}">
-                <a16:creationId xmlns:a16="http://schemas.microsoft.com/office/drawing/2014/main" id="{747102BF-A698-444E-B693-3BC2E2F22350}"/>
+                <a16:creationId xmlns:a16="http://schemas.microsoft.com/office/drawing/2014/main" xmlns="" id="{747102BF-A698-444E-B693-3BC2E2F22350}"/>
               </a:ext>
             </a:extLst>
           </p:cNvPr>
@@ -4762,12 +4763,13 @@
         </p:nvSpPr>
         <p:spPr>
           <a:xfrm>
-            <a:off x="691816" y="223312"/>
-            <a:ext cx="10808368" cy="1155796"/>
+            <a:off x="691816" y="2567213"/>
+            <a:ext cx="10808368" cy="1723573"/>
           </a:xfrm>
           <a:prstGeom prst="rect">
             <a:avLst/>
           </a:prstGeom>
+          <a:noFill/>
         </p:spPr>
         <p:txBody>
           <a:bodyPr vert="horz" lIns="91440" tIns="45720" rIns="91440" bIns="45720" rtlCol="0">
@@ -4943,20 +4945,27 @@
               <a:buNone/>
             </a:pPr>
             <a:r>
-              <a:rPr lang="he-IL" sz="3200" b="1" u="sng" dirty="0">
-                <a:solidFill>
-                  <a:srgbClr val="595959"/>
-                </a:solidFill>
-              </a:rPr>
-              <a:t>הנח את האצבע בנקודת ההתחלה ואז לחץ רווח פעם אחת</a:t>
-            </a:r>
+              <a:rPr lang="he-IL" sz="3200" dirty="0" smtClean="0"/>
+              <a:t>הנתונים נשמרים,</a:t>
+            </a:r>
+          </a:p>
+          <a:p>
+            <a:pPr marL="0" indent="0" algn="ctr" rtl="1">
+              <a:buFont typeface="Arial" panose="020B0604020202020204" pitchFamily="34" charset="0"/>
+              <a:buNone/>
+            </a:pPr>
+            <a:r>
+              <a:rPr lang="he-IL" sz="3200" dirty="0" smtClean="0"/>
+              <a:t>אנא המתן והמנע מללחוץ על מקשים כלשהם</a:t>
+            </a:r>
+            <a:endParaRPr lang="en-US" sz="1300" dirty="0"/>
           </a:p>
         </p:txBody>
       </p:sp>
     </p:spTree>
     <p:extLst>
       <p:ext uri="{BB962C8B-B14F-4D97-AF65-F5344CB8AC3E}">
-        <p14:creationId xmlns:p14="http://schemas.microsoft.com/office/powerpoint/2010/main" val="1581616032"/>
+        <p14:creationId xmlns:p14="http://schemas.microsoft.com/office/powerpoint/2010/main" val="2217358485"/>
       </p:ext>
     </p:extLst>
   </p:cSld>
@@ -4996,7 +5005,7 @@
           <p:cNvPr id="6" name="Content Placeholder 2">
             <a:extLst>
               <a:ext uri="{FF2B5EF4-FFF2-40B4-BE49-F238E27FC236}">
-                <a16:creationId xmlns:a16="http://schemas.microsoft.com/office/drawing/2014/main" id="{747102BF-A698-444E-B693-3BC2E2F22350}"/>
+                <a16:creationId xmlns:a16="http://schemas.microsoft.com/office/drawing/2014/main" xmlns="" id="{747102BF-A698-444E-B693-3BC2E2F22350}"/>
               </a:ext>
             </a:extLst>
           </p:cNvPr>
@@ -5193,112 +5202,15 @@
                   <a:srgbClr val="595959"/>
                 </a:solidFill>
               </a:rPr>
-              <a:t>גע בנקודה הכחולה ואז לחץ רווח פעם אחת</a:t>
+              <a:t>הנח את האצבע בנקודת ההתחלה ואז לחץ רווח פעם אחת</a:t>
             </a:r>
           </a:p>
         </p:txBody>
       </p:sp>
-      <p:graphicFrame>
-        <p:nvGraphicFramePr>
-          <p:cNvPr id="5" name="Table 4">
-            <a:extLst>
-              <a:ext uri="{FF2B5EF4-FFF2-40B4-BE49-F238E27FC236}">
-                <a16:creationId xmlns:a16="http://schemas.microsoft.com/office/drawing/2014/main" id="{9CAF9F99-453D-44F1-88EC-228F7966FFE4}"/>
-              </a:ext>
-            </a:extLst>
-          </p:cNvPr>
-          <p:cNvGraphicFramePr>
-            <a:graphicFrameLocks noGrp="1"/>
-          </p:cNvGraphicFramePr>
-          <p:nvPr>
-            <p:extLst>
-              <p:ext uri="{D42A27DB-BD31-4B8C-83A1-F6EECF244321}">
-                <p14:modId xmlns:p14="http://schemas.microsoft.com/office/powerpoint/2010/main" val="1985556340"/>
-              </p:ext>
-            </p:extLst>
-          </p:nvPr>
-        </p:nvGraphicFramePr>
-        <p:xfrm>
-          <a:off x="1557867" y="1379108"/>
-          <a:ext cx="9076266" cy="1283817"/>
-        </p:xfrm>
-        <a:graphic>
-          <a:graphicData uri="http://schemas.openxmlformats.org/drawingml/2006/table">
-            <a:tbl>
-              <a:tblPr rtl="1" firstRow="1" bandRow="1">
-                <a:tableStyleId>{5C22544A-7EE6-4342-B048-85BDC9FD1C3A}</a:tableStyleId>
-              </a:tblPr>
-              <a:tblGrid>
-                <a:gridCol w="9076266">
-                  <a:extLst>
-                    <a:ext uri="{9D8B030D-6E8A-4147-A177-3AD203B41FA5}">
-                      <a16:colId xmlns:a16="http://schemas.microsoft.com/office/drawing/2014/main" val="371563066"/>
-                    </a:ext>
-                  </a:extLst>
-                </a:gridCol>
-              </a:tblGrid>
-              <a:tr h="1283817">
-                <a:tc>
-                  <a:txBody>
-                    <a:bodyPr/>
-                    <a:lstStyle/>
-                    <a:p>
-                      <a:pPr algn="ctr" rtl="1"/>
-                      <a:r>
-                        <a:rPr lang="en-US" sz="7200" b="1" dirty="0">
-                          <a:solidFill>
-                            <a:srgbClr val="709CC0"/>
-                          </a:solidFill>
-                        </a:rPr>
-                        <a:t>o</a:t>
-                      </a:r>
-                      <a:endParaRPr lang="he-IL" sz="3200" dirty="0">
-                        <a:solidFill>
-                          <a:schemeClr val="tx1"/>
-                        </a:solidFill>
-                      </a:endParaRPr>
-                    </a:p>
-                  </a:txBody>
-                  <a:tcPr>
-                    <a:lnL w="12700" cmpd="sng">
-                      <a:noFill/>
-                    </a:lnL>
-                    <a:lnR w="12700" cmpd="sng">
-                      <a:noFill/>
-                    </a:lnR>
-                    <a:lnT w="12700" cmpd="sng">
-                      <a:noFill/>
-                    </a:lnT>
-                    <a:lnB w="38100" cmpd="sng">
-                      <a:noFill/>
-                    </a:lnB>
-                    <a:lnTlToBr w="12700" cmpd="sng">
-                      <a:noFill/>
-                      <a:prstDash val="solid"/>
-                    </a:lnTlToBr>
-                    <a:lnBlToTr w="12700" cmpd="sng">
-                      <a:noFill/>
-                      <a:prstDash val="solid"/>
-                    </a:lnBlToTr>
-                    <a:solidFill>
-                      <a:srgbClr val="7E7E7E"/>
-                    </a:solidFill>
-                  </a:tcPr>
-                </a:tc>
-                <a:extLst>
-                  <a:ext uri="{0D108BD9-81ED-4DB2-BD59-A6C34878D82A}">
-                    <a16:rowId xmlns:a16="http://schemas.microsoft.com/office/drawing/2014/main" val="10001"/>
-                  </a:ext>
-                </a:extLst>
-              </a:tr>
-            </a:tbl>
-          </a:graphicData>
-        </a:graphic>
-      </p:graphicFrame>
     </p:spTree>
     <p:extLst>
       <p:ext uri="{BB962C8B-B14F-4D97-AF65-F5344CB8AC3E}">
-        <p14:creationId xmlns:p14="http://schemas.microsoft.com/office/powerpoint/2010/main" val="3826736148"/>
+        <p14:creationId xmlns:p14="http://schemas.microsoft.com/office/powerpoint/2010/main" val="1581616032"/>
       </p:ext>
     </p:extLst>
   </p:cSld>
@@ -5338,7 +5250,7 @@
           <p:cNvPr id="6" name="Content Placeholder 2">
             <a:extLst>
               <a:ext uri="{FF2B5EF4-FFF2-40B4-BE49-F238E27FC236}">
-                <a16:creationId xmlns:a16="http://schemas.microsoft.com/office/drawing/2014/main" id="{747102BF-A698-444E-B693-3BC2E2F22350}"/>
+                <a16:creationId xmlns:a16="http://schemas.microsoft.com/office/drawing/2014/main" xmlns="" id="{747102BF-A698-444E-B693-3BC2E2F22350}"/>
               </a:ext>
             </a:extLst>
           </p:cNvPr>
@@ -5545,7 +5457,349 @@
           <p:cNvPr id="5" name="Table 4">
             <a:extLst>
               <a:ext uri="{FF2B5EF4-FFF2-40B4-BE49-F238E27FC236}">
-                <a16:creationId xmlns:a16="http://schemas.microsoft.com/office/drawing/2014/main" id="{9CAF9F99-453D-44F1-88EC-228F7966FFE4}"/>
+                <a16:creationId xmlns:a16="http://schemas.microsoft.com/office/drawing/2014/main" xmlns="" id="{9CAF9F99-453D-44F1-88EC-228F7966FFE4}"/>
+              </a:ext>
+            </a:extLst>
+          </p:cNvPr>
+          <p:cNvGraphicFramePr>
+            <a:graphicFrameLocks noGrp="1"/>
+          </p:cNvGraphicFramePr>
+          <p:nvPr>
+            <p:extLst>
+              <p:ext uri="{D42A27DB-BD31-4B8C-83A1-F6EECF244321}">
+                <p14:modId xmlns:p14="http://schemas.microsoft.com/office/powerpoint/2010/main" val="1985556340"/>
+              </p:ext>
+            </p:extLst>
+          </p:nvPr>
+        </p:nvGraphicFramePr>
+        <p:xfrm>
+          <a:off x="1557867" y="1379108"/>
+          <a:ext cx="9076266" cy="1283817"/>
+        </p:xfrm>
+        <a:graphic>
+          <a:graphicData uri="http://schemas.openxmlformats.org/drawingml/2006/table">
+            <a:tbl>
+              <a:tblPr rtl="1" firstRow="1" bandRow="1">
+                <a:tableStyleId>{5C22544A-7EE6-4342-B048-85BDC9FD1C3A}</a:tableStyleId>
+              </a:tblPr>
+              <a:tblGrid>
+                <a:gridCol w="9076266">
+                  <a:extLst>
+                    <a:ext uri="{9D8B030D-6E8A-4147-A177-3AD203B41FA5}">
+                      <a16:colId xmlns:a16="http://schemas.microsoft.com/office/drawing/2014/main" xmlns="" val="371563066"/>
+                    </a:ext>
+                  </a:extLst>
+                </a:gridCol>
+              </a:tblGrid>
+              <a:tr h="1283817">
+                <a:tc>
+                  <a:txBody>
+                    <a:bodyPr/>
+                    <a:lstStyle/>
+                    <a:p>
+                      <a:pPr algn="ctr" rtl="1"/>
+                      <a:r>
+                        <a:rPr lang="en-US" sz="7200" b="1" dirty="0">
+                          <a:solidFill>
+                            <a:srgbClr val="709CC0"/>
+                          </a:solidFill>
+                        </a:rPr>
+                        <a:t>o</a:t>
+                      </a:r>
+                      <a:endParaRPr lang="he-IL" sz="3200" dirty="0">
+                        <a:solidFill>
+                          <a:schemeClr val="tx1"/>
+                        </a:solidFill>
+                      </a:endParaRPr>
+                    </a:p>
+                  </a:txBody>
+                  <a:tcPr>
+                    <a:lnL w="12700" cmpd="sng">
+                      <a:noFill/>
+                    </a:lnL>
+                    <a:lnR w="12700" cmpd="sng">
+                      <a:noFill/>
+                    </a:lnR>
+                    <a:lnT w="12700" cmpd="sng">
+                      <a:noFill/>
+                    </a:lnT>
+                    <a:lnB w="38100" cmpd="sng">
+                      <a:noFill/>
+                    </a:lnB>
+                    <a:lnTlToBr w="12700" cmpd="sng">
+                      <a:noFill/>
+                      <a:prstDash val="solid"/>
+                    </a:lnTlToBr>
+                    <a:lnBlToTr w="12700" cmpd="sng">
+                      <a:noFill/>
+                      <a:prstDash val="solid"/>
+                    </a:lnBlToTr>
+                    <a:solidFill>
+                      <a:srgbClr val="7E7E7E"/>
+                    </a:solidFill>
+                  </a:tcPr>
+                </a:tc>
+                <a:extLst>
+                  <a:ext uri="{0D108BD9-81ED-4DB2-BD59-A6C34878D82A}">
+                    <a16:rowId xmlns:a16="http://schemas.microsoft.com/office/drawing/2014/main" xmlns="" val="10001"/>
+                  </a:ext>
+                </a:extLst>
+              </a:tr>
+            </a:tbl>
+          </a:graphicData>
+        </a:graphic>
+      </p:graphicFrame>
+    </p:spTree>
+    <p:extLst>
+      <p:ext uri="{BB962C8B-B14F-4D97-AF65-F5344CB8AC3E}">
+        <p14:creationId xmlns:p14="http://schemas.microsoft.com/office/powerpoint/2010/main" val="3826736148"/>
+      </p:ext>
+    </p:extLst>
+  </p:cSld>
+  <p:clrMapOvr>
+    <a:masterClrMapping/>
+  </p:clrMapOvr>
+</p:sld>
+</file>
+
+<file path=ppt/slides/slide18.xml><?xml version="1.0" encoding="utf-8"?>
+<p:sld xmlns:a="http://schemas.openxmlformats.org/drawingml/2006/main" xmlns:r="http://schemas.openxmlformats.org/officeDocument/2006/relationships" xmlns:p="http://schemas.openxmlformats.org/presentationml/2006/main">
+  <p:cSld>
+    <p:bg>
+      <p:bgPr>
+        <a:solidFill>
+          <a:srgbClr val="7E7E7E"/>
+        </a:solidFill>
+        <a:effectLst/>
+      </p:bgPr>
+    </p:bg>
+    <p:spTree>
+      <p:nvGrpSpPr>
+        <p:cNvPr id="1" name=""/>
+        <p:cNvGrpSpPr/>
+        <p:nvPr/>
+      </p:nvGrpSpPr>
+      <p:grpSpPr>
+        <a:xfrm>
+          <a:off x="0" y="0"/>
+          <a:ext cx="0" cy="0"/>
+          <a:chOff x="0" y="0"/>
+          <a:chExt cx="0" cy="0"/>
+        </a:xfrm>
+      </p:grpSpPr>
+      <p:sp>
+        <p:nvSpPr>
+          <p:cNvPr id="6" name="Content Placeholder 2">
+            <a:extLst>
+              <a:ext uri="{FF2B5EF4-FFF2-40B4-BE49-F238E27FC236}">
+                <a16:creationId xmlns:a16="http://schemas.microsoft.com/office/drawing/2014/main" xmlns="" id="{747102BF-A698-444E-B693-3BC2E2F22350}"/>
+              </a:ext>
+            </a:extLst>
+          </p:cNvPr>
+          <p:cNvSpPr txBox="1">
+            <a:spLocks/>
+          </p:cNvSpPr>
+          <p:nvPr/>
+        </p:nvSpPr>
+        <p:spPr>
+          <a:xfrm>
+            <a:off x="691816" y="223312"/>
+            <a:ext cx="10808368" cy="1155796"/>
+          </a:xfrm>
+          <a:prstGeom prst="rect">
+            <a:avLst/>
+          </a:prstGeom>
+        </p:spPr>
+        <p:txBody>
+          <a:bodyPr vert="horz" lIns="91440" tIns="45720" rIns="91440" bIns="45720" rtlCol="0">
+            <a:normAutofit/>
+          </a:bodyPr>
+          <a:lstStyle>
+            <a:lvl1pPr marL="228600" indent="-228600" algn="l" defTabSz="914400" rtl="0" eaLnBrk="1" latinLnBrk="0" hangingPunct="1">
+              <a:lnSpc>
+                <a:spcPct val="90000"/>
+              </a:lnSpc>
+              <a:spcBef>
+                <a:spcPts val="1000"/>
+              </a:spcBef>
+              <a:buFont typeface="Arial" panose="020B0604020202020204" pitchFamily="34" charset="0"/>
+              <a:buChar char="•"/>
+              <a:defRPr sz="2800" kern="1200">
+                <a:solidFill>
+                  <a:schemeClr val="tx1"/>
+                </a:solidFill>
+                <a:latin typeface="+mn-lt"/>
+                <a:ea typeface="+mn-ea"/>
+                <a:cs typeface="+mn-cs"/>
+              </a:defRPr>
+            </a:lvl1pPr>
+            <a:lvl2pPr marL="685800" indent="-228600" algn="l" defTabSz="914400" rtl="0" eaLnBrk="1" latinLnBrk="0" hangingPunct="1">
+              <a:lnSpc>
+                <a:spcPct val="90000"/>
+              </a:lnSpc>
+              <a:spcBef>
+                <a:spcPts val="500"/>
+              </a:spcBef>
+              <a:buFont typeface="Arial" panose="020B0604020202020204" pitchFamily="34" charset="0"/>
+              <a:buChar char="•"/>
+              <a:defRPr sz="2400" kern="1200">
+                <a:solidFill>
+                  <a:schemeClr val="tx1"/>
+                </a:solidFill>
+                <a:latin typeface="+mn-lt"/>
+                <a:ea typeface="+mn-ea"/>
+                <a:cs typeface="+mn-cs"/>
+              </a:defRPr>
+            </a:lvl2pPr>
+            <a:lvl3pPr marL="1143000" indent="-228600" algn="l" defTabSz="914400" rtl="0" eaLnBrk="1" latinLnBrk="0" hangingPunct="1">
+              <a:lnSpc>
+                <a:spcPct val="90000"/>
+              </a:lnSpc>
+              <a:spcBef>
+                <a:spcPts val="500"/>
+              </a:spcBef>
+              <a:buFont typeface="Arial" panose="020B0604020202020204" pitchFamily="34" charset="0"/>
+              <a:buChar char="•"/>
+              <a:defRPr sz="2000" kern="1200">
+                <a:solidFill>
+                  <a:schemeClr val="tx1"/>
+                </a:solidFill>
+                <a:latin typeface="+mn-lt"/>
+                <a:ea typeface="+mn-ea"/>
+                <a:cs typeface="+mn-cs"/>
+              </a:defRPr>
+            </a:lvl3pPr>
+            <a:lvl4pPr marL="1600200" indent="-228600" algn="l" defTabSz="914400" rtl="0" eaLnBrk="1" latinLnBrk="0" hangingPunct="1">
+              <a:lnSpc>
+                <a:spcPct val="90000"/>
+              </a:lnSpc>
+              <a:spcBef>
+                <a:spcPts val="500"/>
+              </a:spcBef>
+              <a:buFont typeface="Arial" panose="020B0604020202020204" pitchFamily="34" charset="0"/>
+              <a:buChar char="•"/>
+              <a:defRPr sz="1800" kern="1200">
+                <a:solidFill>
+                  <a:schemeClr val="tx1"/>
+                </a:solidFill>
+                <a:latin typeface="+mn-lt"/>
+                <a:ea typeface="+mn-ea"/>
+                <a:cs typeface="+mn-cs"/>
+              </a:defRPr>
+            </a:lvl4pPr>
+            <a:lvl5pPr marL="2057400" indent="-228600" algn="l" defTabSz="914400" rtl="0" eaLnBrk="1" latinLnBrk="0" hangingPunct="1">
+              <a:lnSpc>
+                <a:spcPct val="90000"/>
+              </a:lnSpc>
+              <a:spcBef>
+                <a:spcPts val="500"/>
+              </a:spcBef>
+              <a:buFont typeface="Arial" panose="020B0604020202020204" pitchFamily="34" charset="0"/>
+              <a:buChar char="•"/>
+              <a:defRPr sz="1800" kern="1200">
+                <a:solidFill>
+                  <a:schemeClr val="tx1"/>
+                </a:solidFill>
+                <a:latin typeface="+mn-lt"/>
+                <a:ea typeface="+mn-ea"/>
+                <a:cs typeface="+mn-cs"/>
+              </a:defRPr>
+            </a:lvl5pPr>
+            <a:lvl6pPr marL="2514600" indent="-228600" algn="l" defTabSz="914400" rtl="0" eaLnBrk="1" latinLnBrk="0" hangingPunct="1">
+              <a:lnSpc>
+                <a:spcPct val="90000"/>
+              </a:lnSpc>
+              <a:spcBef>
+                <a:spcPts val="500"/>
+              </a:spcBef>
+              <a:buFont typeface="Arial" panose="020B0604020202020204" pitchFamily="34" charset="0"/>
+              <a:buChar char="•"/>
+              <a:defRPr sz="1800" kern="1200">
+                <a:solidFill>
+                  <a:schemeClr val="tx1"/>
+                </a:solidFill>
+                <a:latin typeface="+mn-lt"/>
+                <a:ea typeface="+mn-ea"/>
+                <a:cs typeface="+mn-cs"/>
+              </a:defRPr>
+            </a:lvl6pPr>
+            <a:lvl7pPr marL="2971800" indent="-228600" algn="l" defTabSz="914400" rtl="0" eaLnBrk="1" latinLnBrk="0" hangingPunct="1">
+              <a:lnSpc>
+                <a:spcPct val="90000"/>
+              </a:lnSpc>
+              <a:spcBef>
+                <a:spcPts val="500"/>
+              </a:spcBef>
+              <a:buFont typeface="Arial" panose="020B0604020202020204" pitchFamily="34" charset="0"/>
+              <a:buChar char="•"/>
+              <a:defRPr sz="1800" kern="1200">
+                <a:solidFill>
+                  <a:schemeClr val="tx1"/>
+                </a:solidFill>
+                <a:latin typeface="+mn-lt"/>
+                <a:ea typeface="+mn-ea"/>
+                <a:cs typeface="+mn-cs"/>
+              </a:defRPr>
+            </a:lvl7pPr>
+            <a:lvl8pPr marL="3429000" indent="-228600" algn="l" defTabSz="914400" rtl="0" eaLnBrk="1" latinLnBrk="0" hangingPunct="1">
+              <a:lnSpc>
+                <a:spcPct val="90000"/>
+              </a:lnSpc>
+              <a:spcBef>
+                <a:spcPts val="500"/>
+              </a:spcBef>
+              <a:buFont typeface="Arial" panose="020B0604020202020204" pitchFamily="34" charset="0"/>
+              <a:buChar char="•"/>
+              <a:defRPr sz="1800" kern="1200">
+                <a:solidFill>
+                  <a:schemeClr val="tx1"/>
+                </a:solidFill>
+                <a:latin typeface="+mn-lt"/>
+                <a:ea typeface="+mn-ea"/>
+                <a:cs typeface="+mn-cs"/>
+              </a:defRPr>
+            </a:lvl8pPr>
+            <a:lvl9pPr marL="3886200" indent="-228600" algn="l" defTabSz="914400" rtl="0" eaLnBrk="1" latinLnBrk="0" hangingPunct="1">
+              <a:lnSpc>
+                <a:spcPct val="90000"/>
+              </a:lnSpc>
+              <a:spcBef>
+                <a:spcPts val="500"/>
+              </a:spcBef>
+              <a:buFont typeface="Arial" panose="020B0604020202020204" pitchFamily="34" charset="0"/>
+              <a:buChar char="•"/>
+              <a:defRPr sz="1800" kern="1200">
+                <a:solidFill>
+                  <a:schemeClr val="tx1"/>
+                </a:solidFill>
+                <a:latin typeface="+mn-lt"/>
+                <a:ea typeface="+mn-ea"/>
+                <a:cs typeface="+mn-cs"/>
+              </a:defRPr>
+            </a:lvl9pPr>
+          </a:lstStyle>
+          <a:p>
+            <a:pPr marL="0" indent="0" algn="ctr" rtl="1">
+              <a:buFont typeface="Arial" panose="020B0604020202020204" pitchFamily="34" charset="0"/>
+              <a:buNone/>
+            </a:pPr>
+            <a:r>
+              <a:rPr lang="he-IL" sz="3200" b="1" u="sng" dirty="0">
+                <a:solidFill>
+                  <a:srgbClr val="595959"/>
+                </a:solidFill>
+              </a:rPr>
+              <a:t>גע בנקודה הכחולה ואז לחץ רווח פעם אחת</a:t>
+            </a:r>
+          </a:p>
+        </p:txBody>
+      </p:sp>
+      <p:graphicFrame>
+        <p:nvGraphicFramePr>
+          <p:cNvPr id="5" name="Table 4">
+            <a:extLst>
+              <a:ext uri="{FF2B5EF4-FFF2-40B4-BE49-F238E27FC236}">
+                <a16:creationId xmlns:a16="http://schemas.microsoft.com/office/drawing/2014/main" xmlns="" id="{9CAF9F99-453D-44F1-88EC-228F7966FFE4}"/>
               </a:ext>
             </a:extLst>
           </p:cNvPr>
@@ -5574,14 +5828,14 @@
                 <a:gridCol w="4521200">
                   <a:extLst>
                     <a:ext uri="{9D8B030D-6E8A-4147-A177-3AD203B41FA5}">
-                      <a16:colId xmlns:a16="http://schemas.microsoft.com/office/drawing/2014/main" val="371563066"/>
+                      <a16:colId xmlns:a16="http://schemas.microsoft.com/office/drawing/2014/main" xmlns="" val="371563066"/>
                     </a:ext>
                   </a:extLst>
                 </a:gridCol>
                 <a:gridCol w="4555066">
                   <a:extLst>
                     <a:ext uri="{9D8B030D-6E8A-4147-A177-3AD203B41FA5}">
-                      <a16:colId xmlns:a16="http://schemas.microsoft.com/office/drawing/2014/main" val="2181931161"/>
+                      <a16:colId xmlns:a16="http://schemas.microsoft.com/office/drawing/2014/main" xmlns="" val="2181931161"/>
                     </a:ext>
                   </a:extLst>
                 </a:gridCol>
@@ -5716,7 +5970,7 @@
                 </a:tc>
                 <a:extLst>
                   <a:ext uri="{0D108BD9-81ED-4DB2-BD59-A6C34878D82A}">
-                    <a16:rowId xmlns:a16="http://schemas.microsoft.com/office/drawing/2014/main" val="10001"/>
+                    <a16:rowId xmlns:a16="http://schemas.microsoft.com/office/drawing/2014/main" xmlns="" val="10001"/>
                   </a:ext>
                 </a:extLst>
               </a:tr>
@@ -5737,7 +5991,7 @@
 </p:sld>
 </file>
 
-<file path=ppt/slides/slide18.xml><?xml version="1.0" encoding="utf-8"?>
+<file path=ppt/slides/slide19.xml><?xml version="1.0" encoding="utf-8"?>
 <p:sld xmlns:a="http://schemas.openxmlformats.org/drawingml/2006/main" xmlns:r="http://schemas.openxmlformats.org/officeDocument/2006/relationships" xmlns:p="http://schemas.openxmlformats.org/presentationml/2006/main">
   <p:cSld>
     <p:bg>
@@ -5767,7 +6021,7 @@
           <p:cNvPr id="6" name="Content Placeholder 2">
             <a:extLst>
               <a:ext uri="{FF2B5EF4-FFF2-40B4-BE49-F238E27FC236}">
-                <a16:creationId xmlns:a16="http://schemas.microsoft.com/office/drawing/2014/main" id="{747102BF-A698-444E-B693-3BC2E2F22350}"/>
+                <a16:creationId xmlns:a16="http://schemas.microsoft.com/office/drawing/2014/main" xmlns="" id="{747102BF-A698-444E-B693-3BC2E2F22350}"/>
               </a:ext>
             </a:extLst>
           </p:cNvPr>
@@ -5974,7 +6228,7 @@
           <p:cNvPr id="5" name="Table 4">
             <a:extLst>
               <a:ext uri="{FF2B5EF4-FFF2-40B4-BE49-F238E27FC236}">
-                <a16:creationId xmlns:a16="http://schemas.microsoft.com/office/drawing/2014/main" id="{9CAF9F99-453D-44F1-88EC-228F7966FFE4}"/>
+                <a16:creationId xmlns:a16="http://schemas.microsoft.com/office/drawing/2014/main" xmlns="" id="{9CAF9F99-453D-44F1-88EC-228F7966FFE4}"/>
               </a:ext>
             </a:extLst>
           </p:cNvPr>
@@ -6003,14 +6257,14 @@
                 <a:gridCol w="4521200">
                   <a:extLst>
                     <a:ext uri="{9D8B030D-6E8A-4147-A177-3AD203B41FA5}">
-                      <a16:colId xmlns:a16="http://schemas.microsoft.com/office/drawing/2014/main" val="371563066"/>
+                      <a16:colId xmlns:a16="http://schemas.microsoft.com/office/drawing/2014/main" xmlns="" val="371563066"/>
                     </a:ext>
                   </a:extLst>
                 </a:gridCol>
                 <a:gridCol w="4555066">
                   <a:extLst>
                     <a:ext uri="{9D8B030D-6E8A-4147-A177-3AD203B41FA5}">
-                      <a16:colId xmlns:a16="http://schemas.microsoft.com/office/drawing/2014/main" val="2181931161"/>
+                      <a16:colId xmlns:a16="http://schemas.microsoft.com/office/drawing/2014/main" xmlns="" val="2181931161"/>
                     </a:ext>
                   </a:extLst>
                 </a:gridCol>
@@ -6146,7 +6400,7 @@
                 </a:tc>
                 <a:extLst>
                   <a:ext uri="{0D108BD9-81ED-4DB2-BD59-A6C34878D82A}">
-                    <a16:rowId xmlns:a16="http://schemas.microsoft.com/office/drawing/2014/main" val="10001"/>
+                    <a16:rowId xmlns:a16="http://schemas.microsoft.com/office/drawing/2014/main" xmlns="" val="10001"/>
                   </a:ext>
                 </a:extLst>
               </a:tr>
@@ -6158,36 +6412,6 @@
     <p:extLst>
       <p:ext uri="{BB962C8B-B14F-4D97-AF65-F5344CB8AC3E}">
         <p14:creationId xmlns:p14="http://schemas.microsoft.com/office/powerpoint/2010/main" val="339207425"/>
-      </p:ext>
-    </p:extLst>
-  </p:cSld>
-  <p:clrMapOvr>
-    <a:masterClrMapping/>
-  </p:clrMapOvr>
-</p:sld>
-</file>
-
-<file path=ppt/slides/slide19.xml><?xml version="1.0" encoding="utf-8"?>
-<p:sld xmlns:a="http://schemas.openxmlformats.org/drawingml/2006/main" xmlns:r="http://schemas.openxmlformats.org/officeDocument/2006/relationships" xmlns:p="http://schemas.openxmlformats.org/presentationml/2006/main">
-  <p:cSld>
-    <p:spTree>
-      <p:nvGrpSpPr>
-        <p:cNvPr id="1" name=""/>
-        <p:cNvGrpSpPr/>
-        <p:nvPr/>
-      </p:nvGrpSpPr>
-      <p:grpSpPr>
-        <a:xfrm>
-          <a:off x="0" y="0"/>
-          <a:ext cx="0" cy="0"/>
-          <a:chOff x="0" y="0"/>
-          <a:chExt cx="0" cy="0"/>
-        </a:xfrm>
-      </p:grpSpPr>
-    </p:spTree>
-    <p:extLst>
-      <p:ext uri="{BB962C8B-B14F-4D97-AF65-F5344CB8AC3E}">
-        <p14:creationId xmlns:p14="http://schemas.microsoft.com/office/powerpoint/2010/main" val="2748039734"/>
       </p:ext>
     </p:extLst>
   </p:cSld>
@@ -6290,6 +6514,36 @@
 </file>
 
 <file path=ppt/slides/slide20.xml><?xml version="1.0" encoding="utf-8"?>
+<p:sld xmlns:a="http://schemas.openxmlformats.org/drawingml/2006/main" xmlns:r="http://schemas.openxmlformats.org/officeDocument/2006/relationships" xmlns:p="http://schemas.openxmlformats.org/presentationml/2006/main">
+  <p:cSld>
+    <p:spTree>
+      <p:nvGrpSpPr>
+        <p:cNvPr id="1" name=""/>
+        <p:cNvGrpSpPr/>
+        <p:nvPr/>
+      </p:nvGrpSpPr>
+      <p:grpSpPr>
+        <a:xfrm>
+          <a:off x="0" y="0"/>
+          <a:ext cx="0" cy="0"/>
+          <a:chOff x="0" y="0"/>
+          <a:chExt cx="0" cy="0"/>
+        </a:xfrm>
+      </p:grpSpPr>
+    </p:spTree>
+    <p:extLst>
+      <p:ext uri="{BB962C8B-B14F-4D97-AF65-F5344CB8AC3E}">
+        <p14:creationId xmlns:p14="http://schemas.microsoft.com/office/powerpoint/2010/main" val="2748039734"/>
+      </p:ext>
+    </p:extLst>
+  </p:cSld>
+  <p:clrMapOvr>
+    <a:masterClrMapping/>
+  </p:clrMapOvr>
+</p:sld>
+</file>
+
+<file path=ppt/slides/slide21.xml><?xml version="1.0" encoding="utf-8"?>
 <p:sld xmlns:a="http://schemas.openxmlformats.org/drawingml/2006/main" xmlns:r="http://schemas.openxmlformats.org/officeDocument/2006/relationships" xmlns:p="http://schemas.openxmlformats.org/presentationml/2006/main">
   <p:cSld>
     <p:bg>
@@ -6357,7 +6611,7 @@
           <p:cNvPr id="6" name="Content Placeholder 2">
             <a:extLst>
               <a:ext uri="{FF2B5EF4-FFF2-40B4-BE49-F238E27FC236}">
-                <a16:creationId xmlns:a16="http://schemas.microsoft.com/office/drawing/2014/main" id="{747102BF-A698-444E-B693-3BC2E2F22350}"/>
+                <a16:creationId xmlns:a16="http://schemas.microsoft.com/office/drawing/2014/main" xmlns="" id="{747102BF-A698-444E-B693-3BC2E2F22350}"/>
               </a:ext>
             </a:extLst>
           </p:cNvPr>
@@ -6731,7 +6985,7 @@
           <p:cNvPr id="6" name="Content Placeholder 2">
             <a:extLst>
               <a:ext uri="{FF2B5EF4-FFF2-40B4-BE49-F238E27FC236}">
-                <a16:creationId xmlns:a16="http://schemas.microsoft.com/office/drawing/2014/main" id="{747102BF-A698-444E-B693-3BC2E2F22350}"/>
+                <a16:creationId xmlns:a16="http://schemas.microsoft.com/office/drawing/2014/main" xmlns="" id="{747102BF-A698-444E-B693-3BC2E2F22350}"/>
               </a:ext>
             </a:extLst>
           </p:cNvPr>
@@ -6983,7 +7237,7 @@
           <p:cNvPr id="6" name="Content Placeholder 2">
             <a:extLst>
               <a:ext uri="{FF2B5EF4-FFF2-40B4-BE49-F238E27FC236}">
-                <a16:creationId xmlns:a16="http://schemas.microsoft.com/office/drawing/2014/main" id="{747102BF-A698-444E-B693-3BC2E2F22350}"/>
+                <a16:creationId xmlns:a16="http://schemas.microsoft.com/office/drawing/2014/main" xmlns="" id="{747102BF-A698-444E-B693-3BC2E2F22350}"/>
               </a:ext>
             </a:extLst>
           </p:cNvPr>
@@ -7225,7 +7479,7 @@
           <p:cNvPr id="6" name="Content Placeholder 2">
             <a:extLst>
               <a:ext uri="{FF2B5EF4-FFF2-40B4-BE49-F238E27FC236}">
-                <a16:creationId xmlns:a16="http://schemas.microsoft.com/office/drawing/2014/main" id="{747102BF-A698-444E-B693-3BC2E2F22350}"/>
+                <a16:creationId xmlns:a16="http://schemas.microsoft.com/office/drawing/2014/main" xmlns="" id="{747102BF-A698-444E-B693-3BC2E2F22350}"/>
               </a:ext>
             </a:extLst>
           </p:cNvPr>
@@ -7477,7 +7731,7 @@
           <p:cNvPr id="6" name="Content Placeholder 2">
             <a:extLst>
               <a:ext uri="{FF2B5EF4-FFF2-40B4-BE49-F238E27FC236}">
-                <a16:creationId xmlns:a16="http://schemas.microsoft.com/office/drawing/2014/main" id="{747102BF-A698-444E-B693-3BC2E2F22350}"/>
+                <a16:creationId xmlns:a16="http://schemas.microsoft.com/office/drawing/2014/main" xmlns="" id="{747102BF-A698-444E-B693-3BC2E2F22350}"/>
               </a:ext>
             </a:extLst>
           </p:cNvPr>
@@ -7687,7 +7941,7 @@
           <p:cNvPr id="5" name="Table 4">
             <a:extLst>
               <a:ext uri="{FF2B5EF4-FFF2-40B4-BE49-F238E27FC236}">
-                <a16:creationId xmlns:a16="http://schemas.microsoft.com/office/drawing/2014/main" id="{9CAF9F99-453D-44F1-88EC-228F7966FFE4}"/>
+                <a16:creationId xmlns:a16="http://schemas.microsoft.com/office/drawing/2014/main" xmlns="" id="{9CAF9F99-453D-44F1-88EC-228F7966FFE4}"/>
               </a:ext>
             </a:extLst>
           </p:cNvPr>
@@ -7716,14 +7970,14 @@
                 <a:gridCol w="4521200">
                   <a:extLst>
                     <a:ext uri="{9D8B030D-6E8A-4147-A177-3AD203B41FA5}">
-                      <a16:colId xmlns:a16="http://schemas.microsoft.com/office/drawing/2014/main" val="371563066"/>
+                      <a16:colId xmlns:a16="http://schemas.microsoft.com/office/drawing/2014/main" xmlns="" val="371563066"/>
                     </a:ext>
                   </a:extLst>
                 </a:gridCol>
                 <a:gridCol w="4555066">
                   <a:extLst>
                     <a:ext uri="{9D8B030D-6E8A-4147-A177-3AD203B41FA5}">
-                      <a16:colId xmlns:a16="http://schemas.microsoft.com/office/drawing/2014/main" val="2181931161"/>
+                      <a16:colId xmlns:a16="http://schemas.microsoft.com/office/drawing/2014/main" xmlns="" val="2181931161"/>
                     </a:ext>
                   </a:extLst>
                 </a:gridCol>
@@ -7861,7 +8115,7 @@
                 </a:tc>
                 <a:extLst>
                   <a:ext uri="{0D108BD9-81ED-4DB2-BD59-A6C34878D82A}">
-                    <a16:rowId xmlns:a16="http://schemas.microsoft.com/office/drawing/2014/main" val="2258008607"/>
+                    <a16:rowId xmlns:a16="http://schemas.microsoft.com/office/drawing/2014/main" xmlns="" val="2258008607"/>
                   </a:ext>
                 </a:extLst>
               </a:tr>
@@ -7874,7 +8128,7 @@
           <p:cNvPr id="7" name="Table 6">
             <a:extLst>
               <a:ext uri="{FF2B5EF4-FFF2-40B4-BE49-F238E27FC236}">
-                <a16:creationId xmlns:a16="http://schemas.microsoft.com/office/drawing/2014/main" id="{9CAF9F99-453D-44F1-88EC-228F7966FFE4}"/>
+                <a16:creationId xmlns:a16="http://schemas.microsoft.com/office/drawing/2014/main" xmlns="" id="{9CAF9F99-453D-44F1-88EC-228F7966FFE4}"/>
               </a:ext>
             </a:extLst>
           </p:cNvPr>
@@ -7903,14 +8157,14 @@
                 <a:gridCol w="4521200">
                   <a:extLst>
                     <a:ext uri="{9D8B030D-6E8A-4147-A177-3AD203B41FA5}">
-                      <a16:colId xmlns:a16="http://schemas.microsoft.com/office/drawing/2014/main" val="371563066"/>
+                      <a16:colId xmlns:a16="http://schemas.microsoft.com/office/drawing/2014/main" xmlns="" val="371563066"/>
                     </a:ext>
                   </a:extLst>
                 </a:gridCol>
                 <a:gridCol w="4555066">
                   <a:extLst>
                     <a:ext uri="{9D8B030D-6E8A-4147-A177-3AD203B41FA5}">
-                      <a16:colId xmlns:a16="http://schemas.microsoft.com/office/drawing/2014/main" val="2181931161"/>
+                      <a16:colId xmlns:a16="http://schemas.microsoft.com/office/drawing/2014/main" xmlns="" val="2181931161"/>
                     </a:ext>
                   </a:extLst>
                 </a:gridCol>
@@ -8062,7 +8316,7 @@
                 </a:tc>
                 <a:extLst>
                   <a:ext uri="{0D108BD9-81ED-4DB2-BD59-A6C34878D82A}">
-                    <a16:rowId xmlns:a16="http://schemas.microsoft.com/office/drawing/2014/main" val="10001"/>
+                    <a16:rowId xmlns:a16="http://schemas.microsoft.com/office/drawing/2014/main" xmlns="" val="10001"/>
                   </a:ext>
                 </a:extLst>
               </a:tr>
@@ -8113,7 +8367,7 @@
           <p:cNvPr id="5" name="Content Placeholder 2">
             <a:extLst>
               <a:ext uri="{FF2B5EF4-FFF2-40B4-BE49-F238E27FC236}">
-                <a16:creationId xmlns:a16="http://schemas.microsoft.com/office/drawing/2014/main" id="{747102BF-A698-444E-B693-3BC2E2F22350}"/>
+                <a16:creationId xmlns:a16="http://schemas.microsoft.com/office/drawing/2014/main" xmlns="" id="{747102BF-A698-444E-B693-3BC2E2F22350}"/>
               </a:ext>
             </a:extLst>
           </p:cNvPr>
@@ -8342,7 +8596,7 @@
           <p:cNvPr id="7" name="Table 6">
             <a:extLst>
               <a:ext uri="{FF2B5EF4-FFF2-40B4-BE49-F238E27FC236}">
-                <a16:creationId xmlns:a16="http://schemas.microsoft.com/office/drawing/2014/main" id="{9CAF9F99-453D-44F1-88EC-228F7966FFE4}"/>
+                <a16:creationId xmlns:a16="http://schemas.microsoft.com/office/drawing/2014/main" xmlns="" id="{9CAF9F99-453D-44F1-88EC-228F7966FFE4}"/>
               </a:ext>
             </a:extLst>
           </p:cNvPr>
@@ -8371,14 +8625,14 @@
                 <a:gridCol w="4521200">
                   <a:extLst>
                     <a:ext uri="{9D8B030D-6E8A-4147-A177-3AD203B41FA5}">
-                      <a16:colId xmlns:a16="http://schemas.microsoft.com/office/drawing/2014/main" val="371563066"/>
+                      <a16:colId xmlns:a16="http://schemas.microsoft.com/office/drawing/2014/main" xmlns="" val="371563066"/>
                     </a:ext>
                   </a:extLst>
                 </a:gridCol>
                 <a:gridCol w="4555066">
                   <a:extLst>
                     <a:ext uri="{9D8B030D-6E8A-4147-A177-3AD203B41FA5}">
-                      <a16:colId xmlns:a16="http://schemas.microsoft.com/office/drawing/2014/main" val="2181931161"/>
+                      <a16:colId xmlns:a16="http://schemas.microsoft.com/office/drawing/2014/main" xmlns="" val="2181931161"/>
                     </a:ext>
                   </a:extLst>
                 </a:gridCol>
@@ -8540,7 +8794,7 @@
                 </a:tc>
                 <a:extLst>
                   <a:ext uri="{0D108BD9-81ED-4DB2-BD59-A6C34878D82A}">
-                    <a16:rowId xmlns:a16="http://schemas.microsoft.com/office/drawing/2014/main" val="2258008607"/>
+                    <a16:rowId xmlns:a16="http://schemas.microsoft.com/office/drawing/2014/main" xmlns="" val="2258008607"/>
                   </a:ext>
                 </a:extLst>
               </a:tr>
@@ -8553,7 +8807,7 @@
           <p:cNvPr id="8" name="Table 7">
             <a:extLst>
               <a:ext uri="{FF2B5EF4-FFF2-40B4-BE49-F238E27FC236}">
-                <a16:creationId xmlns:a16="http://schemas.microsoft.com/office/drawing/2014/main" id="{9CAF9F99-453D-44F1-88EC-228F7966FFE4}"/>
+                <a16:creationId xmlns:a16="http://schemas.microsoft.com/office/drawing/2014/main" xmlns="" id="{9CAF9F99-453D-44F1-88EC-228F7966FFE4}"/>
               </a:ext>
             </a:extLst>
           </p:cNvPr>
@@ -8582,14 +8836,14 @@
                 <a:gridCol w="4521200">
                   <a:extLst>
                     <a:ext uri="{9D8B030D-6E8A-4147-A177-3AD203B41FA5}">
-                      <a16:colId xmlns:a16="http://schemas.microsoft.com/office/drawing/2014/main" val="371563066"/>
+                      <a16:colId xmlns:a16="http://schemas.microsoft.com/office/drawing/2014/main" xmlns="" val="371563066"/>
                     </a:ext>
                   </a:extLst>
                 </a:gridCol>
                 <a:gridCol w="4555066">
                   <a:extLst>
                     <a:ext uri="{9D8B030D-6E8A-4147-A177-3AD203B41FA5}">
-                      <a16:colId xmlns:a16="http://schemas.microsoft.com/office/drawing/2014/main" val="2181931161"/>
+                      <a16:colId xmlns:a16="http://schemas.microsoft.com/office/drawing/2014/main" xmlns="" val="2181931161"/>
                     </a:ext>
                   </a:extLst>
                 </a:gridCol>
@@ -8741,7 +8995,7 @@
                 </a:tc>
                 <a:extLst>
                   <a:ext uri="{0D108BD9-81ED-4DB2-BD59-A6C34878D82A}">
-                    <a16:rowId xmlns:a16="http://schemas.microsoft.com/office/drawing/2014/main" val="10001"/>
+                    <a16:rowId xmlns:a16="http://schemas.microsoft.com/office/drawing/2014/main" xmlns="" val="10001"/>
                   </a:ext>
                 </a:extLst>
               </a:tr>
@@ -8792,7 +9046,7 @@
           <p:cNvPr id="6" name="Content Placeholder 2">
             <a:extLst>
               <a:ext uri="{FF2B5EF4-FFF2-40B4-BE49-F238E27FC236}">
-                <a16:creationId xmlns:a16="http://schemas.microsoft.com/office/drawing/2014/main" id="{747102BF-A698-444E-B693-3BC2E2F22350}"/>
+                <a16:creationId xmlns:a16="http://schemas.microsoft.com/office/drawing/2014/main" xmlns="" id="{747102BF-A698-444E-B693-3BC2E2F22350}"/>
               </a:ext>
             </a:extLst>
           </p:cNvPr>
@@ -8999,7 +9253,7 @@
           <p:cNvPr id="5" name="Table 4">
             <a:extLst>
               <a:ext uri="{FF2B5EF4-FFF2-40B4-BE49-F238E27FC236}">
-                <a16:creationId xmlns:a16="http://schemas.microsoft.com/office/drawing/2014/main" id="{9CAF9F99-453D-44F1-88EC-228F7966FFE4}"/>
+                <a16:creationId xmlns:a16="http://schemas.microsoft.com/office/drawing/2014/main" xmlns="" id="{9CAF9F99-453D-44F1-88EC-228F7966FFE4}"/>
               </a:ext>
             </a:extLst>
           </p:cNvPr>
@@ -9028,14 +9282,14 @@
                 <a:gridCol w="4521200">
                   <a:extLst>
                     <a:ext uri="{9D8B030D-6E8A-4147-A177-3AD203B41FA5}">
-                      <a16:colId xmlns:a16="http://schemas.microsoft.com/office/drawing/2014/main" val="371563066"/>
+                      <a16:colId xmlns:a16="http://schemas.microsoft.com/office/drawing/2014/main" xmlns="" val="371563066"/>
                     </a:ext>
                   </a:extLst>
                 </a:gridCol>
                 <a:gridCol w="4555066">
                   <a:extLst>
                     <a:ext uri="{9D8B030D-6E8A-4147-A177-3AD203B41FA5}">
-                      <a16:colId xmlns:a16="http://schemas.microsoft.com/office/drawing/2014/main" val="2181931161"/>
+                      <a16:colId xmlns:a16="http://schemas.microsoft.com/office/drawing/2014/main" xmlns="" val="2181931161"/>
                     </a:ext>
                   </a:extLst>
                 </a:gridCol>
@@ -9187,7 +9441,7 @@
                 </a:tc>
                 <a:extLst>
                   <a:ext uri="{0D108BD9-81ED-4DB2-BD59-A6C34878D82A}">
-                    <a16:rowId xmlns:a16="http://schemas.microsoft.com/office/drawing/2014/main" val="10001"/>
+                    <a16:rowId xmlns:a16="http://schemas.microsoft.com/office/drawing/2014/main" xmlns="" val="10001"/>
                   </a:ext>
                 </a:extLst>
               </a:tr>

</xml_diff>

<commit_message>
debug screen alignment func
</commit_message>
<xml_diff>
--- a/experiment/RUN_ME/stimuli/instructions presentation.pptx
+++ b/experiment/RUN_ME/stimuli/instructions presentation.pptx
@@ -263,7 +263,7 @@
           <a:p>
             <a:fld id="{F999E2B6-E0C8-4E2F-B37B-1FC830B33272}" type="datetimeFigureOut">
               <a:rPr lang="en-US" smtClean="0"/>
-              <a:t>4/7/2021</a:t>
+              <a:t>4/8/2021</a:t>
             </a:fld>
             <a:endParaRPr lang="en-US"/>
           </a:p>
@@ -431,7 +431,7 @@
           <a:p>
             <a:fld id="{F999E2B6-E0C8-4E2F-B37B-1FC830B33272}" type="datetimeFigureOut">
               <a:rPr lang="en-US" smtClean="0"/>
-              <a:t>4/7/2021</a:t>
+              <a:t>4/8/2021</a:t>
             </a:fld>
             <a:endParaRPr lang="en-US"/>
           </a:p>
@@ -609,7 +609,7 @@
           <a:p>
             <a:fld id="{F999E2B6-E0C8-4E2F-B37B-1FC830B33272}" type="datetimeFigureOut">
               <a:rPr lang="en-US" smtClean="0"/>
-              <a:t>4/7/2021</a:t>
+              <a:t>4/8/2021</a:t>
             </a:fld>
             <a:endParaRPr lang="en-US"/>
           </a:p>
@@ -777,7 +777,7 @@
           <a:p>
             <a:fld id="{F999E2B6-E0C8-4E2F-B37B-1FC830B33272}" type="datetimeFigureOut">
               <a:rPr lang="en-US" smtClean="0"/>
-              <a:t>4/7/2021</a:t>
+              <a:t>4/8/2021</a:t>
             </a:fld>
             <a:endParaRPr lang="en-US"/>
           </a:p>
@@ -1022,7 +1022,7 @@
           <a:p>
             <a:fld id="{F999E2B6-E0C8-4E2F-B37B-1FC830B33272}" type="datetimeFigureOut">
               <a:rPr lang="en-US" smtClean="0"/>
-              <a:t>4/7/2021</a:t>
+              <a:t>4/8/2021</a:t>
             </a:fld>
             <a:endParaRPr lang="en-US"/>
           </a:p>
@@ -1251,7 +1251,7 @@
           <a:p>
             <a:fld id="{F999E2B6-E0C8-4E2F-B37B-1FC830B33272}" type="datetimeFigureOut">
               <a:rPr lang="en-US" smtClean="0"/>
-              <a:t>4/7/2021</a:t>
+              <a:t>4/8/2021</a:t>
             </a:fld>
             <a:endParaRPr lang="en-US"/>
           </a:p>
@@ -1615,7 +1615,7 @@
           <a:p>
             <a:fld id="{F999E2B6-E0C8-4E2F-B37B-1FC830B33272}" type="datetimeFigureOut">
               <a:rPr lang="en-US" smtClean="0"/>
-              <a:t>4/7/2021</a:t>
+              <a:t>4/8/2021</a:t>
             </a:fld>
             <a:endParaRPr lang="en-US"/>
           </a:p>
@@ -1732,7 +1732,7 @@
           <a:p>
             <a:fld id="{F999E2B6-E0C8-4E2F-B37B-1FC830B33272}" type="datetimeFigureOut">
               <a:rPr lang="en-US" smtClean="0"/>
-              <a:t>4/7/2021</a:t>
+              <a:t>4/8/2021</a:t>
             </a:fld>
             <a:endParaRPr lang="en-US"/>
           </a:p>
@@ -1827,7 +1827,7 @@
           <a:p>
             <a:fld id="{F999E2B6-E0C8-4E2F-B37B-1FC830B33272}" type="datetimeFigureOut">
               <a:rPr lang="en-US" smtClean="0"/>
-              <a:t>4/7/2021</a:t>
+              <a:t>4/8/2021</a:t>
             </a:fld>
             <a:endParaRPr lang="en-US"/>
           </a:p>
@@ -2102,7 +2102,7 @@
           <a:p>
             <a:fld id="{F999E2B6-E0C8-4E2F-B37B-1FC830B33272}" type="datetimeFigureOut">
               <a:rPr lang="en-US" smtClean="0"/>
-              <a:t>4/7/2021</a:t>
+              <a:t>4/8/2021</a:t>
             </a:fld>
             <a:endParaRPr lang="en-US"/>
           </a:p>
@@ -2354,7 +2354,7 @@
           <a:p>
             <a:fld id="{F999E2B6-E0C8-4E2F-B37B-1FC830B33272}" type="datetimeFigureOut">
               <a:rPr lang="en-US" smtClean="0"/>
-              <a:t>4/7/2021</a:t>
+              <a:t>4/8/2021</a:t>
             </a:fld>
             <a:endParaRPr lang="en-US"/>
           </a:p>
@@ -2565,7 +2565,7 @@
           <a:p>
             <a:fld id="{F999E2B6-E0C8-4E2F-B37B-1FC830B33272}" type="datetimeFigureOut">
               <a:rPr lang="en-US" smtClean="0"/>
-              <a:t>4/7/2021</a:t>
+              <a:t>4/8/2021</a:t>
             </a:fld>
             <a:endParaRPr lang="en-US"/>
           </a:p>
@@ -3063,7 +3063,7 @@
           <p:cNvPr id="2" name="Table 2">
             <a:extLst>
               <a:ext uri="{FF2B5EF4-FFF2-40B4-BE49-F238E27FC236}">
-                <a16:creationId xmlns:a16="http://schemas.microsoft.com/office/drawing/2014/main" id="{9768F41E-FF16-4CA0-9061-785C57DCD75D}"/>
+                <a16:creationId xmlns:a16="http://schemas.microsoft.com/office/drawing/2014/main" xmlns="" id="{9768F41E-FF16-4CA0-9061-785C57DCD75D}"/>
               </a:ext>
             </a:extLst>
           </p:cNvPr>
@@ -3092,28 +3092,28 @@
                 <a:gridCol w="3048000">
                   <a:extLst>
                     <a:ext uri="{9D8B030D-6E8A-4147-A177-3AD203B41FA5}">
-                      <a16:colId xmlns:a16="http://schemas.microsoft.com/office/drawing/2014/main" val="371563066"/>
+                      <a16:colId xmlns:a16="http://schemas.microsoft.com/office/drawing/2014/main" xmlns="" val="371563066"/>
                     </a:ext>
                   </a:extLst>
                 </a:gridCol>
                 <a:gridCol w="3048000">
                   <a:extLst>
                     <a:ext uri="{9D8B030D-6E8A-4147-A177-3AD203B41FA5}">
-                      <a16:colId xmlns:a16="http://schemas.microsoft.com/office/drawing/2014/main" val="2688513847"/>
+                      <a16:colId xmlns:a16="http://schemas.microsoft.com/office/drawing/2014/main" xmlns="" val="2688513847"/>
                     </a:ext>
                   </a:extLst>
                 </a:gridCol>
                 <a:gridCol w="3048000">
                   <a:extLst>
                     <a:ext uri="{9D8B030D-6E8A-4147-A177-3AD203B41FA5}">
-                      <a16:colId xmlns:a16="http://schemas.microsoft.com/office/drawing/2014/main" val="2201978408"/>
+                      <a16:colId xmlns:a16="http://schemas.microsoft.com/office/drawing/2014/main" xmlns="" val="2201978408"/>
                     </a:ext>
                   </a:extLst>
                 </a:gridCol>
                 <a:gridCol w="3048000">
                   <a:extLst>
                     <a:ext uri="{9D8B030D-6E8A-4147-A177-3AD203B41FA5}">
-                      <a16:colId xmlns:a16="http://schemas.microsoft.com/office/drawing/2014/main" val="2181931161"/>
+                      <a16:colId xmlns:a16="http://schemas.microsoft.com/office/drawing/2014/main" xmlns="" val="2181931161"/>
                     </a:ext>
                   </a:extLst>
                 </a:gridCol>
@@ -3289,7 +3289,7 @@
                 </a:tc>
                 <a:extLst>
                   <a:ext uri="{0D108BD9-81ED-4DB2-BD59-A6C34878D82A}">
-                    <a16:rowId xmlns:a16="http://schemas.microsoft.com/office/drawing/2014/main" val="2258008607"/>
+                    <a16:rowId xmlns:a16="http://schemas.microsoft.com/office/drawing/2014/main" xmlns="" val="2258008607"/>
                   </a:ext>
                 </a:extLst>
               </a:tr>
@@ -3497,7 +3497,7 @@
                 </a:tc>
                 <a:extLst>
                   <a:ext uri="{0D108BD9-81ED-4DB2-BD59-A6C34878D82A}">
-                    <a16:rowId xmlns:a16="http://schemas.microsoft.com/office/drawing/2014/main" val="3004479924"/>
+                    <a16:rowId xmlns:a16="http://schemas.microsoft.com/office/drawing/2014/main" xmlns="" val="3004479924"/>
                   </a:ext>
                 </a:extLst>
               </a:tr>
@@ -3510,7 +3510,7 @@
           <p:cNvPr id="6" name="Content Placeholder 2">
             <a:extLst>
               <a:ext uri="{FF2B5EF4-FFF2-40B4-BE49-F238E27FC236}">
-                <a16:creationId xmlns:a16="http://schemas.microsoft.com/office/drawing/2014/main" id="{747102BF-A698-444E-B693-3BC2E2F22350}"/>
+                <a16:creationId xmlns:a16="http://schemas.microsoft.com/office/drawing/2014/main" xmlns="" id="{747102BF-A698-444E-B693-3BC2E2F22350}"/>
               </a:ext>
             </a:extLst>
           </p:cNvPr>
@@ -3755,7 +3755,7 @@
           <p:cNvPr id="6" name="Content Placeholder 2">
             <a:extLst>
               <a:ext uri="{FF2B5EF4-FFF2-40B4-BE49-F238E27FC236}">
-                <a16:creationId xmlns:a16="http://schemas.microsoft.com/office/drawing/2014/main" id="{747102BF-A698-444E-B693-3BC2E2F22350}"/>
+                <a16:creationId xmlns:a16="http://schemas.microsoft.com/office/drawing/2014/main" xmlns="" id="{747102BF-A698-444E-B693-3BC2E2F22350}"/>
               </a:ext>
             </a:extLst>
           </p:cNvPr>
@@ -3997,7 +3997,7 @@
           <p:cNvPr id="6" name="Content Placeholder 2">
             <a:extLst>
               <a:ext uri="{FF2B5EF4-FFF2-40B4-BE49-F238E27FC236}">
-                <a16:creationId xmlns:a16="http://schemas.microsoft.com/office/drawing/2014/main" id="{747102BF-A698-444E-B693-3BC2E2F22350}"/>
+                <a16:creationId xmlns:a16="http://schemas.microsoft.com/office/drawing/2014/main" xmlns="" id="{747102BF-A698-444E-B693-3BC2E2F22350}"/>
               </a:ext>
             </a:extLst>
           </p:cNvPr>
@@ -4239,7 +4239,7 @@
           <p:cNvPr id="6" name="Content Placeholder 2">
             <a:extLst>
               <a:ext uri="{FF2B5EF4-FFF2-40B4-BE49-F238E27FC236}">
-                <a16:creationId xmlns:a16="http://schemas.microsoft.com/office/drawing/2014/main" id="{747102BF-A698-444E-B693-3BC2E2F22350}"/>
+                <a16:creationId xmlns:a16="http://schemas.microsoft.com/office/drawing/2014/main" xmlns="" id="{747102BF-A698-444E-B693-3BC2E2F22350}"/>
               </a:ext>
             </a:extLst>
           </p:cNvPr>
@@ -4491,7 +4491,7 @@
           <p:cNvPr id="6" name="Content Placeholder 2">
             <a:extLst>
               <a:ext uri="{FF2B5EF4-FFF2-40B4-BE49-F238E27FC236}">
-                <a16:creationId xmlns:a16="http://schemas.microsoft.com/office/drawing/2014/main" id="{747102BF-A698-444E-B693-3BC2E2F22350}"/>
+                <a16:creationId xmlns:a16="http://schemas.microsoft.com/office/drawing/2014/main" xmlns="" id="{747102BF-A698-444E-B693-3BC2E2F22350}"/>
               </a:ext>
             </a:extLst>
           </p:cNvPr>
@@ -4754,7 +4754,7 @@
           <p:cNvPr id="6" name="Content Placeholder 2">
             <a:extLst>
               <a:ext uri="{FF2B5EF4-FFF2-40B4-BE49-F238E27FC236}">
-                <a16:creationId xmlns:a16="http://schemas.microsoft.com/office/drawing/2014/main" id="{747102BF-A698-444E-B693-3BC2E2F22350}"/>
+                <a16:creationId xmlns:a16="http://schemas.microsoft.com/office/drawing/2014/main" xmlns="" id="{747102BF-A698-444E-B693-3BC2E2F22350}"/>
               </a:ext>
             </a:extLst>
           </p:cNvPr>
@@ -5007,7 +5007,7 @@
           <p:cNvPr id="6" name="Content Placeholder 2">
             <a:extLst>
               <a:ext uri="{FF2B5EF4-FFF2-40B4-BE49-F238E27FC236}">
-                <a16:creationId xmlns:a16="http://schemas.microsoft.com/office/drawing/2014/main" id="{747102BF-A698-444E-B693-3BC2E2F22350}"/>
+                <a16:creationId xmlns:a16="http://schemas.microsoft.com/office/drawing/2014/main" xmlns="" id="{747102BF-A698-444E-B693-3BC2E2F22350}"/>
               </a:ext>
             </a:extLst>
           </p:cNvPr>
@@ -5252,7 +5252,7 @@
           <p:cNvPr id="6" name="Content Placeholder 2">
             <a:extLst>
               <a:ext uri="{FF2B5EF4-FFF2-40B4-BE49-F238E27FC236}">
-                <a16:creationId xmlns:a16="http://schemas.microsoft.com/office/drawing/2014/main" id="{747102BF-A698-444E-B693-3BC2E2F22350}"/>
+                <a16:creationId xmlns:a16="http://schemas.microsoft.com/office/drawing/2014/main" xmlns="" id="{747102BF-A698-444E-B693-3BC2E2F22350}"/>
               </a:ext>
             </a:extLst>
           </p:cNvPr>
@@ -5459,7 +5459,7 @@
           <p:cNvPr id="5" name="Table 4">
             <a:extLst>
               <a:ext uri="{FF2B5EF4-FFF2-40B4-BE49-F238E27FC236}">
-                <a16:creationId xmlns:a16="http://schemas.microsoft.com/office/drawing/2014/main" id="{9CAF9F99-453D-44F1-88EC-228F7966FFE4}"/>
+                <a16:creationId xmlns:a16="http://schemas.microsoft.com/office/drawing/2014/main" xmlns="" id="{9CAF9F99-453D-44F1-88EC-228F7966FFE4}"/>
               </a:ext>
             </a:extLst>
           </p:cNvPr>
@@ -5488,7 +5488,7 @@
                 <a:gridCol w="9076266">
                   <a:extLst>
                     <a:ext uri="{9D8B030D-6E8A-4147-A177-3AD203B41FA5}">
-                      <a16:colId xmlns:a16="http://schemas.microsoft.com/office/drawing/2014/main" val="371563066"/>
+                      <a16:colId xmlns:a16="http://schemas.microsoft.com/office/drawing/2014/main" xmlns="" val="371563066"/>
                     </a:ext>
                   </a:extLst>
                 </a:gridCol>
@@ -5543,7 +5543,7 @@
                 </a:tc>
                 <a:extLst>
                   <a:ext uri="{0D108BD9-81ED-4DB2-BD59-A6C34878D82A}">
-                    <a16:rowId xmlns:a16="http://schemas.microsoft.com/office/drawing/2014/main" val="10001"/>
+                    <a16:rowId xmlns:a16="http://schemas.microsoft.com/office/drawing/2014/main" xmlns="" val="10001"/>
                   </a:ext>
                 </a:extLst>
               </a:tr>
@@ -5594,7 +5594,7 @@
           <p:cNvPr id="6" name="Content Placeholder 2">
             <a:extLst>
               <a:ext uri="{FF2B5EF4-FFF2-40B4-BE49-F238E27FC236}">
-                <a16:creationId xmlns:a16="http://schemas.microsoft.com/office/drawing/2014/main" id="{747102BF-A698-444E-B693-3BC2E2F22350}"/>
+                <a16:creationId xmlns:a16="http://schemas.microsoft.com/office/drawing/2014/main" xmlns="" id="{747102BF-A698-444E-B693-3BC2E2F22350}"/>
               </a:ext>
             </a:extLst>
           </p:cNvPr>
@@ -5801,7 +5801,7 @@
           <p:cNvPr id="5" name="Table 4">
             <a:extLst>
               <a:ext uri="{FF2B5EF4-FFF2-40B4-BE49-F238E27FC236}">
-                <a16:creationId xmlns:a16="http://schemas.microsoft.com/office/drawing/2014/main" id="{9CAF9F99-453D-44F1-88EC-228F7966FFE4}"/>
+                <a16:creationId xmlns:a16="http://schemas.microsoft.com/office/drawing/2014/main" xmlns="" id="{9CAF9F99-453D-44F1-88EC-228F7966FFE4}"/>
               </a:ext>
             </a:extLst>
           </p:cNvPr>
@@ -5830,14 +5830,14 @@
                 <a:gridCol w="4521200">
                   <a:extLst>
                     <a:ext uri="{9D8B030D-6E8A-4147-A177-3AD203B41FA5}">
-                      <a16:colId xmlns:a16="http://schemas.microsoft.com/office/drawing/2014/main" val="371563066"/>
+                      <a16:colId xmlns:a16="http://schemas.microsoft.com/office/drawing/2014/main" xmlns="" val="371563066"/>
                     </a:ext>
                   </a:extLst>
                 </a:gridCol>
                 <a:gridCol w="4555066">
                   <a:extLst>
                     <a:ext uri="{9D8B030D-6E8A-4147-A177-3AD203B41FA5}">
-                      <a16:colId xmlns:a16="http://schemas.microsoft.com/office/drawing/2014/main" val="2181931161"/>
+                      <a16:colId xmlns:a16="http://schemas.microsoft.com/office/drawing/2014/main" xmlns="" val="2181931161"/>
                     </a:ext>
                   </a:extLst>
                 </a:gridCol>
@@ -5972,7 +5972,7 @@
                 </a:tc>
                 <a:extLst>
                   <a:ext uri="{0D108BD9-81ED-4DB2-BD59-A6C34878D82A}">
-                    <a16:rowId xmlns:a16="http://schemas.microsoft.com/office/drawing/2014/main" val="10001"/>
+                    <a16:rowId xmlns:a16="http://schemas.microsoft.com/office/drawing/2014/main" xmlns="" val="10001"/>
                   </a:ext>
                 </a:extLst>
               </a:tr>
@@ -6023,7 +6023,7 @@
           <p:cNvPr id="6" name="Content Placeholder 2">
             <a:extLst>
               <a:ext uri="{FF2B5EF4-FFF2-40B4-BE49-F238E27FC236}">
-                <a16:creationId xmlns:a16="http://schemas.microsoft.com/office/drawing/2014/main" id="{747102BF-A698-444E-B693-3BC2E2F22350}"/>
+                <a16:creationId xmlns:a16="http://schemas.microsoft.com/office/drawing/2014/main" xmlns="" id="{747102BF-A698-444E-B693-3BC2E2F22350}"/>
               </a:ext>
             </a:extLst>
           </p:cNvPr>
@@ -6230,7 +6230,7 @@
           <p:cNvPr id="5" name="Table 4">
             <a:extLst>
               <a:ext uri="{FF2B5EF4-FFF2-40B4-BE49-F238E27FC236}">
-                <a16:creationId xmlns:a16="http://schemas.microsoft.com/office/drawing/2014/main" id="{9CAF9F99-453D-44F1-88EC-228F7966FFE4}"/>
+                <a16:creationId xmlns:a16="http://schemas.microsoft.com/office/drawing/2014/main" xmlns="" id="{9CAF9F99-453D-44F1-88EC-228F7966FFE4}"/>
               </a:ext>
             </a:extLst>
           </p:cNvPr>
@@ -6259,14 +6259,14 @@
                 <a:gridCol w="4521200">
                   <a:extLst>
                     <a:ext uri="{9D8B030D-6E8A-4147-A177-3AD203B41FA5}">
-                      <a16:colId xmlns:a16="http://schemas.microsoft.com/office/drawing/2014/main" val="371563066"/>
+                      <a16:colId xmlns:a16="http://schemas.microsoft.com/office/drawing/2014/main" xmlns="" val="371563066"/>
                     </a:ext>
                   </a:extLst>
                 </a:gridCol>
                 <a:gridCol w="4555066">
                   <a:extLst>
                     <a:ext uri="{9D8B030D-6E8A-4147-A177-3AD203B41FA5}">
-                      <a16:colId xmlns:a16="http://schemas.microsoft.com/office/drawing/2014/main" val="2181931161"/>
+                      <a16:colId xmlns:a16="http://schemas.microsoft.com/office/drawing/2014/main" xmlns="" val="2181931161"/>
                     </a:ext>
                   </a:extLst>
                 </a:gridCol>
@@ -6402,7 +6402,7 @@
                 </a:tc>
                 <a:extLst>
                   <a:ext uri="{0D108BD9-81ED-4DB2-BD59-A6C34878D82A}">
-                    <a16:rowId xmlns:a16="http://schemas.microsoft.com/office/drawing/2014/main" val="10001"/>
+                    <a16:rowId xmlns:a16="http://schemas.microsoft.com/office/drawing/2014/main" xmlns="" val="10001"/>
                   </a:ext>
                 </a:extLst>
               </a:tr>
@@ -6420,6 +6420,13 @@
   <p:clrMapOvr>
     <a:masterClrMapping/>
   </p:clrMapOvr>
+  <p:timing>
+    <p:tnLst>
+      <p:par>
+        <p:cTn id="1" dur="indefinite" restart="never" nodeType="tmRoot"/>
+      </p:par>
+    </p:tnLst>
+  </p:timing>
 </p:sld>
 </file>
 
@@ -6545,7 +6552,7 @@
           <p:cNvPr id="6" name="Content Placeholder 2">
             <a:extLst>
               <a:ext uri="{FF2B5EF4-FFF2-40B4-BE49-F238E27FC236}">
-                <a16:creationId xmlns:a16="http://schemas.microsoft.com/office/drawing/2014/main" id="{747102BF-A698-444E-B693-3BC2E2F22350}"/>
+                <a16:creationId xmlns:a16="http://schemas.microsoft.com/office/drawing/2014/main" xmlns="" id="{747102BF-A698-444E-B693-3BC2E2F22350}"/>
               </a:ext>
             </a:extLst>
           </p:cNvPr>
@@ -6556,8 +6563,8 @@
         </p:nvSpPr>
         <p:spPr>
           <a:xfrm>
-            <a:off x="224225" y="264728"/>
-            <a:ext cx="10808368" cy="2016995"/>
+            <a:off x="22469" y="71027"/>
+            <a:ext cx="10808368" cy="2409578"/>
           </a:xfrm>
           <a:prstGeom prst="rect">
             <a:avLst/>
@@ -6565,7 +6572,7 @@
         </p:spPr>
         <p:txBody>
           <a:bodyPr vert="horz" lIns="91440" tIns="45720" rIns="91440" bIns="45720" rtlCol="0">
-            <a:normAutofit/>
+            <a:normAutofit fontScale="85000" lnSpcReduction="20000"/>
           </a:bodyPr>
           <a:lstStyle>
             <a:lvl1pPr marL="228600" indent="-228600" algn="l" defTabSz="914400" rtl="0" eaLnBrk="1" latinLnBrk="0" hangingPunct="1">
@@ -6737,8 +6744,8 @@
               <a:buAutoNum type="arabicPeriod"/>
             </a:pPr>
             <a:r>
-              <a:rPr lang="en-US" sz="2400" b="1" dirty="0"/>
-              <a:t>Put finger on blue circle A and press A, then on B and press B.</a:t>
+              <a:rPr lang="en-US" sz="2400" b="1" dirty="0" smtClean="0"/>
+              <a:t>Put Marker on starting point and press ‘s’.</a:t>
             </a:r>
           </a:p>
           <a:p>
@@ -6747,9 +6754,93 @@
               <a:buAutoNum type="arabicPeriod"/>
             </a:pPr>
             <a:r>
+              <a:rPr lang="en-US" sz="2400" b="1" dirty="0" smtClean="0"/>
+              <a:t>Put marker on </a:t>
+            </a:r>
+            <a:r>
               <a:rPr lang="en-US" sz="2400" b="1" dirty="0"/>
-              <a:t>Verify angle between AB and AS is 90⁰ (S = start point).</a:t>
-            </a:r>
+              <a:t>blue circle A and press </a:t>
+            </a:r>
+            <a:r>
+              <a:rPr lang="en-US" sz="2400" b="1" dirty="0" smtClean="0"/>
+              <a:t>‘a’, </a:t>
+            </a:r>
+            <a:r>
+              <a:rPr lang="en-US" sz="2400" b="1" dirty="0"/>
+              <a:t>then on B and press </a:t>
+            </a:r>
+            <a:r>
+              <a:rPr lang="en-US" sz="2400" b="1" dirty="0" smtClean="0"/>
+              <a:t>‘b’</a:t>
+            </a:r>
+            <a:r>
+              <a:rPr lang="en-US" sz="2400" b="1" dirty="0" smtClean="0"/>
+              <a:t>.</a:t>
+            </a:r>
+          </a:p>
+          <a:p>
+            <a:pPr marL="457200" indent="-457200">
+              <a:buFont typeface="+mj-lt"/>
+              <a:buAutoNum type="arabicPeriod"/>
+            </a:pPr>
+            <a:r>
+              <a:rPr lang="en-US" sz="2400" b="1" dirty="0" smtClean="0"/>
+              <a:t>Marker on table exactly below A, and </a:t>
+            </a:r>
+            <a:r>
+              <a:rPr lang="en-US" sz="2400" b="1" smtClean="0"/>
+              <a:t>press ‘t’.</a:t>
+            </a:r>
+            <a:endParaRPr lang="en-US" sz="2400" b="1" dirty="0"/>
+          </a:p>
+          <a:p>
+            <a:pPr marL="457200" indent="-457200">
+              <a:buFont typeface="+mj-lt"/>
+              <a:buAutoNum type="arabicPeriod"/>
+            </a:pPr>
+            <a:r>
+              <a:rPr lang="en-US" sz="2400" b="1" dirty="0" smtClean="0"/>
+              <a:t>Adjust screen so that:</a:t>
+            </a:r>
+          </a:p>
+          <a:p>
+            <a:pPr marL="914400" lvl="1" indent="-457200">
+              <a:buFont typeface="+mj-lt"/>
+              <a:buAutoNum type="arabicPeriod"/>
+            </a:pPr>
+            <a:r>
+              <a:rPr lang="en-US" sz="2000" b="1" dirty="0" smtClean="0"/>
+              <a:t>Angle </a:t>
+            </a:r>
+            <a:r>
+              <a:rPr lang="en-US" sz="2000" b="1" dirty="0"/>
+              <a:t>between AB and AS is 90⁰ (S = start point</a:t>
+            </a:r>
+            <a:r>
+              <a:rPr lang="en-US" sz="2000" b="1" dirty="0" smtClean="0"/>
+              <a:t>).</a:t>
+            </a:r>
+          </a:p>
+          <a:p>
+            <a:pPr marL="914400" lvl="1" indent="-457200">
+              <a:buFont typeface="+mj-lt"/>
+              <a:buAutoNum type="arabicPeriod"/>
+            </a:pPr>
+            <a:r>
+              <a:rPr lang="en-US" sz="2000" b="1" dirty="0" smtClean="0"/>
+              <a:t>Distance from starting point to screen is 40 cm.</a:t>
+            </a:r>
+          </a:p>
+          <a:p>
+            <a:pPr marL="914400" lvl="1" indent="-457200">
+              <a:buFont typeface="+mj-lt"/>
+              <a:buAutoNum type="arabicPeriod"/>
+            </a:pPr>
+            <a:r>
+              <a:rPr lang="en-US" sz="2000" b="1" dirty="0" smtClean="0"/>
+              <a:t>Height of A is 25 cm.</a:t>
+            </a:r>
+            <a:endParaRPr lang="en-US" sz="2000" b="1" dirty="0"/>
           </a:p>
           <a:p>
             <a:pPr marL="0" indent="0">
@@ -6757,7 +6848,11 @@
             </a:pPr>
             <a:r>
               <a:rPr lang="en-US" sz="2400" b="1" dirty="0"/>
-              <a:t>Repeat until condition in 2 is met, then press space.</a:t>
+              <a:t>Repeat until </a:t>
+            </a:r>
+            <a:r>
+              <a:rPr lang="en-US" sz="2400" b="1" dirty="0" smtClean="0"/>
+              <a:t>all conditions are met, then press space.</a:t>
             </a:r>
             <a:endParaRPr lang="he-IL" sz="2400" b="1" dirty="0"/>
           </a:p>
@@ -6771,7 +6866,7 @@
           <p:cNvPr id="5" name="Table 4">
             <a:extLst>
               <a:ext uri="{FF2B5EF4-FFF2-40B4-BE49-F238E27FC236}">
-                <a16:creationId xmlns:a16="http://schemas.microsoft.com/office/drawing/2014/main" id="{9CAF9F99-453D-44F1-88EC-228F7966FFE4}"/>
+                <a16:creationId xmlns:a16="http://schemas.microsoft.com/office/drawing/2014/main" xmlns="" id="{9CAF9F99-453D-44F1-88EC-228F7966FFE4}"/>
               </a:ext>
             </a:extLst>
           </p:cNvPr>
@@ -6800,14 +6895,14 @@
                 <a:gridCol w="3542156">
                   <a:extLst>
                     <a:ext uri="{9D8B030D-6E8A-4147-A177-3AD203B41FA5}">
-                      <a16:colId xmlns:a16="http://schemas.microsoft.com/office/drawing/2014/main" val="371563066"/>
+                      <a16:colId xmlns:a16="http://schemas.microsoft.com/office/drawing/2014/main" xmlns="" val="371563066"/>
                     </a:ext>
                   </a:extLst>
                 </a:gridCol>
                 <a:gridCol w="3568688">
                   <a:extLst>
                     <a:ext uri="{9D8B030D-6E8A-4147-A177-3AD203B41FA5}">
-                      <a16:colId xmlns:a16="http://schemas.microsoft.com/office/drawing/2014/main" val="2181931161"/>
+                      <a16:colId xmlns:a16="http://schemas.microsoft.com/office/drawing/2014/main" xmlns="" val="2181931161"/>
                     </a:ext>
                   </a:extLst>
                 </a:gridCol>
@@ -6943,7 +7038,7 @@
                 </a:tc>
                 <a:extLst>
                   <a:ext uri="{0D108BD9-81ED-4DB2-BD59-A6C34878D82A}">
-                    <a16:rowId xmlns:a16="http://schemas.microsoft.com/office/drawing/2014/main" val="10001"/>
+                    <a16:rowId xmlns:a16="http://schemas.microsoft.com/office/drawing/2014/main" xmlns="" val="10001"/>
                   </a:ext>
                 </a:extLst>
               </a:tr>
@@ -6956,7 +7051,7 @@
           <p:cNvPr id="4" name="Table 3">
             <a:extLst>
               <a:ext uri="{FF2B5EF4-FFF2-40B4-BE49-F238E27FC236}">
-                <a16:creationId xmlns:a16="http://schemas.microsoft.com/office/drawing/2014/main" id="{A3B9448A-B7F5-4830-913D-C9F6A35383F6}"/>
+                <a16:creationId xmlns:a16="http://schemas.microsoft.com/office/drawing/2014/main" xmlns="" id="{A3B9448A-B7F5-4830-913D-C9F6A35383F6}"/>
               </a:ext>
             </a:extLst>
           </p:cNvPr>
@@ -6985,7 +7080,7 @@
                 <a:gridCol w="3290454">
                   <a:extLst>
                     <a:ext uri="{9D8B030D-6E8A-4147-A177-3AD203B41FA5}">
-                      <a16:colId xmlns:a16="http://schemas.microsoft.com/office/drawing/2014/main" val="371563066"/>
+                      <a16:colId xmlns:a16="http://schemas.microsoft.com/office/drawing/2014/main" xmlns="" val="371563066"/>
                     </a:ext>
                   </a:extLst>
                 </a:gridCol>
@@ -7038,7 +7133,7 @@
                 </a:tc>
                 <a:extLst>
                   <a:ext uri="{0D108BD9-81ED-4DB2-BD59-A6C34878D82A}">
-                    <a16:rowId xmlns:a16="http://schemas.microsoft.com/office/drawing/2014/main" val="10001"/>
+                    <a16:rowId xmlns:a16="http://schemas.microsoft.com/office/drawing/2014/main" xmlns="" val="10001"/>
                   </a:ext>
                 </a:extLst>
               </a:tr>
@@ -7051,7 +7146,7 @@
           <p:cNvPr id="7" name="Table 6">
             <a:extLst>
               <a:ext uri="{FF2B5EF4-FFF2-40B4-BE49-F238E27FC236}">
-                <a16:creationId xmlns:a16="http://schemas.microsoft.com/office/drawing/2014/main" id="{E0C09A9D-193B-41BE-8D5D-486A55741393}"/>
+                <a16:creationId xmlns:a16="http://schemas.microsoft.com/office/drawing/2014/main" xmlns="" id="{E0C09A9D-193B-41BE-8D5D-486A55741393}"/>
               </a:ext>
             </a:extLst>
           </p:cNvPr>
@@ -7080,7 +7175,7 @@
                 <a:gridCol w="3290454">
                   <a:extLst>
                     <a:ext uri="{9D8B030D-6E8A-4147-A177-3AD203B41FA5}">
-                      <a16:colId xmlns:a16="http://schemas.microsoft.com/office/drawing/2014/main" val="371563066"/>
+                      <a16:colId xmlns:a16="http://schemas.microsoft.com/office/drawing/2014/main" xmlns="" val="371563066"/>
                     </a:ext>
                   </a:extLst>
                 </a:gridCol>
@@ -7133,7 +7228,7 @@
                 </a:tc>
                 <a:extLst>
                   <a:ext uri="{0D108BD9-81ED-4DB2-BD59-A6C34878D82A}">
-                    <a16:rowId xmlns:a16="http://schemas.microsoft.com/office/drawing/2014/main" val="10001"/>
+                    <a16:rowId xmlns:a16="http://schemas.microsoft.com/office/drawing/2014/main" xmlns="" val="10001"/>
                   </a:ext>
                 </a:extLst>
               </a:tr>
@@ -7146,7 +7241,7 @@
           <p:cNvPr id="8" name="Table 7">
             <a:extLst>
               <a:ext uri="{FF2B5EF4-FFF2-40B4-BE49-F238E27FC236}">
-                <a16:creationId xmlns:a16="http://schemas.microsoft.com/office/drawing/2014/main" id="{3F377A96-D01A-4E09-B218-335309637969}"/>
+                <a16:creationId xmlns:a16="http://schemas.microsoft.com/office/drawing/2014/main" xmlns="" id="{3F377A96-D01A-4E09-B218-335309637969}"/>
               </a:ext>
             </a:extLst>
           </p:cNvPr>
@@ -7175,7 +7270,7 @@
                 <a:gridCol w="3290454">
                   <a:extLst>
                     <a:ext uri="{9D8B030D-6E8A-4147-A177-3AD203B41FA5}">
-                      <a16:colId xmlns:a16="http://schemas.microsoft.com/office/drawing/2014/main" val="371563066"/>
+                      <a16:colId xmlns:a16="http://schemas.microsoft.com/office/drawing/2014/main" xmlns="" val="371563066"/>
                     </a:ext>
                   </a:extLst>
                 </a:gridCol>
@@ -7228,7 +7323,7 @@
                 </a:tc>
                 <a:extLst>
                   <a:ext uri="{0D108BD9-81ED-4DB2-BD59-A6C34878D82A}">
-                    <a16:rowId xmlns:a16="http://schemas.microsoft.com/office/drawing/2014/main" val="10001"/>
+                    <a16:rowId xmlns:a16="http://schemas.microsoft.com/office/drawing/2014/main" xmlns="" val="10001"/>
                   </a:ext>
                 </a:extLst>
               </a:tr>
@@ -7246,6 +7341,13 @@
   <p:clrMapOvr>
     <a:masterClrMapping/>
   </p:clrMapOvr>
+  <p:timing>
+    <p:tnLst>
+      <p:par>
+        <p:cTn id="1" dur="indefinite" restart="never" nodeType="tmRoot"/>
+      </p:par>
+    </p:tnLst>
+  </p:timing>
 </p:sld>
 </file>
 
@@ -7279,7 +7381,7 @@
           <p:cNvPr id="6" name="Content Placeholder 2">
             <a:extLst>
               <a:ext uri="{FF2B5EF4-FFF2-40B4-BE49-F238E27FC236}">
-                <a16:creationId xmlns:a16="http://schemas.microsoft.com/office/drawing/2014/main" id="{747102BF-A698-444E-B693-3BC2E2F22350}"/>
+                <a16:creationId xmlns:a16="http://schemas.microsoft.com/office/drawing/2014/main" xmlns="" id="{747102BF-A698-444E-B693-3BC2E2F22350}"/>
               </a:ext>
             </a:extLst>
           </p:cNvPr>
@@ -7499,6 +7601,13 @@
   <p:clrMapOvr>
     <a:masterClrMapping/>
   </p:clrMapOvr>
+  <p:timing>
+    <p:tnLst>
+      <p:par>
+        <p:cTn id="1" dur="indefinite" restart="never" nodeType="tmRoot"/>
+      </p:par>
+    </p:tnLst>
+  </p:timing>
 </p:sld>
 </file>
 
@@ -7600,7 +7709,7 @@
           <p:cNvPr id="6" name="Content Placeholder 2">
             <a:extLst>
               <a:ext uri="{FF2B5EF4-FFF2-40B4-BE49-F238E27FC236}">
-                <a16:creationId xmlns:a16="http://schemas.microsoft.com/office/drawing/2014/main" id="{747102BF-A698-444E-B693-3BC2E2F22350}"/>
+                <a16:creationId xmlns:a16="http://schemas.microsoft.com/office/drawing/2014/main" xmlns="" id="{747102BF-A698-444E-B693-3BC2E2F22350}"/>
               </a:ext>
             </a:extLst>
           </p:cNvPr>
@@ -7974,7 +8083,7 @@
           <p:cNvPr id="6" name="Content Placeholder 2">
             <a:extLst>
               <a:ext uri="{FF2B5EF4-FFF2-40B4-BE49-F238E27FC236}">
-                <a16:creationId xmlns:a16="http://schemas.microsoft.com/office/drawing/2014/main" id="{747102BF-A698-444E-B693-3BC2E2F22350}"/>
+                <a16:creationId xmlns:a16="http://schemas.microsoft.com/office/drawing/2014/main" xmlns="" id="{747102BF-A698-444E-B693-3BC2E2F22350}"/>
               </a:ext>
             </a:extLst>
           </p:cNvPr>
@@ -8226,7 +8335,7 @@
           <p:cNvPr id="6" name="Content Placeholder 2">
             <a:extLst>
               <a:ext uri="{FF2B5EF4-FFF2-40B4-BE49-F238E27FC236}">
-                <a16:creationId xmlns:a16="http://schemas.microsoft.com/office/drawing/2014/main" id="{747102BF-A698-444E-B693-3BC2E2F22350}"/>
+                <a16:creationId xmlns:a16="http://schemas.microsoft.com/office/drawing/2014/main" xmlns="" id="{747102BF-A698-444E-B693-3BC2E2F22350}"/>
               </a:ext>
             </a:extLst>
           </p:cNvPr>
@@ -8468,7 +8577,7 @@
           <p:cNvPr id="6" name="Content Placeholder 2">
             <a:extLst>
               <a:ext uri="{FF2B5EF4-FFF2-40B4-BE49-F238E27FC236}">
-                <a16:creationId xmlns:a16="http://schemas.microsoft.com/office/drawing/2014/main" id="{747102BF-A698-444E-B693-3BC2E2F22350}"/>
+                <a16:creationId xmlns:a16="http://schemas.microsoft.com/office/drawing/2014/main" xmlns="" id="{747102BF-A698-444E-B693-3BC2E2F22350}"/>
               </a:ext>
             </a:extLst>
           </p:cNvPr>
@@ -8720,7 +8829,7 @@
           <p:cNvPr id="6" name="Content Placeholder 2">
             <a:extLst>
               <a:ext uri="{FF2B5EF4-FFF2-40B4-BE49-F238E27FC236}">
-                <a16:creationId xmlns:a16="http://schemas.microsoft.com/office/drawing/2014/main" id="{747102BF-A698-444E-B693-3BC2E2F22350}"/>
+                <a16:creationId xmlns:a16="http://schemas.microsoft.com/office/drawing/2014/main" xmlns="" id="{747102BF-A698-444E-B693-3BC2E2F22350}"/>
               </a:ext>
             </a:extLst>
           </p:cNvPr>
@@ -8930,7 +9039,7 @@
           <p:cNvPr id="5" name="Table 4">
             <a:extLst>
               <a:ext uri="{FF2B5EF4-FFF2-40B4-BE49-F238E27FC236}">
-                <a16:creationId xmlns:a16="http://schemas.microsoft.com/office/drawing/2014/main" id="{9CAF9F99-453D-44F1-88EC-228F7966FFE4}"/>
+                <a16:creationId xmlns:a16="http://schemas.microsoft.com/office/drawing/2014/main" xmlns="" id="{9CAF9F99-453D-44F1-88EC-228F7966FFE4}"/>
               </a:ext>
             </a:extLst>
           </p:cNvPr>
@@ -8959,14 +9068,14 @@
                 <a:gridCol w="4521200">
                   <a:extLst>
                     <a:ext uri="{9D8B030D-6E8A-4147-A177-3AD203B41FA5}">
-                      <a16:colId xmlns:a16="http://schemas.microsoft.com/office/drawing/2014/main" val="371563066"/>
+                      <a16:colId xmlns:a16="http://schemas.microsoft.com/office/drawing/2014/main" xmlns="" val="371563066"/>
                     </a:ext>
                   </a:extLst>
                 </a:gridCol>
                 <a:gridCol w="4555066">
                   <a:extLst>
                     <a:ext uri="{9D8B030D-6E8A-4147-A177-3AD203B41FA5}">
-                      <a16:colId xmlns:a16="http://schemas.microsoft.com/office/drawing/2014/main" val="2181931161"/>
+                      <a16:colId xmlns:a16="http://schemas.microsoft.com/office/drawing/2014/main" xmlns="" val="2181931161"/>
                     </a:ext>
                   </a:extLst>
                 </a:gridCol>
@@ -9104,7 +9213,7 @@
                 </a:tc>
                 <a:extLst>
                   <a:ext uri="{0D108BD9-81ED-4DB2-BD59-A6C34878D82A}">
-                    <a16:rowId xmlns:a16="http://schemas.microsoft.com/office/drawing/2014/main" val="2258008607"/>
+                    <a16:rowId xmlns:a16="http://schemas.microsoft.com/office/drawing/2014/main" xmlns="" val="2258008607"/>
                   </a:ext>
                 </a:extLst>
               </a:tr>
@@ -9117,7 +9226,7 @@
           <p:cNvPr id="7" name="Table 6">
             <a:extLst>
               <a:ext uri="{FF2B5EF4-FFF2-40B4-BE49-F238E27FC236}">
-                <a16:creationId xmlns:a16="http://schemas.microsoft.com/office/drawing/2014/main" id="{9CAF9F99-453D-44F1-88EC-228F7966FFE4}"/>
+                <a16:creationId xmlns:a16="http://schemas.microsoft.com/office/drawing/2014/main" xmlns="" id="{9CAF9F99-453D-44F1-88EC-228F7966FFE4}"/>
               </a:ext>
             </a:extLst>
           </p:cNvPr>
@@ -9146,14 +9255,14 @@
                 <a:gridCol w="4521200">
                   <a:extLst>
                     <a:ext uri="{9D8B030D-6E8A-4147-A177-3AD203B41FA5}">
-                      <a16:colId xmlns:a16="http://schemas.microsoft.com/office/drawing/2014/main" val="371563066"/>
+                      <a16:colId xmlns:a16="http://schemas.microsoft.com/office/drawing/2014/main" xmlns="" val="371563066"/>
                     </a:ext>
                   </a:extLst>
                 </a:gridCol>
                 <a:gridCol w="4555066">
                   <a:extLst>
                     <a:ext uri="{9D8B030D-6E8A-4147-A177-3AD203B41FA5}">
-                      <a16:colId xmlns:a16="http://schemas.microsoft.com/office/drawing/2014/main" val="2181931161"/>
+                      <a16:colId xmlns:a16="http://schemas.microsoft.com/office/drawing/2014/main" xmlns="" val="2181931161"/>
                     </a:ext>
                   </a:extLst>
                 </a:gridCol>
@@ -9305,7 +9414,7 @@
                 </a:tc>
                 <a:extLst>
                   <a:ext uri="{0D108BD9-81ED-4DB2-BD59-A6C34878D82A}">
-                    <a16:rowId xmlns:a16="http://schemas.microsoft.com/office/drawing/2014/main" val="10001"/>
+                    <a16:rowId xmlns:a16="http://schemas.microsoft.com/office/drawing/2014/main" xmlns="" val="10001"/>
                   </a:ext>
                 </a:extLst>
               </a:tr>
@@ -9356,7 +9465,7 @@
           <p:cNvPr id="5" name="Content Placeholder 2">
             <a:extLst>
               <a:ext uri="{FF2B5EF4-FFF2-40B4-BE49-F238E27FC236}">
-                <a16:creationId xmlns:a16="http://schemas.microsoft.com/office/drawing/2014/main" id="{747102BF-A698-444E-B693-3BC2E2F22350}"/>
+                <a16:creationId xmlns:a16="http://schemas.microsoft.com/office/drawing/2014/main" xmlns="" id="{747102BF-A698-444E-B693-3BC2E2F22350}"/>
               </a:ext>
             </a:extLst>
           </p:cNvPr>
@@ -9585,7 +9694,7 @@
           <p:cNvPr id="7" name="Table 6">
             <a:extLst>
               <a:ext uri="{FF2B5EF4-FFF2-40B4-BE49-F238E27FC236}">
-                <a16:creationId xmlns:a16="http://schemas.microsoft.com/office/drawing/2014/main" id="{9CAF9F99-453D-44F1-88EC-228F7966FFE4}"/>
+                <a16:creationId xmlns:a16="http://schemas.microsoft.com/office/drawing/2014/main" xmlns="" id="{9CAF9F99-453D-44F1-88EC-228F7966FFE4}"/>
               </a:ext>
             </a:extLst>
           </p:cNvPr>
@@ -9614,14 +9723,14 @@
                 <a:gridCol w="4521200">
                   <a:extLst>
                     <a:ext uri="{9D8B030D-6E8A-4147-A177-3AD203B41FA5}">
-                      <a16:colId xmlns:a16="http://schemas.microsoft.com/office/drawing/2014/main" val="371563066"/>
+                      <a16:colId xmlns:a16="http://schemas.microsoft.com/office/drawing/2014/main" xmlns="" val="371563066"/>
                     </a:ext>
                   </a:extLst>
                 </a:gridCol>
                 <a:gridCol w="4555066">
                   <a:extLst>
                     <a:ext uri="{9D8B030D-6E8A-4147-A177-3AD203B41FA5}">
-                      <a16:colId xmlns:a16="http://schemas.microsoft.com/office/drawing/2014/main" val="2181931161"/>
+                      <a16:colId xmlns:a16="http://schemas.microsoft.com/office/drawing/2014/main" xmlns="" val="2181931161"/>
                     </a:ext>
                   </a:extLst>
                 </a:gridCol>
@@ -9783,7 +9892,7 @@
                 </a:tc>
                 <a:extLst>
                   <a:ext uri="{0D108BD9-81ED-4DB2-BD59-A6C34878D82A}">
-                    <a16:rowId xmlns:a16="http://schemas.microsoft.com/office/drawing/2014/main" val="2258008607"/>
+                    <a16:rowId xmlns:a16="http://schemas.microsoft.com/office/drawing/2014/main" xmlns="" val="2258008607"/>
                   </a:ext>
                 </a:extLst>
               </a:tr>
@@ -9796,7 +9905,7 @@
           <p:cNvPr id="8" name="Table 7">
             <a:extLst>
               <a:ext uri="{FF2B5EF4-FFF2-40B4-BE49-F238E27FC236}">
-                <a16:creationId xmlns:a16="http://schemas.microsoft.com/office/drawing/2014/main" id="{9CAF9F99-453D-44F1-88EC-228F7966FFE4}"/>
+                <a16:creationId xmlns:a16="http://schemas.microsoft.com/office/drawing/2014/main" xmlns="" id="{9CAF9F99-453D-44F1-88EC-228F7966FFE4}"/>
               </a:ext>
             </a:extLst>
           </p:cNvPr>
@@ -9825,14 +9934,14 @@
                 <a:gridCol w="4521200">
                   <a:extLst>
                     <a:ext uri="{9D8B030D-6E8A-4147-A177-3AD203B41FA5}">
-                      <a16:colId xmlns:a16="http://schemas.microsoft.com/office/drawing/2014/main" val="371563066"/>
+                      <a16:colId xmlns:a16="http://schemas.microsoft.com/office/drawing/2014/main" xmlns="" val="371563066"/>
                     </a:ext>
                   </a:extLst>
                 </a:gridCol>
                 <a:gridCol w="4555066">
                   <a:extLst>
                     <a:ext uri="{9D8B030D-6E8A-4147-A177-3AD203B41FA5}">
-                      <a16:colId xmlns:a16="http://schemas.microsoft.com/office/drawing/2014/main" val="2181931161"/>
+                      <a16:colId xmlns:a16="http://schemas.microsoft.com/office/drawing/2014/main" xmlns="" val="2181931161"/>
                     </a:ext>
                   </a:extLst>
                 </a:gridCol>
@@ -9984,7 +10093,7 @@
                 </a:tc>
                 <a:extLst>
                   <a:ext uri="{0D108BD9-81ED-4DB2-BD59-A6C34878D82A}">
-                    <a16:rowId xmlns:a16="http://schemas.microsoft.com/office/drawing/2014/main" val="10001"/>
+                    <a16:rowId xmlns:a16="http://schemas.microsoft.com/office/drawing/2014/main" xmlns="" val="10001"/>
                   </a:ext>
                 </a:extLst>
               </a:tr>
@@ -10035,7 +10144,7 @@
           <p:cNvPr id="6" name="Content Placeholder 2">
             <a:extLst>
               <a:ext uri="{FF2B5EF4-FFF2-40B4-BE49-F238E27FC236}">
-                <a16:creationId xmlns:a16="http://schemas.microsoft.com/office/drawing/2014/main" id="{747102BF-A698-444E-B693-3BC2E2F22350}"/>
+                <a16:creationId xmlns:a16="http://schemas.microsoft.com/office/drawing/2014/main" xmlns="" id="{747102BF-A698-444E-B693-3BC2E2F22350}"/>
               </a:ext>
             </a:extLst>
           </p:cNvPr>
@@ -10242,7 +10351,7 @@
           <p:cNvPr id="5" name="Table 4">
             <a:extLst>
               <a:ext uri="{FF2B5EF4-FFF2-40B4-BE49-F238E27FC236}">
-                <a16:creationId xmlns:a16="http://schemas.microsoft.com/office/drawing/2014/main" id="{9CAF9F99-453D-44F1-88EC-228F7966FFE4}"/>
+                <a16:creationId xmlns:a16="http://schemas.microsoft.com/office/drawing/2014/main" xmlns="" id="{9CAF9F99-453D-44F1-88EC-228F7966FFE4}"/>
               </a:ext>
             </a:extLst>
           </p:cNvPr>
@@ -10271,14 +10380,14 @@
                 <a:gridCol w="4521200">
                   <a:extLst>
                     <a:ext uri="{9D8B030D-6E8A-4147-A177-3AD203B41FA5}">
-                      <a16:colId xmlns:a16="http://schemas.microsoft.com/office/drawing/2014/main" val="371563066"/>
+                      <a16:colId xmlns:a16="http://schemas.microsoft.com/office/drawing/2014/main" xmlns="" val="371563066"/>
                     </a:ext>
                   </a:extLst>
                 </a:gridCol>
                 <a:gridCol w="4555066">
                   <a:extLst>
                     <a:ext uri="{9D8B030D-6E8A-4147-A177-3AD203B41FA5}">
-                      <a16:colId xmlns:a16="http://schemas.microsoft.com/office/drawing/2014/main" val="2181931161"/>
+                      <a16:colId xmlns:a16="http://schemas.microsoft.com/office/drawing/2014/main" xmlns="" val="2181931161"/>
                     </a:ext>
                   </a:extLst>
                 </a:gridCol>
@@ -10430,7 +10539,7 @@
                 </a:tc>
                 <a:extLst>
                   <a:ext uri="{0D108BD9-81ED-4DB2-BD59-A6C34878D82A}">
-                    <a16:rowId xmlns:a16="http://schemas.microsoft.com/office/drawing/2014/main" val="10001"/>
+                    <a16:rowId xmlns:a16="http://schemas.microsoft.com/office/drawing/2014/main" xmlns="" val="10001"/>
                   </a:ext>
                 </a:extLst>
               </a:tr>

</xml_diff>

<commit_message>
Updated masks to VPIXX size
</commit_message>
<xml_diff>
--- a/experiment/RUN_ME/stimuli/instructions presentation.pptx
+++ b/experiment/RUN_ME/stimuli/instructions presentation.pptx
@@ -268,7 +268,7 @@
           <a:p>
             <a:fld id="{F999E2B6-E0C8-4E2F-B37B-1FC830B33272}" type="datetimeFigureOut">
               <a:rPr lang="en-US" smtClean="0"/>
-              <a:t>5/25/2021</a:t>
+              <a:t>5/26/2021</a:t>
             </a:fld>
             <a:endParaRPr lang="en-US"/>
           </a:p>
@@ -436,7 +436,7 @@
           <a:p>
             <a:fld id="{F999E2B6-E0C8-4E2F-B37B-1FC830B33272}" type="datetimeFigureOut">
               <a:rPr lang="en-US" smtClean="0"/>
-              <a:t>5/25/2021</a:t>
+              <a:t>5/26/2021</a:t>
             </a:fld>
             <a:endParaRPr lang="en-US"/>
           </a:p>
@@ -614,7 +614,7 @@
           <a:p>
             <a:fld id="{F999E2B6-E0C8-4E2F-B37B-1FC830B33272}" type="datetimeFigureOut">
               <a:rPr lang="en-US" smtClean="0"/>
-              <a:t>5/25/2021</a:t>
+              <a:t>5/26/2021</a:t>
             </a:fld>
             <a:endParaRPr lang="en-US"/>
           </a:p>
@@ -782,7 +782,7 @@
           <a:p>
             <a:fld id="{F999E2B6-E0C8-4E2F-B37B-1FC830B33272}" type="datetimeFigureOut">
               <a:rPr lang="en-US" smtClean="0"/>
-              <a:t>5/25/2021</a:t>
+              <a:t>5/26/2021</a:t>
             </a:fld>
             <a:endParaRPr lang="en-US"/>
           </a:p>
@@ -1027,7 +1027,7 @@
           <a:p>
             <a:fld id="{F999E2B6-E0C8-4E2F-B37B-1FC830B33272}" type="datetimeFigureOut">
               <a:rPr lang="en-US" smtClean="0"/>
-              <a:t>5/25/2021</a:t>
+              <a:t>5/26/2021</a:t>
             </a:fld>
             <a:endParaRPr lang="en-US"/>
           </a:p>
@@ -1256,7 +1256,7 @@
           <a:p>
             <a:fld id="{F999E2B6-E0C8-4E2F-B37B-1FC830B33272}" type="datetimeFigureOut">
               <a:rPr lang="en-US" smtClean="0"/>
-              <a:t>5/25/2021</a:t>
+              <a:t>5/26/2021</a:t>
             </a:fld>
             <a:endParaRPr lang="en-US"/>
           </a:p>
@@ -1620,7 +1620,7 @@
           <a:p>
             <a:fld id="{F999E2B6-E0C8-4E2F-B37B-1FC830B33272}" type="datetimeFigureOut">
               <a:rPr lang="en-US" smtClean="0"/>
-              <a:t>5/25/2021</a:t>
+              <a:t>5/26/2021</a:t>
             </a:fld>
             <a:endParaRPr lang="en-US"/>
           </a:p>
@@ -1737,7 +1737,7 @@
           <a:p>
             <a:fld id="{F999E2B6-E0C8-4E2F-B37B-1FC830B33272}" type="datetimeFigureOut">
               <a:rPr lang="en-US" smtClean="0"/>
-              <a:t>5/25/2021</a:t>
+              <a:t>5/26/2021</a:t>
             </a:fld>
             <a:endParaRPr lang="en-US"/>
           </a:p>
@@ -1832,7 +1832,7 @@
           <a:p>
             <a:fld id="{F999E2B6-E0C8-4E2F-B37B-1FC830B33272}" type="datetimeFigureOut">
               <a:rPr lang="en-US" smtClean="0"/>
-              <a:t>5/25/2021</a:t>
+              <a:t>5/26/2021</a:t>
             </a:fld>
             <a:endParaRPr lang="en-US"/>
           </a:p>
@@ -2107,7 +2107,7 @@
           <a:p>
             <a:fld id="{F999E2B6-E0C8-4E2F-B37B-1FC830B33272}" type="datetimeFigureOut">
               <a:rPr lang="en-US" smtClean="0"/>
-              <a:t>5/25/2021</a:t>
+              <a:t>5/26/2021</a:t>
             </a:fld>
             <a:endParaRPr lang="en-US"/>
           </a:p>
@@ -2359,7 +2359,7 @@
           <a:p>
             <a:fld id="{F999E2B6-E0C8-4E2F-B37B-1FC830B33272}" type="datetimeFigureOut">
               <a:rPr lang="en-US" smtClean="0"/>
-              <a:t>5/25/2021</a:t>
+              <a:t>5/26/2021</a:t>
             </a:fld>
             <a:endParaRPr lang="en-US"/>
           </a:p>
@@ -2570,7 +2570,7 @@
           <a:p>
             <a:fld id="{F999E2B6-E0C8-4E2F-B37B-1FC830B33272}" type="datetimeFigureOut">
               <a:rPr lang="en-US" smtClean="0"/>
-              <a:t>5/25/2021</a:t>
+              <a:t>5/26/2021</a:t>
             </a:fld>
             <a:endParaRPr lang="en-US"/>
           </a:p>
@@ -3068,7 +3068,7 @@
           <p:cNvPr id="5" name="Content Placeholder 2">
             <a:extLst>
               <a:ext uri="{FF2B5EF4-FFF2-40B4-BE49-F238E27FC236}">
-                <a16:creationId xmlns:a16="http://schemas.microsoft.com/office/drawing/2014/main" id="{747102BF-A698-444E-B693-3BC2E2F22350}"/>
+                <a16:creationId xmlns:a16="http://schemas.microsoft.com/office/drawing/2014/main" xmlns="" id="{747102BF-A698-444E-B693-3BC2E2F22350}"/>
               </a:ext>
             </a:extLst>
           </p:cNvPr>
@@ -3297,7 +3297,7 @@
           <p:cNvPr id="7" name="Table 6">
             <a:extLst>
               <a:ext uri="{FF2B5EF4-FFF2-40B4-BE49-F238E27FC236}">
-                <a16:creationId xmlns:a16="http://schemas.microsoft.com/office/drawing/2014/main" id="{9CAF9F99-453D-44F1-88EC-228F7966FFE4}"/>
+                <a16:creationId xmlns:a16="http://schemas.microsoft.com/office/drawing/2014/main" xmlns="" id="{9CAF9F99-453D-44F1-88EC-228F7966FFE4}"/>
               </a:ext>
             </a:extLst>
           </p:cNvPr>
@@ -3320,14 +3320,14 @@
                 <a:gridCol w="4521200">
                   <a:extLst>
                     <a:ext uri="{9D8B030D-6E8A-4147-A177-3AD203B41FA5}">
-                      <a16:colId xmlns:a16="http://schemas.microsoft.com/office/drawing/2014/main" val="371563066"/>
+                      <a16:colId xmlns:a16="http://schemas.microsoft.com/office/drawing/2014/main" xmlns="" val="371563066"/>
                     </a:ext>
                   </a:extLst>
                 </a:gridCol>
                 <a:gridCol w="4555066">
                   <a:extLst>
                     <a:ext uri="{9D8B030D-6E8A-4147-A177-3AD203B41FA5}">
-                      <a16:colId xmlns:a16="http://schemas.microsoft.com/office/drawing/2014/main" val="2181931161"/>
+                      <a16:colId xmlns:a16="http://schemas.microsoft.com/office/drawing/2014/main" xmlns="" val="2181931161"/>
                     </a:ext>
                   </a:extLst>
                 </a:gridCol>
@@ -3489,7 +3489,7 @@
                 </a:tc>
                 <a:extLst>
                   <a:ext uri="{0D108BD9-81ED-4DB2-BD59-A6C34878D82A}">
-                    <a16:rowId xmlns:a16="http://schemas.microsoft.com/office/drawing/2014/main" val="2258008607"/>
+                    <a16:rowId xmlns:a16="http://schemas.microsoft.com/office/drawing/2014/main" xmlns="" val="2258008607"/>
                   </a:ext>
                 </a:extLst>
               </a:tr>
@@ -3502,7 +3502,7 @@
           <p:cNvPr id="8" name="Table 7">
             <a:extLst>
               <a:ext uri="{FF2B5EF4-FFF2-40B4-BE49-F238E27FC236}">
-                <a16:creationId xmlns:a16="http://schemas.microsoft.com/office/drawing/2014/main" id="{9CAF9F99-453D-44F1-88EC-228F7966FFE4}"/>
+                <a16:creationId xmlns:a16="http://schemas.microsoft.com/office/drawing/2014/main" xmlns="" id="{9CAF9F99-453D-44F1-88EC-228F7966FFE4}"/>
               </a:ext>
             </a:extLst>
           </p:cNvPr>
@@ -3525,14 +3525,14 @@
                 <a:gridCol w="4521200">
                   <a:extLst>
                     <a:ext uri="{9D8B030D-6E8A-4147-A177-3AD203B41FA5}">
-                      <a16:colId xmlns:a16="http://schemas.microsoft.com/office/drawing/2014/main" val="371563066"/>
+                      <a16:colId xmlns:a16="http://schemas.microsoft.com/office/drawing/2014/main" xmlns="" val="371563066"/>
                     </a:ext>
                   </a:extLst>
                 </a:gridCol>
                 <a:gridCol w="4555066">
                   <a:extLst>
                     <a:ext uri="{9D8B030D-6E8A-4147-A177-3AD203B41FA5}">
-                      <a16:colId xmlns:a16="http://schemas.microsoft.com/office/drawing/2014/main" val="2181931161"/>
+                      <a16:colId xmlns:a16="http://schemas.microsoft.com/office/drawing/2014/main" xmlns="" val="2181931161"/>
                     </a:ext>
                   </a:extLst>
                 </a:gridCol>
@@ -3684,7 +3684,7 @@
                 </a:tc>
                 <a:extLst>
                   <a:ext uri="{0D108BD9-81ED-4DB2-BD59-A6C34878D82A}">
-                    <a16:rowId xmlns:a16="http://schemas.microsoft.com/office/drawing/2014/main" val="10001"/>
+                    <a16:rowId xmlns:a16="http://schemas.microsoft.com/office/drawing/2014/main" xmlns="" val="10001"/>
                   </a:ext>
                 </a:extLst>
               </a:tr>
@@ -3697,7 +3697,7 @@
           <p:cNvPr id="6" name="Content Placeholder 2">
             <a:extLst>
               <a:ext uri="{FF2B5EF4-FFF2-40B4-BE49-F238E27FC236}">
-                <a16:creationId xmlns:a16="http://schemas.microsoft.com/office/drawing/2014/main" id="{C31A80B8-1841-40D1-9CE0-CC09FA970B6F}"/>
+                <a16:creationId xmlns:a16="http://schemas.microsoft.com/office/drawing/2014/main" xmlns="" id="{C31A80B8-1841-40D1-9CE0-CC09FA970B6F}"/>
               </a:ext>
             </a:extLst>
           </p:cNvPr>
@@ -3939,7 +3939,7 @@
           <p:cNvPr id="6" name="Content Placeholder 2">
             <a:extLst>
               <a:ext uri="{FF2B5EF4-FFF2-40B4-BE49-F238E27FC236}">
-                <a16:creationId xmlns:a16="http://schemas.microsoft.com/office/drawing/2014/main" id="{747102BF-A698-444E-B693-3BC2E2F22350}"/>
+                <a16:creationId xmlns:a16="http://schemas.microsoft.com/office/drawing/2014/main" xmlns="" id="{747102BF-A698-444E-B693-3BC2E2F22350}"/>
               </a:ext>
             </a:extLst>
           </p:cNvPr>
@@ -4191,7 +4191,7 @@
           <p:cNvPr id="6" name="Content Placeholder 2">
             <a:extLst>
               <a:ext uri="{FF2B5EF4-FFF2-40B4-BE49-F238E27FC236}">
-                <a16:creationId xmlns:a16="http://schemas.microsoft.com/office/drawing/2014/main" id="{747102BF-A698-444E-B693-3BC2E2F22350}"/>
+                <a16:creationId xmlns:a16="http://schemas.microsoft.com/office/drawing/2014/main" xmlns="" id="{747102BF-A698-444E-B693-3BC2E2F22350}"/>
               </a:ext>
             </a:extLst>
           </p:cNvPr>
@@ -4401,7 +4401,7 @@
           <p:cNvPr id="5" name="Table 4">
             <a:extLst>
               <a:ext uri="{FF2B5EF4-FFF2-40B4-BE49-F238E27FC236}">
-                <a16:creationId xmlns:a16="http://schemas.microsoft.com/office/drawing/2014/main" id="{9CAF9F99-453D-44F1-88EC-228F7966FFE4}"/>
+                <a16:creationId xmlns:a16="http://schemas.microsoft.com/office/drawing/2014/main" xmlns="" id="{9CAF9F99-453D-44F1-88EC-228F7966FFE4}"/>
               </a:ext>
             </a:extLst>
           </p:cNvPr>
@@ -4430,14 +4430,14 @@
                 <a:gridCol w="4521200">
                   <a:extLst>
                     <a:ext uri="{9D8B030D-6E8A-4147-A177-3AD203B41FA5}">
-                      <a16:colId xmlns:a16="http://schemas.microsoft.com/office/drawing/2014/main" val="371563066"/>
+                      <a16:colId xmlns:a16="http://schemas.microsoft.com/office/drawing/2014/main" xmlns="" val="371563066"/>
                     </a:ext>
                   </a:extLst>
                 </a:gridCol>
                 <a:gridCol w="4555066">
                   <a:extLst>
                     <a:ext uri="{9D8B030D-6E8A-4147-A177-3AD203B41FA5}">
-                      <a16:colId xmlns:a16="http://schemas.microsoft.com/office/drawing/2014/main" val="2181931161"/>
+                      <a16:colId xmlns:a16="http://schemas.microsoft.com/office/drawing/2014/main" xmlns="" val="2181931161"/>
                     </a:ext>
                   </a:extLst>
                 </a:gridCol>
@@ -4575,7 +4575,7 @@
                 </a:tc>
                 <a:extLst>
                   <a:ext uri="{0D108BD9-81ED-4DB2-BD59-A6C34878D82A}">
-                    <a16:rowId xmlns:a16="http://schemas.microsoft.com/office/drawing/2014/main" val="2258008607"/>
+                    <a16:rowId xmlns:a16="http://schemas.microsoft.com/office/drawing/2014/main" xmlns="" val="2258008607"/>
                   </a:ext>
                 </a:extLst>
               </a:tr>
@@ -4588,7 +4588,7 @@
           <p:cNvPr id="7" name="Table 6">
             <a:extLst>
               <a:ext uri="{FF2B5EF4-FFF2-40B4-BE49-F238E27FC236}">
-                <a16:creationId xmlns:a16="http://schemas.microsoft.com/office/drawing/2014/main" id="{9CAF9F99-453D-44F1-88EC-228F7966FFE4}"/>
+                <a16:creationId xmlns:a16="http://schemas.microsoft.com/office/drawing/2014/main" xmlns="" id="{9CAF9F99-453D-44F1-88EC-228F7966FFE4}"/>
               </a:ext>
             </a:extLst>
           </p:cNvPr>
@@ -4617,14 +4617,14 @@
                 <a:gridCol w="4521200">
                   <a:extLst>
                     <a:ext uri="{9D8B030D-6E8A-4147-A177-3AD203B41FA5}">
-                      <a16:colId xmlns:a16="http://schemas.microsoft.com/office/drawing/2014/main" val="371563066"/>
+                      <a16:colId xmlns:a16="http://schemas.microsoft.com/office/drawing/2014/main" xmlns="" val="371563066"/>
                     </a:ext>
                   </a:extLst>
                 </a:gridCol>
                 <a:gridCol w="4555066">
                   <a:extLst>
                     <a:ext uri="{9D8B030D-6E8A-4147-A177-3AD203B41FA5}">
-                      <a16:colId xmlns:a16="http://schemas.microsoft.com/office/drawing/2014/main" val="2181931161"/>
+                      <a16:colId xmlns:a16="http://schemas.microsoft.com/office/drawing/2014/main" xmlns="" val="2181931161"/>
                     </a:ext>
                   </a:extLst>
                 </a:gridCol>
@@ -4776,7 +4776,7 @@
                 </a:tc>
                 <a:extLst>
                   <a:ext uri="{0D108BD9-81ED-4DB2-BD59-A6C34878D82A}">
-                    <a16:rowId xmlns:a16="http://schemas.microsoft.com/office/drawing/2014/main" val="10001"/>
+                    <a16:rowId xmlns:a16="http://schemas.microsoft.com/office/drawing/2014/main" xmlns="" val="10001"/>
                   </a:ext>
                 </a:extLst>
               </a:tr>
@@ -4827,7 +4827,7 @@
           <p:cNvPr id="5" name="Content Placeholder 2">
             <a:extLst>
               <a:ext uri="{FF2B5EF4-FFF2-40B4-BE49-F238E27FC236}">
-                <a16:creationId xmlns:a16="http://schemas.microsoft.com/office/drawing/2014/main" id="{747102BF-A698-444E-B693-3BC2E2F22350}"/>
+                <a16:creationId xmlns:a16="http://schemas.microsoft.com/office/drawing/2014/main" xmlns="" id="{747102BF-A698-444E-B693-3BC2E2F22350}"/>
               </a:ext>
             </a:extLst>
           </p:cNvPr>
@@ -5056,7 +5056,7 @@
           <p:cNvPr id="7" name="Table 6">
             <a:extLst>
               <a:ext uri="{FF2B5EF4-FFF2-40B4-BE49-F238E27FC236}">
-                <a16:creationId xmlns:a16="http://schemas.microsoft.com/office/drawing/2014/main" id="{9CAF9F99-453D-44F1-88EC-228F7966FFE4}"/>
+                <a16:creationId xmlns:a16="http://schemas.microsoft.com/office/drawing/2014/main" xmlns="" id="{9CAF9F99-453D-44F1-88EC-228F7966FFE4}"/>
               </a:ext>
             </a:extLst>
           </p:cNvPr>
@@ -5085,14 +5085,14 @@
                 <a:gridCol w="4521200">
                   <a:extLst>
                     <a:ext uri="{9D8B030D-6E8A-4147-A177-3AD203B41FA5}">
-                      <a16:colId xmlns:a16="http://schemas.microsoft.com/office/drawing/2014/main" val="371563066"/>
+                      <a16:colId xmlns:a16="http://schemas.microsoft.com/office/drawing/2014/main" xmlns="" val="371563066"/>
                     </a:ext>
                   </a:extLst>
                 </a:gridCol>
                 <a:gridCol w="4555066">
                   <a:extLst>
                     <a:ext uri="{9D8B030D-6E8A-4147-A177-3AD203B41FA5}">
-                      <a16:colId xmlns:a16="http://schemas.microsoft.com/office/drawing/2014/main" val="2181931161"/>
+                      <a16:colId xmlns:a16="http://schemas.microsoft.com/office/drawing/2014/main" xmlns="" val="2181931161"/>
                     </a:ext>
                   </a:extLst>
                 </a:gridCol>
@@ -5254,7 +5254,7 @@
                 </a:tc>
                 <a:extLst>
                   <a:ext uri="{0D108BD9-81ED-4DB2-BD59-A6C34878D82A}">
-                    <a16:rowId xmlns:a16="http://schemas.microsoft.com/office/drawing/2014/main" val="2258008607"/>
+                    <a16:rowId xmlns:a16="http://schemas.microsoft.com/office/drawing/2014/main" xmlns="" val="2258008607"/>
                   </a:ext>
                 </a:extLst>
               </a:tr>
@@ -5267,7 +5267,7 @@
           <p:cNvPr id="8" name="Table 7">
             <a:extLst>
               <a:ext uri="{FF2B5EF4-FFF2-40B4-BE49-F238E27FC236}">
-                <a16:creationId xmlns:a16="http://schemas.microsoft.com/office/drawing/2014/main" id="{9CAF9F99-453D-44F1-88EC-228F7966FFE4}"/>
+                <a16:creationId xmlns:a16="http://schemas.microsoft.com/office/drawing/2014/main" xmlns="" id="{9CAF9F99-453D-44F1-88EC-228F7966FFE4}"/>
               </a:ext>
             </a:extLst>
           </p:cNvPr>
@@ -5296,14 +5296,14 @@
                 <a:gridCol w="4521200">
                   <a:extLst>
                     <a:ext uri="{9D8B030D-6E8A-4147-A177-3AD203B41FA5}">
-                      <a16:colId xmlns:a16="http://schemas.microsoft.com/office/drawing/2014/main" val="371563066"/>
+                      <a16:colId xmlns:a16="http://schemas.microsoft.com/office/drawing/2014/main" xmlns="" val="371563066"/>
                     </a:ext>
                   </a:extLst>
                 </a:gridCol>
                 <a:gridCol w="4555066">
                   <a:extLst>
                     <a:ext uri="{9D8B030D-6E8A-4147-A177-3AD203B41FA5}">
-                      <a16:colId xmlns:a16="http://schemas.microsoft.com/office/drawing/2014/main" val="2181931161"/>
+                      <a16:colId xmlns:a16="http://schemas.microsoft.com/office/drawing/2014/main" xmlns="" val="2181931161"/>
                     </a:ext>
                   </a:extLst>
                 </a:gridCol>
@@ -5455,7 +5455,7 @@
                 </a:tc>
                 <a:extLst>
                   <a:ext uri="{0D108BD9-81ED-4DB2-BD59-A6C34878D82A}">
-                    <a16:rowId xmlns:a16="http://schemas.microsoft.com/office/drawing/2014/main" val="10001"/>
+                    <a16:rowId xmlns:a16="http://schemas.microsoft.com/office/drawing/2014/main" xmlns="" val="10001"/>
                   </a:ext>
                 </a:extLst>
               </a:tr>
@@ -5506,7 +5506,7 @@
           <p:cNvPr id="6" name="Content Placeholder 2">
             <a:extLst>
               <a:ext uri="{FF2B5EF4-FFF2-40B4-BE49-F238E27FC236}">
-                <a16:creationId xmlns:a16="http://schemas.microsoft.com/office/drawing/2014/main" id="{747102BF-A698-444E-B693-3BC2E2F22350}"/>
+                <a16:creationId xmlns:a16="http://schemas.microsoft.com/office/drawing/2014/main" xmlns="" id="{747102BF-A698-444E-B693-3BC2E2F22350}"/>
               </a:ext>
             </a:extLst>
           </p:cNvPr>
@@ -5713,7 +5713,7 @@
           <p:cNvPr id="5" name="Table 4">
             <a:extLst>
               <a:ext uri="{FF2B5EF4-FFF2-40B4-BE49-F238E27FC236}">
-                <a16:creationId xmlns:a16="http://schemas.microsoft.com/office/drawing/2014/main" id="{9CAF9F99-453D-44F1-88EC-228F7966FFE4}"/>
+                <a16:creationId xmlns:a16="http://schemas.microsoft.com/office/drawing/2014/main" xmlns="" id="{9CAF9F99-453D-44F1-88EC-228F7966FFE4}"/>
               </a:ext>
             </a:extLst>
           </p:cNvPr>
@@ -5742,14 +5742,14 @@
                 <a:gridCol w="4521200">
                   <a:extLst>
                     <a:ext uri="{9D8B030D-6E8A-4147-A177-3AD203B41FA5}">
-                      <a16:colId xmlns:a16="http://schemas.microsoft.com/office/drawing/2014/main" val="371563066"/>
+                      <a16:colId xmlns:a16="http://schemas.microsoft.com/office/drawing/2014/main" xmlns="" val="371563066"/>
                     </a:ext>
                   </a:extLst>
                 </a:gridCol>
                 <a:gridCol w="4555066">
                   <a:extLst>
                     <a:ext uri="{9D8B030D-6E8A-4147-A177-3AD203B41FA5}">
-                      <a16:colId xmlns:a16="http://schemas.microsoft.com/office/drawing/2014/main" val="2181931161"/>
+                      <a16:colId xmlns:a16="http://schemas.microsoft.com/office/drawing/2014/main" xmlns="" val="2181931161"/>
                     </a:ext>
                   </a:extLst>
                 </a:gridCol>
@@ -5901,7 +5901,7 @@
                 </a:tc>
                 <a:extLst>
                   <a:ext uri="{0D108BD9-81ED-4DB2-BD59-A6C34878D82A}">
-                    <a16:rowId xmlns:a16="http://schemas.microsoft.com/office/drawing/2014/main" val="10001"/>
+                    <a16:rowId xmlns:a16="http://schemas.microsoft.com/office/drawing/2014/main" xmlns="" val="10001"/>
                   </a:ext>
                 </a:extLst>
               </a:tr>
@@ -5952,7 +5952,7 @@
           <p:cNvPr id="2" name="Table 2">
             <a:extLst>
               <a:ext uri="{FF2B5EF4-FFF2-40B4-BE49-F238E27FC236}">
-                <a16:creationId xmlns:a16="http://schemas.microsoft.com/office/drawing/2014/main" id="{9768F41E-FF16-4CA0-9061-785C57DCD75D}"/>
+                <a16:creationId xmlns:a16="http://schemas.microsoft.com/office/drawing/2014/main" xmlns="" id="{9768F41E-FF16-4CA0-9061-785C57DCD75D}"/>
               </a:ext>
             </a:extLst>
           </p:cNvPr>
@@ -5981,28 +5981,28 @@
                 <a:gridCol w="3048000">
                   <a:extLst>
                     <a:ext uri="{9D8B030D-6E8A-4147-A177-3AD203B41FA5}">
-                      <a16:colId xmlns:a16="http://schemas.microsoft.com/office/drawing/2014/main" val="371563066"/>
+                      <a16:colId xmlns:a16="http://schemas.microsoft.com/office/drawing/2014/main" xmlns="" val="371563066"/>
                     </a:ext>
                   </a:extLst>
                 </a:gridCol>
                 <a:gridCol w="3048000">
                   <a:extLst>
                     <a:ext uri="{9D8B030D-6E8A-4147-A177-3AD203B41FA5}">
-                      <a16:colId xmlns:a16="http://schemas.microsoft.com/office/drawing/2014/main" val="2688513847"/>
+                      <a16:colId xmlns:a16="http://schemas.microsoft.com/office/drawing/2014/main" xmlns="" val="2688513847"/>
                     </a:ext>
                   </a:extLst>
                 </a:gridCol>
                 <a:gridCol w="3048000">
                   <a:extLst>
                     <a:ext uri="{9D8B030D-6E8A-4147-A177-3AD203B41FA5}">
-                      <a16:colId xmlns:a16="http://schemas.microsoft.com/office/drawing/2014/main" val="2201978408"/>
+                      <a16:colId xmlns:a16="http://schemas.microsoft.com/office/drawing/2014/main" xmlns="" val="2201978408"/>
                     </a:ext>
                   </a:extLst>
                 </a:gridCol>
                 <a:gridCol w="3048000">
                   <a:extLst>
                     <a:ext uri="{9D8B030D-6E8A-4147-A177-3AD203B41FA5}">
-                      <a16:colId xmlns:a16="http://schemas.microsoft.com/office/drawing/2014/main" val="2181931161"/>
+                      <a16:colId xmlns:a16="http://schemas.microsoft.com/office/drawing/2014/main" xmlns="" val="2181931161"/>
                     </a:ext>
                   </a:extLst>
                 </a:gridCol>
@@ -6178,7 +6178,7 @@
                 </a:tc>
                 <a:extLst>
                   <a:ext uri="{0D108BD9-81ED-4DB2-BD59-A6C34878D82A}">
-                    <a16:rowId xmlns:a16="http://schemas.microsoft.com/office/drawing/2014/main" val="2258008607"/>
+                    <a16:rowId xmlns:a16="http://schemas.microsoft.com/office/drawing/2014/main" xmlns="" val="2258008607"/>
                   </a:ext>
                 </a:extLst>
               </a:tr>
@@ -6386,7 +6386,7 @@
                 </a:tc>
                 <a:extLst>
                   <a:ext uri="{0D108BD9-81ED-4DB2-BD59-A6C34878D82A}">
-                    <a16:rowId xmlns:a16="http://schemas.microsoft.com/office/drawing/2014/main" val="3004479924"/>
+                    <a16:rowId xmlns:a16="http://schemas.microsoft.com/office/drawing/2014/main" xmlns="" val="3004479924"/>
                   </a:ext>
                 </a:extLst>
               </a:tr>
@@ -6399,7 +6399,7 @@
           <p:cNvPr id="6" name="Content Placeholder 2">
             <a:extLst>
               <a:ext uri="{FF2B5EF4-FFF2-40B4-BE49-F238E27FC236}">
-                <a16:creationId xmlns:a16="http://schemas.microsoft.com/office/drawing/2014/main" id="{747102BF-A698-444E-B693-3BC2E2F22350}"/>
+                <a16:creationId xmlns:a16="http://schemas.microsoft.com/office/drawing/2014/main" xmlns="" id="{747102BF-A698-444E-B693-3BC2E2F22350}"/>
               </a:ext>
             </a:extLst>
           </p:cNvPr>
@@ -6644,7 +6644,7 @@
           <p:cNvPr id="6" name="Content Placeholder 2">
             <a:extLst>
               <a:ext uri="{FF2B5EF4-FFF2-40B4-BE49-F238E27FC236}">
-                <a16:creationId xmlns:a16="http://schemas.microsoft.com/office/drawing/2014/main" id="{747102BF-A698-444E-B693-3BC2E2F22350}"/>
+                <a16:creationId xmlns:a16="http://schemas.microsoft.com/office/drawing/2014/main" xmlns="" id="{747102BF-A698-444E-B693-3BC2E2F22350}"/>
               </a:ext>
             </a:extLst>
           </p:cNvPr>
@@ -6886,7 +6886,7 @@
           <p:cNvPr id="6" name="Content Placeholder 2">
             <a:extLst>
               <a:ext uri="{FF2B5EF4-FFF2-40B4-BE49-F238E27FC236}">
-                <a16:creationId xmlns:a16="http://schemas.microsoft.com/office/drawing/2014/main" id="{747102BF-A698-444E-B693-3BC2E2F22350}"/>
+                <a16:creationId xmlns:a16="http://schemas.microsoft.com/office/drawing/2014/main" xmlns="" id="{747102BF-A698-444E-B693-3BC2E2F22350}"/>
               </a:ext>
             </a:extLst>
           </p:cNvPr>
@@ -7128,7 +7128,7 @@
           <p:cNvPr id="6" name="Content Placeholder 2">
             <a:extLst>
               <a:ext uri="{FF2B5EF4-FFF2-40B4-BE49-F238E27FC236}">
-                <a16:creationId xmlns:a16="http://schemas.microsoft.com/office/drawing/2014/main" id="{747102BF-A698-444E-B693-3BC2E2F22350}"/>
+                <a16:creationId xmlns:a16="http://schemas.microsoft.com/office/drawing/2014/main" xmlns="" id="{747102BF-A698-444E-B693-3BC2E2F22350}"/>
               </a:ext>
             </a:extLst>
           </p:cNvPr>
@@ -7370,7 +7370,7 @@
           <p:cNvPr id="6" name="Content Placeholder 2">
             <a:extLst>
               <a:ext uri="{FF2B5EF4-FFF2-40B4-BE49-F238E27FC236}">
-                <a16:creationId xmlns:a16="http://schemas.microsoft.com/office/drawing/2014/main" id="{747102BF-A698-444E-B693-3BC2E2F22350}"/>
+                <a16:creationId xmlns:a16="http://schemas.microsoft.com/office/drawing/2014/main" xmlns="" id="{747102BF-A698-444E-B693-3BC2E2F22350}"/>
               </a:ext>
             </a:extLst>
           </p:cNvPr>
@@ -7714,7 +7714,7 @@
           <p:cNvPr id="6" name="Content Placeholder 2">
             <a:extLst>
               <a:ext uri="{FF2B5EF4-FFF2-40B4-BE49-F238E27FC236}">
-                <a16:creationId xmlns:a16="http://schemas.microsoft.com/office/drawing/2014/main" id="{747102BF-A698-444E-B693-3BC2E2F22350}"/>
+                <a16:creationId xmlns:a16="http://schemas.microsoft.com/office/drawing/2014/main" xmlns="" id="{747102BF-A698-444E-B693-3BC2E2F22350}"/>
               </a:ext>
             </a:extLst>
           </p:cNvPr>
@@ -7977,7 +7977,7 @@
           <p:cNvPr id="6" name="Content Placeholder 2">
             <a:extLst>
               <a:ext uri="{FF2B5EF4-FFF2-40B4-BE49-F238E27FC236}">
-                <a16:creationId xmlns:a16="http://schemas.microsoft.com/office/drawing/2014/main" id="{747102BF-A698-444E-B693-3BC2E2F22350}"/>
+                <a16:creationId xmlns:a16="http://schemas.microsoft.com/office/drawing/2014/main" xmlns="" id="{747102BF-A698-444E-B693-3BC2E2F22350}"/>
               </a:ext>
             </a:extLst>
           </p:cNvPr>
@@ -8230,7 +8230,7 @@
           <p:cNvPr id="6" name="Content Placeholder 2">
             <a:extLst>
               <a:ext uri="{FF2B5EF4-FFF2-40B4-BE49-F238E27FC236}">
-                <a16:creationId xmlns:a16="http://schemas.microsoft.com/office/drawing/2014/main" id="{747102BF-A698-444E-B693-3BC2E2F22350}"/>
+                <a16:creationId xmlns:a16="http://schemas.microsoft.com/office/drawing/2014/main" xmlns="" id="{747102BF-A698-444E-B693-3BC2E2F22350}"/>
               </a:ext>
             </a:extLst>
           </p:cNvPr>
@@ -8475,7 +8475,7 @@
           <p:cNvPr id="6" name="Content Placeholder 2">
             <a:extLst>
               <a:ext uri="{FF2B5EF4-FFF2-40B4-BE49-F238E27FC236}">
-                <a16:creationId xmlns:a16="http://schemas.microsoft.com/office/drawing/2014/main" id="{747102BF-A698-444E-B693-3BC2E2F22350}"/>
+                <a16:creationId xmlns:a16="http://schemas.microsoft.com/office/drawing/2014/main" xmlns="" id="{747102BF-A698-444E-B693-3BC2E2F22350}"/>
               </a:ext>
             </a:extLst>
           </p:cNvPr>
@@ -8682,7 +8682,7 @@
           <p:cNvPr id="5" name="Table 4">
             <a:extLst>
               <a:ext uri="{FF2B5EF4-FFF2-40B4-BE49-F238E27FC236}">
-                <a16:creationId xmlns:a16="http://schemas.microsoft.com/office/drawing/2014/main" id="{9CAF9F99-453D-44F1-88EC-228F7966FFE4}"/>
+                <a16:creationId xmlns:a16="http://schemas.microsoft.com/office/drawing/2014/main" xmlns="" id="{9CAF9F99-453D-44F1-88EC-228F7966FFE4}"/>
               </a:ext>
             </a:extLst>
           </p:cNvPr>
@@ -8711,7 +8711,7 @@
                 <a:gridCol w="9076266">
                   <a:extLst>
                     <a:ext uri="{9D8B030D-6E8A-4147-A177-3AD203B41FA5}">
-                      <a16:colId xmlns:a16="http://schemas.microsoft.com/office/drawing/2014/main" val="371563066"/>
+                      <a16:colId xmlns:a16="http://schemas.microsoft.com/office/drawing/2014/main" xmlns="" val="371563066"/>
                     </a:ext>
                   </a:extLst>
                 </a:gridCol>
@@ -8766,7 +8766,7 @@
                 </a:tc>
                 <a:extLst>
                   <a:ext uri="{0D108BD9-81ED-4DB2-BD59-A6C34878D82A}">
-                    <a16:rowId xmlns:a16="http://schemas.microsoft.com/office/drawing/2014/main" val="10001"/>
+                    <a16:rowId xmlns:a16="http://schemas.microsoft.com/office/drawing/2014/main" xmlns="" val="10001"/>
                   </a:ext>
                 </a:extLst>
               </a:tr>
@@ -8817,7 +8817,7 @@
           <p:cNvPr id="6" name="Content Placeholder 2">
             <a:extLst>
               <a:ext uri="{FF2B5EF4-FFF2-40B4-BE49-F238E27FC236}">
-                <a16:creationId xmlns:a16="http://schemas.microsoft.com/office/drawing/2014/main" id="{747102BF-A698-444E-B693-3BC2E2F22350}"/>
+                <a16:creationId xmlns:a16="http://schemas.microsoft.com/office/drawing/2014/main" xmlns="" id="{747102BF-A698-444E-B693-3BC2E2F22350}"/>
               </a:ext>
             </a:extLst>
           </p:cNvPr>
@@ -9024,7 +9024,7 @@
           <p:cNvPr id="5" name="Table 4">
             <a:extLst>
               <a:ext uri="{FF2B5EF4-FFF2-40B4-BE49-F238E27FC236}">
-                <a16:creationId xmlns:a16="http://schemas.microsoft.com/office/drawing/2014/main" id="{9CAF9F99-453D-44F1-88EC-228F7966FFE4}"/>
+                <a16:creationId xmlns:a16="http://schemas.microsoft.com/office/drawing/2014/main" xmlns="" id="{9CAF9F99-453D-44F1-88EC-228F7966FFE4}"/>
               </a:ext>
             </a:extLst>
           </p:cNvPr>
@@ -9053,14 +9053,14 @@
                 <a:gridCol w="4521200">
                   <a:extLst>
                     <a:ext uri="{9D8B030D-6E8A-4147-A177-3AD203B41FA5}">
-                      <a16:colId xmlns:a16="http://schemas.microsoft.com/office/drawing/2014/main" val="371563066"/>
+                      <a16:colId xmlns:a16="http://schemas.microsoft.com/office/drawing/2014/main" xmlns="" val="371563066"/>
                     </a:ext>
                   </a:extLst>
                 </a:gridCol>
                 <a:gridCol w="4555066">
                   <a:extLst>
                     <a:ext uri="{9D8B030D-6E8A-4147-A177-3AD203B41FA5}">
-                      <a16:colId xmlns:a16="http://schemas.microsoft.com/office/drawing/2014/main" val="2181931161"/>
+                      <a16:colId xmlns:a16="http://schemas.microsoft.com/office/drawing/2014/main" xmlns="" val="2181931161"/>
                     </a:ext>
                   </a:extLst>
                 </a:gridCol>
@@ -9195,7 +9195,7 @@
                 </a:tc>
                 <a:extLst>
                   <a:ext uri="{0D108BD9-81ED-4DB2-BD59-A6C34878D82A}">
-                    <a16:rowId xmlns:a16="http://schemas.microsoft.com/office/drawing/2014/main" val="10001"/>
+                    <a16:rowId xmlns:a16="http://schemas.microsoft.com/office/drawing/2014/main" xmlns="" val="10001"/>
                   </a:ext>
                 </a:extLst>
               </a:tr>
@@ -9246,7 +9246,7 @@
           <p:cNvPr id="6" name="Content Placeholder 2">
             <a:extLst>
               <a:ext uri="{FF2B5EF4-FFF2-40B4-BE49-F238E27FC236}">
-                <a16:creationId xmlns:a16="http://schemas.microsoft.com/office/drawing/2014/main" id="{747102BF-A698-444E-B693-3BC2E2F22350}"/>
+                <a16:creationId xmlns:a16="http://schemas.microsoft.com/office/drawing/2014/main" xmlns="" id="{747102BF-A698-444E-B693-3BC2E2F22350}"/>
               </a:ext>
             </a:extLst>
           </p:cNvPr>
@@ -9453,7 +9453,7 @@
           <p:cNvPr id="5" name="Table 4">
             <a:extLst>
               <a:ext uri="{FF2B5EF4-FFF2-40B4-BE49-F238E27FC236}">
-                <a16:creationId xmlns:a16="http://schemas.microsoft.com/office/drawing/2014/main" id="{9CAF9F99-453D-44F1-88EC-228F7966FFE4}"/>
+                <a16:creationId xmlns:a16="http://schemas.microsoft.com/office/drawing/2014/main" xmlns="" id="{9CAF9F99-453D-44F1-88EC-228F7966FFE4}"/>
               </a:ext>
             </a:extLst>
           </p:cNvPr>
@@ -9482,14 +9482,14 @@
                 <a:gridCol w="4521200">
                   <a:extLst>
                     <a:ext uri="{9D8B030D-6E8A-4147-A177-3AD203B41FA5}">
-                      <a16:colId xmlns:a16="http://schemas.microsoft.com/office/drawing/2014/main" val="371563066"/>
+                      <a16:colId xmlns:a16="http://schemas.microsoft.com/office/drawing/2014/main" xmlns="" val="371563066"/>
                     </a:ext>
                   </a:extLst>
                 </a:gridCol>
                 <a:gridCol w="4555066">
                   <a:extLst>
                     <a:ext uri="{9D8B030D-6E8A-4147-A177-3AD203B41FA5}">
-                      <a16:colId xmlns:a16="http://schemas.microsoft.com/office/drawing/2014/main" val="2181931161"/>
+                      <a16:colId xmlns:a16="http://schemas.microsoft.com/office/drawing/2014/main" xmlns="" val="2181931161"/>
                     </a:ext>
                   </a:extLst>
                 </a:gridCol>
@@ -9625,7 +9625,7 @@
                 </a:tc>
                 <a:extLst>
                   <a:ext uri="{0D108BD9-81ED-4DB2-BD59-A6C34878D82A}">
-                    <a16:rowId xmlns:a16="http://schemas.microsoft.com/office/drawing/2014/main" val="10001"/>
+                    <a16:rowId xmlns:a16="http://schemas.microsoft.com/office/drawing/2014/main" xmlns="" val="10001"/>
                   </a:ext>
                 </a:extLst>
               </a:tr>
@@ -9676,7 +9676,7 @@
           <p:cNvPr id="6" name="Content Placeholder 2">
             <a:extLst>
               <a:ext uri="{FF2B5EF4-FFF2-40B4-BE49-F238E27FC236}">
-                <a16:creationId xmlns:a16="http://schemas.microsoft.com/office/drawing/2014/main" id="{747102BF-A698-444E-B693-3BC2E2F22350}"/>
+                <a16:creationId xmlns:a16="http://schemas.microsoft.com/office/drawing/2014/main" xmlns="" id="{747102BF-A698-444E-B693-3BC2E2F22350}"/>
               </a:ext>
             </a:extLst>
           </p:cNvPr>
@@ -9889,13 +9889,8 @@
             </a:pPr>
             <a:r>
               <a:rPr lang="en-US" sz="2400" b="1" dirty="0"/>
-              <a:t>Marker on table exactly below A, and </a:t>
-            </a:r>
-            <a:r>
-              <a:rPr lang="en-US" sz="2400" b="1"/>
-              <a:t>press ‘t’.</a:t>
-            </a:r>
-            <a:endParaRPr lang="en-US" sz="2400" b="1" dirty="0"/>
+              <a:t>Marker on table exactly below A, and press ‘t’.</a:t>
+            </a:r>
           </a:p>
           <a:p>
             <a:pPr marL="457200" indent="-457200">
@@ -9924,7 +9919,19 @@
             </a:pPr>
             <a:r>
               <a:rPr lang="en-US" sz="2000" b="1" dirty="0"/>
-              <a:t>Distance from starting point to screen is 40 cm.</a:t>
+              <a:t>Distance from starting point to screen </a:t>
+            </a:r>
+            <a:r>
+              <a:rPr lang="en-US" sz="2000" b="1"/>
+              <a:t>is </a:t>
+            </a:r>
+            <a:r>
+              <a:rPr lang="en-US" sz="2000" b="1" smtClean="0"/>
+              <a:t>35 </a:t>
+            </a:r>
+            <a:r>
+              <a:rPr lang="en-US" sz="2000" b="1" dirty="0"/>
+              <a:t>cm.</a:t>
             </a:r>
           </a:p>
           <a:p>
@@ -9957,7 +9964,7 @@
           <p:cNvPr id="5" name="Table 4">
             <a:extLst>
               <a:ext uri="{FF2B5EF4-FFF2-40B4-BE49-F238E27FC236}">
-                <a16:creationId xmlns:a16="http://schemas.microsoft.com/office/drawing/2014/main" id="{9CAF9F99-453D-44F1-88EC-228F7966FFE4}"/>
+                <a16:creationId xmlns:a16="http://schemas.microsoft.com/office/drawing/2014/main" xmlns="" id="{9CAF9F99-453D-44F1-88EC-228F7966FFE4}"/>
               </a:ext>
             </a:extLst>
           </p:cNvPr>
@@ -9986,14 +9993,14 @@
                 <a:gridCol w="3542156">
                   <a:extLst>
                     <a:ext uri="{9D8B030D-6E8A-4147-A177-3AD203B41FA5}">
-                      <a16:colId xmlns:a16="http://schemas.microsoft.com/office/drawing/2014/main" val="371563066"/>
+                      <a16:colId xmlns:a16="http://schemas.microsoft.com/office/drawing/2014/main" xmlns="" val="371563066"/>
                     </a:ext>
                   </a:extLst>
                 </a:gridCol>
                 <a:gridCol w="3568688">
                   <a:extLst>
                     <a:ext uri="{9D8B030D-6E8A-4147-A177-3AD203B41FA5}">
-                      <a16:colId xmlns:a16="http://schemas.microsoft.com/office/drawing/2014/main" val="2181931161"/>
+                      <a16:colId xmlns:a16="http://schemas.microsoft.com/office/drawing/2014/main" xmlns="" val="2181931161"/>
                     </a:ext>
                   </a:extLst>
                 </a:gridCol>
@@ -10129,7 +10136,7 @@
                 </a:tc>
                 <a:extLst>
                   <a:ext uri="{0D108BD9-81ED-4DB2-BD59-A6C34878D82A}">
-                    <a16:rowId xmlns:a16="http://schemas.microsoft.com/office/drawing/2014/main" val="10001"/>
+                    <a16:rowId xmlns:a16="http://schemas.microsoft.com/office/drawing/2014/main" xmlns="" val="10001"/>
                   </a:ext>
                 </a:extLst>
               </a:tr>
@@ -10142,7 +10149,7 @@
           <p:cNvPr id="4" name="Table 3">
             <a:extLst>
               <a:ext uri="{FF2B5EF4-FFF2-40B4-BE49-F238E27FC236}">
-                <a16:creationId xmlns:a16="http://schemas.microsoft.com/office/drawing/2014/main" id="{A3B9448A-B7F5-4830-913D-C9F6A35383F6}"/>
+                <a16:creationId xmlns:a16="http://schemas.microsoft.com/office/drawing/2014/main" xmlns="" id="{A3B9448A-B7F5-4830-913D-C9F6A35383F6}"/>
               </a:ext>
             </a:extLst>
           </p:cNvPr>
@@ -10171,7 +10178,7 @@
                 <a:gridCol w="3290454">
                   <a:extLst>
                     <a:ext uri="{9D8B030D-6E8A-4147-A177-3AD203B41FA5}">
-                      <a16:colId xmlns:a16="http://schemas.microsoft.com/office/drawing/2014/main" val="371563066"/>
+                      <a16:colId xmlns:a16="http://schemas.microsoft.com/office/drawing/2014/main" xmlns="" val="371563066"/>
                     </a:ext>
                   </a:extLst>
                 </a:gridCol>
@@ -10224,7 +10231,7 @@
                 </a:tc>
                 <a:extLst>
                   <a:ext uri="{0D108BD9-81ED-4DB2-BD59-A6C34878D82A}">
-                    <a16:rowId xmlns:a16="http://schemas.microsoft.com/office/drawing/2014/main" val="10001"/>
+                    <a16:rowId xmlns:a16="http://schemas.microsoft.com/office/drawing/2014/main" xmlns="" val="10001"/>
                   </a:ext>
                 </a:extLst>
               </a:tr>
@@ -10237,7 +10244,7 @@
           <p:cNvPr id="7" name="Table 6">
             <a:extLst>
               <a:ext uri="{FF2B5EF4-FFF2-40B4-BE49-F238E27FC236}">
-                <a16:creationId xmlns:a16="http://schemas.microsoft.com/office/drawing/2014/main" id="{E0C09A9D-193B-41BE-8D5D-486A55741393}"/>
+                <a16:creationId xmlns:a16="http://schemas.microsoft.com/office/drawing/2014/main" xmlns="" id="{E0C09A9D-193B-41BE-8D5D-486A55741393}"/>
               </a:ext>
             </a:extLst>
           </p:cNvPr>
@@ -10266,7 +10273,7 @@
                 <a:gridCol w="3290454">
                   <a:extLst>
                     <a:ext uri="{9D8B030D-6E8A-4147-A177-3AD203B41FA5}">
-                      <a16:colId xmlns:a16="http://schemas.microsoft.com/office/drawing/2014/main" val="371563066"/>
+                      <a16:colId xmlns:a16="http://schemas.microsoft.com/office/drawing/2014/main" xmlns="" val="371563066"/>
                     </a:ext>
                   </a:extLst>
                 </a:gridCol>
@@ -10319,7 +10326,7 @@
                 </a:tc>
                 <a:extLst>
                   <a:ext uri="{0D108BD9-81ED-4DB2-BD59-A6C34878D82A}">
-                    <a16:rowId xmlns:a16="http://schemas.microsoft.com/office/drawing/2014/main" val="10001"/>
+                    <a16:rowId xmlns:a16="http://schemas.microsoft.com/office/drawing/2014/main" xmlns="" val="10001"/>
                   </a:ext>
                 </a:extLst>
               </a:tr>
@@ -10332,7 +10339,7 @@
           <p:cNvPr id="8" name="Table 7">
             <a:extLst>
               <a:ext uri="{FF2B5EF4-FFF2-40B4-BE49-F238E27FC236}">
-                <a16:creationId xmlns:a16="http://schemas.microsoft.com/office/drawing/2014/main" id="{3F377A96-D01A-4E09-B218-335309637969}"/>
+                <a16:creationId xmlns:a16="http://schemas.microsoft.com/office/drawing/2014/main" xmlns="" id="{3F377A96-D01A-4E09-B218-335309637969}"/>
               </a:ext>
             </a:extLst>
           </p:cNvPr>
@@ -10361,7 +10368,7 @@
                 <a:gridCol w="3290454">
                   <a:extLst>
                     <a:ext uri="{9D8B030D-6E8A-4147-A177-3AD203B41FA5}">
-                      <a16:colId xmlns:a16="http://schemas.microsoft.com/office/drawing/2014/main" val="371563066"/>
+                      <a16:colId xmlns:a16="http://schemas.microsoft.com/office/drawing/2014/main" xmlns="" val="371563066"/>
                     </a:ext>
                   </a:extLst>
                 </a:gridCol>
@@ -10414,7 +10421,7 @@
                 </a:tc>
                 <a:extLst>
                   <a:ext uri="{0D108BD9-81ED-4DB2-BD59-A6C34878D82A}">
-                    <a16:rowId xmlns:a16="http://schemas.microsoft.com/office/drawing/2014/main" val="10001"/>
+                    <a16:rowId xmlns:a16="http://schemas.microsoft.com/office/drawing/2014/main" xmlns="" val="10001"/>
                   </a:ext>
                 </a:extLst>
               </a:tr>
@@ -10533,7 +10540,7 @@
           <p:cNvPr id="6" name="Content Placeholder 2">
             <a:extLst>
               <a:ext uri="{FF2B5EF4-FFF2-40B4-BE49-F238E27FC236}">
-                <a16:creationId xmlns:a16="http://schemas.microsoft.com/office/drawing/2014/main" id="{747102BF-A698-444E-B693-3BC2E2F22350}"/>
+                <a16:creationId xmlns:a16="http://schemas.microsoft.com/office/drawing/2014/main" xmlns="" id="{747102BF-A698-444E-B693-3BC2E2F22350}"/>
               </a:ext>
             </a:extLst>
           </p:cNvPr>
@@ -10831,7 +10838,7 @@
           <p:cNvPr id="6" name="Content Placeholder 2">
             <a:extLst>
               <a:ext uri="{FF2B5EF4-FFF2-40B4-BE49-F238E27FC236}">
-                <a16:creationId xmlns:a16="http://schemas.microsoft.com/office/drawing/2014/main" id="{747102BF-A698-444E-B693-3BC2E2F22350}"/>
+                <a16:creationId xmlns:a16="http://schemas.microsoft.com/office/drawing/2014/main" xmlns="" id="{747102BF-A698-444E-B693-3BC2E2F22350}"/>
               </a:ext>
             </a:extLst>
           </p:cNvPr>
@@ -11083,7 +11090,7 @@
           <p:cNvPr id="6" name="Content Placeholder 2">
             <a:extLst>
               <a:ext uri="{FF2B5EF4-FFF2-40B4-BE49-F238E27FC236}">
-                <a16:creationId xmlns:a16="http://schemas.microsoft.com/office/drawing/2014/main" id="{747102BF-A698-444E-B693-3BC2E2F22350}"/>
+                <a16:creationId xmlns:a16="http://schemas.microsoft.com/office/drawing/2014/main" xmlns="" id="{747102BF-A698-444E-B693-3BC2E2F22350}"/>
               </a:ext>
             </a:extLst>
           </p:cNvPr>
@@ -11475,7 +11482,7 @@
           <p:cNvPr id="6" name="Content Placeholder 2">
             <a:extLst>
               <a:ext uri="{FF2B5EF4-FFF2-40B4-BE49-F238E27FC236}">
-                <a16:creationId xmlns:a16="http://schemas.microsoft.com/office/drawing/2014/main" id="{747102BF-A698-444E-B693-3BC2E2F22350}"/>
+                <a16:creationId xmlns:a16="http://schemas.microsoft.com/office/drawing/2014/main" xmlns="" id="{747102BF-A698-444E-B693-3BC2E2F22350}"/>
               </a:ext>
             </a:extLst>
           </p:cNvPr>
@@ -11728,7 +11735,7 @@
           <p:cNvPr id="6" name="Content Placeholder 2">
             <a:extLst>
               <a:ext uri="{FF2B5EF4-FFF2-40B4-BE49-F238E27FC236}">
-                <a16:creationId xmlns:a16="http://schemas.microsoft.com/office/drawing/2014/main" id="{747102BF-A698-444E-B693-3BC2E2F22350}"/>
+                <a16:creationId xmlns:a16="http://schemas.microsoft.com/office/drawing/2014/main" xmlns="" id="{747102BF-A698-444E-B693-3BC2E2F22350}"/>
               </a:ext>
             </a:extLst>
           </p:cNvPr>
@@ -11980,7 +11987,7 @@
           <p:cNvPr id="6" name="Content Placeholder 2">
             <a:extLst>
               <a:ext uri="{FF2B5EF4-FFF2-40B4-BE49-F238E27FC236}">
-                <a16:creationId xmlns:a16="http://schemas.microsoft.com/office/drawing/2014/main" id="{747102BF-A698-444E-B693-3BC2E2F22350}"/>
+                <a16:creationId xmlns:a16="http://schemas.microsoft.com/office/drawing/2014/main" xmlns="" id="{747102BF-A698-444E-B693-3BC2E2F22350}"/>
               </a:ext>
             </a:extLst>
           </p:cNvPr>
@@ -12222,7 +12229,7 @@
           <p:cNvPr id="6" name="Content Placeholder 2">
             <a:extLst>
               <a:ext uri="{FF2B5EF4-FFF2-40B4-BE49-F238E27FC236}">
-                <a16:creationId xmlns:a16="http://schemas.microsoft.com/office/drawing/2014/main" id="{747102BF-A698-444E-B693-3BC2E2F22350}"/>
+                <a16:creationId xmlns:a16="http://schemas.microsoft.com/office/drawing/2014/main" xmlns="" id="{747102BF-A698-444E-B693-3BC2E2F22350}"/>
               </a:ext>
             </a:extLst>
           </p:cNvPr>
@@ -12432,7 +12439,7 @@
           <p:cNvPr id="5" name="Table 4">
             <a:extLst>
               <a:ext uri="{FF2B5EF4-FFF2-40B4-BE49-F238E27FC236}">
-                <a16:creationId xmlns:a16="http://schemas.microsoft.com/office/drawing/2014/main" id="{9CAF9F99-453D-44F1-88EC-228F7966FFE4}"/>
+                <a16:creationId xmlns:a16="http://schemas.microsoft.com/office/drawing/2014/main" xmlns="" id="{9CAF9F99-453D-44F1-88EC-228F7966FFE4}"/>
               </a:ext>
             </a:extLst>
           </p:cNvPr>
@@ -12455,14 +12462,14 @@
                 <a:gridCol w="4521200">
                   <a:extLst>
                     <a:ext uri="{9D8B030D-6E8A-4147-A177-3AD203B41FA5}">
-                      <a16:colId xmlns:a16="http://schemas.microsoft.com/office/drawing/2014/main" val="371563066"/>
+                      <a16:colId xmlns:a16="http://schemas.microsoft.com/office/drawing/2014/main" xmlns="" val="371563066"/>
                     </a:ext>
                   </a:extLst>
                 </a:gridCol>
                 <a:gridCol w="4555066">
                   <a:extLst>
                     <a:ext uri="{9D8B030D-6E8A-4147-A177-3AD203B41FA5}">
-                      <a16:colId xmlns:a16="http://schemas.microsoft.com/office/drawing/2014/main" val="2181931161"/>
+                      <a16:colId xmlns:a16="http://schemas.microsoft.com/office/drawing/2014/main" xmlns="" val="2181931161"/>
                     </a:ext>
                   </a:extLst>
                 </a:gridCol>
@@ -12600,7 +12607,7 @@
                 </a:tc>
                 <a:extLst>
                   <a:ext uri="{0D108BD9-81ED-4DB2-BD59-A6C34878D82A}">
-                    <a16:rowId xmlns:a16="http://schemas.microsoft.com/office/drawing/2014/main" val="2258008607"/>
+                    <a16:rowId xmlns:a16="http://schemas.microsoft.com/office/drawing/2014/main" xmlns="" val="2258008607"/>
                   </a:ext>
                 </a:extLst>
               </a:tr>
@@ -12613,7 +12620,7 @@
           <p:cNvPr id="7" name="Table 6">
             <a:extLst>
               <a:ext uri="{FF2B5EF4-FFF2-40B4-BE49-F238E27FC236}">
-                <a16:creationId xmlns:a16="http://schemas.microsoft.com/office/drawing/2014/main" id="{9CAF9F99-453D-44F1-88EC-228F7966FFE4}"/>
+                <a16:creationId xmlns:a16="http://schemas.microsoft.com/office/drawing/2014/main" xmlns="" id="{9CAF9F99-453D-44F1-88EC-228F7966FFE4}"/>
               </a:ext>
             </a:extLst>
           </p:cNvPr>
@@ -12636,14 +12643,14 @@
                 <a:gridCol w="4521200">
                   <a:extLst>
                     <a:ext uri="{9D8B030D-6E8A-4147-A177-3AD203B41FA5}">
-                      <a16:colId xmlns:a16="http://schemas.microsoft.com/office/drawing/2014/main" val="371563066"/>
+                      <a16:colId xmlns:a16="http://schemas.microsoft.com/office/drawing/2014/main" xmlns="" val="371563066"/>
                     </a:ext>
                   </a:extLst>
                 </a:gridCol>
                 <a:gridCol w="4555066">
                   <a:extLst>
                     <a:ext uri="{9D8B030D-6E8A-4147-A177-3AD203B41FA5}">
-                      <a16:colId xmlns:a16="http://schemas.microsoft.com/office/drawing/2014/main" val="2181931161"/>
+                      <a16:colId xmlns:a16="http://schemas.microsoft.com/office/drawing/2014/main" xmlns="" val="2181931161"/>
                     </a:ext>
                   </a:extLst>
                 </a:gridCol>
@@ -12795,7 +12802,7 @@
                 </a:tc>
                 <a:extLst>
                   <a:ext uri="{0D108BD9-81ED-4DB2-BD59-A6C34878D82A}">
-                    <a16:rowId xmlns:a16="http://schemas.microsoft.com/office/drawing/2014/main" val="10001"/>
+                    <a16:rowId xmlns:a16="http://schemas.microsoft.com/office/drawing/2014/main" xmlns="" val="10001"/>
                   </a:ext>
                 </a:extLst>
               </a:tr>
@@ -12808,7 +12815,7 @@
           <p:cNvPr id="8" name="Content Placeholder 2">
             <a:extLst>
               <a:ext uri="{FF2B5EF4-FFF2-40B4-BE49-F238E27FC236}">
-                <a16:creationId xmlns:a16="http://schemas.microsoft.com/office/drawing/2014/main" id="{E0640A27-01A1-4CBA-BA12-916E63F5099E}"/>
+                <a16:creationId xmlns:a16="http://schemas.microsoft.com/office/drawing/2014/main" xmlns="" id="{E0640A27-01A1-4CBA-BA12-916E63F5099E}"/>
               </a:ext>
             </a:extLst>
           </p:cNvPr>

</xml_diff>

<commit_message>
Add 'early_res' and 'incorrect' to experiment and analysis
</commit_message>
<xml_diff>
--- a/experiment/RUN_ME/stimuli/instructions presentation.pptx
+++ b/experiment/RUN_ME/stimuli/instructions presentation.pptx
@@ -22,17 +22,19 @@
     <p:sldId id="298" r:id="rId16"/>
     <p:sldId id="307" r:id="rId17"/>
     <p:sldId id="323" r:id="rId18"/>
-    <p:sldId id="309" r:id="rId19"/>
-    <p:sldId id="306" r:id="rId20"/>
-    <p:sldId id="299" r:id="rId21"/>
-    <p:sldId id="316" r:id="rId22"/>
-    <p:sldId id="312" r:id="rId23"/>
-    <p:sldId id="315" r:id="rId24"/>
-    <p:sldId id="313" r:id="rId25"/>
-    <p:sldId id="314" r:id="rId26"/>
-    <p:sldId id="317" r:id="rId27"/>
-    <p:sldId id="310" r:id="rId28"/>
-    <p:sldId id="311" r:id="rId29"/>
+    <p:sldId id="324" r:id="rId19"/>
+    <p:sldId id="325" r:id="rId20"/>
+    <p:sldId id="309" r:id="rId21"/>
+    <p:sldId id="306" r:id="rId22"/>
+    <p:sldId id="299" r:id="rId23"/>
+    <p:sldId id="316" r:id="rId24"/>
+    <p:sldId id="312" r:id="rId25"/>
+    <p:sldId id="315" r:id="rId26"/>
+    <p:sldId id="313" r:id="rId27"/>
+    <p:sldId id="314" r:id="rId28"/>
+    <p:sldId id="317" r:id="rId29"/>
+    <p:sldId id="310" r:id="rId30"/>
+    <p:sldId id="311" r:id="rId31"/>
   </p:sldIdLst>
   <p:sldSz cx="12192000" cy="6858000"/>
   <p:notesSz cx="6858000" cy="9144000"/>
@@ -268,7 +270,7 @@
           <a:p>
             <a:fld id="{F999E2B6-E0C8-4E2F-B37B-1FC830B33272}" type="datetimeFigureOut">
               <a:rPr lang="en-US" smtClean="0"/>
-              <a:t>5/26/2021</a:t>
+              <a:t>8/22/2021</a:t>
             </a:fld>
             <a:endParaRPr lang="en-US"/>
           </a:p>
@@ -436,7 +438,7 @@
           <a:p>
             <a:fld id="{F999E2B6-E0C8-4E2F-B37B-1FC830B33272}" type="datetimeFigureOut">
               <a:rPr lang="en-US" smtClean="0"/>
-              <a:t>5/26/2021</a:t>
+              <a:t>8/22/2021</a:t>
             </a:fld>
             <a:endParaRPr lang="en-US"/>
           </a:p>
@@ -614,7 +616,7 @@
           <a:p>
             <a:fld id="{F999E2B6-E0C8-4E2F-B37B-1FC830B33272}" type="datetimeFigureOut">
               <a:rPr lang="en-US" smtClean="0"/>
-              <a:t>5/26/2021</a:t>
+              <a:t>8/22/2021</a:t>
             </a:fld>
             <a:endParaRPr lang="en-US"/>
           </a:p>
@@ -782,7 +784,7 @@
           <a:p>
             <a:fld id="{F999E2B6-E0C8-4E2F-B37B-1FC830B33272}" type="datetimeFigureOut">
               <a:rPr lang="en-US" smtClean="0"/>
-              <a:t>5/26/2021</a:t>
+              <a:t>8/22/2021</a:t>
             </a:fld>
             <a:endParaRPr lang="en-US"/>
           </a:p>
@@ -1027,7 +1029,7 @@
           <a:p>
             <a:fld id="{F999E2B6-E0C8-4E2F-B37B-1FC830B33272}" type="datetimeFigureOut">
               <a:rPr lang="en-US" smtClean="0"/>
-              <a:t>5/26/2021</a:t>
+              <a:t>8/22/2021</a:t>
             </a:fld>
             <a:endParaRPr lang="en-US"/>
           </a:p>
@@ -1256,7 +1258,7 @@
           <a:p>
             <a:fld id="{F999E2B6-E0C8-4E2F-B37B-1FC830B33272}" type="datetimeFigureOut">
               <a:rPr lang="en-US" smtClean="0"/>
-              <a:t>5/26/2021</a:t>
+              <a:t>8/22/2021</a:t>
             </a:fld>
             <a:endParaRPr lang="en-US"/>
           </a:p>
@@ -1620,7 +1622,7 @@
           <a:p>
             <a:fld id="{F999E2B6-E0C8-4E2F-B37B-1FC830B33272}" type="datetimeFigureOut">
               <a:rPr lang="en-US" smtClean="0"/>
-              <a:t>5/26/2021</a:t>
+              <a:t>8/22/2021</a:t>
             </a:fld>
             <a:endParaRPr lang="en-US"/>
           </a:p>
@@ -1737,7 +1739,7 @@
           <a:p>
             <a:fld id="{F999E2B6-E0C8-4E2F-B37B-1FC830B33272}" type="datetimeFigureOut">
               <a:rPr lang="en-US" smtClean="0"/>
-              <a:t>5/26/2021</a:t>
+              <a:t>8/22/2021</a:t>
             </a:fld>
             <a:endParaRPr lang="en-US"/>
           </a:p>
@@ -1832,7 +1834,7 @@
           <a:p>
             <a:fld id="{F999E2B6-E0C8-4E2F-B37B-1FC830B33272}" type="datetimeFigureOut">
               <a:rPr lang="en-US" smtClean="0"/>
-              <a:t>5/26/2021</a:t>
+              <a:t>8/22/2021</a:t>
             </a:fld>
             <a:endParaRPr lang="en-US"/>
           </a:p>
@@ -2107,7 +2109,7 @@
           <a:p>
             <a:fld id="{F999E2B6-E0C8-4E2F-B37B-1FC830B33272}" type="datetimeFigureOut">
               <a:rPr lang="en-US" smtClean="0"/>
-              <a:t>5/26/2021</a:t>
+              <a:t>8/22/2021</a:t>
             </a:fld>
             <a:endParaRPr lang="en-US"/>
           </a:p>
@@ -2359,7 +2361,7 @@
           <a:p>
             <a:fld id="{F999E2B6-E0C8-4E2F-B37B-1FC830B33272}" type="datetimeFigureOut">
               <a:rPr lang="en-US" smtClean="0"/>
-              <a:t>5/26/2021</a:t>
+              <a:t>8/22/2021</a:t>
             </a:fld>
             <a:endParaRPr lang="en-US"/>
           </a:p>
@@ -2570,7 +2572,7 @@
           <a:p>
             <a:fld id="{F999E2B6-E0C8-4E2F-B37B-1FC830B33272}" type="datetimeFigureOut">
               <a:rPr lang="en-US" smtClean="0"/>
-              <a:t>5/26/2021</a:t>
+              <a:t>8/22/2021</a:t>
             </a:fld>
             <a:endParaRPr lang="en-US"/>
           </a:p>
@@ -3068,7 +3070,7 @@
           <p:cNvPr id="5" name="Content Placeholder 2">
             <a:extLst>
               <a:ext uri="{FF2B5EF4-FFF2-40B4-BE49-F238E27FC236}">
-                <a16:creationId xmlns:a16="http://schemas.microsoft.com/office/drawing/2014/main" xmlns="" id="{747102BF-A698-444E-B693-3BC2E2F22350}"/>
+                <a16:creationId xmlns:a16="http://schemas.microsoft.com/office/drawing/2014/main" id="{747102BF-A698-444E-B693-3BC2E2F22350}"/>
               </a:ext>
             </a:extLst>
           </p:cNvPr>
@@ -3297,7 +3299,7 @@
           <p:cNvPr id="7" name="Table 6">
             <a:extLst>
               <a:ext uri="{FF2B5EF4-FFF2-40B4-BE49-F238E27FC236}">
-                <a16:creationId xmlns:a16="http://schemas.microsoft.com/office/drawing/2014/main" xmlns="" id="{9CAF9F99-453D-44F1-88EC-228F7966FFE4}"/>
+                <a16:creationId xmlns:a16="http://schemas.microsoft.com/office/drawing/2014/main" id="{9CAF9F99-453D-44F1-88EC-228F7966FFE4}"/>
               </a:ext>
             </a:extLst>
           </p:cNvPr>
@@ -3320,14 +3322,14 @@
                 <a:gridCol w="4521200">
                   <a:extLst>
                     <a:ext uri="{9D8B030D-6E8A-4147-A177-3AD203B41FA5}">
-                      <a16:colId xmlns:a16="http://schemas.microsoft.com/office/drawing/2014/main" xmlns="" val="371563066"/>
+                      <a16:colId xmlns:a16="http://schemas.microsoft.com/office/drawing/2014/main" val="371563066"/>
                     </a:ext>
                   </a:extLst>
                 </a:gridCol>
                 <a:gridCol w="4555066">
                   <a:extLst>
                     <a:ext uri="{9D8B030D-6E8A-4147-A177-3AD203B41FA5}">
-                      <a16:colId xmlns:a16="http://schemas.microsoft.com/office/drawing/2014/main" xmlns="" val="2181931161"/>
+                      <a16:colId xmlns:a16="http://schemas.microsoft.com/office/drawing/2014/main" val="2181931161"/>
                     </a:ext>
                   </a:extLst>
                 </a:gridCol>
@@ -3489,7 +3491,7 @@
                 </a:tc>
                 <a:extLst>
                   <a:ext uri="{0D108BD9-81ED-4DB2-BD59-A6C34878D82A}">
-                    <a16:rowId xmlns:a16="http://schemas.microsoft.com/office/drawing/2014/main" xmlns="" val="2258008607"/>
+                    <a16:rowId xmlns:a16="http://schemas.microsoft.com/office/drawing/2014/main" val="2258008607"/>
                   </a:ext>
                 </a:extLst>
               </a:tr>
@@ -3502,7 +3504,7 @@
           <p:cNvPr id="8" name="Table 7">
             <a:extLst>
               <a:ext uri="{FF2B5EF4-FFF2-40B4-BE49-F238E27FC236}">
-                <a16:creationId xmlns:a16="http://schemas.microsoft.com/office/drawing/2014/main" xmlns="" id="{9CAF9F99-453D-44F1-88EC-228F7966FFE4}"/>
+                <a16:creationId xmlns:a16="http://schemas.microsoft.com/office/drawing/2014/main" id="{9CAF9F99-453D-44F1-88EC-228F7966FFE4}"/>
               </a:ext>
             </a:extLst>
           </p:cNvPr>
@@ -3525,14 +3527,14 @@
                 <a:gridCol w="4521200">
                   <a:extLst>
                     <a:ext uri="{9D8B030D-6E8A-4147-A177-3AD203B41FA5}">
-                      <a16:colId xmlns:a16="http://schemas.microsoft.com/office/drawing/2014/main" xmlns="" val="371563066"/>
+                      <a16:colId xmlns:a16="http://schemas.microsoft.com/office/drawing/2014/main" val="371563066"/>
                     </a:ext>
                   </a:extLst>
                 </a:gridCol>
                 <a:gridCol w="4555066">
                   <a:extLst>
                     <a:ext uri="{9D8B030D-6E8A-4147-A177-3AD203B41FA5}">
-                      <a16:colId xmlns:a16="http://schemas.microsoft.com/office/drawing/2014/main" xmlns="" val="2181931161"/>
+                      <a16:colId xmlns:a16="http://schemas.microsoft.com/office/drawing/2014/main" val="2181931161"/>
                     </a:ext>
                   </a:extLst>
                 </a:gridCol>
@@ -3684,7 +3686,7 @@
                 </a:tc>
                 <a:extLst>
                   <a:ext uri="{0D108BD9-81ED-4DB2-BD59-A6C34878D82A}">
-                    <a16:rowId xmlns:a16="http://schemas.microsoft.com/office/drawing/2014/main" xmlns="" val="10001"/>
+                    <a16:rowId xmlns:a16="http://schemas.microsoft.com/office/drawing/2014/main" val="10001"/>
                   </a:ext>
                 </a:extLst>
               </a:tr>
@@ -3697,7 +3699,7 @@
           <p:cNvPr id="6" name="Content Placeholder 2">
             <a:extLst>
               <a:ext uri="{FF2B5EF4-FFF2-40B4-BE49-F238E27FC236}">
-                <a16:creationId xmlns:a16="http://schemas.microsoft.com/office/drawing/2014/main" xmlns="" id="{C31A80B8-1841-40D1-9CE0-CC09FA970B6F}"/>
+                <a16:creationId xmlns:a16="http://schemas.microsoft.com/office/drawing/2014/main" id="{C31A80B8-1841-40D1-9CE0-CC09FA970B6F}"/>
               </a:ext>
             </a:extLst>
           </p:cNvPr>
@@ -3939,7 +3941,7 @@
           <p:cNvPr id="6" name="Content Placeholder 2">
             <a:extLst>
               <a:ext uri="{FF2B5EF4-FFF2-40B4-BE49-F238E27FC236}">
-                <a16:creationId xmlns:a16="http://schemas.microsoft.com/office/drawing/2014/main" xmlns="" id="{747102BF-A698-444E-B693-3BC2E2F22350}"/>
+                <a16:creationId xmlns:a16="http://schemas.microsoft.com/office/drawing/2014/main" id="{747102BF-A698-444E-B693-3BC2E2F22350}"/>
               </a:ext>
             </a:extLst>
           </p:cNvPr>
@@ -4191,7 +4193,7 @@
           <p:cNvPr id="6" name="Content Placeholder 2">
             <a:extLst>
               <a:ext uri="{FF2B5EF4-FFF2-40B4-BE49-F238E27FC236}">
-                <a16:creationId xmlns:a16="http://schemas.microsoft.com/office/drawing/2014/main" xmlns="" id="{747102BF-A698-444E-B693-3BC2E2F22350}"/>
+                <a16:creationId xmlns:a16="http://schemas.microsoft.com/office/drawing/2014/main" id="{747102BF-A698-444E-B693-3BC2E2F22350}"/>
               </a:ext>
             </a:extLst>
           </p:cNvPr>
@@ -4401,7 +4403,7 @@
           <p:cNvPr id="5" name="Table 4">
             <a:extLst>
               <a:ext uri="{FF2B5EF4-FFF2-40B4-BE49-F238E27FC236}">
-                <a16:creationId xmlns:a16="http://schemas.microsoft.com/office/drawing/2014/main" xmlns="" id="{9CAF9F99-453D-44F1-88EC-228F7966FFE4}"/>
+                <a16:creationId xmlns:a16="http://schemas.microsoft.com/office/drawing/2014/main" id="{9CAF9F99-453D-44F1-88EC-228F7966FFE4}"/>
               </a:ext>
             </a:extLst>
           </p:cNvPr>
@@ -4430,14 +4432,14 @@
                 <a:gridCol w="4521200">
                   <a:extLst>
                     <a:ext uri="{9D8B030D-6E8A-4147-A177-3AD203B41FA5}">
-                      <a16:colId xmlns:a16="http://schemas.microsoft.com/office/drawing/2014/main" xmlns="" val="371563066"/>
+                      <a16:colId xmlns:a16="http://schemas.microsoft.com/office/drawing/2014/main" val="371563066"/>
                     </a:ext>
                   </a:extLst>
                 </a:gridCol>
                 <a:gridCol w="4555066">
                   <a:extLst>
                     <a:ext uri="{9D8B030D-6E8A-4147-A177-3AD203B41FA5}">
-                      <a16:colId xmlns:a16="http://schemas.microsoft.com/office/drawing/2014/main" xmlns="" val="2181931161"/>
+                      <a16:colId xmlns:a16="http://schemas.microsoft.com/office/drawing/2014/main" val="2181931161"/>
                     </a:ext>
                   </a:extLst>
                 </a:gridCol>
@@ -4575,7 +4577,7 @@
                 </a:tc>
                 <a:extLst>
                   <a:ext uri="{0D108BD9-81ED-4DB2-BD59-A6C34878D82A}">
-                    <a16:rowId xmlns:a16="http://schemas.microsoft.com/office/drawing/2014/main" xmlns="" val="2258008607"/>
+                    <a16:rowId xmlns:a16="http://schemas.microsoft.com/office/drawing/2014/main" val="2258008607"/>
                   </a:ext>
                 </a:extLst>
               </a:tr>
@@ -4588,7 +4590,7 @@
           <p:cNvPr id="7" name="Table 6">
             <a:extLst>
               <a:ext uri="{FF2B5EF4-FFF2-40B4-BE49-F238E27FC236}">
-                <a16:creationId xmlns:a16="http://schemas.microsoft.com/office/drawing/2014/main" xmlns="" id="{9CAF9F99-453D-44F1-88EC-228F7966FFE4}"/>
+                <a16:creationId xmlns:a16="http://schemas.microsoft.com/office/drawing/2014/main" id="{9CAF9F99-453D-44F1-88EC-228F7966FFE4}"/>
               </a:ext>
             </a:extLst>
           </p:cNvPr>
@@ -4617,14 +4619,14 @@
                 <a:gridCol w="4521200">
                   <a:extLst>
                     <a:ext uri="{9D8B030D-6E8A-4147-A177-3AD203B41FA5}">
-                      <a16:colId xmlns:a16="http://schemas.microsoft.com/office/drawing/2014/main" xmlns="" val="371563066"/>
+                      <a16:colId xmlns:a16="http://schemas.microsoft.com/office/drawing/2014/main" val="371563066"/>
                     </a:ext>
                   </a:extLst>
                 </a:gridCol>
                 <a:gridCol w="4555066">
                   <a:extLst>
                     <a:ext uri="{9D8B030D-6E8A-4147-A177-3AD203B41FA5}">
-                      <a16:colId xmlns:a16="http://schemas.microsoft.com/office/drawing/2014/main" xmlns="" val="2181931161"/>
+                      <a16:colId xmlns:a16="http://schemas.microsoft.com/office/drawing/2014/main" val="2181931161"/>
                     </a:ext>
                   </a:extLst>
                 </a:gridCol>
@@ -4776,7 +4778,7 @@
                 </a:tc>
                 <a:extLst>
                   <a:ext uri="{0D108BD9-81ED-4DB2-BD59-A6C34878D82A}">
-                    <a16:rowId xmlns:a16="http://schemas.microsoft.com/office/drawing/2014/main" xmlns="" val="10001"/>
+                    <a16:rowId xmlns:a16="http://schemas.microsoft.com/office/drawing/2014/main" val="10001"/>
                   </a:ext>
                 </a:extLst>
               </a:tr>
@@ -4827,7 +4829,7 @@
           <p:cNvPr id="5" name="Content Placeholder 2">
             <a:extLst>
               <a:ext uri="{FF2B5EF4-FFF2-40B4-BE49-F238E27FC236}">
-                <a16:creationId xmlns:a16="http://schemas.microsoft.com/office/drawing/2014/main" xmlns="" id="{747102BF-A698-444E-B693-3BC2E2F22350}"/>
+                <a16:creationId xmlns:a16="http://schemas.microsoft.com/office/drawing/2014/main" id="{747102BF-A698-444E-B693-3BC2E2F22350}"/>
               </a:ext>
             </a:extLst>
           </p:cNvPr>
@@ -5056,7 +5058,7 @@
           <p:cNvPr id="7" name="Table 6">
             <a:extLst>
               <a:ext uri="{FF2B5EF4-FFF2-40B4-BE49-F238E27FC236}">
-                <a16:creationId xmlns:a16="http://schemas.microsoft.com/office/drawing/2014/main" xmlns="" id="{9CAF9F99-453D-44F1-88EC-228F7966FFE4}"/>
+                <a16:creationId xmlns:a16="http://schemas.microsoft.com/office/drawing/2014/main" id="{9CAF9F99-453D-44F1-88EC-228F7966FFE4}"/>
               </a:ext>
             </a:extLst>
           </p:cNvPr>
@@ -5085,14 +5087,14 @@
                 <a:gridCol w="4521200">
                   <a:extLst>
                     <a:ext uri="{9D8B030D-6E8A-4147-A177-3AD203B41FA5}">
-                      <a16:colId xmlns:a16="http://schemas.microsoft.com/office/drawing/2014/main" xmlns="" val="371563066"/>
+                      <a16:colId xmlns:a16="http://schemas.microsoft.com/office/drawing/2014/main" val="371563066"/>
                     </a:ext>
                   </a:extLst>
                 </a:gridCol>
                 <a:gridCol w="4555066">
                   <a:extLst>
                     <a:ext uri="{9D8B030D-6E8A-4147-A177-3AD203B41FA5}">
-                      <a16:colId xmlns:a16="http://schemas.microsoft.com/office/drawing/2014/main" xmlns="" val="2181931161"/>
+                      <a16:colId xmlns:a16="http://schemas.microsoft.com/office/drawing/2014/main" val="2181931161"/>
                     </a:ext>
                   </a:extLst>
                 </a:gridCol>
@@ -5254,7 +5256,7 @@
                 </a:tc>
                 <a:extLst>
                   <a:ext uri="{0D108BD9-81ED-4DB2-BD59-A6C34878D82A}">
-                    <a16:rowId xmlns:a16="http://schemas.microsoft.com/office/drawing/2014/main" xmlns="" val="2258008607"/>
+                    <a16:rowId xmlns:a16="http://schemas.microsoft.com/office/drawing/2014/main" val="2258008607"/>
                   </a:ext>
                 </a:extLst>
               </a:tr>
@@ -5267,7 +5269,7 @@
           <p:cNvPr id="8" name="Table 7">
             <a:extLst>
               <a:ext uri="{FF2B5EF4-FFF2-40B4-BE49-F238E27FC236}">
-                <a16:creationId xmlns:a16="http://schemas.microsoft.com/office/drawing/2014/main" xmlns="" id="{9CAF9F99-453D-44F1-88EC-228F7966FFE4}"/>
+                <a16:creationId xmlns:a16="http://schemas.microsoft.com/office/drawing/2014/main" id="{9CAF9F99-453D-44F1-88EC-228F7966FFE4}"/>
               </a:ext>
             </a:extLst>
           </p:cNvPr>
@@ -5296,14 +5298,14 @@
                 <a:gridCol w="4521200">
                   <a:extLst>
                     <a:ext uri="{9D8B030D-6E8A-4147-A177-3AD203B41FA5}">
-                      <a16:colId xmlns:a16="http://schemas.microsoft.com/office/drawing/2014/main" xmlns="" val="371563066"/>
+                      <a16:colId xmlns:a16="http://schemas.microsoft.com/office/drawing/2014/main" val="371563066"/>
                     </a:ext>
                   </a:extLst>
                 </a:gridCol>
                 <a:gridCol w="4555066">
                   <a:extLst>
                     <a:ext uri="{9D8B030D-6E8A-4147-A177-3AD203B41FA5}">
-                      <a16:colId xmlns:a16="http://schemas.microsoft.com/office/drawing/2014/main" xmlns="" val="2181931161"/>
+                      <a16:colId xmlns:a16="http://schemas.microsoft.com/office/drawing/2014/main" val="2181931161"/>
                     </a:ext>
                   </a:extLst>
                 </a:gridCol>
@@ -5455,7 +5457,7 @@
                 </a:tc>
                 <a:extLst>
                   <a:ext uri="{0D108BD9-81ED-4DB2-BD59-A6C34878D82A}">
-                    <a16:rowId xmlns:a16="http://schemas.microsoft.com/office/drawing/2014/main" xmlns="" val="10001"/>
+                    <a16:rowId xmlns:a16="http://schemas.microsoft.com/office/drawing/2014/main" val="10001"/>
                   </a:ext>
                 </a:extLst>
               </a:tr>
@@ -5506,7 +5508,7 @@
           <p:cNvPr id="6" name="Content Placeholder 2">
             <a:extLst>
               <a:ext uri="{FF2B5EF4-FFF2-40B4-BE49-F238E27FC236}">
-                <a16:creationId xmlns:a16="http://schemas.microsoft.com/office/drawing/2014/main" xmlns="" id="{747102BF-A698-444E-B693-3BC2E2F22350}"/>
+                <a16:creationId xmlns:a16="http://schemas.microsoft.com/office/drawing/2014/main" id="{747102BF-A698-444E-B693-3BC2E2F22350}"/>
               </a:ext>
             </a:extLst>
           </p:cNvPr>
@@ -5713,7 +5715,7 @@
           <p:cNvPr id="5" name="Table 4">
             <a:extLst>
               <a:ext uri="{FF2B5EF4-FFF2-40B4-BE49-F238E27FC236}">
-                <a16:creationId xmlns:a16="http://schemas.microsoft.com/office/drawing/2014/main" xmlns="" id="{9CAF9F99-453D-44F1-88EC-228F7966FFE4}"/>
+                <a16:creationId xmlns:a16="http://schemas.microsoft.com/office/drawing/2014/main" id="{9CAF9F99-453D-44F1-88EC-228F7966FFE4}"/>
               </a:ext>
             </a:extLst>
           </p:cNvPr>
@@ -5742,14 +5744,14 @@
                 <a:gridCol w="4521200">
                   <a:extLst>
                     <a:ext uri="{9D8B030D-6E8A-4147-A177-3AD203B41FA5}">
-                      <a16:colId xmlns:a16="http://schemas.microsoft.com/office/drawing/2014/main" xmlns="" val="371563066"/>
+                      <a16:colId xmlns:a16="http://schemas.microsoft.com/office/drawing/2014/main" val="371563066"/>
                     </a:ext>
                   </a:extLst>
                 </a:gridCol>
                 <a:gridCol w="4555066">
                   <a:extLst>
                     <a:ext uri="{9D8B030D-6E8A-4147-A177-3AD203B41FA5}">
-                      <a16:colId xmlns:a16="http://schemas.microsoft.com/office/drawing/2014/main" xmlns="" val="2181931161"/>
+                      <a16:colId xmlns:a16="http://schemas.microsoft.com/office/drawing/2014/main" val="2181931161"/>
                     </a:ext>
                   </a:extLst>
                 </a:gridCol>
@@ -5901,7 +5903,7 @@
                 </a:tc>
                 <a:extLst>
                   <a:ext uri="{0D108BD9-81ED-4DB2-BD59-A6C34878D82A}">
-                    <a16:rowId xmlns:a16="http://schemas.microsoft.com/office/drawing/2014/main" xmlns="" val="10001"/>
+                    <a16:rowId xmlns:a16="http://schemas.microsoft.com/office/drawing/2014/main" val="10001"/>
                   </a:ext>
                 </a:extLst>
               </a:tr>
@@ -5952,7 +5954,7 @@
           <p:cNvPr id="2" name="Table 2">
             <a:extLst>
               <a:ext uri="{FF2B5EF4-FFF2-40B4-BE49-F238E27FC236}">
-                <a16:creationId xmlns:a16="http://schemas.microsoft.com/office/drawing/2014/main" xmlns="" id="{9768F41E-FF16-4CA0-9061-785C57DCD75D}"/>
+                <a16:creationId xmlns:a16="http://schemas.microsoft.com/office/drawing/2014/main" id="{9768F41E-FF16-4CA0-9061-785C57DCD75D}"/>
               </a:ext>
             </a:extLst>
           </p:cNvPr>
@@ -5981,28 +5983,28 @@
                 <a:gridCol w="3048000">
                   <a:extLst>
                     <a:ext uri="{9D8B030D-6E8A-4147-A177-3AD203B41FA5}">
-                      <a16:colId xmlns:a16="http://schemas.microsoft.com/office/drawing/2014/main" xmlns="" val="371563066"/>
+                      <a16:colId xmlns:a16="http://schemas.microsoft.com/office/drawing/2014/main" val="371563066"/>
                     </a:ext>
                   </a:extLst>
                 </a:gridCol>
                 <a:gridCol w="3048000">
                   <a:extLst>
                     <a:ext uri="{9D8B030D-6E8A-4147-A177-3AD203B41FA5}">
-                      <a16:colId xmlns:a16="http://schemas.microsoft.com/office/drawing/2014/main" xmlns="" val="2688513847"/>
+                      <a16:colId xmlns:a16="http://schemas.microsoft.com/office/drawing/2014/main" val="2688513847"/>
                     </a:ext>
                   </a:extLst>
                 </a:gridCol>
                 <a:gridCol w="3048000">
                   <a:extLst>
                     <a:ext uri="{9D8B030D-6E8A-4147-A177-3AD203B41FA5}">
-                      <a16:colId xmlns:a16="http://schemas.microsoft.com/office/drawing/2014/main" xmlns="" val="2201978408"/>
+                      <a16:colId xmlns:a16="http://schemas.microsoft.com/office/drawing/2014/main" val="2201978408"/>
                     </a:ext>
                   </a:extLst>
                 </a:gridCol>
                 <a:gridCol w="3048000">
                   <a:extLst>
                     <a:ext uri="{9D8B030D-6E8A-4147-A177-3AD203B41FA5}">
-                      <a16:colId xmlns:a16="http://schemas.microsoft.com/office/drawing/2014/main" xmlns="" val="2181931161"/>
+                      <a16:colId xmlns:a16="http://schemas.microsoft.com/office/drawing/2014/main" val="2181931161"/>
                     </a:ext>
                   </a:extLst>
                 </a:gridCol>
@@ -6178,7 +6180,7 @@
                 </a:tc>
                 <a:extLst>
                   <a:ext uri="{0D108BD9-81ED-4DB2-BD59-A6C34878D82A}">
-                    <a16:rowId xmlns:a16="http://schemas.microsoft.com/office/drawing/2014/main" xmlns="" val="2258008607"/>
+                    <a16:rowId xmlns:a16="http://schemas.microsoft.com/office/drawing/2014/main" val="2258008607"/>
                   </a:ext>
                 </a:extLst>
               </a:tr>
@@ -6386,7 +6388,7 @@
                 </a:tc>
                 <a:extLst>
                   <a:ext uri="{0D108BD9-81ED-4DB2-BD59-A6C34878D82A}">
-                    <a16:rowId xmlns:a16="http://schemas.microsoft.com/office/drawing/2014/main" xmlns="" val="3004479924"/>
+                    <a16:rowId xmlns:a16="http://schemas.microsoft.com/office/drawing/2014/main" val="3004479924"/>
                   </a:ext>
                 </a:extLst>
               </a:tr>
@@ -6399,7 +6401,7 @@
           <p:cNvPr id="6" name="Content Placeholder 2">
             <a:extLst>
               <a:ext uri="{FF2B5EF4-FFF2-40B4-BE49-F238E27FC236}">
-                <a16:creationId xmlns:a16="http://schemas.microsoft.com/office/drawing/2014/main" xmlns="" id="{747102BF-A698-444E-B693-3BC2E2F22350}"/>
+                <a16:creationId xmlns:a16="http://schemas.microsoft.com/office/drawing/2014/main" id="{747102BF-A698-444E-B693-3BC2E2F22350}"/>
               </a:ext>
             </a:extLst>
           </p:cNvPr>
@@ -6644,7 +6646,7 @@
           <p:cNvPr id="6" name="Content Placeholder 2">
             <a:extLst>
               <a:ext uri="{FF2B5EF4-FFF2-40B4-BE49-F238E27FC236}">
-                <a16:creationId xmlns:a16="http://schemas.microsoft.com/office/drawing/2014/main" xmlns="" id="{747102BF-A698-444E-B693-3BC2E2F22350}"/>
+                <a16:creationId xmlns:a16="http://schemas.microsoft.com/office/drawing/2014/main" id="{747102BF-A698-444E-B693-3BC2E2F22350}"/>
               </a:ext>
             </a:extLst>
           </p:cNvPr>
@@ -6837,7 +6839,7 @@
             </a:pPr>
             <a:r>
               <a:rPr lang="he-IL" sz="3200" b="1" dirty="0"/>
-              <a:t>התחלתם לנוע מאוחר מדי, התחילו לנוע מוקדם יותר</a:t>
+              <a:t>זזת מאוחר</a:t>
             </a:r>
             <a:endParaRPr lang="en-US" sz="2000" dirty="0"/>
           </a:p>
@@ -6886,7 +6888,7 @@
           <p:cNvPr id="6" name="Content Placeholder 2">
             <a:extLst>
               <a:ext uri="{FF2B5EF4-FFF2-40B4-BE49-F238E27FC236}">
-                <a16:creationId xmlns:a16="http://schemas.microsoft.com/office/drawing/2014/main" xmlns="" id="{747102BF-A698-444E-B693-3BC2E2F22350}"/>
+                <a16:creationId xmlns:a16="http://schemas.microsoft.com/office/drawing/2014/main" id="{747102BF-A698-444E-B693-3BC2E2F22350}"/>
               </a:ext>
             </a:extLst>
           </p:cNvPr>
@@ -7079,7 +7081,7 @@
             </a:pPr>
             <a:r>
               <a:rPr lang="he-IL" sz="3200" b="1" dirty="0"/>
-              <a:t>הגעתם למסך מאוחר מדי, בצעו הושטה מהירה יותר</a:t>
+              <a:t>זזת מוקדם</a:t>
             </a:r>
             <a:endParaRPr lang="en-US" sz="2000" dirty="0"/>
           </a:p>
@@ -7128,7 +7130,7 @@
           <p:cNvPr id="6" name="Content Placeholder 2">
             <a:extLst>
               <a:ext uri="{FF2B5EF4-FFF2-40B4-BE49-F238E27FC236}">
-                <a16:creationId xmlns:a16="http://schemas.microsoft.com/office/drawing/2014/main" xmlns="" id="{747102BF-A698-444E-B693-3BC2E2F22350}"/>
+                <a16:creationId xmlns:a16="http://schemas.microsoft.com/office/drawing/2014/main" id="{747102BF-A698-444E-B693-3BC2E2F22350}"/>
               </a:ext>
             </a:extLst>
           </p:cNvPr>
@@ -7321,16 +7323,15 @@
             </a:pPr>
             <a:r>
               <a:rPr lang="he-IL" sz="3200" b="1" dirty="0"/>
-              <a:t>החזירו את האצבע לנקודת ההתחלה</a:t>
-            </a:r>
-            <a:endParaRPr lang="en-US" sz="2000" dirty="0"/>
+              <a:t>זזת לאט</a:t>
+            </a:r>
           </a:p>
         </p:txBody>
       </p:sp>
     </p:spTree>
     <p:extLst>
       <p:ext uri="{BB962C8B-B14F-4D97-AF65-F5344CB8AC3E}">
-        <p14:creationId xmlns:p14="http://schemas.microsoft.com/office/powerpoint/2010/main" val="1185155127"/>
+        <p14:creationId xmlns:p14="http://schemas.microsoft.com/office/powerpoint/2010/main" val="1942749224"/>
       </p:ext>
     </p:extLst>
   </p:cSld>
@@ -7370,7 +7371,7 @@
           <p:cNvPr id="6" name="Content Placeholder 2">
             <a:extLst>
               <a:ext uri="{FF2B5EF4-FFF2-40B4-BE49-F238E27FC236}">
-                <a16:creationId xmlns:a16="http://schemas.microsoft.com/office/drawing/2014/main" xmlns="" id="{747102BF-A698-444E-B693-3BC2E2F22350}"/>
+                <a16:creationId xmlns:a16="http://schemas.microsoft.com/office/drawing/2014/main" id="{747102BF-A698-444E-B693-3BC2E2F22350}"/>
               </a:ext>
             </a:extLst>
           </p:cNvPr>
@@ -7382,7 +7383,7 @@
         <p:spPr>
           <a:xfrm>
             <a:off x="691816" y="2851102"/>
-            <a:ext cx="10808368" cy="1155796"/>
+            <a:ext cx="10808368" cy="534894"/>
           </a:xfrm>
           <a:prstGeom prst="rect">
             <a:avLst/>
@@ -7562,27 +7563,16 @@
               <a:buNone/>
             </a:pPr>
             <a:r>
-              <a:rPr lang="he-IL" sz="3200" b="1" u="sng" dirty="0"/>
-              <a:t>סיימתם בלוק</a:t>
-            </a:r>
-          </a:p>
-          <a:p>
-            <a:pPr marL="0" indent="0" algn="ctr" rtl="1">
-              <a:buFont typeface="Arial" panose="020B0604020202020204" pitchFamily="34" charset="0"/>
-              <a:buNone/>
-            </a:pPr>
-            <a:r>
-              <a:rPr lang="he-IL" sz="3200" dirty="0"/>
-              <a:t>כשאתם מוכנים לחצו "רווח" על מנת להמשיך לבלוק הבא</a:t>
-            </a:r>
-            <a:endParaRPr lang="en-US" sz="2000" dirty="0"/>
+              <a:rPr lang="he-IL" sz="3200" b="1" dirty="0"/>
+              <a:t>תשובה שגויה</a:t>
+            </a:r>
           </a:p>
         </p:txBody>
       </p:sp>
     </p:spTree>
     <p:extLst>
       <p:ext uri="{BB962C8B-B14F-4D97-AF65-F5344CB8AC3E}">
-        <p14:creationId xmlns:p14="http://schemas.microsoft.com/office/powerpoint/2010/main" val="1323838221"/>
+        <p14:creationId xmlns:p14="http://schemas.microsoft.com/office/powerpoint/2010/main" val="2200760431"/>
       </p:ext>
     </p:extLst>
   </p:cSld>
@@ -7714,7 +7704,7 @@
           <p:cNvPr id="6" name="Content Placeholder 2">
             <a:extLst>
               <a:ext uri="{FF2B5EF4-FFF2-40B4-BE49-F238E27FC236}">
-                <a16:creationId xmlns:a16="http://schemas.microsoft.com/office/drawing/2014/main" xmlns="" id="{747102BF-A698-444E-B693-3BC2E2F22350}"/>
+                <a16:creationId xmlns:a16="http://schemas.microsoft.com/office/drawing/2014/main" id="{747102BF-A698-444E-B693-3BC2E2F22350}"/>
               </a:ext>
             </a:extLst>
           </p:cNvPr>
@@ -7725,13 +7715,12 @@
         </p:nvSpPr>
         <p:spPr>
           <a:xfrm>
-            <a:off x="691816" y="2567213"/>
-            <a:ext cx="10808368" cy="1723573"/>
+            <a:off x="691816" y="2851102"/>
+            <a:ext cx="10808368" cy="534894"/>
           </a:xfrm>
           <a:prstGeom prst="rect">
             <a:avLst/>
           </a:prstGeom>
-          <a:noFill/>
         </p:spPr>
         <p:txBody>
           <a:bodyPr vert="horz" lIns="91440" tIns="45720" rIns="91440" bIns="45720" rtlCol="0">
@@ -7907,37 +7896,17 @@
               <a:buNone/>
             </a:pPr>
             <a:r>
-              <a:rPr lang="he-IL" sz="3200" dirty="0"/>
-              <a:t>תם ונשלם הניסוי,</a:t>
-            </a:r>
-          </a:p>
-          <a:p>
-            <a:pPr marL="0" indent="0" algn="ctr" rtl="1">
-              <a:buFont typeface="Arial" panose="020B0604020202020204" pitchFamily="34" charset="0"/>
-              <a:buNone/>
-            </a:pPr>
-            <a:r>
-              <a:rPr lang="he-IL" sz="3200" dirty="0"/>
-              <a:t>תודה על השתתפותך!</a:t>
-            </a:r>
-          </a:p>
-          <a:p>
-            <a:pPr marL="0" indent="0" algn="ctr" rtl="1">
-              <a:buFont typeface="Arial" panose="020B0604020202020204" pitchFamily="34" charset="0"/>
-              <a:buNone/>
-            </a:pPr>
-            <a:r>
-              <a:rPr lang="he-IL" sz="2100" dirty="0"/>
-              <a:t>(קרא לנסיין)</a:t>
-            </a:r>
-            <a:endParaRPr lang="en-US" sz="1300" dirty="0"/>
+              <a:rPr lang="he-IL" sz="3200" b="1" dirty="0"/>
+              <a:t>החזירו את האצבע לנקודת ההתחלה</a:t>
+            </a:r>
+            <a:endParaRPr lang="en-US" sz="2000" dirty="0"/>
           </a:p>
         </p:txBody>
       </p:sp>
     </p:spTree>
     <p:extLst>
       <p:ext uri="{BB962C8B-B14F-4D97-AF65-F5344CB8AC3E}">
-        <p14:creationId xmlns:p14="http://schemas.microsoft.com/office/powerpoint/2010/main" val="2008702893"/>
+        <p14:creationId xmlns:p14="http://schemas.microsoft.com/office/powerpoint/2010/main" val="1185155127"/>
       </p:ext>
     </p:extLst>
   </p:cSld>
@@ -7977,7 +7946,7 @@
           <p:cNvPr id="6" name="Content Placeholder 2">
             <a:extLst>
               <a:ext uri="{FF2B5EF4-FFF2-40B4-BE49-F238E27FC236}">
-                <a16:creationId xmlns:a16="http://schemas.microsoft.com/office/drawing/2014/main" xmlns="" id="{747102BF-A698-444E-B693-3BC2E2F22350}"/>
+                <a16:creationId xmlns:a16="http://schemas.microsoft.com/office/drawing/2014/main" id="{747102BF-A698-444E-B693-3BC2E2F22350}"/>
               </a:ext>
             </a:extLst>
           </p:cNvPr>
@@ -7988,13 +7957,12 @@
         </p:nvSpPr>
         <p:spPr>
           <a:xfrm>
-            <a:off x="691816" y="2567213"/>
-            <a:ext cx="10808368" cy="1723573"/>
+            <a:off x="691816" y="2851102"/>
+            <a:ext cx="10808368" cy="1155796"/>
           </a:xfrm>
           <a:prstGeom prst="rect">
             <a:avLst/>
           </a:prstGeom>
-          <a:noFill/>
         </p:spPr>
         <p:txBody>
           <a:bodyPr vert="horz" lIns="91440" tIns="45720" rIns="91440" bIns="45720" rtlCol="0">
@@ -8170,8 +8138,8 @@
               <a:buNone/>
             </a:pPr>
             <a:r>
-              <a:rPr lang="he-IL" sz="3200" dirty="0"/>
-              <a:t>הנתונים נשמרים,</a:t>
+              <a:rPr lang="he-IL" sz="3200" b="1" u="sng" dirty="0"/>
+              <a:t>סיימתם בלוק</a:t>
             </a:r>
           </a:p>
           <a:p>
@@ -8181,16 +8149,16 @@
             </a:pPr>
             <a:r>
               <a:rPr lang="he-IL" sz="3200" dirty="0"/>
-              <a:t>אנא המתן והמנע מללחוץ על מקשים כלשהם</a:t>
-            </a:r>
-            <a:endParaRPr lang="en-US" sz="1300" dirty="0"/>
+              <a:t>כשאתם מוכנים לחצו "רווח" על מנת להמשיך לבלוק הבא</a:t>
+            </a:r>
+            <a:endParaRPr lang="en-US" sz="2000" dirty="0"/>
           </a:p>
         </p:txBody>
       </p:sp>
     </p:spTree>
     <p:extLst>
       <p:ext uri="{BB962C8B-B14F-4D97-AF65-F5344CB8AC3E}">
-        <p14:creationId xmlns:p14="http://schemas.microsoft.com/office/powerpoint/2010/main" val="2217358485"/>
+        <p14:creationId xmlns:p14="http://schemas.microsoft.com/office/powerpoint/2010/main" val="1323838221"/>
       </p:ext>
     </p:extLst>
   </p:cSld>
@@ -8230,7 +8198,7 @@
           <p:cNvPr id="6" name="Content Placeholder 2">
             <a:extLst>
               <a:ext uri="{FF2B5EF4-FFF2-40B4-BE49-F238E27FC236}">
-                <a16:creationId xmlns:a16="http://schemas.microsoft.com/office/drawing/2014/main" xmlns="" id="{747102BF-A698-444E-B693-3BC2E2F22350}"/>
+                <a16:creationId xmlns:a16="http://schemas.microsoft.com/office/drawing/2014/main" id="{747102BF-A698-444E-B693-3BC2E2F22350}"/>
               </a:ext>
             </a:extLst>
           </p:cNvPr>
@@ -8241,12 +8209,13 @@
         </p:nvSpPr>
         <p:spPr>
           <a:xfrm>
-            <a:off x="691816" y="223312"/>
-            <a:ext cx="10808368" cy="1155796"/>
+            <a:off x="691816" y="2567213"/>
+            <a:ext cx="10808368" cy="1723573"/>
           </a:xfrm>
           <a:prstGeom prst="rect">
             <a:avLst/>
           </a:prstGeom>
+          <a:noFill/>
         </p:spPr>
         <p:txBody>
           <a:bodyPr vert="horz" lIns="91440" tIns="45720" rIns="91440" bIns="45720" rtlCol="0">
@@ -8422,20 +8391,37 @@
               <a:buNone/>
             </a:pPr>
             <a:r>
-              <a:rPr lang="he-IL" sz="3200" b="1" u="sng" dirty="0">
-                <a:solidFill>
-                  <a:srgbClr val="595959"/>
-                </a:solidFill>
-              </a:rPr>
-              <a:t>הנח את האצבע בנקודת ההתחלה ואז לחץ רווח פעם אחת</a:t>
-            </a:r>
+              <a:rPr lang="he-IL" sz="3200" dirty="0"/>
+              <a:t>תם ונשלם הניסוי,</a:t>
+            </a:r>
+          </a:p>
+          <a:p>
+            <a:pPr marL="0" indent="0" algn="ctr" rtl="1">
+              <a:buFont typeface="Arial" panose="020B0604020202020204" pitchFamily="34" charset="0"/>
+              <a:buNone/>
+            </a:pPr>
+            <a:r>
+              <a:rPr lang="he-IL" sz="3200" dirty="0"/>
+              <a:t>תודה על השתתפותך!</a:t>
+            </a:r>
+          </a:p>
+          <a:p>
+            <a:pPr marL="0" indent="0" algn="ctr" rtl="1">
+              <a:buFont typeface="Arial" panose="020B0604020202020204" pitchFamily="34" charset="0"/>
+              <a:buNone/>
+            </a:pPr>
+            <a:r>
+              <a:rPr lang="he-IL" sz="2100" dirty="0"/>
+              <a:t>(קרא לנסיין)</a:t>
+            </a:r>
+            <a:endParaRPr lang="en-US" sz="1300" dirty="0"/>
           </a:p>
         </p:txBody>
       </p:sp>
     </p:spTree>
     <p:extLst>
       <p:ext uri="{BB962C8B-B14F-4D97-AF65-F5344CB8AC3E}">
-        <p14:creationId xmlns:p14="http://schemas.microsoft.com/office/powerpoint/2010/main" val="1581616032"/>
+        <p14:creationId xmlns:p14="http://schemas.microsoft.com/office/powerpoint/2010/main" val="2008702893"/>
       </p:ext>
     </p:extLst>
   </p:cSld>
@@ -8475,7 +8461,7 @@
           <p:cNvPr id="6" name="Content Placeholder 2">
             <a:extLst>
               <a:ext uri="{FF2B5EF4-FFF2-40B4-BE49-F238E27FC236}">
-                <a16:creationId xmlns:a16="http://schemas.microsoft.com/office/drawing/2014/main" xmlns="" id="{747102BF-A698-444E-B693-3BC2E2F22350}"/>
+                <a16:creationId xmlns:a16="http://schemas.microsoft.com/office/drawing/2014/main" id="{747102BF-A698-444E-B693-3BC2E2F22350}"/>
               </a:ext>
             </a:extLst>
           </p:cNvPr>
@@ -8486,12 +8472,13 @@
         </p:nvSpPr>
         <p:spPr>
           <a:xfrm>
-            <a:off x="691816" y="223312"/>
-            <a:ext cx="10808368" cy="1155796"/>
+            <a:off x="691816" y="2567213"/>
+            <a:ext cx="10808368" cy="1723573"/>
           </a:xfrm>
           <a:prstGeom prst="rect">
             <a:avLst/>
           </a:prstGeom>
+          <a:noFill/>
         </p:spPr>
         <p:txBody>
           <a:bodyPr vert="horz" lIns="91440" tIns="45720" rIns="91440" bIns="45720" rtlCol="0">
@@ -8667,117 +8654,27 @@
               <a:buNone/>
             </a:pPr>
             <a:r>
-              <a:rPr lang="he-IL" sz="3200" b="1" u="sng" dirty="0">
-                <a:solidFill>
-                  <a:srgbClr val="595959"/>
-                </a:solidFill>
-              </a:rPr>
-              <a:t>גע בנקודה הכחולה ואז לחץ רווח פעם אחת</a:t>
-            </a:r>
+              <a:rPr lang="he-IL" sz="3200" dirty="0"/>
+              <a:t>הנתונים נשמרים,</a:t>
+            </a:r>
+          </a:p>
+          <a:p>
+            <a:pPr marL="0" indent="0" algn="ctr" rtl="1">
+              <a:buFont typeface="Arial" panose="020B0604020202020204" pitchFamily="34" charset="0"/>
+              <a:buNone/>
+            </a:pPr>
+            <a:r>
+              <a:rPr lang="he-IL" sz="3200" dirty="0"/>
+              <a:t>אנא המתן והמנע מללחוץ על מקשים כלשהם</a:t>
+            </a:r>
+            <a:endParaRPr lang="en-US" sz="1300" dirty="0"/>
           </a:p>
         </p:txBody>
       </p:sp>
-      <p:graphicFrame>
-        <p:nvGraphicFramePr>
-          <p:cNvPr id="5" name="Table 4">
-            <a:extLst>
-              <a:ext uri="{FF2B5EF4-FFF2-40B4-BE49-F238E27FC236}">
-                <a16:creationId xmlns:a16="http://schemas.microsoft.com/office/drawing/2014/main" xmlns="" id="{9CAF9F99-453D-44F1-88EC-228F7966FFE4}"/>
-              </a:ext>
-            </a:extLst>
-          </p:cNvPr>
-          <p:cNvGraphicFramePr>
-            <a:graphicFrameLocks noGrp="1"/>
-          </p:cNvGraphicFramePr>
-          <p:nvPr>
-            <p:extLst>
-              <p:ext uri="{D42A27DB-BD31-4B8C-83A1-F6EECF244321}">
-                <p14:modId xmlns:p14="http://schemas.microsoft.com/office/powerpoint/2010/main" val="1985556340"/>
-              </p:ext>
-            </p:extLst>
-          </p:nvPr>
-        </p:nvGraphicFramePr>
-        <p:xfrm>
-          <a:off x="1557867" y="1379108"/>
-          <a:ext cx="9076266" cy="1283817"/>
-        </p:xfrm>
-        <a:graphic>
-          <a:graphicData uri="http://schemas.openxmlformats.org/drawingml/2006/table">
-            <a:tbl>
-              <a:tblPr rtl="1" firstRow="1" bandRow="1">
-                <a:tableStyleId>{5C22544A-7EE6-4342-B048-85BDC9FD1C3A}</a:tableStyleId>
-              </a:tblPr>
-              <a:tblGrid>
-                <a:gridCol w="9076266">
-                  <a:extLst>
-                    <a:ext uri="{9D8B030D-6E8A-4147-A177-3AD203B41FA5}">
-                      <a16:colId xmlns:a16="http://schemas.microsoft.com/office/drawing/2014/main" xmlns="" val="371563066"/>
-                    </a:ext>
-                  </a:extLst>
-                </a:gridCol>
-              </a:tblGrid>
-              <a:tr h="1283817">
-                <a:tc>
-                  <a:txBody>
-                    <a:bodyPr/>
-                    <a:lstStyle/>
-                    <a:p>
-                      <a:pPr algn="ctr" rtl="1"/>
-                      <a:r>
-                        <a:rPr lang="en-US" sz="7200" b="1" dirty="0">
-                          <a:solidFill>
-                            <a:srgbClr val="709CC0"/>
-                          </a:solidFill>
-                        </a:rPr>
-                        <a:t>o</a:t>
-                      </a:r>
-                      <a:endParaRPr lang="he-IL" sz="3200" dirty="0">
-                        <a:solidFill>
-                          <a:schemeClr val="tx1"/>
-                        </a:solidFill>
-                      </a:endParaRPr>
-                    </a:p>
-                  </a:txBody>
-                  <a:tcPr>
-                    <a:lnL w="12700" cmpd="sng">
-                      <a:noFill/>
-                    </a:lnL>
-                    <a:lnR w="12700" cmpd="sng">
-                      <a:noFill/>
-                    </a:lnR>
-                    <a:lnT w="12700" cmpd="sng">
-                      <a:noFill/>
-                    </a:lnT>
-                    <a:lnB w="38100" cmpd="sng">
-                      <a:noFill/>
-                    </a:lnB>
-                    <a:lnTlToBr w="12700" cmpd="sng">
-                      <a:noFill/>
-                      <a:prstDash val="solid"/>
-                    </a:lnTlToBr>
-                    <a:lnBlToTr w="12700" cmpd="sng">
-                      <a:noFill/>
-                      <a:prstDash val="solid"/>
-                    </a:lnBlToTr>
-                    <a:solidFill>
-                      <a:srgbClr val="7E7E7E"/>
-                    </a:solidFill>
-                  </a:tcPr>
-                </a:tc>
-                <a:extLst>
-                  <a:ext uri="{0D108BD9-81ED-4DB2-BD59-A6C34878D82A}">
-                    <a16:rowId xmlns:a16="http://schemas.microsoft.com/office/drawing/2014/main" xmlns="" val="10001"/>
-                  </a:ext>
-                </a:extLst>
-              </a:tr>
-            </a:tbl>
-          </a:graphicData>
-        </a:graphic>
-      </p:graphicFrame>
     </p:spTree>
     <p:extLst>
       <p:ext uri="{BB962C8B-B14F-4D97-AF65-F5344CB8AC3E}">
-        <p14:creationId xmlns:p14="http://schemas.microsoft.com/office/powerpoint/2010/main" val="3826736148"/>
+        <p14:creationId xmlns:p14="http://schemas.microsoft.com/office/powerpoint/2010/main" val="2217358485"/>
       </p:ext>
     </p:extLst>
   </p:cSld>
@@ -8817,7 +8714,7 @@
           <p:cNvPr id="6" name="Content Placeholder 2">
             <a:extLst>
               <a:ext uri="{FF2B5EF4-FFF2-40B4-BE49-F238E27FC236}">
-                <a16:creationId xmlns:a16="http://schemas.microsoft.com/office/drawing/2014/main" xmlns="" id="{747102BF-A698-444E-B693-3BC2E2F22350}"/>
+                <a16:creationId xmlns:a16="http://schemas.microsoft.com/office/drawing/2014/main" id="{747102BF-A698-444E-B693-3BC2E2F22350}"/>
               </a:ext>
             </a:extLst>
           </p:cNvPr>
@@ -9014,6 +8911,251 @@
                   <a:srgbClr val="595959"/>
                 </a:solidFill>
               </a:rPr>
+              <a:t>הנח את האצבע בנקודת ההתחלה ואז לחץ רווח פעם אחת</a:t>
+            </a:r>
+          </a:p>
+        </p:txBody>
+      </p:sp>
+    </p:spTree>
+    <p:extLst>
+      <p:ext uri="{BB962C8B-B14F-4D97-AF65-F5344CB8AC3E}">
+        <p14:creationId xmlns:p14="http://schemas.microsoft.com/office/powerpoint/2010/main" val="1581616032"/>
+      </p:ext>
+    </p:extLst>
+  </p:cSld>
+  <p:clrMapOvr>
+    <a:masterClrMapping/>
+  </p:clrMapOvr>
+</p:sld>
+</file>
+
+<file path=ppt/slides/slide25.xml><?xml version="1.0" encoding="utf-8"?>
+<p:sld xmlns:a="http://schemas.openxmlformats.org/drawingml/2006/main" xmlns:r="http://schemas.openxmlformats.org/officeDocument/2006/relationships" xmlns:p="http://schemas.openxmlformats.org/presentationml/2006/main">
+  <p:cSld>
+    <p:bg>
+      <p:bgPr>
+        <a:solidFill>
+          <a:srgbClr val="7E7E7E"/>
+        </a:solidFill>
+        <a:effectLst/>
+      </p:bgPr>
+    </p:bg>
+    <p:spTree>
+      <p:nvGrpSpPr>
+        <p:cNvPr id="1" name=""/>
+        <p:cNvGrpSpPr/>
+        <p:nvPr/>
+      </p:nvGrpSpPr>
+      <p:grpSpPr>
+        <a:xfrm>
+          <a:off x="0" y="0"/>
+          <a:ext cx="0" cy="0"/>
+          <a:chOff x="0" y="0"/>
+          <a:chExt cx="0" cy="0"/>
+        </a:xfrm>
+      </p:grpSpPr>
+      <p:sp>
+        <p:nvSpPr>
+          <p:cNvPr id="6" name="Content Placeholder 2">
+            <a:extLst>
+              <a:ext uri="{FF2B5EF4-FFF2-40B4-BE49-F238E27FC236}">
+                <a16:creationId xmlns:a16="http://schemas.microsoft.com/office/drawing/2014/main" id="{747102BF-A698-444E-B693-3BC2E2F22350}"/>
+              </a:ext>
+            </a:extLst>
+          </p:cNvPr>
+          <p:cNvSpPr txBox="1">
+            <a:spLocks/>
+          </p:cNvSpPr>
+          <p:nvPr/>
+        </p:nvSpPr>
+        <p:spPr>
+          <a:xfrm>
+            <a:off x="691816" y="223312"/>
+            <a:ext cx="10808368" cy="1155796"/>
+          </a:xfrm>
+          <a:prstGeom prst="rect">
+            <a:avLst/>
+          </a:prstGeom>
+        </p:spPr>
+        <p:txBody>
+          <a:bodyPr vert="horz" lIns="91440" tIns="45720" rIns="91440" bIns="45720" rtlCol="0">
+            <a:normAutofit/>
+          </a:bodyPr>
+          <a:lstStyle>
+            <a:lvl1pPr marL="228600" indent="-228600" algn="l" defTabSz="914400" rtl="0" eaLnBrk="1" latinLnBrk="0" hangingPunct="1">
+              <a:lnSpc>
+                <a:spcPct val="90000"/>
+              </a:lnSpc>
+              <a:spcBef>
+                <a:spcPts val="1000"/>
+              </a:spcBef>
+              <a:buFont typeface="Arial" panose="020B0604020202020204" pitchFamily="34" charset="0"/>
+              <a:buChar char="•"/>
+              <a:defRPr sz="2800" kern="1200">
+                <a:solidFill>
+                  <a:schemeClr val="tx1"/>
+                </a:solidFill>
+                <a:latin typeface="+mn-lt"/>
+                <a:ea typeface="+mn-ea"/>
+                <a:cs typeface="+mn-cs"/>
+              </a:defRPr>
+            </a:lvl1pPr>
+            <a:lvl2pPr marL="685800" indent="-228600" algn="l" defTabSz="914400" rtl="0" eaLnBrk="1" latinLnBrk="0" hangingPunct="1">
+              <a:lnSpc>
+                <a:spcPct val="90000"/>
+              </a:lnSpc>
+              <a:spcBef>
+                <a:spcPts val="500"/>
+              </a:spcBef>
+              <a:buFont typeface="Arial" panose="020B0604020202020204" pitchFamily="34" charset="0"/>
+              <a:buChar char="•"/>
+              <a:defRPr sz="2400" kern="1200">
+                <a:solidFill>
+                  <a:schemeClr val="tx1"/>
+                </a:solidFill>
+                <a:latin typeface="+mn-lt"/>
+                <a:ea typeface="+mn-ea"/>
+                <a:cs typeface="+mn-cs"/>
+              </a:defRPr>
+            </a:lvl2pPr>
+            <a:lvl3pPr marL="1143000" indent="-228600" algn="l" defTabSz="914400" rtl="0" eaLnBrk="1" latinLnBrk="0" hangingPunct="1">
+              <a:lnSpc>
+                <a:spcPct val="90000"/>
+              </a:lnSpc>
+              <a:spcBef>
+                <a:spcPts val="500"/>
+              </a:spcBef>
+              <a:buFont typeface="Arial" panose="020B0604020202020204" pitchFamily="34" charset="0"/>
+              <a:buChar char="•"/>
+              <a:defRPr sz="2000" kern="1200">
+                <a:solidFill>
+                  <a:schemeClr val="tx1"/>
+                </a:solidFill>
+                <a:latin typeface="+mn-lt"/>
+                <a:ea typeface="+mn-ea"/>
+                <a:cs typeface="+mn-cs"/>
+              </a:defRPr>
+            </a:lvl3pPr>
+            <a:lvl4pPr marL="1600200" indent="-228600" algn="l" defTabSz="914400" rtl="0" eaLnBrk="1" latinLnBrk="0" hangingPunct="1">
+              <a:lnSpc>
+                <a:spcPct val="90000"/>
+              </a:lnSpc>
+              <a:spcBef>
+                <a:spcPts val="500"/>
+              </a:spcBef>
+              <a:buFont typeface="Arial" panose="020B0604020202020204" pitchFamily="34" charset="0"/>
+              <a:buChar char="•"/>
+              <a:defRPr sz="1800" kern="1200">
+                <a:solidFill>
+                  <a:schemeClr val="tx1"/>
+                </a:solidFill>
+                <a:latin typeface="+mn-lt"/>
+                <a:ea typeface="+mn-ea"/>
+                <a:cs typeface="+mn-cs"/>
+              </a:defRPr>
+            </a:lvl4pPr>
+            <a:lvl5pPr marL="2057400" indent="-228600" algn="l" defTabSz="914400" rtl="0" eaLnBrk="1" latinLnBrk="0" hangingPunct="1">
+              <a:lnSpc>
+                <a:spcPct val="90000"/>
+              </a:lnSpc>
+              <a:spcBef>
+                <a:spcPts val="500"/>
+              </a:spcBef>
+              <a:buFont typeface="Arial" panose="020B0604020202020204" pitchFamily="34" charset="0"/>
+              <a:buChar char="•"/>
+              <a:defRPr sz="1800" kern="1200">
+                <a:solidFill>
+                  <a:schemeClr val="tx1"/>
+                </a:solidFill>
+                <a:latin typeface="+mn-lt"/>
+                <a:ea typeface="+mn-ea"/>
+                <a:cs typeface="+mn-cs"/>
+              </a:defRPr>
+            </a:lvl5pPr>
+            <a:lvl6pPr marL="2514600" indent="-228600" algn="l" defTabSz="914400" rtl="0" eaLnBrk="1" latinLnBrk="0" hangingPunct="1">
+              <a:lnSpc>
+                <a:spcPct val="90000"/>
+              </a:lnSpc>
+              <a:spcBef>
+                <a:spcPts val="500"/>
+              </a:spcBef>
+              <a:buFont typeface="Arial" panose="020B0604020202020204" pitchFamily="34" charset="0"/>
+              <a:buChar char="•"/>
+              <a:defRPr sz="1800" kern="1200">
+                <a:solidFill>
+                  <a:schemeClr val="tx1"/>
+                </a:solidFill>
+                <a:latin typeface="+mn-lt"/>
+                <a:ea typeface="+mn-ea"/>
+                <a:cs typeface="+mn-cs"/>
+              </a:defRPr>
+            </a:lvl6pPr>
+            <a:lvl7pPr marL="2971800" indent="-228600" algn="l" defTabSz="914400" rtl="0" eaLnBrk="1" latinLnBrk="0" hangingPunct="1">
+              <a:lnSpc>
+                <a:spcPct val="90000"/>
+              </a:lnSpc>
+              <a:spcBef>
+                <a:spcPts val="500"/>
+              </a:spcBef>
+              <a:buFont typeface="Arial" panose="020B0604020202020204" pitchFamily="34" charset="0"/>
+              <a:buChar char="•"/>
+              <a:defRPr sz="1800" kern="1200">
+                <a:solidFill>
+                  <a:schemeClr val="tx1"/>
+                </a:solidFill>
+                <a:latin typeface="+mn-lt"/>
+                <a:ea typeface="+mn-ea"/>
+                <a:cs typeface="+mn-cs"/>
+              </a:defRPr>
+            </a:lvl7pPr>
+            <a:lvl8pPr marL="3429000" indent="-228600" algn="l" defTabSz="914400" rtl="0" eaLnBrk="1" latinLnBrk="0" hangingPunct="1">
+              <a:lnSpc>
+                <a:spcPct val="90000"/>
+              </a:lnSpc>
+              <a:spcBef>
+                <a:spcPts val="500"/>
+              </a:spcBef>
+              <a:buFont typeface="Arial" panose="020B0604020202020204" pitchFamily="34" charset="0"/>
+              <a:buChar char="•"/>
+              <a:defRPr sz="1800" kern="1200">
+                <a:solidFill>
+                  <a:schemeClr val="tx1"/>
+                </a:solidFill>
+                <a:latin typeface="+mn-lt"/>
+                <a:ea typeface="+mn-ea"/>
+                <a:cs typeface="+mn-cs"/>
+              </a:defRPr>
+            </a:lvl8pPr>
+            <a:lvl9pPr marL="3886200" indent="-228600" algn="l" defTabSz="914400" rtl="0" eaLnBrk="1" latinLnBrk="0" hangingPunct="1">
+              <a:lnSpc>
+                <a:spcPct val="90000"/>
+              </a:lnSpc>
+              <a:spcBef>
+                <a:spcPts val="500"/>
+              </a:spcBef>
+              <a:buFont typeface="Arial" panose="020B0604020202020204" pitchFamily="34" charset="0"/>
+              <a:buChar char="•"/>
+              <a:defRPr sz="1800" kern="1200">
+                <a:solidFill>
+                  <a:schemeClr val="tx1"/>
+                </a:solidFill>
+                <a:latin typeface="+mn-lt"/>
+                <a:ea typeface="+mn-ea"/>
+                <a:cs typeface="+mn-cs"/>
+              </a:defRPr>
+            </a:lvl9pPr>
+          </a:lstStyle>
+          <a:p>
+            <a:pPr marL="0" indent="0" algn="ctr" rtl="1">
+              <a:buFont typeface="Arial" panose="020B0604020202020204" pitchFamily="34" charset="0"/>
+              <a:buNone/>
+            </a:pPr>
+            <a:r>
+              <a:rPr lang="he-IL" sz="3200" b="1" u="sng" dirty="0">
+                <a:solidFill>
+                  <a:srgbClr val="595959"/>
+                </a:solidFill>
+              </a:rPr>
               <a:t>גע בנקודה הכחולה ואז לחץ רווח פעם אחת</a:t>
             </a:r>
           </a:p>
@@ -9024,7 +9166,349 @@
           <p:cNvPr id="5" name="Table 4">
             <a:extLst>
               <a:ext uri="{FF2B5EF4-FFF2-40B4-BE49-F238E27FC236}">
-                <a16:creationId xmlns:a16="http://schemas.microsoft.com/office/drawing/2014/main" xmlns="" id="{9CAF9F99-453D-44F1-88EC-228F7966FFE4}"/>
+                <a16:creationId xmlns:a16="http://schemas.microsoft.com/office/drawing/2014/main" id="{9CAF9F99-453D-44F1-88EC-228F7966FFE4}"/>
+              </a:ext>
+            </a:extLst>
+          </p:cNvPr>
+          <p:cNvGraphicFramePr>
+            <a:graphicFrameLocks noGrp="1"/>
+          </p:cNvGraphicFramePr>
+          <p:nvPr>
+            <p:extLst>
+              <p:ext uri="{D42A27DB-BD31-4B8C-83A1-F6EECF244321}">
+                <p14:modId xmlns:p14="http://schemas.microsoft.com/office/powerpoint/2010/main" val="1985556340"/>
+              </p:ext>
+            </p:extLst>
+          </p:nvPr>
+        </p:nvGraphicFramePr>
+        <p:xfrm>
+          <a:off x="1557867" y="1379108"/>
+          <a:ext cx="9076266" cy="1283817"/>
+        </p:xfrm>
+        <a:graphic>
+          <a:graphicData uri="http://schemas.openxmlformats.org/drawingml/2006/table">
+            <a:tbl>
+              <a:tblPr rtl="1" firstRow="1" bandRow="1">
+                <a:tableStyleId>{5C22544A-7EE6-4342-B048-85BDC9FD1C3A}</a:tableStyleId>
+              </a:tblPr>
+              <a:tblGrid>
+                <a:gridCol w="9076266">
+                  <a:extLst>
+                    <a:ext uri="{9D8B030D-6E8A-4147-A177-3AD203B41FA5}">
+                      <a16:colId xmlns:a16="http://schemas.microsoft.com/office/drawing/2014/main" val="371563066"/>
+                    </a:ext>
+                  </a:extLst>
+                </a:gridCol>
+              </a:tblGrid>
+              <a:tr h="1283817">
+                <a:tc>
+                  <a:txBody>
+                    <a:bodyPr/>
+                    <a:lstStyle/>
+                    <a:p>
+                      <a:pPr algn="ctr" rtl="1"/>
+                      <a:r>
+                        <a:rPr lang="en-US" sz="7200" b="1" dirty="0">
+                          <a:solidFill>
+                            <a:srgbClr val="709CC0"/>
+                          </a:solidFill>
+                        </a:rPr>
+                        <a:t>o</a:t>
+                      </a:r>
+                      <a:endParaRPr lang="he-IL" sz="3200" dirty="0">
+                        <a:solidFill>
+                          <a:schemeClr val="tx1"/>
+                        </a:solidFill>
+                      </a:endParaRPr>
+                    </a:p>
+                  </a:txBody>
+                  <a:tcPr>
+                    <a:lnL w="12700" cmpd="sng">
+                      <a:noFill/>
+                    </a:lnL>
+                    <a:lnR w="12700" cmpd="sng">
+                      <a:noFill/>
+                    </a:lnR>
+                    <a:lnT w="12700" cmpd="sng">
+                      <a:noFill/>
+                    </a:lnT>
+                    <a:lnB w="38100" cmpd="sng">
+                      <a:noFill/>
+                    </a:lnB>
+                    <a:lnTlToBr w="12700" cmpd="sng">
+                      <a:noFill/>
+                      <a:prstDash val="solid"/>
+                    </a:lnTlToBr>
+                    <a:lnBlToTr w="12700" cmpd="sng">
+                      <a:noFill/>
+                      <a:prstDash val="solid"/>
+                    </a:lnBlToTr>
+                    <a:solidFill>
+                      <a:srgbClr val="7E7E7E"/>
+                    </a:solidFill>
+                  </a:tcPr>
+                </a:tc>
+                <a:extLst>
+                  <a:ext uri="{0D108BD9-81ED-4DB2-BD59-A6C34878D82A}">
+                    <a16:rowId xmlns:a16="http://schemas.microsoft.com/office/drawing/2014/main" val="10001"/>
+                  </a:ext>
+                </a:extLst>
+              </a:tr>
+            </a:tbl>
+          </a:graphicData>
+        </a:graphic>
+      </p:graphicFrame>
+    </p:spTree>
+    <p:extLst>
+      <p:ext uri="{BB962C8B-B14F-4D97-AF65-F5344CB8AC3E}">
+        <p14:creationId xmlns:p14="http://schemas.microsoft.com/office/powerpoint/2010/main" val="3826736148"/>
+      </p:ext>
+    </p:extLst>
+  </p:cSld>
+  <p:clrMapOvr>
+    <a:masterClrMapping/>
+  </p:clrMapOvr>
+</p:sld>
+</file>
+
+<file path=ppt/slides/slide26.xml><?xml version="1.0" encoding="utf-8"?>
+<p:sld xmlns:a="http://schemas.openxmlformats.org/drawingml/2006/main" xmlns:r="http://schemas.openxmlformats.org/officeDocument/2006/relationships" xmlns:p="http://schemas.openxmlformats.org/presentationml/2006/main">
+  <p:cSld>
+    <p:bg>
+      <p:bgPr>
+        <a:solidFill>
+          <a:srgbClr val="7E7E7E"/>
+        </a:solidFill>
+        <a:effectLst/>
+      </p:bgPr>
+    </p:bg>
+    <p:spTree>
+      <p:nvGrpSpPr>
+        <p:cNvPr id="1" name=""/>
+        <p:cNvGrpSpPr/>
+        <p:nvPr/>
+      </p:nvGrpSpPr>
+      <p:grpSpPr>
+        <a:xfrm>
+          <a:off x="0" y="0"/>
+          <a:ext cx="0" cy="0"/>
+          <a:chOff x="0" y="0"/>
+          <a:chExt cx="0" cy="0"/>
+        </a:xfrm>
+      </p:grpSpPr>
+      <p:sp>
+        <p:nvSpPr>
+          <p:cNvPr id="6" name="Content Placeholder 2">
+            <a:extLst>
+              <a:ext uri="{FF2B5EF4-FFF2-40B4-BE49-F238E27FC236}">
+                <a16:creationId xmlns:a16="http://schemas.microsoft.com/office/drawing/2014/main" id="{747102BF-A698-444E-B693-3BC2E2F22350}"/>
+              </a:ext>
+            </a:extLst>
+          </p:cNvPr>
+          <p:cNvSpPr txBox="1">
+            <a:spLocks/>
+          </p:cNvSpPr>
+          <p:nvPr/>
+        </p:nvSpPr>
+        <p:spPr>
+          <a:xfrm>
+            <a:off x="691816" y="223312"/>
+            <a:ext cx="10808368" cy="1155796"/>
+          </a:xfrm>
+          <a:prstGeom prst="rect">
+            <a:avLst/>
+          </a:prstGeom>
+        </p:spPr>
+        <p:txBody>
+          <a:bodyPr vert="horz" lIns="91440" tIns="45720" rIns="91440" bIns="45720" rtlCol="0">
+            <a:normAutofit/>
+          </a:bodyPr>
+          <a:lstStyle>
+            <a:lvl1pPr marL="228600" indent="-228600" algn="l" defTabSz="914400" rtl="0" eaLnBrk="1" latinLnBrk="0" hangingPunct="1">
+              <a:lnSpc>
+                <a:spcPct val="90000"/>
+              </a:lnSpc>
+              <a:spcBef>
+                <a:spcPts val="1000"/>
+              </a:spcBef>
+              <a:buFont typeface="Arial" panose="020B0604020202020204" pitchFamily="34" charset="0"/>
+              <a:buChar char="•"/>
+              <a:defRPr sz="2800" kern="1200">
+                <a:solidFill>
+                  <a:schemeClr val="tx1"/>
+                </a:solidFill>
+                <a:latin typeface="+mn-lt"/>
+                <a:ea typeface="+mn-ea"/>
+                <a:cs typeface="+mn-cs"/>
+              </a:defRPr>
+            </a:lvl1pPr>
+            <a:lvl2pPr marL="685800" indent="-228600" algn="l" defTabSz="914400" rtl="0" eaLnBrk="1" latinLnBrk="0" hangingPunct="1">
+              <a:lnSpc>
+                <a:spcPct val="90000"/>
+              </a:lnSpc>
+              <a:spcBef>
+                <a:spcPts val="500"/>
+              </a:spcBef>
+              <a:buFont typeface="Arial" panose="020B0604020202020204" pitchFamily="34" charset="0"/>
+              <a:buChar char="•"/>
+              <a:defRPr sz="2400" kern="1200">
+                <a:solidFill>
+                  <a:schemeClr val="tx1"/>
+                </a:solidFill>
+                <a:latin typeface="+mn-lt"/>
+                <a:ea typeface="+mn-ea"/>
+                <a:cs typeface="+mn-cs"/>
+              </a:defRPr>
+            </a:lvl2pPr>
+            <a:lvl3pPr marL="1143000" indent="-228600" algn="l" defTabSz="914400" rtl="0" eaLnBrk="1" latinLnBrk="0" hangingPunct="1">
+              <a:lnSpc>
+                <a:spcPct val="90000"/>
+              </a:lnSpc>
+              <a:spcBef>
+                <a:spcPts val="500"/>
+              </a:spcBef>
+              <a:buFont typeface="Arial" panose="020B0604020202020204" pitchFamily="34" charset="0"/>
+              <a:buChar char="•"/>
+              <a:defRPr sz="2000" kern="1200">
+                <a:solidFill>
+                  <a:schemeClr val="tx1"/>
+                </a:solidFill>
+                <a:latin typeface="+mn-lt"/>
+                <a:ea typeface="+mn-ea"/>
+                <a:cs typeface="+mn-cs"/>
+              </a:defRPr>
+            </a:lvl3pPr>
+            <a:lvl4pPr marL="1600200" indent="-228600" algn="l" defTabSz="914400" rtl="0" eaLnBrk="1" latinLnBrk="0" hangingPunct="1">
+              <a:lnSpc>
+                <a:spcPct val="90000"/>
+              </a:lnSpc>
+              <a:spcBef>
+                <a:spcPts val="500"/>
+              </a:spcBef>
+              <a:buFont typeface="Arial" panose="020B0604020202020204" pitchFamily="34" charset="0"/>
+              <a:buChar char="•"/>
+              <a:defRPr sz="1800" kern="1200">
+                <a:solidFill>
+                  <a:schemeClr val="tx1"/>
+                </a:solidFill>
+                <a:latin typeface="+mn-lt"/>
+                <a:ea typeface="+mn-ea"/>
+                <a:cs typeface="+mn-cs"/>
+              </a:defRPr>
+            </a:lvl4pPr>
+            <a:lvl5pPr marL="2057400" indent="-228600" algn="l" defTabSz="914400" rtl="0" eaLnBrk="1" latinLnBrk="0" hangingPunct="1">
+              <a:lnSpc>
+                <a:spcPct val="90000"/>
+              </a:lnSpc>
+              <a:spcBef>
+                <a:spcPts val="500"/>
+              </a:spcBef>
+              <a:buFont typeface="Arial" panose="020B0604020202020204" pitchFamily="34" charset="0"/>
+              <a:buChar char="•"/>
+              <a:defRPr sz="1800" kern="1200">
+                <a:solidFill>
+                  <a:schemeClr val="tx1"/>
+                </a:solidFill>
+                <a:latin typeface="+mn-lt"/>
+                <a:ea typeface="+mn-ea"/>
+                <a:cs typeface="+mn-cs"/>
+              </a:defRPr>
+            </a:lvl5pPr>
+            <a:lvl6pPr marL="2514600" indent="-228600" algn="l" defTabSz="914400" rtl="0" eaLnBrk="1" latinLnBrk="0" hangingPunct="1">
+              <a:lnSpc>
+                <a:spcPct val="90000"/>
+              </a:lnSpc>
+              <a:spcBef>
+                <a:spcPts val="500"/>
+              </a:spcBef>
+              <a:buFont typeface="Arial" panose="020B0604020202020204" pitchFamily="34" charset="0"/>
+              <a:buChar char="•"/>
+              <a:defRPr sz="1800" kern="1200">
+                <a:solidFill>
+                  <a:schemeClr val="tx1"/>
+                </a:solidFill>
+                <a:latin typeface="+mn-lt"/>
+                <a:ea typeface="+mn-ea"/>
+                <a:cs typeface="+mn-cs"/>
+              </a:defRPr>
+            </a:lvl6pPr>
+            <a:lvl7pPr marL="2971800" indent="-228600" algn="l" defTabSz="914400" rtl="0" eaLnBrk="1" latinLnBrk="0" hangingPunct="1">
+              <a:lnSpc>
+                <a:spcPct val="90000"/>
+              </a:lnSpc>
+              <a:spcBef>
+                <a:spcPts val="500"/>
+              </a:spcBef>
+              <a:buFont typeface="Arial" panose="020B0604020202020204" pitchFamily="34" charset="0"/>
+              <a:buChar char="•"/>
+              <a:defRPr sz="1800" kern="1200">
+                <a:solidFill>
+                  <a:schemeClr val="tx1"/>
+                </a:solidFill>
+                <a:latin typeface="+mn-lt"/>
+                <a:ea typeface="+mn-ea"/>
+                <a:cs typeface="+mn-cs"/>
+              </a:defRPr>
+            </a:lvl7pPr>
+            <a:lvl8pPr marL="3429000" indent="-228600" algn="l" defTabSz="914400" rtl="0" eaLnBrk="1" latinLnBrk="0" hangingPunct="1">
+              <a:lnSpc>
+                <a:spcPct val="90000"/>
+              </a:lnSpc>
+              <a:spcBef>
+                <a:spcPts val="500"/>
+              </a:spcBef>
+              <a:buFont typeface="Arial" panose="020B0604020202020204" pitchFamily="34" charset="0"/>
+              <a:buChar char="•"/>
+              <a:defRPr sz="1800" kern="1200">
+                <a:solidFill>
+                  <a:schemeClr val="tx1"/>
+                </a:solidFill>
+                <a:latin typeface="+mn-lt"/>
+                <a:ea typeface="+mn-ea"/>
+                <a:cs typeface="+mn-cs"/>
+              </a:defRPr>
+            </a:lvl8pPr>
+            <a:lvl9pPr marL="3886200" indent="-228600" algn="l" defTabSz="914400" rtl="0" eaLnBrk="1" latinLnBrk="0" hangingPunct="1">
+              <a:lnSpc>
+                <a:spcPct val="90000"/>
+              </a:lnSpc>
+              <a:spcBef>
+                <a:spcPts val="500"/>
+              </a:spcBef>
+              <a:buFont typeface="Arial" panose="020B0604020202020204" pitchFamily="34" charset="0"/>
+              <a:buChar char="•"/>
+              <a:defRPr sz="1800" kern="1200">
+                <a:solidFill>
+                  <a:schemeClr val="tx1"/>
+                </a:solidFill>
+                <a:latin typeface="+mn-lt"/>
+                <a:ea typeface="+mn-ea"/>
+                <a:cs typeface="+mn-cs"/>
+              </a:defRPr>
+            </a:lvl9pPr>
+          </a:lstStyle>
+          <a:p>
+            <a:pPr marL="0" indent="0" algn="ctr" rtl="1">
+              <a:buFont typeface="Arial" panose="020B0604020202020204" pitchFamily="34" charset="0"/>
+              <a:buNone/>
+            </a:pPr>
+            <a:r>
+              <a:rPr lang="he-IL" sz="3200" b="1" u="sng" dirty="0">
+                <a:solidFill>
+                  <a:srgbClr val="595959"/>
+                </a:solidFill>
+              </a:rPr>
+              <a:t>גע בנקודה הכחולה ואז לחץ רווח פעם אחת</a:t>
+            </a:r>
+          </a:p>
+        </p:txBody>
+      </p:sp>
+      <p:graphicFrame>
+        <p:nvGraphicFramePr>
+          <p:cNvPr id="5" name="Table 4">
+            <a:extLst>
+              <a:ext uri="{FF2B5EF4-FFF2-40B4-BE49-F238E27FC236}">
+                <a16:creationId xmlns:a16="http://schemas.microsoft.com/office/drawing/2014/main" id="{9CAF9F99-453D-44F1-88EC-228F7966FFE4}"/>
               </a:ext>
             </a:extLst>
           </p:cNvPr>
@@ -9053,14 +9537,14 @@
                 <a:gridCol w="4521200">
                   <a:extLst>
                     <a:ext uri="{9D8B030D-6E8A-4147-A177-3AD203B41FA5}">
-                      <a16:colId xmlns:a16="http://schemas.microsoft.com/office/drawing/2014/main" xmlns="" val="371563066"/>
+                      <a16:colId xmlns:a16="http://schemas.microsoft.com/office/drawing/2014/main" val="371563066"/>
                     </a:ext>
                   </a:extLst>
                 </a:gridCol>
                 <a:gridCol w="4555066">
                   <a:extLst>
                     <a:ext uri="{9D8B030D-6E8A-4147-A177-3AD203B41FA5}">
-                      <a16:colId xmlns:a16="http://schemas.microsoft.com/office/drawing/2014/main" xmlns="" val="2181931161"/>
+                      <a16:colId xmlns:a16="http://schemas.microsoft.com/office/drawing/2014/main" val="2181931161"/>
                     </a:ext>
                   </a:extLst>
                 </a:gridCol>
@@ -9195,7 +9679,7 @@
                 </a:tc>
                 <a:extLst>
                   <a:ext uri="{0D108BD9-81ED-4DB2-BD59-A6C34878D82A}">
-                    <a16:rowId xmlns:a16="http://schemas.microsoft.com/office/drawing/2014/main" xmlns="" val="10001"/>
+                    <a16:rowId xmlns:a16="http://schemas.microsoft.com/office/drawing/2014/main" val="10001"/>
                   </a:ext>
                 </a:extLst>
               </a:tr>
@@ -9216,7 +9700,7 @@
 </p:sld>
 </file>
 
-<file path=ppt/slides/slide25.xml><?xml version="1.0" encoding="utf-8"?>
+<file path=ppt/slides/slide27.xml><?xml version="1.0" encoding="utf-8"?>
 <p:sld xmlns:a="http://schemas.openxmlformats.org/drawingml/2006/main" xmlns:r="http://schemas.openxmlformats.org/officeDocument/2006/relationships" xmlns:p="http://schemas.openxmlformats.org/presentationml/2006/main">
   <p:cSld>
     <p:bg>
@@ -9246,7 +9730,7 @@
           <p:cNvPr id="6" name="Content Placeholder 2">
             <a:extLst>
               <a:ext uri="{FF2B5EF4-FFF2-40B4-BE49-F238E27FC236}">
-                <a16:creationId xmlns:a16="http://schemas.microsoft.com/office/drawing/2014/main" xmlns="" id="{747102BF-A698-444E-B693-3BC2E2F22350}"/>
+                <a16:creationId xmlns:a16="http://schemas.microsoft.com/office/drawing/2014/main" id="{747102BF-A698-444E-B693-3BC2E2F22350}"/>
               </a:ext>
             </a:extLst>
           </p:cNvPr>
@@ -9453,7 +9937,7 @@
           <p:cNvPr id="5" name="Table 4">
             <a:extLst>
               <a:ext uri="{FF2B5EF4-FFF2-40B4-BE49-F238E27FC236}">
-                <a16:creationId xmlns:a16="http://schemas.microsoft.com/office/drawing/2014/main" xmlns="" id="{9CAF9F99-453D-44F1-88EC-228F7966FFE4}"/>
+                <a16:creationId xmlns:a16="http://schemas.microsoft.com/office/drawing/2014/main" id="{9CAF9F99-453D-44F1-88EC-228F7966FFE4}"/>
               </a:ext>
             </a:extLst>
           </p:cNvPr>
@@ -9482,14 +9966,14 @@
                 <a:gridCol w="4521200">
                   <a:extLst>
                     <a:ext uri="{9D8B030D-6E8A-4147-A177-3AD203B41FA5}">
-                      <a16:colId xmlns:a16="http://schemas.microsoft.com/office/drawing/2014/main" xmlns="" val="371563066"/>
+                      <a16:colId xmlns:a16="http://schemas.microsoft.com/office/drawing/2014/main" val="371563066"/>
                     </a:ext>
                   </a:extLst>
                 </a:gridCol>
                 <a:gridCol w="4555066">
                   <a:extLst>
                     <a:ext uri="{9D8B030D-6E8A-4147-A177-3AD203B41FA5}">
-                      <a16:colId xmlns:a16="http://schemas.microsoft.com/office/drawing/2014/main" xmlns="" val="2181931161"/>
+                      <a16:colId xmlns:a16="http://schemas.microsoft.com/office/drawing/2014/main" val="2181931161"/>
                     </a:ext>
                   </a:extLst>
                 </a:gridCol>
@@ -9625,7 +10109,7 @@
                 </a:tc>
                 <a:extLst>
                   <a:ext uri="{0D108BD9-81ED-4DB2-BD59-A6C34878D82A}">
-                    <a16:rowId xmlns:a16="http://schemas.microsoft.com/office/drawing/2014/main" xmlns="" val="10001"/>
+                    <a16:rowId xmlns:a16="http://schemas.microsoft.com/office/drawing/2014/main" val="10001"/>
                   </a:ext>
                 </a:extLst>
               </a:tr>
@@ -9646,7 +10130,7 @@
 </p:sld>
 </file>
 
-<file path=ppt/slides/slide26.xml><?xml version="1.0" encoding="utf-8"?>
+<file path=ppt/slides/slide28.xml><?xml version="1.0" encoding="utf-8"?>
 <p:sld xmlns:a="http://schemas.openxmlformats.org/drawingml/2006/main" xmlns:r="http://schemas.openxmlformats.org/officeDocument/2006/relationships" xmlns:p="http://schemas.openxmlformats.org/presentationml/2006/main">
   <p:cSld>
     <p:bg>
@@ -9676,7 +10160,7 @@
           <p:cNvPr id="6" name="Content Placeholder 2">
             <a:extLst>
               <a:ext uri="{FF2B5EF4-FFF2-40B4-BE49-F238E27FC236}">
-                <a16:creationId xmlns:a16="http://schemas.microsoft.com/office/drawing/2014/main" xmlns="" id="{747102BF-A698-444E-B693-3BC2E2F22350}"/>
+                <a16:creationId xmlns:a16="http://schemas.microsoft.com/office/drawing/2014/main" id="{747102BF-A698-444E-B693-3BC2E2F22350}"/>
               </a:ext>
             </a:extLst>
           </p:cNvPr>
@@ -9923,11 +10407,7 @@
             </a:r>
             <a:r>
               <a:rPr lang="en-US" sz="2000" b="1"/>
-              <a:t>is </a:t>
-            </a:r>
-            <a:r>
-              <a:rPr lang="en-US" sz="2000" b="1" smtClean="0"/>
-              <a:t>35 </a:t>
+              <a:t>is 35 </a:t>
             </a:r>
             <a:r>
               <a:rPr lang="en-US" sz="2000" b="1" dirty="0"/>
@@ -9964,7 +10444,7 @@
           <p:cNvPr id="5" name="Table 4">
             <a:extLst>
               <a:ext uri="{FF2B5EF4-FFF2-40B4-BE49-F238E27FC236}">
-                <a16:creationId xmlns:a16="http://schemas.microsoft.com/office/drawing/2014/main" xmlns="" id="{9CAF9F99-453D-44F1-88EC-228F7966FFE4}"/>
+                <a16:creationId xmlns:a16="http://schemas.microsoft.com/office/drawing/2014/main" id="{9CAF9F99-453D-44F1-88EC-228F7966FFE4}"/>
               </a:ext>
             </a:extLst>
           </p:cNvPr>
@@ -9993,14 +10473,14 @@
                 <a:gridCol w="3542156">
                   <a:extLst>
                     <a:ext uri="{9D8B030D-6E8A-4147-A177-3AD203B41FA5}">
-                      <a16:colId xmlns:a16="http://schemas.microsoft.com/office/drawing/2014/main" xmlns="" val="371563066"/>
+                      <a16:colId xmlns:a16="http://schemas.microsoft.com/office/drawing/2014/main" val="371563066"/>
                     </a:ext>
                   </a:extLst>
                 </a:gridCol>
                 <a:gridCol w="3568688">
                   <a:extLst>
                     <a:ext uri="{9D8B030D-6E8A-4147-A177-3AD203B41FA5}">
-                      <a16:colId xmlns:a16="http://schemas.microsoft.com/office/drawing/2014/main" xmlns="" val="2181931161"/>
+                      <a16:colId xmlns:a16="http://schemas.microsoft.com/office/drawing/2014/main" val="2181931161"/>
                     </a:ext>
                   </a:extLst>
                 </a:gridCol>
@@ -10136,7 +10616,7 @@
                 </a:tc>
                 <a:extLst>
                   <a:ext uri="{0D108BD9-81ED-4DB2-BD59-A6C34878D82A}">
-                    <a16:rowId xmlns:a16="http://schemas.microsoft.com/office/drawing/2014/main" xmlns="" val="10001"/>
+                    <a16:rowId xmlns:a16="http://schemas.microsoft.com/office/drawing/2014/main" val="10001"/>
                   </a:ext>
                 </a:extLst>
               </a:tr>
@@ -10149,7 +10629,7 @@
           <p:cNvPr id="4" name="Table 3">
             <a:extLst>
               <a:ext uri="{FF2B5EF4-FFF2-40B4-BE49-F238E27FC236}">
-                <a16:creationId xmlns:a16="http://schemas.microsoft.com/office/drawing/2014/main" xmlns="" id="{A3B9448A-B7F5-4830-913D-C9F6A35383F6}"/>
+                <a16:creationId xmlns:a16="http://schemas.microsoft.com/office/drawing/2014/main" id="{A3B9448A-B7F5-4830-913D-C9F6A35383F6}"/>
               </a:ext>
             </a:extLst>
           </p:cNvPr>
@@ -10178,7 +10658,7 @@
                 <a:gridCol w="3290454">
                   <a:extLst>
                     <a:ext uri="{9D8B030D-6E8A-4147-A177-3AD203B41FA5}">
-                      <a16:colId xmlns:a16="http://schemas.microsoft.com/office/drawing/2014/main" xmlns="" val="371563066"/>
+                      <a16:colId xmlns:a16="http://schemas.microsoft.com/office/drawing/2014/main" val="371563066"/>
                     </a:ext>
                   </a:extLst>
                 </a:gridCol>
@@ -10231,7 +10711,7 @@
                 </a:tc>
                 <a:extLst>
                   <a:ext uri="{0D108BD9-81ED-4DB2-BD59-A6C34878D82A}">
-                    <a16:rowId xmlns:a16="http://schemas.microsoft.com/office/drawing/2014/main" xmlns="" val="10001"/>
+                    <a16:rowId xmlns:a16="http://schemas.microsoft.com/office/drawing/2014/main" val="10001"/>
                   </a:ext>
                 </a:extLst>
               </a:tr>
@@ -10244,7 +10724,7 @@
           <p:cNvPr id="7" name="Table 6">
             <a:extLst>
               <a:ext uri="{FF2B5EF4-FFF2-40B4-BE49-F238E27FC236}">
-                <a16:creationId xmlns:a16="http://schemas.microsoft.com/office/drawing/2014/main" xmlns="" id="{E0C09A9D-193B-41BE-8D5D-486A55741393}"/>
+                <a16:creationId xmlns:a16="http://schemas.microsoft.com/office/drawing/2014/main" id="{E0C09A9D-193B-41BE-8D5D-486A55741393}"/>
               </a:ext>
             </a:extLst>
           </p:cNvPr>
@@ -10273,7 +10753,7 @@
                 <a:gridCol w="3290454">
                   <a:extLst>
                     <a:ext uri="{9D8B030D-6E8A-4147-A177-3AD203B41FA5}">
-                      <a16:colId xmlns:a16="http://schemas.microsoft.com/office/drawing/2014/main" xmlns="" val="371563066"/>
+                      <a16:colId xmlns:a16="http://schemas.microsoft.com/office/drawing/2014/main" val="371563066"/>
                     </a:ext>
                   </a:extLst>
                 </a:gridCol>
@@ -10326,7 +10806,7 @@
                 </a:tc>
                 <a:extLst>
                   <a:ext uri="{0D108BD9-81ED-4DB2-BD59-A6C34878D82A}">
-                    <a16:rowId xmlns:a16="http://schemas.microsoft.com/office/drawing/2014/main" xmlns="" val="10001"/>
+                    <a16:rowId xmlns:a16="http://schemas.microsoft.com/office/drawing/2014/main" val="10001"/>
                   </a:ext>
                 </a:extLst>
               </a:tr>
@@ -10339,7 +10819,7 @@
           <p:cNvPr id="8" name="Table 7">
             <a:extLst>
               <a:ext uri="{FF2B5EF4-FFF2-40B4-BE49-F238E27FC236}">
-                <a16:creationId xmlns:a16="http://schemas.microsoft.com/office/drawing/2014/main" xmlns="" id="{3F377A96-D01A-4E09-B218-335309637969}"/>
+                <a16:creationId xmlns:a16="http://schemas.microsoft.com/office/drawing/2014/main" id="{3F377A96-D01A-4E09-B218-335309637969}"/>
               </a:ext>
             </a:extLst>
           </p:cNvPr>
@@ -10368,7 +10848,7 @@
                 <a:gridCol w="3290454">
                   <a:extLst>
                     <a:ext uri="{9D8B030D-6E8A-4147-A177-3AD203B41FA5}">
-                      <a16:colId xmlns:a16="http://schemas.microsoft.com/office/drawing/2014/main" xmlns="" val="371563066"/>
+                      <a16:colId xmlns:a16="http://schemas.microsoft.com/office/drawing/2014/main" val="371563066"/>
                     </a:ext>
                   </a:extLst>
                 </a:gridCol>
@@ -10421,7 +10901,7 @@
                 </a:tc>
                 <a:extLst>
                   <a:ext uri="{0D108BD9-81ED-4DB2-BD59-A6C34878D82A}">
-                    <a16:rowId xmlns:a16="http://schemas.microsoft.com/office/drawing/2014/main" xmlns="" val="10001"/>
+                    <a16:rowId xmlns:a16="http://schemas.microsoft.com/office/drawing/2014/main" val="10001"/>
                   </a:ext>
                 </a:extLst>
               </a:tr>
@@ -10442,7 +10922,7 @@
 </p:sld>
 </file>
 
-<file path=ppt/slides/slide27.xml><?xml version="1.0" encoding="utf-8"?>
+<file path=ppt/slides/slide29.xml><?xml version="1.0" encoding="utf-8"?>
 <p:sld xmlns:a="http://schemas.openxmlformats.org/drawingml/2006/main" xmlns:r="http://schemas.openxmlformats.org/officeDocument/2006/relationships" xmlns:p="http://schemas.openxmlformats.org/presentationml/2006/main">
   <p:cSld>
     <p:spTree>
@@ -10463,44 +10943,6 @@
     <p:extLst>
       <p:ext uri="{BB962C8B-B14F-4D97-AF65-F5344CB8AC3E}">
         <p14:creationId xmlns:p14="http://schemas.microsoft.com/office/powerpoint/2010/main" val="2748039734"/>
-      </p:ext>
-    </p:extLst>
-  </p:cSld>
-  <p:clrMapOvr>
-    <a:masterClrMapping/>
-  </p:clrMapOvr>
-</p:sld>
-</file>
-
-<file path=ppt/slides/slide28.xml><?xml version="1.0" encoding="utf-8"?>
-<p:sld xmlns:a="http://schemas.openxmlformats.org/drawingml/2006/main" xmlns:r="http://schemas.openxmlformats.org/officeDocument/2006/relationships" xmlns:p="http://schemas.openxmlformats.org/presentationml/2006/main">
-  <p:cSld>
-    <p:bg>
-      <p:bgPr>
-        <a:solidFill>
-          <a:schemeClr val="tx1"/>
-        </a:solidFill>
-        <a:effectLst/>
-      </p:bgPr>
-    </p:bg>
-    <p:spTree>
-      <p:nvGrpSpPr>
-        <p:cNvPr id="1" name=""/>
-        <p:cNvGrpSpPr/>
-        <p:nvPr/>
-      </p:nvGrpSpPr>
-      <p:grpSpPr>
-        <a:xfrm>
-          <a:off x="0" y="0"/>
-          <a:ext cx="0" cy="0"/>
-          <a:chOff x="0" y="0"/>
-          <a:chExt cx="0" cy="0"/>
-        </a:xfrm>
-      </p:grpSpPr>
-    </p:spTree>
-    <p:extLst>
-      <p:ext uri="{BB962C8B-B14F-4D97-AF65-F5344CB8AC3E}">
-        <p14:creationId xmlns:p14="http://schemas.microsoft.com/office/powerpoint/2010/main" val="2906826757"/>
       </p:ext>
     </p:extLst>
   </p:cSld>
@@ -10540,7 +10982,7 @@
           <p:cNvPr id="6" name="Content Placeholder 2">
             <a:extLst>
               <a:ext uri="{FF2B5EF4-FFF2-40B4-BE49-F238E27FC236}">
-                <a16:creationId xmlns:a16="http://schemas.microsoft.com/office/drawing/2014/main" xmlns="" id="{747102BF-A698-444E-B693-3BC2E2F22350}"/>
+                <a16:creationId xmlns:a16="http://schemas.microsoft.com/office/drawing/2014/main" id="{747102BF-A698-444E-B693-3BC2E2F22350}"/>
               </a:ext>
             </a:extLst>
           </p:cNvPr>
@@ -10799,6 +11241,44 @@
     <p:extLst>
       <p:ext uri="{BB962C8B-B14F-4D97-AF65-F5344CB8AC3E}">
         <p14:creationId xmlns:p14="http://schemas.microsoft.com/office/powerpoint/2010/main" val="3276391210"/>
+      </p:ext>
+    </p:extLst>
+  </p:cSld>
+  <p:clrMapOvr>
+    <a:masterClrMapping/>
+  </p:clrMapOvr>
+</p:sld>
+</file>
+
+<file path=ppt/slides/slide30.xml><?xml version="1.0" encoding="utf-8"?>
+<p:sld xmlns:a="http://schemas.openxmlformats.org/drawingml/2006/main" xmlns:r="http://schemas.openxmlformats.org/officeDocument/2006/relationships" xmlns:p="http://schemas.openxmlformats.org/presentationml/2006/main">
+  <p:cSld>
+    <p:bg>
+      <p:bgPr>
+        <a:solidFill>
+          <a:schemeClr val="tx1"/>
+        </a:solidFill>
+        <a:effectLst/>
+      </p:bgPr>
+    </p:bg>
+    <p:spTree>
+      <p:nvGrpSpPr>
+        <p:cNvPr id="1" name=""/>
+        <p:cNvGrpSpPr/>
+        <p:nvPr/>
+      </p:nvGrpSpPr>
+      <p:grpSpPr>
+        <a:xfrm>
+          <a:off x="0" y="0"/>
+          <a:ext cx="0" cy="0"/>
+          <a:chOff x="0" y="0"/>
+          <a:chExt cx="0" cy="0"/>
+        </a:xfrm>
+      </p:grpSpPr>
+    </p:spTree>
+    <p:extLst>
+      <p:ext uri="{BB962C8B-B14F-4D97-AF65-F5344CB8AC3E}">
+        <p14:creationId xmlns:p14="http://schemas.microsoft.com/office/powerpoint/2010/main" val="2906826757"/>
       </p:ext>
     </p:extLst>
   </p:cSld>
@@ -10838,7 +11318,7 @@
           <p:cNvPr id="6" name="Content Placeholder 2">
             <a:extLst>
               <a:ext uri="{FF2B5EF4-FFF2-40B4-BE49-F238E27FC236}">
-                <a16:creationId xmlns:a16="http://schemas.microsoft.com/office/drawing/2014/main" xmlns="" id="{747102BF-A698-444E-B693-3BC2E2F22350}"/>
+                <a16:creationId xmlns:a16="http://schemas.microsoft.com/office/drawing/2014/main" id="{747102BF-A698-444E-B693-3BC2E2F22350}"/>
               </a:ext>
             </a:extLst>
           </p:cNvPr>
@@ -11090,7 +11570,7 @@
           <p:cNvPr id="6" name="Content Placeholder 2">
             <a:extLst>
               <a:ext uri="{FF2B5EF4-FFF2-40B4-BE49-F238E27FC236}">
-                <a16:creationId xmlns:a16="http://schemas.microsoft.com/office/drawing/2014/main" xmlns="" id="{747102BF-A698-444E-B693-3BC2E2F22350}"/>
+                <a16:creationId xmlns:a16="http://schemas.microsoft.com/office/drawing/2014/main" id="{747102BF-A698-444E-B693-3BC2E2F22350}"/>
               </a:ext>
             </a:extLst>
           </p:cNvPr>
@@ -11482,7 +11962,7 @@
           <p:cNvPr id="6" name="Content Placeholder 2">
             <a:extLst>
               <a:ext uri="{FF2B5EF4-FFF2-40B4-BE49-F238E27FC236}">
-                <a16:creationId xmlns:a16="http://schemas.microsoft.com/office/drawing/2014/main" xmlns="" id="{747102BF-A698-444E-B693-3BC2E2F22350}"/>
+                <a16:creationId xmlns:a16="http://schemas.microsoft.com/office/drawing/2014/main" id="{747102BF-A698-444E-B693-3BC2E2F22350}"/>
               </a:ext>
             </a:extLst>
           </p:cNvPr>
@@ -11735,7 +12215,7 @@
           <p:cNvPr id="6" name="Content Placeholder 2">
             <a:extLst>
               <a:ext uri="{FF2B5EF4-FFF2-40B4-BE49-F238E27FC236}">
-                <a16:creationId xmlns:a16="http://schemas.microsoft.com/office/drawing/2014/main" xmlns="" id="{747102BF-A698-444E-B693-3BC2E2F22350}"/>
+                <a16:creationId xmlns:a16="http://schemas.microsoft.com/office/drawing/2014/main" id="{747102BF-A698-444E-B693-3BC2E2F22350}"/>
               </a:ext>
             </a:extLst>
           </p:cNvPr>
@@ -11987,7 +12467,7 @@
           <p:cNvPr id="6" name="Content Placeholder 2">
             <a:extLst>
               <a:ext uri="{FF2B5EF4-FFF2-40B4-BE49-F238E27FC236}">
-                <a16:creationId xmlns:a16="http://schemas.microsoft.com/office/drawing/2014/main" xmlns="" id="{747102BF-A698-444E-B693-3BC2E2F22350}"/>
+                <a16:creationId xmlns:a16="http://schemas.microsoft.com/office/drawing/2014/main" id="{747102BF-A698-444E-B693-3BC2E2F22350}"/>
               </a:ext>
             </a:extLst>
           </p:cNvPr>
@@ -12229,7 +12709,7 @@
           <p:cNvPr id="6" name="Content Placeholder 2">
             <a:extLst>
               <a:ext uri="{FF2B5EF4-FFF2-40B4-BE49-F238E27FC236}">
-                <a16:creationId xmlns:a16="http://schemas.microsoft.com/office/drawing/2014/main" xmlns="" id="{747102BF-A698-444E-B693-3BC2E2F22350}"/>
+                <a16:creationId xmlns:a16="http://schemas.microsoft.com/office/drawing/2014/main" id="{747102BF-A698-444E-B693-3BC2E2F22350}"/>
               </a:ext>
             </a:extLst>
           </p:cNvPr>
@@ -12439,7 +12919,7 @@
           <p:cNvPr id="5" name="Table 4">
             <a:extLst>
               <a:ext uri="{FF2B5EF4-FFF2-40B4-BE49-F238E27FC236}">
-                <a16:creationId xmlns:a16="http://schemas.microsoft.com/office/drawing/2014/main" xmlns="" id="{9CAF9F99-453D-44F1-88EC-228F7966FFE4}"/>
+                <a16:creationId xmlns:a16="http://schemas.microsoft.com/office/drawing/2014/main" id="{9CAF9F99-453D-44F1-88EC-228F7966FFE4}"/>
               </a:ext>
             </a:extLst>
           </p:cNvPr>
@@ -12462,14 +12942,14 @@
                 <a:gridCol w="4521200">
                   <a:extLst>
                     <a:ext uri="{9D8B030D-6E8A-4147-A177-3AD203B41FA5}">
-                      <a16:colId xmlns:a16="http://schemas.microsoft.com/office/drawing/2014/main" xmlns="" val="371563066"/>
+                      <a16:colId xmlns:a16="http://schemas.microsoft.com/office/drawing/2014/main" val="371563066"/>
                     </a:ext>
                   </a:extLst>
                 </a:gridCol>
                 <a:gridCol w="4555066">
                   <a:extLst>
                     <a:ext uri="{9D8B030D-6E8A-4147-A177-3AD203B41FA5}">
-                      <a16:colId xmlns:a16="http://schemas.microsoft.com/office/drawing/2014/main" xmlns="" val="2181931161"/>
+                      <a16:colId xmlns:a16="http://schemas.microsoft.com/office/drawing/2014/main" val="2181931161"/>
                     </a:ext>
                   </a:extLst>
                 </a:gridCol>
@@ -12607,7 +13087,7 @@
                 </a:tc>
                 <a:extLst>
                   <a:ext uri="{0D108BD9-81ED-4DB2-BD59-A6C34878D82A}">
-                    <a16:rowId xmlns:a16="http://schemas.microsoft.com/office/drawing/2014/main" xmlns="" val="2258008607"/>
+                    <a16:rowId xmlns:a16="http://schemas.microsoft.com/office/drawing/2014/main" val="2258008607"/>
                   </a:ext>
                 </a:extLst>
               </a:tr>
@@ -12620,7 +13100,7 @@
           <p:cNvPr id="7" name="Table 6">
             <a:extLst>
               <a:ext uri="{FF2B5EF4-FFF2-40B4-BE49-F238E27FC236}">
-                <a16:creationId xmlns:a16="http://schemas.microsoft.com/office/drawing/2014/main" xmlns="" id="{9CAF9F99-453D-44F1-88EC-228F7966FFE4}"/>
+                <a16:creationId xmlns:a16="http://schemas.microsoft.com/office/drawing/2014/main" id="{9CAF9F99-453D-44F1-88EC-228F7966FFE4}"/>
               </a:ext>
             </a:extLst>
           </p:cNvPr>
@@ -12643,14 +13123,14 @@
                 <a:gridCol w="4521200">
                   <a:extLst>
                     <a:ext uri="{9D8B030D-6E8A-4147-A177-3AD203B41FA5}">
-                      <a16:colId xmlns:a16="http://schemas.microsoft.com/office/drawing/2014/main" xmlns="" val="371563066"/>
+                      <a16:colId xmlns:a16="http://schemas.microsoft.com/office/drawing/2014/main" val="371563066"/>
                     </a:ext>
                   </a:extLst>
                 </a:gridCol>
                 <a:gridCol w="4555066">
                   <a:extLst>
                     <a:ext uri="{9D8B030D-6E8A-4147-A177-3AD203B41FA5}">
-                      <a16:colId xmlns:a16="http://schemas.microsoft.com/office/drawing/2014/main" xmlns="" val="2181931161"/>
+                      <a16:colId xmlns:a16="http://schemas.microsoft.com/office/drawing/2014/main" val="2181931161"/>
                     </a:ext>
                   </a:extLst>
                 </a:gridCol>
@@ -12802,7 +13282,7 @@
                 </a:tc>
                 <a:extLst>
                   <a:ext uri="{0D108BD9-81ED-4DB2-BD59-A6C34878D82A}">
-                    <a16:rowId xmlns:a16="http://schemas.microsoft.com/office/drawing/2014/main" xmlns="" val="10001"/>
+                    <a16:rowId xmlns:a16="http://schemas.microsoft.com/office/drawing/2014/main" val="10001"/>
                   </a:ext>
                 </a:extLst>
               </a:tr>
@@ -12815,7 +13295,7 @@
           <p:cNvPr id="8" name="Content Placeholder 2">
             <a:extLst>
               <a:ext uri="{FF2B5EF4-FFF2-40B4-BE49-F238E27FC236}">
-                <a16:creationId xmlns:a16="http://schemas.microsoft.com/office/drawing/2014/main" xmlns="" id="{E0640A27-01A1-4CBA-BA12-916E63F5099E}"/>
+                <a16:creationId xmlns:a16="http://schemas.microsoft.com/office/drawing/2014/main" id="{E0640A27-01A1-4CBA-BA12-916E63F5099E}"/>
               </a:ext>
             </a:extLst>
           </p:cNvPr>

</xml_diff>

<commit_message>
Pause between trials in practice.
</commit_message>
<xml_diff>
--- a/experiment/RUN_ME/stimuli/instructions presentation.pptx
+++ b/experiment/RUN_ME/stimuli/instructions presentation.pptx
@@ -35,6 +35,7 @@
     <p:sldId id="317" r:id="rId29"/>
     <p:sldId id="310" r:id="rId30"/>
     <p:sldId id="311" r:id="rId31"/>
+    <p:sldId id="326" r:id="rId32"/>
   </p:sldIdLst>
   <p:sldSz cx="12192000" cy="6858000"/>
   <p:notesSz cx="6858000" cy="9144000"/>
@@ -270,7 +271,7 @@
           <a:p>
             <a:fld id="{F999E2B6-E0C8-4E2F-B37B-1FC830B33272}" type="datetimeFigureOut">
               <a:rPr lang="en-US" smtClean="0"/>
-              <a:t>8/22/2021</a:t>
+              <a:t>4/24/2022</a:t>
             </a:fld>
             <a:endParaRPr lang="en-US"/>
           </a:p>
@@ -438,7 +439,7 @@
           <a:p>
             <a:fld id="{F999E2B6-E0C8-4E2F-B37B-1FC830B33272}" type="datetimeFigureOut">
               <a:rPr lang="en-US" smtClean="0"/>
-              <a:t>8/22/2021</a:t>
+              <a:t>4/24/2022</a:t>
             </a:fld>
             <a:endParaRPr lang="en-US"/>
           </a:p>
@@ -616,7 +617,7 @@
           <a:p>
             <a:fld id="{F999E2B6-E0C8-4E2F-B37B-1FC830B33272}" type="datetimeFigureOut">
               <a:rPr lang="en-US" smtClean="0"/>
-              <a:t>8/22/2021</a:t>
+              <a:t>4/24/2022</a:t>
             </a:fld>
             <a:endParaRPr lang="en-US"/>
           </a:p>
@@ -784,7 +785,7 @@
           <a:p>
             <a:fld id="{F999E2B6-E0C8-4E2F-B37B-1FC830B33272}" type="datetimeFigureOut">
               <a:rPr lang="en-US" smtClean="0"/>
-              <a:t>8/22/2021</a:t>
+              <a:t>4/24/2022</a:t>
             </a:fld>
             <a:endParaRPr lang="en-US"/>
           </a:p>
@@ -1029,7 +1030,7 @@
           <a:p>
             <a:fld id="{F999E2B6-E0C8-4E2F-B37B-1FC830B33272}" type="datetimeFigureOut">
               <a:rPr lang="en-US" smtClean="0"/>
-              <a:t>8/22/2021</a:t>
+              <a:t>4/24/2022</a:t>
             </a:fld>
             <a:endParaRPr lang="en-US"/>
           </a:p>
@@ -1258,7 +1259,7 @@
           <a:p>
             <a:fld id="{F999E2B6-E0C8-4E2F-B37B-1FC830B33272}" type="datetimeFigureOut">
               <a:rPr lang="en-US" smtClean="0"/>
-              <a:t>8/22/2021</a:t>
+              <a:t>4/24/2022</a:t>
             </a:fld>
             <a:endParaRPr lang="en-US"/>
           </a:p>
@@ -1622,7 +1623,7 @@
           <a:p>
             <a:fld id="{F999E2B6-E0C8-4E2F-B37B-1FC830B33272}" type="datetimeFigureOut">
               <a:rPr lang="en-US" smtClean="0"/>
-              <a:t>8/22/2021</a:t>
+              <a:t>4/24/2022</a:t>
             </a:fld>
             <a:endParaRPr lang="en-US"/>
           </a:p>
@@ -1739,7 +1740,7 @@
           <a:p>
             <a:fld id="{F999E2B6-E0C8-4E2F-B37B-1FC830B33272}" type="datetimeFigureOut">
               <a:rPr lang="en-US" smtClean="0"/>
-              <a:t>8/22/2021</a:t>
+              <a:t>4/24/2022</a:t>
             </a:fld>
             <a:endParaRPr lang="en-US"/>
           </a:p>
@@ -1834,7 +1835,7 @@
           <a:p>
             <a:fld id="{F999E2B6-E0C8-4E2F-B37B-1FC830B33272}" type="datetimeFigureOut">
               <a:rPr lang="en-US" smtClean="0"/>
-              <a:t>8/22/2021</a:t>
+              <a:t>4/24/2022</a:t>
             </a:fld>
             <a:endParaRPr lang="en-US"/>
           </a:p>
@@ -2109,7 +2110,7 @@
           <a:p>
             <a:fld id="{F999E2B6-E0C8-4E2F-B37B-1FC830B33272}" type="datetimeFigureOut">
               <a:rPr lang="en-US" smtClean="0"/>
-              <a:t>8/22/2021</a:t>
+              <a:t>4/24/2022</a:t>
             </a:fld>
             <a:endParaRPr lang="en-US"/>
           </a:p>
@@ -2361,7 +2362,7 @@
           <a:p>
             <a:fld id="{F999E2B6-E0C8-4E2F-B37B-1FC830B33272}" type="datetimeFigureOut">
               <a:rPr lang="en-US" smtClean="0"/>
-              <a:t>8/22/2021</a:t>
+              <a:t>4/24/2022</a:t>
             </a:fld>
             <a:endParaRPr lang="en-US"/>
           </a:p>
@@ -2572,7 +2573,7 @@
           <a:p>
             <a:fld id="{F999E2B6-E0C8-4E2F-B37B-1FC830B33272}" type="datetimeFigureOut">
               <a:rPr lang="en-US" smtClean="0"/>
-              <a:t>8/22/2021</a:t>
+              <a:t>4/24/2022</a:t>
             </a:fld>
             <a:endParaRPr lang="en-US"/>
           </a:p>
@@ -11288,6 +11289,247 @@
 </p:sld>
 </file>
 
+<file path=ppt/slides/slide31.xml><?xml version="1.0" encoding="utf-8"?>
+<p:sld xmlns:a="http://schemas.openxmlformats.org/drawingml/2006/main" xmlns:r="http://schemas.openxmlformats.org/officeDocument/2006/relationships" xmlns:p="http://schemas.openxmlformats.org/presentationml/2006/main">
+  <p:cSld>
+    <p:bg>
+      <p:bgPr>
+        <a:solidFill>
+          <a:srgbClr val="7E7E7E"/>
+        </a:solidFill>
+        <a:effectLst/>
+      </p:bgPr>
+    </p:bg>
+    <p:spTree>
+      <p:nvGrpSpPr>
+        <p:cNvPr id="1" name=""/>
+        <p:cNvGrpSpPr/>
+        <p:nvPr/>
+      </p:nvGrpSpPr>
+      <p:grpSpPr>
+        <a:xfrm>
+          <a:off x="0" y="0"/>
+          <a:ext cx="0" cy="0"/>
+          <a:chOff x="0" y="0"/>
+          <a:chExt cx="0" cy="0"/>
+        </a:xfrm>
+      </p:grpSpPr>
+      <p:sp>
+        <p:nvSpPr>
+          <p:cNvPr id="6" name="Content Placeholder 2">
+            <a:extLst>
+              <a:ext uri="{FF2B5EF4-FFF2-40B4-BE49-F238E27FC236}">
+                <a16:creationId xmlns:a16="http://schemas.microsoft.com/office/drawing/2014/main" id="{747102BF-A698-444E-B693-3BC2E2F22350}"/>
+              </a:ext>
+            </a:extLst>
+          </p:cNvPr>
+          <p:cNvSpPr txBox="1">
+            <a:spLocks/>
+          </p:cNvSpPr>
+          <p:nvPr/>
+        </p:nvSpPr>
+        <p:spPr>
+          <a:xfrm>
+            <a:off x="691816" y="2851102"/>
+            <a:ext cx="10808368" cy="534894"/>
+          </a:xfrm>
+          <a:prstGeom prst="rect">
+            <a:avLst/>
+          </a:prstGeom>
+        </p:spPr>
+        <p:txBody>
+          <a:bodyPr vert="horz" lIns="91440" tIns="45720" rIns="91440" bIns="45720" rtlCol="0">
+            <a:normAutofit/>
+          </a:bodyPr>
+          <a:lstStyle>
+            <a:lvl1pPr marL="228600" indent="-228600" algn="l" defTabSz="914400" rtl="0" eaLnBrk="1" latinLnBrk="0" hangingPunct="1">
+              <a:lnSpc>
+                <a:spcPct val="90000"/>
+              </a:lnSpc>
+              <a:spcBef>
+                <a:spcPts val="1000"/>
+              </a:spcBef>
+              <a:buFont typeface="Arial" panose="020B0604020202020204" pitchFamily="34" charset="0"/>
+              <a:buChar char="•"/>
+              <a:defRPr sz="2800" kern="1200">
+                <a:solidFill>
+                  <a:schemeClr val="tx1"/>
+                </a:solidFill>
+                <a:latin typeface="+mn-lt"/>
+                <a:ea typeface="+mn-ea"/>
+                <a:cs typeface="+mn-cs"/>
+              </a:defRPr>
+            </a:lvl1pPr>
+            <a:lvl2pPr marL="685800" indent="-228600" algn="l" defTabSz="914400" rtl="0" eaLnBrk="1" latinLnBrk="0" hangingPunct="1">
+              <a:lnSpc>
+                <a:spcPct val="90000"/>
+              </a:lnSpc>
+              <a:spcBef>
+                <a:spcPts val="500"/>
+              </a:spcBef>
+              <a:buFont typeface="Arial" panose="020B0604020202020204" pitchFamily="34" charset="0"/>
+              <a:buChar char="•"/>
+              <a:defRPr sz="2400" kern="1200">
+                <a:solidFill>
+                  <a:schemeClr val="tx1"/>
+                </a:solidFill>
+                <a:latin typeface="+mn-lt"/>
+                <a:ea typeface="+mn-ea"/>
+                <a:cs typeface="+mn-cs"/>
+              </a:defRPr>
+            </a:lvl2pPr>
+            <a:lvl3pPr marL="1143000" indent="-228600" algn="l" defTabSz="914400" rtl="0" eaLnBrk="1" latinLnBrk="0" hangingPunct="1">
+              <a:lnSpc>
+                <a:spcPct val="90000"/>
+              </a:lnSpc>
+              <a:spcBef>
+                <a:spcPts val="500"/>
+              </a:spcBef>
+              <a:buFont typeface="Arial" panose="020B0604020202020204" pitchFamily="34" charset="0"/>
+              <a:buChar char="•"/>
+              <a:defRPr sz="2000" kern="1200">
+                <a:solidFill>
+                  <a:schemeClr val="tx1"/>
+                </a:solidFill>
+                <a:latin typeface="+mn-lt"/>
+                <a:ea typeface="+mn-ea"/>
+                <a:cs typeface="+mn-cs"/>
+              </a:defRPr>
+            </a:lvl3pPr>
+            <a:lvl4pPr marL="1600200" indent="-228600" algn="l" defTabSz="914400" rtl="0" eaLnBrk="1" latinLnBrk="0" hangingPunct="1">
+              <a:lnSpc>
+                <a:spcPct val="90000"/>
+              </a:lnSpc>
+              <a:spcBef>
+                <a:spcPts val="500"/>
+              </a:spcBef>
+              <a:buFont typeface="Arial" panose="020B0604020202020204" pitchFamily="34" charset="0"/>
+              <a:buChar char="•"/>
+              <a:defRPr sz="1800" kern="1200">
+                <a:solidFill>
+                  <a:schemeClr val="tx1"/>
+                </a:solidFill>
+                <a:latin typeface="+mn-lt"/>
+                <a:ea typeface="+mn-ea"/>
+                <a:cs typeface="+mn-cs"/>
+              </a:defRPr>
+            </a:lvl4pPr>
+            <a:lvl5pPr marL="2057400" indent="-228600" algn="l" defTabSz="914400" rtl="0" eaLnBrk="1" latinLnBrk="0" hangingPunct="1">
+              <a:lnSpc>
+                <a:spcPct val="90000"/>
+              </a:lnSpc>
+              <a:spcBef>
+                <a:spcPts val="500"/>
+              </a:spcBef>
+              <a:buFont typeface="Arial" panose="020B0604020202020204" pitchFamily="34" charset="0"/>
+              <a:buChar char="•"/>
+              <a:defRPr sz="1800" kern="1200">
+                <a:solidFill>
+                  <a:schemeClr val="tx1"/>
+                </a:solidFill>
+                <a:latin typeface="+mn-lt"/>
+                <a:ea typeface="+mn-ea"/>
+                <a:cs typeface="+mn-cs"/>
+              </a:defRPr>
+            </a:lvl5pPr>
+            <a:lvl6pPr marL="2514600" indent="-228600" algn="l" defTabSz="914400" rtl="0" eaLnBrk="1" latinLnBrk="0" hangingPunct="1">
+              <a:lnSpc>
+                <a:spcPct val="90000"/>
+              </a:lnSpc>
+              <a:spcBef>
+                <a:spcPts val="500"/>
+              </a:spcBef>
+              <a:buFont typeface="Arial" panose="020B0604020202020204" pitchFamily="34" charset="0"/>
+              <a:buChar char="•"/>
+              <a:defRPr sz="1800" kern="1200">
+                <a:solidFill>
+                  <a:schemeClr val="tx1"/>
+                </a:solidFill>
+                <a:latin typeface="+mn-lt"/>
+                <a:ea typeface="+mn-ea"/>
+                <a:cs typeface="+mn-cs"/>
+              </a:defRPr>
+            </a:lvl6pPr>
+            <a:lvl7pPr marL="2971800" indent="-228600" algn="l" defTabSz="914400" rtl="0" eaLnBrk="1" latinLnBrk="0" hangingPunct="1">
+              <a:lnSpc>
+                <a:spcPct val="90000"/>
+              </a:lnSpc>
+              <a:spcBef>
+                <a:spcPts val="500"/>
+              </a:spcBef>
+              <a:buFont typeface="Arial" panose="020B0604020202020204" pitchFamily="34" charset="0"/>
+              <a:buChar char="•"/>
+              <a:defRPr sz="1800" kern="1200">
+                <a:solidFill>
+                  <a:schemeClr val="tx1"/>
+                </a:solidFill>
+                <a:latin typeface="+mn-lt"/>
+                <a:ea typeface="+mn-ea"/>
+                <a:cs typeface="+mn-cs"/>
+              </a:defRPr>
+            </a:lvl7pPr>
+            <a:lvl8pPr marL="3429000" indent="-228600" algn="l" defTabSz="914400" rtl="0" eaLnBrk="1" latinLnBrk="0" hangingPunct="1">
+              <a:lnSpc>
+                <a:spcPct val="90000"/>
+              </a:lnSpc>
+              <a:spcBef>
+                <a:spcPts val="500"/>
+              </a:spcBef>
+              <a:buFont typeface="Arial" panose="020B0604020202020204" pitchFamily="34" charset="0"/>
+              <a:buChar char="•"/>
+              <a:defRPr sz="1800" kern="1200">
+                <a:solidFill>
+                  <a:schemeClr val="tx1"/>
+                </a:solidFill>
+                <a:latin typeface="+mn-lt"/>
+                <a:ea typeface="+mn-ea"/>
+                <a:cs typeface="+mn-cs"/>
+              </a:defRPr>
+            </a:lvl8pPr>
+            <a:lvl9pPr marL="3886200" indent="-228600" algn="l" defTabSz="914400" rtl="0" eaLnBrk="1" latinLnBrk="0" hangingPunct="1">
+              <a:lnSpc>
+                <a:spcPct val="90000"/>
+              </a:lnSpc>
+              <a:spcBef>
+                <a:spcPts val="500"/>
+              </a:spcBef>
+              <a:buFont typeface="Arial" panose="020B0604020202020204" pitchFamily="34" charset="0"/>
+              <a:buChar char="•"/>
+              <a:defRPr sz="1800" kern="1200">
+                <a:solidFill>
+                  <a:schemeClr val="tx1"/>
+                </a:solidFill>
+                <a:latin typeface="+mn-lt"/>
+                <a:ea typeface="+mn-ea"/>
+                <a:cs typeface="+mn-cs"/>
+              </a:defRPr>
+            </a:lvl9pPr>
+          </a:lstStyle>
+          <a:p>
+            <a:pPr marL="0" indent="0" algn="ctr" rtl="1">
+              <a:buFont typeface="Arial" panose="020B0604020202020204" pitchFamily="34" charset="0"/>
+              <a:buNone/>
+            </a:pPr>
+            <a:r>
+              <a:rPr lang="he-IL" sz="3200" b="1" dirty="0"/>
+              <a:t>לחץ/י רווח להמשך</a:t>
+            </a:r>
+          </a:p>
+        </p:txBody>
+      </p:sp>
+    </p:spTree>
+    <p:extLst>
+      <p:ext uri="{BB962C8B-B14F-4D97-AF65-F5344CB8AC3E}">
+        <p14:creationId xmlns:p14="http://schemas.microsoft.com/office/powerpoint/2010/main" val="2354202686"/>
+      </p:ext>
+    </p:extLst>
+  </p:cSld>
+  <p:clrMapOvr>
+    <a:masterClrMapping/>
+  </p:clrMapOvr>
+</p:sld>
+</file>
+
 <file path=ppt/slides/slide4.xml><?xml version="1.0" encoding="utf-8"?>
 <p:sld xmlns:a="http://schemas.openxmlformats.org/drawingml/2006/main" xmlns:r="http://schemas.openxmlformats.org/officeDocument/2006/relationships" xmlns:p="http://schemas.openxmlformats.org/presentationml/2006/main">
   <p:cSld>

</xml_diff>

<commit_message>
Added instructions for Keyboard response.
</commit_message>
<xml_diff>
--- a/experiment/RUN_ME/stimuli/instructions presentation.pptx
+++ b/experiment/RUN_ME/stimuli/instructions presentation.pptx
@@ -36,6 +36,9 @@
     <p:sldId id="310" r:id="rId30"/>
     <p:sldId id="311" r:id="rId31"/>
     <p:sldId id="326" r:id="rId32"/>
+    <p:sldId id="327" r:id="rId33"/>
+    <p:sldId id="328" r:id="rId34"/>
+    <p:sldId id="329" r:id="rId35"/>
   </p:sldIdLst>
   <p:sldSz cx="12192000" cy="6858000"/>
   <p:notesSz cx="6858000" cy="9144000"/>
@@ -271,7 +274,7 @@
           <a:p>
             <a:fld id="{F999E2B6-E0C8-4E2F-B37B-1FC830B33272}" type="datetimeFigureOut">
               <a:rPr lang="en-US" smtClean="0"/>
-              <a:t>4/24/2022</a:t>
+              <a:t>4/26/2022</a:t>
             </a:fld>
             <a:endParaRPr lang="en-US"/>
           </a:p>
@@ -439,7 +442,7 @@
           <a:p>
             <a:fld id="{F999E2B6-E0C8-4E2F-B37B-1FC830B33272}" type="datetimeFigureOut">
               <a:rPr lang="en-US" smtClean="0"/>
-              <a:t>4/24/2022</a:t>
+              <a:t>4/26/2022</a:t>
             </a:fld>
             <a:endParaRPr lang="en-US"/>
           </a:p>
@@ -617,7 +620,7 @@
           <a:p>
             <a:fld id="{F999E2B6-E0C8-4E2F-B37B-1FC830B33272}" type="datetimeFigureOut">
               <a:rPr lang="en-US" smtClean="0"/>
-              <a:t>4/24/2022</a:t>
+              <a:t>4/26/2022</a:t>
             </a:fld>
             <a:endParaRPr lang="en-US"/>
           </a:p>
@@ -785,7 +788,7 @@
           <a:p>
             <a:fld id="{F999E2B6-E0C8-4E2F-B37B-1FC830B33272}" type="datetimeFigureOut">
               <a:rPr lang="en-US" smtClean="0"/>
-              <a:t>4/24/2022</a:t>
+              <a:t>4/26/2022</a:t>
             </a:fld>
             <a:endParaRPr lang="en-US"/>
           </a:p>
@@ -1030,7 +1033,7 @@
           <a:p>
             <a:fld id="{F999E2B6-E0C8-4E2F-B37B-1FC830B33272}" type="datetimeFigureOut">
               <a:rPr lang="en-US" smtClean="0"/>
-              <a:t>4/24/2022</a:t>
+              <a:t>4/26/2022</a:t>
             </a:fld>
             <a:endParaRPr lang="en-US"/>
           </a:p>
@@ -1259,7 +1262,7 @@
           <a:p>
             <a:fld id="{F999E2B6-E0C8-4E2F-B37B-1FC830B33272}" type="datetimeFigureOut">
               <a:rPr lang="en-US" smtClean="0"/>
-              <a:t>4/24/2022</a:t>
+              <a:t>4/26/2022</a:t>
             </a:fld>
             <a:endParaRPr lang="en-US"/>
           </a:p>
@@ -1623,7 +1626,7 @@
           <a:p>
             <a:fld id="{F999E2B6-E0C8-4E2F-B37B-1FC830B33272}" type="datetimeFigureOut">
               <a:rPr lang="en-US" smtClean="0"/>
-              <a:t>4/24/2022</a:t>
+              <a:t>4/26/2022</a:t>
             </a:fld>
             <a:endParaRPr lang="en-US"/>
           </a:p>
@@ -1740,7 +1743,7 @@
           <a:p>
             <a:fld id="{F999E2B6-E0C8-4E2F-B37B-1FC830B33272}" type="datetimeFigureOut">
               <a:rPr lang="en-US" smtClean="0"/>
-              <a:t>4/24/2022</a:t>
+              <a:t>4/26/2022</a:t>
             </a:fld>
             <a:endParaRPr lang="en-US"/>
           </a:p>
@@ -1835,7 +1838,7 @@
           <a:p>
             <a:fld id="{F999E2B6-E0C8-4E2F-B37B-1FC830B33272}" type="datetimeFigureOut">
               <a:rPr lang="en-US" smtClean="0"/>
-              <a:t>4/24/2022</a:t>
+              <a:t>4/26/2022</a:t>
             </a:fld>
             <a:endParaRPr lang="en-US"/>
           </a:p>
@@ -2110,7 +2113,7 @@
           <a:p>
             <a:fld id="{F999E2B6-E0C8-4E2F-B37B-1FC830B33272}" type="datetimeFigureOut">
               <a:rPr lang="en-US" smtClean="0"/>
-              <a:t>4/24/2022</a:t>
+              <a:t>4/26/2022</a:t>
             </a:fld>
             <a:endParaRPr lang="en-US"/>
           </a:p>
@@ -2362,7 +2365,7 @@
           <a:p>
             <a:fld id="{F999E2B6-E0C8-4E2F-B37B-1FC830B33272}" type="datetimeFigureOut">
               <a:rPr lang="en-US" smtClean="0"/>
-              <a:t>4/24/2022</a:t>
+              <a:t>4/26/2022</a:t>
             </a:fld>
             <a:endParaRPr lang="en-US"/>
           </a:p>
@@ -2573,7 +2576,7 @@
           <a:p>
             <a:fld id="{F999E2B6-E0C8-4E2F-B37B-1FC830B33272}" type="datetimeFigureOut">
               <a:rPr lang="en-US" smtClean="0"/>
-              <a:t>4/24/2022</a:t>
+              <a:t>4/26/2022</a:t>
             </a:fld>
             <a:endParaRPr lang="en-US"/>
           </a:p>
@@ -11530,6 +11533,1276 @@
 </p:sld>
 </file>
 
+<file path=ppt/slides/slide32.xml><?xml version="1.0" encoding="utf-8"?>
+<p:sld xmlns:a="http://schemas.openxmlformats.org/drawingml/2006/main" xmlns:r="http://schemas.openxmlformats.org/officeDocument/2006/relationships" xmlns:p="http://schemas.openxmlformats.org/presentationml/2006/main">
+  <p:cSld>
+    <p:bg>
+      <p:bgPr>
+        <a:solidFill>
+          <a:srgbClr val="7E7E7E"/>
+        </a:solidFill>
+        <a:effectLst/>
+      </p:bgPr>
+    </p:bg>
+    <p:spTree>
+      <p:nvGrpSpPr>
+        <p:cNvPr id="1" name=""/>
+        <p:cNvGrpSpPr/>
+        <p:nvPr/>
+      </p:nvGrpSpPr>
+      <p:grpSpPr>
+        <a:xfrm>
+          <a:off x="0" y="0"/>
+          <a:ext cx="0" cy="0"/>
+          <a:chOff x="0" y="0"/>
+          <a:chExt cx="0" cy="0"/>
+        </a:xfrm>
+      </p:grpSpPr>
+      <p:sp>
+        <p:nvSpPr>
+          <p:cNvPr id="6" name="Content Placeholder 2">
+            <a:extLst>
+              <a:ext uri="{FF2B5EF4-FFF2-40B4-BE49-F238E27FC236}">
+                <a16:creationId xmlns:a16="http://schemas.microsoft.com/office/drawing/2014/main" id="{747102BF-A698-444E-B693-3BC2E2F22350}"/>
+              </a:ext>
+            </a:extLst>
+          </p:cNvPr>
+          <p:cNvSpPr txBox="1">
+            <a:spLocks/>
+          </p:cNvSpPr>
+          <p:nvPr/>
+        </p:nvSpPr>
+        <p:spPr>
+          <a:xfrm>
+            <a:off x="691816" y="48359"/>
+            <a:ext cx="10808368" cy="1683685"/>
+          </a:xfrm>
+          <a:prstGeom prst="rect">
+            <a:avLst/>
+          </a:prstGeom>
+        </p:spPr>
+        <p:txBody>
+          <a:bodyPr vert="horz" lIns="91440" tIns="45720" rIns="91440" bIns="45720" rtlCol="0">
+            <a:normAutofit/>
+          </a:bodyPr>
+          <a:lstStyle>
+            <a:lvl1pPr marL="228600" indent="-228600" algn="l" defTabSz="914400" rtl="0" eaLnBrk="1" latinLnBrk="0" hangingPunct="1">
+              <a:lnSpc>
+                <a:spcPct val="90000"/>
+              </a:lnSpc>
+              <a:spcBef>
+                <a:spcPts val="1000"/>
+              </a:spcBef>
+              <a:buFont typeface="Arial" panose="020B0604020202020204" pitchFamily="34" charset="0"/>
+              <a:buChar char="•"/>
+              <a:defRPr sz="2800" kern="1200">
+                <a:solidFill>
+                  <a:schemeClr val="tx1"/>
+                </a:solidFill>
+                <a:latin typeface="+mn-lt"/>
+                <a:ea typeface="+mn-ea"/>
+                <a:cs typeface="+mn-cs"/>
+              </a:defRPr>
+            </a:lvl1pPr>
+            <a:lvl2pPr marL="685800" indent="-228600" algn="l" defTabSz="914400" rtl="0" eaLnBrk="1" latinLnBrk="0" hangingPunct="1">
+              <a:lnSpc>
+                <a:spcPct val="90000"/>
+              </a:lnSpc>
+              <a:spcBef>
+                <a:spcPts val="500"/>
+              </a:spcBef>
+              <a:buFont typeface="Arial" panose="020B0604020202020204" pitchFamily="34" charset="0"/>
+              <a:buChar char="•"/>
+              <a:defRPr sz="2400" kern="1200">
+                <a:solidFill>
+                  <a:schemeClr val="tx1"/>
+                </a:solidFill>
+                <a:latin typeface="+mn-lt"/>
+                <a:ea typeface="+mn-ea"/>
+                <a:cs typeface="+mn-cs"/>
+              </a:defRPr>
+            </a:lvl2pPr>
+            <a:lvl3pPr marL="1143000" indent="-228600" algn="l" defTabSz="914400" rtl="0" eaLnBrk="1" latinLnBrk="0" hangingPunct="1">
+              <a:lnSpc>
+                <a:spcPct val="90000"/>
+              </a:lnSpc>
+              <a:spcBef>
+                <a:spcPts val="500"/>
+              </a:spcBef>
+              <a:buFont typeface="Arial" panose="020B0604020202020204" pitchFamily="34" charset="0"/>
+              <a:buChar char="•"/>
+              <a:defRPr sz="2000" kern="1200">
+                <a:solidFill>
+                  <a:schemeClr val="tx1"/>
+                </a:solidFill>
+                <a:latin typeface="+mn-lt"/>
+                <a:ea typeface="+mn-ea"/>
+                <a:cs typeface="+mn-cs"/>
+              </a:defRPr>
+            </a:lvl3pPr>
+            <a:lvl4pPr marL="1600200" indent="-228600" algn="l" defTabSz="914400" rtl="0" eaLnBrk="1" latinLnBrk="0" hangingPunct="1">
+              <a:lnSpc>
+                <a:spcPct val="90000"/>
+              </a:lnSpc>
+              <a:spcBef>
+                <a:spcPts val="500"/>
+              </a:spcBef>
+              <a:buFont typeface="Arial" panose="020B0604020202020204" pitchFamily="34" charset="0"/>
+              <a:buChar char="•"/>
+              <a:defRPr sz="1800" kern="1200">
+                <a:solidFill>
+                  <a:schemeClr val="tx1"/>
+                </a:solidFill>
+                <a:latin typeface="+mn-lt"/>
+                <a:ea typeface="+mn-ea"/>
+                <a:cs typeface="+mn-cs"/>
+              </a:defRPr>
+            </a:lvl4pPr>
+            <a:lvl5pPr marL="2057400" indent="-228600" algn="l" defTabSz="914400" rtl="0" eaLnBrk="1" latinLnBrk="0" hangingPunct="1">
+              <a:lnSpc>
+                <a:spcPct val="90000"/>
+              </a:lnSpc>
+              <a:spcBef>
+                <a:spcPts val="500"/>
+              </a:spcBef>
+              <a:buFont typeface="Arial" panose="020B0604020202020204" pitchFamily="34" charset="0"/>
+              <a:buChar char="•"/>
+              <a:defRPr sz="1800" kern="1200">
+                <a:solidFill>
+                  <a:schemeClr val="tx1"/>
+                </a:solidFill>
+                <a:latin typeface="+mn-lt"/>
+                <a:ea typeface="+mn-ea"/>
+                <a:cs typeface="+mn-cs"/>
+              </a:defRPr>
+            </a:lvl5pPr>
+            <a:lvl6pPr marL="2514600" indent="-228600" algn="l" defTabSz="914400" rtl="0" eaLnBrk="1" latinLnBrk="0" hangingPunct="1">
+              <a:lnSpc>
+                <a:spcPct val="90000"/>
+              </a:lnSpc>
+              <a:spcBef>
+                <a:spcPts val="500"/>
+              </a:spcBef>
+              <a:buFont typeface="Arial" panose="020B0604020202020204" pitchFamily="34" charset="0"/>
+              <a:buChar char="•"/>
+              <a:defRPr sz="1800" kern="1200">
+                <a:solidFill>
+                  <a:schemeClr val="tx1"/>
+                </a:solidFill>
+                <a:latin typeface="+mn-lt"/>
+                <a:ea typeface="+mn-ea"/>
+                <a:cs typeface="+mn-cs"/>
+              </a:defRPr>
+            </a:lvl6pPr>
+            <a:lvl7pPr marL="2971800" indent="-228600" algn="l" defTabSz="914400" rtl="0" eaLnBrk="1" latinLnBrk="0" hangingPunct="1">
+              <a:lnSpc>
+                <a:spcPct val="90000"/>
+              </a:lnSpc>
+              <a:spcBef>
+                <a:spcPts val="500"/>
+              </a:spcBef>
+              <a:buFont typeface="Arial" panose="020B0604020202020204" pitchFamily="34" charset="0"/>
+              <a:buChar char="•"/>
+              <a:defRPr sz="1800" kern="1200">
+                <a:solidFill>
+                  <a:schemeClr val="tx1"/>
+                </a:solidFill>
+                <a:latin typeface="+mn-lt"/>
+                <a:ea typeface="+mn-ea"/>
+                <a:cs typeface="+mn-cs"/>
+              </a:defRPr>
+            </a:lvl7pPr>
+            <a:lvl8pPr marL="3429000" indent="-228600" algn="l" defTabSz="914400" rtl="0" eaLnBrk="1" latinLnBrk="0" hangingPunct="1">
+              <a:lnSpc>
+                <a:spcPct val="90000"/>
+              </a:lnSpc>
+              <a:spcBef>
+                <a:spcPts val="500"/>
+              </a:spcBef>
+              <a:buFont typeface="Arial" panose="020B0604020202020204" pitchFamily="34" charset="0"/>
+              <a:buChar char="•"/>
+              <a:defRPr sz="1800" kern="1200">
+                <a:solidFill>
+                  <a:schemeClr val="tx1"/>
+                </a:solidFill>
+                <a:latin typeface="+mn-lt"/>
+                <a:ea typeface="+mn-ea"/>
+                <a:cs typeface="+mn-cs"/>
+              </a:defRPr>
+            </a:lvl8pPr>
+            <a:lvl9pPr marL="3886200" indent="-228600" algn="l" defTabSz="914400" rtl="0" eaLnBrk="1" latinLnBrk="0" hangingPunct="1">
+              <a:lnSpc>
+                <a:spcPct val="90000"/>
+              </a:lnSpc>
+              <a:spcBef>
+                <a:spcPts val="500"/>
+              </a:spcBef>
+              <a:buFont typeface="Arial" panose="020B0604020202020204" pitchFamily="34" charset="0"/>
+              <a:buChar char="•"/>
+              <a:defRPr sz="1800" kern="1200">
+                <a:solidFill>
+                  <a:schemeClr val="tx1"/>
+                </a:solidFill>
+                <a:latin typeface="+mn-lt"/>
+                <a:ea typeface="+mn-ea"/>
+                <a:cs typeface="+mn-cs"/>
+              </a:defRPr>
+            </a:lvl9pPr>
+          </a:lstStyle>
+          <a:p>
+            <a:pPr marL="0" indent="0" algn="ctr" rtl="1">
+              <a:buFont typeface="Arial" panose="020B0604020202020204" pitchFamily="34" charset="0"/>
+              <a:buNone/>
+            </a:pPr>
+            <a:r>
+              <a:rPr lang="he-IL" sz="3200" b="1" u="sng" dirty="0"/>
+              <a:t>מתן תגובה באמצעות המקלדת</a:t>
+            </a:r>
+          </a:p>
+          <a:p>
+            <a:pPr marL="0" indent="0" algn="ctr" rtl="1">
+              <a:buFont typeface="Arial" panose="020B0604020202020204" pitchFamily="34" charset="0"/>
+              <a:buNone/>
+            </a:pPr>
+            <a:r>
+              <a:rPr lang="he-IL" sz="3200" dirty="0"/>
+              <a:t>על מנת לבחור את התשובה השמאלית לחץ על "</a:t>
+            </a:r>
+            <a:r>
+              <a:rPr lang="en-US" sz="3200" dirty="0"/>
+              <a:t>F</a:t>
+            </a:r>
+            <a:r>
+              <a:rPr lang="he-IL" sz="3200" dirty="0"/>
+              <a:t>",</a:t>
+            </a:r>
+          </a:p>
+          <a:p>
+            <a:pPr marL="0" indent="0" algn="ctr" rtl="1">
+              <a:buFont typeface="Arial" panose="020B0604020202020204" pitchFamily="34" charset="0"/>
+              <a:buNone/>
+            </a:pPr>
+            <a:r>
+              <a:rPr lang="he-IL" sz="3200" dirty="0"/>
+              <a:t>על מנת לבחור את התשובה הימנית לחץ על "</a:t>
+            </a:r>
+            <a:r>
+              <a:rPr lang="en-US" sz="3200" dirty="0"/>
+              <a:t>J</a:t>
+            </a:r>
+            <a:r>
+              <a:rPr lang="he-IL" sz="3200" dirty="0"/>
+              <a:t>".</a:t>
+            </a:r>
+            <a:endParaRPr lang="en-US" sz="2000" dirty="0"/>
+          </a:p>
+        </p:txBody>
+      </p:sp>
+      <p:pic>
+        <p:nvPicPr>
+          <p:cNvPr id="3" name="Picture 2" descr="Graphical user interface, application&#10;&#10;Description automatically generated">
+            <a:extLst>
+              <a:ext uri="{FF2B5EF4-FFF2-40B4-BE49-F238E27FC236}">
+                <a16:creationId xmlns:a16="http://schemas.microsoft.com/office/drawing/2014/main" id="{A971F69B-71B8-44D7-9EE5-CBF13C37E210}"/>
+              </a:ext>
+            </a:extLst>
+          </p:cNvPr>
+          <p:cNvPicPr>
+            <a:picLocks noChangeAspect="1"/>
+          </p:cNvPicPr>
+          <p:nvPr/>
+        </p:nvPicPr>
+        <p:blipFill rotWithShape="1">
+          <a:blip r:embed="rId2">
+            <a:extLst>
+              <a:ext uri="{28A0092B-C50C-407E-A947-70E740481C1C}">
+                <a14:useLocalDpi xmlns:a14="http://schemas.microsoft.com/office/drawing/2010/main" val="0"/>
+              </a:ext>
+            </a:extLst>
+          </a:blip>
+          <a:srcRect t="25923" b="32093"/>
+          <a:stretch/>
+        </p:blipFill>
+        <p:spPr>
+          <a:xfrm>
+            <a:off x="0" y="2020187"/>
+            <a:ext cx="12192000" cy="2879296"/>
+          </a:xfrm>
+          <a:prstGeom prst="rect">
+            <a:avLst/>
+          </a:prstGeom>
+        </p:spPr>
+      </p:pic>
+      <p:sp>
+        <p:nvSpPr>
+          <p:cNvPr id="4" name="Content Placeholder 2">
+            <a:extLst>
+              <a:ext uri="{FF2B5EF4-FFF2-40B4-BE49-F238E27FC236}">
+                <a16:creationId xmlns:a16="http://schemas.microsoft.com/office/drawing/2014/main" id="{0EF15924-C51F-4220-99AC-919F3DEBCC13}"/>
+              </a:ext>
+            </a:extLst>
+          </p:cNvPr>
+          <p:cNvSpPr txBox="1">
+            <a:spLocks/>
+          </p:cNvSpPr>
+          <p:nvPr/>
+        </p:nvSpPr>
+        <p:spPr>
+          <a:xfrm>
+            <a:off x="691816" y="2068033"/>
+            <a:ext cx="10808368" cy="559824"/>
+          </a:xfrm>
+          <a:prstGeom prst="rect">
+            <a:avLst/>
+          </a:prstGeom>
+          <a:solidFill>
+            <a:srgbClr val="7E7E7E"/>
+          </a:solidFill>
+        </p:spPr>
+        <p:txBody>
+          <a:bodyPr vert="horz" lIns="91440" tIns="45720" rIns="91440" bIns="45720" rtlCol="0">
+            <a:normAutofit/>
+          </a:bodyPr>
+          <a:lstStyle>
+            <a:lvl1pPr marL="228600" indent="-228600" algn="l" defTabSz="914400" rtl="0" eaLnBrk="1" latinLnBrk="0" hangingPunct="1">
+              <a:lnSpc>
+                <a:spcPct val="90000"/>
+              </a:lnSpc>
+              <a:spcBef>
+                <a:spcPts val="1000"/>
+              </a:spcBef>
+              <a:buFont typeface="Arial" panose="020B0604020202020204" pitchFamily="34" charset="0"/>
+              <a:buChar char="•"/>
+              <a:defRPr sz="2800" kern="1200">
+                <a:solidFill>
+                  <a:schemeClr val="tx1"/>
+                </a:solidFill>
+                <a:latin typeface="+mn-lt"/>
+                <a:ea typeface="+mn-ea"/>
+                <a:cs typeface="+mn-cs"/>
+              </a:defRPr>
+            </a:lvl1pPr>
+            <a:lvl2pPr marL="685800" indent="-228600" algn="l" defTabSz="914400" rtl="0" eaLnBrk="1" latinLnBrk="0" hangingPunct="1">
+              <a:lnSpc>
+                <a:spcPct val="90000"/>
+              </a:lnSpc>
+              <a:spcBef>
+                <a:spcPts val="500"/>
+              </a:spcBef>
+              <a:buFont typeface="Arial" panose="020B0604020202020204" pitchFamily="34" charset="0"/>
+              <a:buChar char="•"/>
+              <a:defRPr sz="2400" kern="1200">
+                <a:solidFill>
+                  <a:schemeClr val="tx1"/>
+                </a:solidFill>
+                <a:latin typeface="+mn-lt"/>
+                <a:ea typeface="+mn-ea"/>
+                <a:cs typeface="+mn-cs"/>
+              </a:defRPr>
+            </a:lvl2pPr>
+            <a:lvl3pPr marL="1143000" indent="-228600" algn="l" defTabSz="914400" rtl="0" eaLnBrk="1" latinLnBrk="0" hangingPunct="1">
+              <a:lnSpc>
+                <a:spcPct val="90000"/>
+              </a:lnSpc>
+              <a:spcBef>
+                <a:spcPts val="500"/>
+              </a:spcBef>
+              <a:buFont typeface="Arial" panose="020B0604020202020204" pitchFamily="34" charset="0"/>
+              <a:buChar char="•"/>
+              <a:defRPr sz="2000" kern="1200">
+                <a:solidFill>
+                  <a:schemeClr val="tx1"/>
+                </a:solidFill>
+                <a:latin typeface="+mn-lt"/>
+                <a:ea typeface="+mn-ea"/>
+                <a:cs typeface="+mn-cs"/>
+              </a:defRPr>
+            </a:lvl3pPr>
+            <a:lvl4pPr marL="1600200" indent="-228600" algn="l" defTabSz="914400" rtl="0" eaLnBrk="1" latinLnBrk="0" hangingPunct="1">
+              <a:lnSpc>
+                <a:spcPct val="90000"/>
+              </a:lnSpc>
+              <a:spcBef>
+                <a:spcPts val="500"/>
+              </a:spcBef>
+              <a:buFont typeface="Arial" panose="020B0604020202020204" pitchFamily="34" charset="0"/>
+              <a:buChar char="•"/>
+              <a:defRPr sz="1800" kern="1200">
+                <a:solidFill>
+                  <a:schemeClr val="tx1"/>
+                </a:solidFill>
+                <a:latin typeface="+mn-lt"/>
+                <a:ea typeface="+mn-ea"/>
+                <a:cs typeface="+mn-cs"/>
+              </a:defRPr>
+            </a:lvl4pPr>
+            <a:lvl5pPr marL="2057400" indent="-228600" algn="l" defTabSz="914400" rtl="0" eaLnBrk="1" latinLnBrk="0" hangingPunct="1">
+              <a:lnSpc>
+                <a:spcPct val="90000"/>
+              </a:lnSpc>
+              <a:spcBef>
+                <a:spcPts val="500"/>
+              </a:spcBef>
+              <a:buFont typeface="Arial" panose="020B0604020202020204" pitchFamily="34" charset="0"/>
+              <a:buChar char="•"/>
+              <a:defRPr sz="1800" kern="1200">
+                <a:solidFill>
+                  <a:schemeClr val="tx1"/>
+                </a:solidFill>
+                <a:latin typeface="+mn-lt"/>
+                <a:ea typeface="+mn-ea"/>
+                <a:cs typeface="+mn-cs"/>
+              </a:defRPr>
+            </a:lvl5pPr>
+            <a:lvl6pPr marL="2514600" indent="-228600" algn="l" defTabSz="914400" rtl="0" eaLnBrk="1" latinLnBrk="0" hangingPunct="1">
+              <a:lnSpc>
+                <a:spcPct val="90000"/>
+              </a:lnSpc>
+              <a:spcBef>
+                <a:spcPts val="500"/>
+              </a:spcBef>
+              <a:buFont typeface="Arial" panose="020B0604020202020204" pitchFamily="34" charset="0"/>
+              <a:buChar char="•"/>
+              <a:defRPr sz="1800" kern="1200">
+                <a:solidFill>
+                  <a:schemeClr val="tx1"/>
+                </a:solidFill>
+                <a:latin typeface="+mn-lt"/>
+                <a:ea typeface="+mn-ea"/>
+                <a:cs typeface="+mn-cs"/>
+              </a:defRPr>
+            </a:lvl6pPr>
+            <a:lvl7pPr marL="2971800" indent="-228600" algn="l" defTabSz="914400" rtl="0" eaLnBrk="1" latinLnBrk="0" hangingPunct="1">
+              <a:lnSpc>
+                <a:spcPct val="90000"/>
+              </a:lnSpc>
+              <a:spcBef>
+                <a:spcPts val="500"/>
+              </a:spcBef>
+              <a:buFont typeface="Arial" panose="020B0604020202020204" pitchFamily="34" charset="0"/>
+              <a:buChar char="•"/>
+              <a:defRPr sz="1800" kern="1200">
+                <a:solidFill>
+                  <a:schemeClr val="tx1"/>
+                </a:solidFill>
+                <a:latin typeface="+mn-lt"/>
+                <a:ea typeface="+mn-ea"/>
+                <a:cs typeface="+mn-cs"/>
+              </a:defRPr>
+            </a:lvl7pPr>
+            <a:lvl8pPr marL="3429000" indent="-228600" algn="l" defTabSz="914400" rtl="0" eaLnBrk="1" latinLnBrk="0" hangingPunct="1">
+              <a:lnSpc>
+                <a:spcPct val="90000"/>
+              </a:lnSpc>
+              <a:spcBef>
+                <a:spcPts val="500"/>
+              </a:spcBef>
+              <a:buFont typeface="Arial" panose="020B0604020202020204" pitchFamily="34" charset="0"/>
+              <a:buChar char="•"/>
+              <a:defRPr sz="1800" kern="1200">
+                <a:solidFill>
+                  <a:schemeClr val="tx1"/>
+                </a:solidFill>
+                <a:latin typeface="+mn-lt"/>
+                <a:ea typeface="+mn-ea"/>
+                <a:cs typeface="+mn-cs"/>
+              </a:defRPr>
+            </a:lvl8pPr>
+            <a:lvl9pPr marL="3886200" indent="-228600" algn="l" defTabSz="914400" rtl="0" eaLnBrk="1" latinLnBrk="0" hangingPunct="1">
+              <a:lnSpc>
+                <a:spcPct val="90000"/>
+              </a:lnSpc>
+              <a:spcBef>
+                <a:spcPts val="500"/>
+              </a:spcBef>
+              <a:buFont typeface="Arial" panose="020B0604020202020204" pitchFamily="34" charset="0"/>
+              <a:buChar char="•"/>
+              <a:defRPr sz="1800" kern="1200">
+                <a:solidFill>
+                  <a:schemeClr val="tx1"/>
+                </a:solidFill>
+                <a:latin typeface="+mn-lt"/>
+                <a:ea typeface="+mn-ea"/>
+                <a:cs typeface="+mn-cs"/>
+              </a:defRPr>
+            </a:lvl9pPr>
+          </a:lstStyle>
+          <a:p>
+            <a:pPr marL="0" indent="0" algn="ctr" rtl="1">
+              <a:buFont typeface="Arial" panose="020B0604020202020204" pitchFamily="34" charset="0"/>
+              <a:buNone/>
+            </a:pPr>
+            <a:r>
+              <a:rPr lang="he-IL" sz="3200" b="1" dirty="0"/>
+              <a:t>תשובה 1                           תשובה 2 </a:t>
+            </a:r>
+            <a:endParaRPr lang="en-US" sz="2000" b="1" dirty="0"/>
+          </a:p>
+        </p:txBody>
+      </p:sp>
+    </p:spTree>
+    <p:extLst>
+      <p:ext uri="{BB962C8B-B14F-4D97-AF65-F5344CB8AC3E}">
+        <p14:creationId xmlns:p14="http://schemas.microsoft.com/office/powerpoint/2010/main" val="3718820983"/>
+      </p:ext>
+    </p:extLst>
+  </p:cSld>
+  <p:clrMapOvr>
+    <a:masterClrMapping/>
+  </p:clrMapOvr>
+</p:sld>
+</file>
+
+<file path=ppt/slides/slide33.xml><?xml version="1.0" encoding="utf-8"?>
+<p:sld xmlns:a="http://schemas.openxmlformats.org/drawingml/2006/main" xmlns:r="http://schemas.openxmlformats.org/officeDocument/2006/relationships" xmlns:p="http://schemas.openxmlformats.org/presentationml/2006/main">
+  <p:cSld>
+    <p:bg>
+      <p:bgPr>
+        <a:solidFill>
+          <a:srgbClr val="7E7E7E"/>
+        </a:solidFill>
+        <a:effectLst/>
+      </p:bgPr>
+    </p:bg>
+    <p:spTree>
+      <p:nvGrpSpPr>
+        <p:cNvPr id="1" name=""/>
+        <p:cNvGrpSpPr/>
+        <p:nvPr/>
+      </p:nvGrpSpPr>
+      <p:grpSpPr>
+        <a:xfrm>
+          <a:off x="0" y="0"/>
+          <a:ext cx="0" cy="0"/>
+          <a:chOff x="0" y="0"/>
+          <a:chExt cx="0" cy="0"/>
+        </a:xfrm>
+      </p:grpSpPr>
+      <p:sp>
+        <p:nvSpPr>
+          <p:cNvPr id="6" name="Content Placeholder 2">
+            <a:extLst>
+              <a:ext uri="{FF2B5EF4-FFF2-40B4-BE49-F238E27FC236}">
+                <a16:creationId xmlns:a16="http://schemas.microsoft.com/office/drawing/2014/main" id="{747102BF-A698-444E-B693-3BC2E2F22350}"/>
+              </a:ext>
+            </a:extLst>
+          </p:cNvPr>
+          <p:cNvSpPr txBox="1">
+            <a:spLocks/>
+          </p:cNvSpPr>
+          <p:nvPr/>
+        </p:nvSpPr>
+        <p:spPr>
+          <a:xfrm>
+            <a:off x="691816" y="184456"/>
+            <a:ext cx="10808368" cy="1367898"/>
+          </a:xfrm>
+          <a:prstGeom prst="rect">
+            <a:avLst/>
+          </a:prstGeom>
+        </p:spPr>
+        <p:txBody>
+          <a:bodyPr vert="horz" lIns="91440" tIns="45720" rIns="91440" bIns="45720" rtlCol="0">
+            <a:normAutofit/>
+          </a:bodyPr>
+          <a:lstStyle>
+            <a:lvl1pPr marL="228600" indent="-228600" algn="l" defTabSz="914400" rtl="0" eaLnBrk="1" latinLnBrk="0" hangingPunct="1">
+              <a:lnSpc>
+                <a:spcPct val="90000"/>
+              </a:lnSpc>
+              <a:spcBef>
+                <a:spcPts val="1000"/>
+              </a:spcBef>
+              <a:buFont typeface="Arial" panose="020B0604020202020204" pitchFamily="34" charset="0"/>
+              <a:buChar char="•"/>
+              <a:defRPr sz="2800" kern="1200">
+                <a:solidFill>
+                  <a:schemeClr val="tx1"/>
+                </a:solidFill>
+                <a:latin typeface="+mn-lt"/>
+                <a:ea typeface="+mn-ea"/>
+                <a:cs typeface="+mn-cs"/>
+              </a:defRPr>
+            </a:lvl1pPr>
+            <a:lvl2pPr marL="685800" indent="-228600" algn="l" defTabSz="914400" rtl="0" eaLnBrk="1" latinLnBrk="0" hangingPunct="1">
+              <a:lnSpc>
+                <a:spcPct val="90000"/>
+              </a:lnSpc>
+              <a:spcBef>
+                <a:spcPts val="500"/>
+              </a:spcBef>
+              <a:buFont typeface="Arial" panose="020B0604020202020204" pitchFamily="34" charset="0"/>
+              <a:buChar char="•"/>
+              <a:defRPr sz="2400" kern="1200">
+                <a:solidFill>
+                  <a:schemeClr val="tx1"/>
+                </a:solidFill>
+                <a:latin typeface="+mn-lt"/>
+                <a:ea typeface="+mn-ea"/>
+                <a:cs typeface="+mn-cs"/>
+              </a:defRPr>
+            </a:lvl2pPr>
+            <a:lvl3pPr marL="1143000" indent="-228600" algn="l" defTabSz="914400" rtl="0" eaLnBrk="1" latinLnBrk="0" hangingPunct="1">
+              <a:lnSpc>
+                <a:spcPct val="90000"/>
+              </a:lnSpc>
+              <a:spcBef>
+                <a:spcPts val="500"/>
+              </a:spcBef>
+              <a:buFont typeface="Arial" panose="020B0604020202020204" pitchFamily="34" charset="0"/>
+              <a:buChar char="•"/>
+              <a:defRPr sz="2000" kern="1200">
+                <a:solidFill>
+                  <a:schemeClr val="tx1"/>
+                </a:solidFill>
+                <a:latin typeface="+mn-lt"/>
+                <a:ea typeface="+mn-ea"/>
+                <a:cs typeface="+mn-cs"/>
+              </a:defRPr>
+            </a:lvl3pPr>
+            <a:lvl4pPr marL="1600200" indent="-228600" algn="l" defTabSz="914400" rtl="0" eaLnBrk="1" latinLnBrk="0" hangingPunct="1">
+              <a:lnSpc>
+                <a:spcPct val="90000"/>
+              </a:lnSpc>
+              <a:spcBef>
+                <a:spcPts val="500"/>
+              </a:spcBef>
+              <a:buFont typeface="Arial" panose="020B0604020202020204" pitchFamily="34" charset="0"/>
+              <a:buChar char="•"/>
+              <a:defRPr sz="1800" kern="1200">
+                <a:solidFill>
+                  <a:schemeClr val="tx1"/>
+                </a:solidFill>
+                <a:latin typeface="+mn-lt"/>
+                <a:ea typeface="+mn-ea"/>
+                <a:cs typeface="+mn-cs"/>
+              </a:defRPr>
+            </a:lvl4pPr>
+            <a:lvl5pPr marL="2057400" indent="-228600" algn="l" defTabSz="914400" rtl="0" eaLnBrk="1" latinLnBrk="0" hangingPunct="1">
+              <a:lnSpc>
+                <a:spcPct val="90000"/>
+              </a:lnSpc>
+              <a:spcBef>
+                <a:spcPts val="500"/>
+              </a:spcBef>
+              <a:buFont typeface="Arial" panose="020B0604020202020204" pitchFamily="34" charset="0"/>
+              <a:buChar char="•"/>
+              <a:defRPr sz="1800" kern="1200">
+                <a:solidFill>
+                  <a:schemeClr val="tx1"/>
+                </a:solidFill>
+                <a:latin typeface="+mn-lt"/>
+                <a:ea typeface="+mn-ea"/>
+                <a:cs typeface="+mn-cs"/>
+              </a:defRPr>
+            </a:lvl5pPr>
+            <a:lvl6pPr marL="2514600" indent="-228600" algn="l" defTabSz="914400" rtl="0" eaLnBrk="1" latinLnBrk="0" hangingPunct="1">
+              <a:lnSpc>
+                <a:spcPct val="90000"/>
+              </a:lnSpc>
+              <a:spcBef>
+                <a:spcPts val="500"/>
+              </a:spcBef>
+              <a:buFont typeface="Arial" panose="020B0604020202020204" pitchFamily="34" charset="0"/>
+              <a:buChar char="•"/>
+              <a:defRPr sz="1800" kern="1200">
+                <a:solidFill>
+                  <a:schemeClr val="tx1"/>
+                </a:solidFill>
+                <a:latin typeface="+mn-lt"/>
+                <a:ea typeface="+mn-ea"/>
+                <a:cs typeface="+mn-cs"/>
+              </a:defRPr>
+            </a:lvl6pPr>
+            <a:lvl7pPr marL="2971800" indent="-228600" algn="l" defTabSz="914400" rtl="0" eaLnBrk="1" latinLnBrk="0" hangingPunct="1">
+              <a:lnSpc>
+                <a:spcPct val="90000"/>
+              </a:lnSpc>
+              <a:spcBef>
+                <a:spcPts val="500"/>
+              </a:spcBef>
+              <a:buFont typeface="Arial" panose="020B0604020202020204" pitchFamily="34" charset="0"/>
+              <a:buChar char="•"/>
+              <a:defRPr sz="1800" kern="1200">
+                <a:solidFill>
+                  <a:schemeClr val="tx1"/>
+                </a:solidFill>
+                <a:latin typeface="+mn-lt"/>
+                <a:ea typeface="+mn-ea"/>
+                <a:cs typeface="+mn-cs"/>
+              </a:defRPr>
+            </a:lvl7pPr>
+            <a:lvl8pPr marL="3429000" indent="-228600" algn="l" defTabSz="914400" rtl="0" eaLnBrk="1" latinLnBrk="0" hangingPunct="1">
+              <a:lnSpc>
+                <a:spcPct val="90000"/>
+              </a:lnSpc>
+              <a:spcBef>
+                <a:spcPts val="500"/>
+              </a:spcBef>
+              <a:buFont typeface="Arial" panose="020B0604020202020204" pitchFamily="34" charset="0"/>
+              <a:buChar char="•"/>
+              <a:defRPr sz="1800" kern="1200">
+                <a:solidFill>
+                  <a:schemeClr val="tx1"/>
+                </a:solidFill>
+                <a:latin typeface="+mn-lt"/>
+                <a:ea typeface="+mn-ea"/>
+                <a:cs typeface="+mn-cs"/>
+              </a:defRPr>
+            </a:lvl8pPr>
+            <a:lvl9pPr marL="3886200" indent="-228600" algn="l" defTabSz="914400" rtl="0" eaLnBrk="1" latinLnBrk="0" hangingPunct="1">
+              <a:lnSpc>
+                <a:spcPct val="90000"/>
+              </a:lnSpc>
+              <a:spcBef>
+                <a:spcPts val="500"/>
+              </a:spcBef>
+              <a:buFont typeface="Arial" panose="020B0604020202020204" pitchFamily="34" charset="0"/>
+              <a:buChar char="•"/>
+              <a:defRPr sz="1800" kern="1200">
+                <a:solidFill>
+                  <a:schemeClr val="tx1"/>
+                </a:solidFill>
+                <a:latin typeface="+mn-lt"/>
+                <a:ea typeface="+mn-ea"/>
+                <a:cs typeface="+mn-cs"/>
+              </a:defRPr>
+            </a:lvl9pPr>
+          </a:lstStyle>
+          <a:p>
+            <a:pPr marL="0" indent="0" algn="ctr" rtl="1">
+              <a:buFont typeface="Arial" panose="020B0604020202020204" pitchFamily="34" charset="0"/>
+              <a:buNone/>
+            </a:pPr>
+            <a:r>
+              <a:rPr lang="he-IL" sz="3200" b="1" u="sng" dirty="0"/>
+              <a:t>מתן תגובה באמצעות המקלדת</a:t>
+            </a:r>
+          </a:p>
+          <a:p>
+            <a:pPr marL="0" indent="0" algn="ctr" rtl="1">
+              <a:buFont typeface="Arial" panose="020B0604020202020204" pitchFamily="34" charset="0"/>
+              <a:buNone/>
+            </a:pPr>
+            <a:r>
+              <a:rPr lang="he-IL" sz="3200" dirty="0"/>
+              <a:t>על מנת לבחור תשובה, גע עם האצבע המורה בעיגול שמתחתיה.</a:t>
+            </a:r>
+            <a:endParaRPr lang="en-US" sz="2000" dirty="0"/>
+          </a:p>
+        </p:txBody>
+      </p:sp>
+      <p:pic>
+        <p:nvPicPr>
+          <p:cNvPr id="3" name="Picture 2" descr="Graphical user interface, application&#10;&#10;Description automatically generated">
+            <a:extLst>
+              <a:ext uri="{FF2B5EF4-FFF2-40B4-BE49-F238E27FC236}">
+                <a16:creationId xmlns:a16="http://schemas.microsoft.com/office/drawing/2014/main" id="{BB7A3934-1B99-444F-9A67-C8E9D01FA96D}"/>
+              </a:ext>
+            </a:extLst>
+          </p:cNvPr>
+          <p:cNvPicPr>
+            <a:picLocks noChangeAspect="1"/>
+          </p:cNvPicPr>
+          <p:nvPr/>
+        </p:nvPicPr>
+        <p:blipFill rotWithShape="1">
+          <a:blip r:embed="rId2">
+            <a:extLst>
+              <a:ext uri="{28A0092B-C50C-407E-A947-70E740481C1C}">
+                <a14:useLocalDpi xmlns:a14="http://schemas.microsoft.com/office/drawing/2010/main" val="0"/>
+              </a:ext>
+            </a:extLst>
+          </a:blip>
+          <a:srcRect t="25923" b="32093"/>
+          <a:stretch/>
+        </p:blipFill>
+        <p:spPr>
+          <a:xfrm>
+            <a:off x="0" y="2020187"/>
+            <a:ext cx="12192000" cy="2879296"/>
+          </a:xfrm>
+          <a:prstGeom prst="rect">
+            <a:avLst/>
+          </a:prstGeom>
+        </p:spPr>
+      </p:pic>
+      <p:sp>
+        <p:nvSpPr>
+          <p:cNvPr id="5" name="Content Placeholder 2">
+            <a:extLst>
+              <a:ext uri="{FF2B5EF4-FFF2-40B4-BE49-F238E27FC236}">
+                <a16:creationId xmlns:a16="http://schemas.microsoft.com/office/drawing/2014/main" id="{91C3D272-F29D-4A74-98CD-F4C792C74F48}"/>
+              </a:ext>
+            </a:extLst>
+          </p:cNvPr>
+          <p:cNvSpPr txBox="1">
+            <a:spLocks/>
+          </p:cNvSpPr>
+          <p:nvPr/>
+        </p:nvSpPr>
+        <p:spPr>
+          <a:xfrm>
+            <a:off x="691816" y="2068033"/>
+            <a:ext cx="10808368" cy="559824"/>
+          </a:xfrm>
+          <a:prstGeom prst="rect">
+            <a:avLst/>
+          </a:prstGeom>
+          <a:solidFill>
+            <a:srgbClr val="7E7E7E"/>
+          </a:solidFill>
+        </p:spPr>
+        <p:txBody>
+          <a:bodyPr vert="horz" lIns="91440" tIns="45720" rIns="91440" bIns="45720" rtlCol="0">
+            <a:normAutofit/>
+          </a:bodyPr>
+          <a:lstStyle>
+            <a:lvl1pPr marL="228600" indent="-228600" algn="l" defTabSz="914400" rtl="0" eaLnBrk="1" latinLnBrk="0" hangingPunct="1">
+              <a:lnSpc>
+                <a:spcPct val="90000"/>
+              </a:lnSpc>
+              <a:spcBef>
+                <a:spcPts val="1000"/>
+              </a:spcBef>
+              <a:buFont typeface="Arial" panose="020B0604020202020204" pitchFamily="34" charset="0"/>
+              <a:buChar char="•"/>
+              <a:defRPr sz="2800" kern="1200">
+                <a:solidFill>
+                  <a:schemeClr val="tx1"/>
+                </a:solidFill>
+                <a:latin typeface="+mn-lt"/>
+                <a:ea typeface="+mn-ea"/>
+                <a:cs typeface="+mn-cs"/>
+              </a:defRPr>
+            </a:lvl1pPr>
+            <a:lvl2pPr marL="685800" indent="-228600" algn="l" defTabSz="914400" rtl="0" eaLnBrk="1" latinLnBrk="0" hangingPunct="1">
+              <a:lnSpc>
+                <a:spcPct val="90000"/>
+              </a:lnSpc>
+              <a:spcBef>
+                <a:spcPts val="500"/>
+              </a:spcBef>
+              <a:buFont typeface="Arial" panose="020B0604020202020204" pitchFamily="34" charset="0"/>
+              <a:buChar char="•"/>
+              <a:defRPr sz="2400" kern="1200">
+                <a:solidFill>
+                  <a:schemeClr val="tx1"/>
+                </a:solidFill>
+                <a:latin typeface="+mn-lt"/>
+                <a:ea typeface="+mn-ea"/>
+                <a:cs typeface="+mn-cs"/>
+              </a:defRPr>
+            </a:lvl2pPr>
+            <a:lvl3pPr marL="1143000" indent="-228600" algn="l" defTabSz="914400" rtl="0" eaLnBrk="1" latinLnBrk="0" hangingPunct="1">
+              <a:lnSpc>
+                <a:spcPct val="90000"/>
+              </a:lnSpc>
+              <a:spcBef>
+                <a:spcPts val="500"/>
+              </a:spcBef>
+              <a:buFont typeface="Arial" panose="020B0604020202020204" pitchFamily="34" charset="0"/>
+              <a:buChar char="•"/>
+              <a:defRPr sz="2000" kern="1200">
+                <a:solidFill>
+                  <a:schemeClr val="tx1"/>
+                </a:solidFill>
+                <a:latin typeface="+mn-lt"/>
+                <a:ea typeface="+mn-ea"/>
+                <a:cs typeface="+mn-cs"/>
+              </a:defRPr>
+            </a:lvl3pPr>
+            <a:lvl4pPr marL="1600200" indent="-228600" algn="l" defTabSz="914400" rtl="0" eaLnBrk="1" latinLnBrk="0" hangingPunct="1">
+              <a:lnSpc>
+                <a:spcPct val="90000"/>
+              </a:lnSpc>
+              <a:spcBef>
+                <a:spcPts val="500"/>
+              </a:spcBef>
+              <a:buFont typeface="Arial" panose="020B0604020202020204" pitchFamily="34" charset="0"/>
+              <a:buChar char="•"/>
+              <a:defRPr sz="1800" kern="1200">
+                <a:solidFill>
+                  <a:schemeClr val="tx1"/>
+                </a:solidFill>
+                <a:latin typeface="+mn-lt"/>
+                <a:ea typeface="+mn-ea"/>
+                <a:cs typeface="+mn-cs"/>
+              </a:defRPr>
+            </a:lvl4pPr>
+            <a:lvl5pPr marL="2057400" indent="-228600" algn="l" defTabSz="914400" rtl="0" eaLnBrk="1" latinLnBrk="0" hangingPunct="1">
+              <a:lnSpc>
+                <a:spcPct val="90000"/>
+              </a:lnSpc>
+              <a:spcBef>
+                <a:spcPts val="500"/>
+              </a:spcBef>
+              <a:buFont typeface="Arial" panose="020B0604020202020204" pitchFamily="34" charset="0"/>
+              <a:buChar char="•"/>
+              <a:defRPr sz="1800" kern="1200">
+                <a:solidFill>
+                  <a:schemeClr val="tx1"/>
+                </a:solidFill>
+                <a:latin typeface="+mn-lt"/>
+                <a:ea typeface="+mn-ea"/>
+                <a:cs typeface="+mn-cs"/>
+              </a:defRPr>
+            </a:lvl5pPr>
+            <a:lvl6pPr marL="2514600" indent="-228600" algn="l" defTabSz="914400" rtl="0" eaLnBrk="1" latinLnBrk="0" hangingPunct="1">
+              <a:lnSpc>
+                <a:spcPct val="90000"/>
+              </a:lnSpc>
+              <a:spcBef>
+                <a:spcPts val="500"/>
+              </a:spcBef>
+              <a:buFont typeface="Arial" panose="020B0604020202020204" pitchFamily="34" charset="0"/>
+              <a:buChar char="•"/>
+              <a:defRPr sz="1800" kern="1200">
+                <a:solidFill>
+                  <a:schemeClr val="tx1"/>
+                </a:solidFill>
+                <a:latin typeface="+mn-lt"/>
+                <a:ea typeface="+mn-ea"/>
+                <a:cs typeface="+mn-cs"/>
+              </a:defRPr>
+            </a:lvl6pPr>
+            <a:lvl7pPr marL="2971800" indent="-228600" algn="l" defTabSz="914400" rtl="0" eaLnBrk="1" latinLnBrk="0" hangingPunct="1">
+              <a:lnSpc>
+                <a:spcPct val="90000"/>
+              </a:lnSpc>
+              <a:spcBef>
+                <a:spcPts val="500"/>
+              </a:spcBef>
+              <a:buFont typeface="Arial" panose="020B0604020202020204" pitchFamily="34" charset="0"/>
+              <a:buChar char="•"/>
+              <a:defRPr sz="1800" kern="1200">
+                <a:solidFill>
+                  <a:schemeClr val="tx1"/>
+                </a:solidFill>
+                <a:latin typeface="+mn-lt"/>
+                <a:ea typeface="+mn-ea"/>
+                <a:cs typeface="+mn-cs"/>
+              </a:defRPr>
+            </a:lvl7pPr>
+            <a:lvl8pPr marL="3429000" indent="-228600" algn="l" defTabSz="914400" rtl="0" eaLnBrk="1" latinLnBrk="0" hangingPunct="1">
+              <a:lnSpc>
+                <a:spcPct val="90000"/>
+              </a:lnSpc>
+              <a:spcBef>
+                <a:spcPts val="500"/>
+              </a:spcBef>
+              <a:buFont typeface="Arial" panose="020B0604020202020204" pitchFamily="34" charset="0"/>
+              <a:buChar char="•"/>
+              <a:defRPr sz="1800" kern="1200">
+                <a:solidFill>
+                  <a:schemeClr val="tx1"/>
+                </a:solidFill>
+                <a:latin typeface="+mn-lt"/>
+                <a:ea typeface="+mn-ea"/>
+                <a:cs typeface="+mn-cs"/>
+              </a:defRPr>
+            </a:lvl8pPr>
+            <a:lvl9pPr marL="3886200" indent="-228600" algn="l" defTabSz="914400" rtl="0" eaLnBrk="1" latinLnBrk="0" hangingPunct="1">
+              <a:lnSpc>
+                <a:spcPct val="90000"/>
+              </a:lnSpc>
+              <a:spcBef>
+                <a:spcPts val="500"/>
+              </a:spcBef>
+              <a:buFont typeface="Arial" panose="020B0604020202020204" pitchFamily="34" charset="0"/>
+              <a:buChar char="•"/>
+              <a:defRPr sz="1800" kern="1200">
+                <a:solidFill>
+                  <a:schemeClr val="tx1"/>
+                </a:solidFill>
+                <a:latin typeface="+mn-lt"/>
+                <a:ea typeface="+mn-ea"/>
+                <a:cs typeface="+mn-cs"/>
+              </a:defRPr>
+            </a:lvl9pPr>
+          </a:lstStyle>
+          <a:p>
+            <a:pPr marL="0" indent="0" algn="ctr" rtl="1">
+              <a:buFont typeface="Arial" panose="020B0604020202020204" pitchFamily="34" charset="0"/>
+              <a:buNone/>
+            </a:pPr>
+            <a:r>
+              <a:rPr lang="he-IL" sz="3200" b="1" dirty="0"/>
+              <a:t>תשובה 1                           תשובה 2 </a:t>
+            </a:r>
+            <a:endParaRPr lang="en-US" sz="2000" b="1" dirty="0"/>
+          </a:p>
+        </p:txBody>
+      </p:sp>
+    </p:spTree>
+    <p:extLst>
+      <p:ext uri="{BB962C8B-B14F-4D97-AF65-F5344CB8AC3E}">
+        <p14:creationId xmlns:p14="http://schemas.microsoft.com/office/powerpoint/2010/main" val="2431895173"/>
+      </p:ext>
+    </p:extLst>
+  </p:cSld>
+  <p:clrMapOvr>
+    <a:masterClrMapping/>
+  </p:clrMapOvr>
+</p:sld>
+</file>
+
+<file path=ppt/slides/slide34.xml><?xml version="1.0" encoding="utf-8"?>
+<p:sld xmlns:a="http://schemas.openxmlformats.org/drawingml/2006/main" xmlns:r="http://schemas.openxmlformats.org/officeDocument/2006/relationships" xmlns:p="http://schemas.openxmlformats.org/presentationml/2006/main">
+  <p:cSld>
+    <p:bg>
+      <p:bgPr>
+        <a:solidFill>
+          <a:srgbClr val="7E7E7E"/>
+        </a:solidFill>
+        <a:effectLst/>
+      </p:bgPr>
+    </p:bg>
+    <p:spTree>
+      <p:nvGrpSpPr>
+        <p:cNvPr id="1" name=""/>
+        <p:cNvGrpSpPr/>
+        <p:nvPr/>
+      </p:nvGrpSpPr>
+      <p:grpSpPr>
+        <a:xfrm>
+          <a:off x="0" y="0"/>
+          <a:ext cx="0" cy="0"/>
+          <a:chOff x="0" y="0"/>
+          <a:chExt cx="0" cy="0"/>
+        </a:xfrm>
+      </p:grpSpPr>
+      <p:sp>
+        <p:nvSpPr>
+          <p:cNvPr id="6" name="Content Placeholder 2">
+            <a:extLst>
+              <a:ext uri="{FF2B5EF4-FFF2-40B4-BE49-F238E27FC236}">
+                <a16:creationId xmlns:a16="http://schemas.microsoft.com/office/drawing/2014/main" id="{747102BF-A698-444E-B693-3BC2E2F22350}"/>
+              </a:ext>
+            </a:extLst>
+          </p:cNvPr>
+          <p:cNvSpPr txBox="1">
+            <a:spLocks/>
+          </p:cNvSpPr>
+          <p:nvPr/>
+        </p:nvSpPr>
+        <p:spPr>
+          <a:xfrm>
+            <a:off x="304800" y="2500778"/>
+            <a:ext cx="11629636" cy="3735452"/>
+          </a:xfrm>
+          <a:prstGeom prst="rect">
+            <a:avLst/>
+          </a:prstGeom>
+        </p:spPr>
+        <p:txBody>
+          <a:bodyPr vert="horz" lIns="91440" tIns="45720" rIns="91440" bIns="45720" rtlCol="0">
+            <a:normAutofit/>
+          </a:bodyPr>
+          <a:lstStyle>
+            <a:lvl1pPr marL="228600" indent="-228600" algn="l" defTabSz="914400" rtl="0" eaLnBrk="1" latinLnBrk="0" hangingPunct="1">
+              <a:lnSpc>
+                <a:spcPct val="90000"/>
+              </a:lnSpc>
+              <a:spcBef>
+                <a:spcPts val="1000"/>
+              </a:spcBef>
+              <a:buFont typeface="Arial" panose="020B0604020202020204" pitchFamily="34" charset="0"/>
+              <a:buChar char="•"/>
+              <a:defRPr sz="2800" kern="1200">
+                <a:solidFill>
+                  <a:schemeClr val="tx1"/>
+                </a:solidFill>
+                <a:latin typeface="+mn-lt"/>
+                <a:ea typeface="+mn-ea"/>
+                <a:cs typeface="+mn-cs"/>
+              </a:defRPr>
+            </a:lvl1pPr>
+            <a:lvl2pPr marL="685800" indent="-228600" algn="l" defTabSz="914400" rtl="0" eaLnBrk="1" latinLnBrk="0" hangingPunct="1">
+              <a:lnSpc>
+                <a:spcPct val="90000"/>
+              </a:lnSpc>
+              <a:spcBef>
+                <a:spcPts val="500"/>
+              </a:spcBef>
+              <a:buFont typeface="Arial" panose="020B0604020202020204" pitchFamily="34" charset="0"/>
+              <a:buChar char="•"/>
+              <a:defRPr sz="2400" kern="1200">
+                <a:solidFill>
+                  <a:schemeClr val="tx1"/>
+                </a:solidFill>
+                <a:latin typeface="+mn-lt"/>
+                <a:ea typeface="+mn-ea"/>
+                <a:cs typeface="+mn-cs"/>
+              </a:defRPr>
+            </a:lvl2pPr>
+            <a:lvl3pPr marL="1143000" indent="-228600" algn="l" defTabSz="914400" rtl="0" eaLnBrk="1" latinLnBrk="0" hangingPunct="1">
+              <a:lnSpc>
+                <a:spcPct val="90000"/>
+              </a:lnSpc>
+              <a:spcBef>
+                <a:spcPts val="500"/>
+              </a:spcBef>
+              <a:buFont typeface="Arial" panose="020B0604020202020204" pitchFamily="34" charset="0"/>
+              <a:buChar char="•"/>
+              <a:defRPr sz="2000" kern="1200">
+                <a:solidFill>
+                  <a:schemeClr val="tx1"/>
+                </a:solidFill>
+                <a:latin typeface="+mn-lt"/>
+                <a:ea typeface="+mn-ea"/>
+                <a:cs typeface="+mn-cs"/>
+              </a:defRPr>
+            </a:lvl3pPr>
+            <a:lvl4pPr marL="1600200" indent="-228600" algn="l" defTabSz="914400" rtl="0" eaLnBrk="1" latinLnBrk="0" hangingPunct="1">
+              <a:lnSpc>
+                <a:spcPct val="90000"/>
+              </a:lnSpc>
+              <a:spcBef>
+                <a:spcPts val="500"/>
+              </a:spcBef>
+              <a:buFont typeface="Arial" panose="020B0604020202020204" pitchFamily="34" charset="0"/>
+              <a:buChar char="•"/>
+              <a:defRPr sz="1800" kern="1200">
+                <a:solidFill>
+                  <a:schemeClr val="tx1"/>
+                </a:solidFill>
+                <a:latin typeface="+mn-lt"/>
+                <a:ea typeface="+mn-ea"/>
+                <a:cs typeface="+mn-cs"/>
+              </a:defRPr>
+            </a:lvl4pPr>
+            <a:lvl5pPr marL="2057400" indent="-228600" algn="l" defTabSz="914400" rtl="0" eaLnBrk="1" latinLnBrk="0" hangingPunct="1">
+              <a:lnSpc>
+                <a:spcPct val="90000"/>
+              </a:lnSpc>
+              <a:spcBef>
+                <a:spcPts val="500"/>
+              </a:spcBef>
+              <a:buFont typeface="Arial" panose="020B0604020202020204" pitchFamily="34" charset="0"/>
+              <a:buChar char="•"/>
+              <a:defRPr sz="1800" kern="1200">
+                <a:solidFill>
+                  <a:schemeClr val="tx1"/>
+                </a:solidFill>
+                <a:latin typeface="+mn-lt"/>
+                <a:ea typeface="+mn-ea"/>
+                <a:cs typeface="+mn-cs"/>
+              </a:defRPr>
+            </a:lvl5pPr>
+            <a:lvl6pPr marL="2514600" indent="-228600" algn="l" defTabSz="914400" rtl="0" eaLnBrk="1" latinLnBrk="0" hangingPunct="1">
+              <a:lnSpc>
+                <a:spcPct val="90000"/>
+              </a:lnSpc>
+              <a:spcBef>
+                <a:spcPts val="500"/>
+              </a:spcBef>
+              <a:buFont typeface="Arial" panose="020B0604020202020204" pitchFamily="34" charset="0"/>
+              <a:buChar char="•"/>
+              <a:defRPr sz="1800" kern="1200">
+                <a:solidFill>
+                  <a:schemeClr val="tx1"/>
+                </a:solidFill>
+                <a:latin typeface="+mn-lt"/>
+                <a:ea typeface="+mn-ea"/>
+                <a:cs typeface="+mn-cs"/>
+              </a:defRPr>
+            </a:lvl6pPr>
+            <a:lvl7pPr marL="2971800" indent="-228600" algn="l" defTabSz="914400" rtl="0" eaLnBrk="1" latinLnBrk="0" hangingPunct="1">
+              <a:lnSpc>
+                <a:spcPct val="90000"/>
+              </a:lnSpc>
+              <a:spcBef>
+                <a:spcPts val="500"/>
+              </a:spcBef>
+              <a:buFont typeface="Arial" panose="020B0604020202020204" pitchFamily="34" charset="0"/>
+              <a:buChar char="•"/>
+              <a:defRPr sz="1800" kern="1200">
+                <a:solidFill>
+                  <a:schemeClr val="tx1"/>
+                </a:solidFill>
+                <a:latin typeface="+mn-lt"/>
+                <a:ea typeface="+mn-ea"/>
+                <a:cs typeface="+mn-cs"/>
+              </a:defRPr>
+            </a:lvl7pPr>
+            <a:lvl8pPr marL="3429000" indent="-228600" algn="l" defTabSz="914400" rtl="0" eaLnBrk="1" latinLnBrk="0" hangingPunct="1">
+              <a:lnSpc>
+                <a:spcPct val="90000"/>
+              </a:lnSpc>
+              <a:spcBef>
+                <a:spcPts val="500"/>
+              </a:spcBef>
+              <a:buFont typeface="Arial" panose="020B0604020202020204" pitchFamily="34" charset="0"/>
+              <a:buChar char="•"/>
+              <a:defRPr sz="1800" kern="1200">
+                <a:solidFill>
+                  <a:schemeClr val="tx1"/>
+                </a:solidFill>
+                <a:latin typeface="+mn-lt"/>
+                <a:ea typeface="+mn-ea"/>
+                <a:cs typeface="+mn-cs"/>
+              </a:defRPr>
+            </a:lvl8pPr>
+            <a:lvl9pPr marL="3886200" indent="-228600" algn="l" defTabSz="914400" rtl="0" eaLnBrk="1" latinLnBrk="0" hangingPunct="1">
+              <a:lnSpc>
+                <a:spcPct val="90000"/>
+              </a:lnSpc>
+              <a:spcBef>
+                <a:spcPts val="500"/>
+              </a:spcBef>
+              <a:buFont typeface="Arial" panose="020B0604020202020204" pitchFamily="34" charset="0"/>
+              <a:buChar char="•"/>
+              <a:defRPr sz="1800" kern="1200">
+                <a:solidFill>
+                  <a:schemeClr val="tx1"/>
+                </a:solidFill>
+                <a:latin typeface="+mn-lt"/>
+                <a:ea typeface="+mn-ea"/>
+                <a:cs typeface="+mn-cs"/>
+              </a:defRPr>
+            </a:lvl9pPr>
+          </a:lstStyle>
+          <a:p>
+            <a:pPr marL="0" indent="0" algn="ctr" rtl="1">
+              <a:buFont typeface="Arial" panose="020B0604020202020204" pitchFamily="34" charset="0"/>
+              <a:buNone/>
+            </a:pPr>
+            <a:r>
+              <a:rPr lang="he-IL" sz="3200" b="1" u="sng" dirty="0"/>
+              <a:t>סיימתם את החלק הראשון של הניסוי</a:t>
+            </a:r>
+          </a:p>
+          <a:p>
+            <a:pPr marL="0" indent="0" algn="ctr" rtl="1">
+              <a:buFont typeface="Arial" panose="020B0604020202020204" pitchFamily="34" charset="0"/>
+              <a:buNone/>
+            </a:pPr>
+            <a:r>
+              <a:rPr lang="he-IL" sz="3200" b="1" dirty="0"/>
+              <a:t>קרא/י לנסיין </a:t>
+            </a:r>
+            <a:r>
+              <a:rPr lang="he-IL" sz="3200" dirty="0"/>
+              <a:t>על מנת להמשיך לחלק השני.</a:t>
+            </a:r>
+            <a:endParaRPr lang="en-US" sz="2000" dirty="0"/>
+          </a:p>
+        </p:txBody>
+      </p:sp>
+    </p:spTree>
+    <p:extLst>
+      <p:ext uri="{BB962C8B-B14F-4D97-AF65-F5344CB8AC3E}">
+        <p14:creationId xmlns:p14="http://schemas.microsoft.com/office/powerpoint/2010/main" val="2408849652"/>
+      </p:ext>
+    </p:extLst>
+  </p:cSld>
+  <p:clrMapOvr>
+    <a:masterClrMapping/>
+  </p:clrMapOvr>
+</p:sld>
+</file>
+
 <file path=ppt/slides/slide4.xml><?xml version="1.0" encoding="utf-8"?>
 <p:sld xmlns:a="http://schemas.openxmlformats.org/drawingml/2006/main" xmlns:r="http://schemas.openxmlformats.org/officeDocument/2006/relationships" xmlns:p="http://schemas.openxmlformats.org/presentationml/2006/main">
   <p:cSld>
@@ -11832,7 +13105,7 @@
         </p:spPr>
         <p:txBody>
           <a:bodyPr vert="horz" lIns="91440" tIns="45720" rIns="91440" bIns="45720" rtlCol="0">
-            <a:normAutofit fontScale="85000" lnSpcReduction="20000"/>
+            <a:normAutofit fontScale="85000" lnSpcReduction="10000"/>
           </a:bodyPr>
           <a:lstStyle>
             <a:lvl1pPr marL="228600" indent="-228600" algn="l" defTabSz="914400" rtl="0" eaLnBrk="1" latinLnBrk="0" hangingPunct="1">
@@ -12005,7 +13278,7 @@
             </a:pPr>
             <a:r>
               <a:rPr lang="he-IL" sz="3200" b="1" u="sng" dirty="0"/>
-              <a:t>החל מעכשיו כל חזרה בניסוי תורכב מכמה שלבים:</a:t>
+              <a:t>כל חזרה בניסוי תורכב מכמה שלבים:</a:t>
             </a:r>
           </a:p>
           <a:p>
@@ -12033,15 +13306,7 @@
             </a:pPr>
             <a:r>
               <a:rPr lang="he-IL" sz="3200" dirty="0"/>
-              <a:t>אחריו יוצגו לכם רצף הגירויים </a:t>
-            </a:r>
-            <a:r>
-              <a:rPr lang="he-IL" sz="3200" dirty="0" err="1"/>
-              <a:t>הויזואליים</a:t>
-            </a:r>
-            <a:r>
-              <a:rPr lang="he-IL" sz="3200" dirty="0"/>
-              <a:t> אך הפעם מילה נוספת תהיה ממוסכת ביניהם.</a:t>
+              <a:t>אחריו יוצגו לכם רצף גירויים ויזואליים (מעוינים וריבועים) וביניהם תוצג מילה לזמן קצר.</a:t>
             </a:r>
           </a:p>
           <a:p>
@@ -12051,7 +13316,7 @@
             </a:pPr>
             <a:r>
               <a:rPr lang="he-IL" sz="3200" dirty="0"/>
-              <a:t>לבסוף תוצג מילה שניה כמו בחלק הקודם של הניסוי.</a:t>
+              <a:t>לאחר מכן תוצג מילה שניה.</a:t>
             </a:r>
           </a:p>
           <a:p>
@@ -12061,7 +13326,7 @@
             </a:pPr>
             <a:r>
               <a:rPr lang="he-IL" sz="3200" dirty="0"/>
-              <a:t>בדומה לחלק הראשון תתבקשו לקבוע </a:t>
+              <a:t>אתם תתבקשו לקבוע </a:t>
             </a:r>
             <a:r>
               <a:rPr lang="he-IL" sz="3200" b="1" dirty="0"/>
@@ -12087,7 +13352,7 @@
             </a:pPr>
             <a:r>
               <a:rPr lang="he-IL" sz="3200" dirty="0"/>
-              <a:t>אחר כך תנסו לזהות את המילה הממוסכת (זאת שהוצגה </a:t>
+              <a:t>אחר כך תנסו לזהות את המילה ה</a:t>
             </a:r>
             <a:r>
               <a:rPr lang="he-IL" sz="3200" b="1" u="sng" dirty="0"/>
@@ -12095,7 +13360,7 @@
             </a:r>
             <a:r>
               <a:rPr lang="he-IL" sz="3200" dirty="0"/>
-              <a:t>), מבין 2 מילים שיוצגו יחדיו.</a:t>
+              <a:t>, מבין 2 מילים שיוצגו יחדיו.</a:t>
             </a:r>
           </a:p>
           <a:p>
@@ -13349,7 +14614,13 @@
           <p:cNvGraphicFramePr>
             <a:graphicFrameLocks noGrp="1"/>
           </p:cNvGraphicFramePr>
-          <p:nvPr/>
+          <p:nvPr>
+            <p:extLst>
+              <p:ext uri="{D42A27DB-BD31-4B8C-83A1-F6EECF244321}">
+                <p14:modId xmlns:p14="http://schemas.microsoft.com/office/powerpoint/2010/main" val="2598975650"/>
+              </p:ext>
+            </p:extLst>
+          </p:nvPr>
         </p:nvGraphicFramePr>
         <p:xfrm>
           <a:off x="1557867" y="2674306"/>

</xml_diff>

<commit_message>
Changed response instructions to E/Y
</commit_message>
<xml_diff>
--- a/experiment/RUN_ME/stimuli/instructions presentation.pptx
+++ b/experiment/RUN_ME/stimuli/instructions presentation.pptx
@@ -275,7 +275,7 @@
           <a:p>
             <a:fld id="{F999E2B6-E0C8-4E2F-B37B-1FC830B33272}" type="datetimeFigureOut">
               <a:rPr lang="en-US" smtClean="0"/>
-              <a:t>6/12/2022</a:t>
+              <a:t>6/13/2022</a:t>
             </a:fld>
             <a:endParaRPr lang="en-US"/>
           </a:p>
@@ -443,7 +443,7 @@
           <a:p>
             <a:fld id="{F999E2B6-E0C8-4E2F-B37B-1FC830B33272}" type="datetimeFigureOut">
               <a:rPr lang="en-US" smtClean="0"/>
-              <a:t>6/12/2022</a:t>
+              <a:t>6/13/2022</a:t>
             </a:fld>
             <a:endParaRPr lang="en-US"/>
           </a:p>
@@ -621,7 +621,7 @@
           <a:p>
             <a:fld id="{F999E2B6-E0C8-4E2F-B37B-1FC830B33272}" type="datetimeFigureOut">
               <a:rPr lang="en-US" smtClean="0"/>
-              <a:t>6/12/2022</a:t>
+              <a:t>6/13/2022</a:t>
             </a:fld>
             <a:endParaRPr lang="en-US"/>
           </a:p>
@@ -789,7 +789,7 @@
           <a:p>
             <a:fld id="{F999E2B6-E0C8-4E2F-B37B-1FC830B33272}" type="datetimeFigureOut">
               <a:rPr lang="en-US" smtClean="0"/>
-              <a:t>6/12/2022</a:t>
+              <a:t>6/13/2022</a:t>
             </a:fld>
             <a:endParaRPr lang="en-US"/>
           </a:p>
@@ -1034,7 +1034,7 @@
           <a:p>
             <a:fld id="{F999E2B6-E0C8-4E2F-B37B-1FC830B33272}" type="datetimeFigureOut">
               <a:rPr lang="en-US" smtClean="0"/>
-              <a:t>6/12/2022</a:t>
+              <a:t>6/13/2022</a:t>
             </a:fld>
             <a:endParaRPr lang="en-US"/>
           </a:p>
@@ -1263,7 +1263,7 @@
           <a:p>
             <a:fld id="{F999E2B6-E0C8-4E2F-B37B-1FC830B33272}" type="datetimeFigureOut">
               <a:rPr lang="en-US" smtClean="0"/>
-              <a:t>6/12/2022</a:t>
+              <a:t>6/13/2022</a:t>
             </a:fld>
             <a:endParaRPr lang="en-US"/>
           </a:p>
@@ -1627,7 +1627,7 @@
           <a:p>
             <a:fld id="{F999E2B6-E0C8-4E2F-B37B-1FC830B33272}" type="datetimeFigureOut">
               <a:rPr lang="en-US" smtClean="0"/>
-              <a:t>6/12/2022</a:t>
+              <a:t>6/13/2022</a:t>
             </a:fld>
             <a:endParaRPr lang="en-US"/>
           </a:p>
@@ -1744,7 +1744,7 @@
           <a:p>
             <a:fld id="{F999E2B6-E0C8-4E2F-B37B-1FC830B33272}" type="datetimeFigureOut">
               <a:rPr lang="en-US" smtClean="0"/>
-              <a:t>6/12/2022</a:t>
+              <a:t>6/13/2022</a:t>
             </a:fld>
             <a:endParaRPr lang="en-US"/>
           </a:p>
@@ -1839,7 +1839,7 @@
           <a:p>
             <a:fld id="{F999E2B6-E0C8-4E2F-B37B-1FC830B33272}" type="datetimeFigureOut">
               <a:rPr lang="en-US" smtClean="0"/>
-              <a:t>6/12/2022</a:t>
+              <a:t>6/13/2022</a:t>
             </a:fld>
             <a:endParaRPr lang="en-US"/>
           </a:p>
@@ -2114,7 +2114,7 @@
           <a:p>
             <a:fld id="{F999E2B6-E0C8-4E2F-B37B-1FC830B33272}" type="datetimeFigureOut">
               <a:rPr lang="en-US" smtClean="0"/>
-              <a:t>6/12/2022</a:t>
+              <a:t>6/13/2022</a:t>
             </a:fld>
             <a:endParaRPr lang="en-US"/>
           </a:p>
@@ -2366,7 +2366,7 @@
           <a:p>
             <a:fld id="{F999E2B6-E0C8-4E2F-B37B-1FC830B33272}" type="datetimeFigureOut">
               <a:rPr lang="en-US" smtClean="0"/>
-              <a:t>6/12/2022</a:t>
+              <a:t>6/13/2022</a:t>
             </a:fld>
             <a:endParaRPr lang="en-US"/>
           </a:p>
@@ -2577,7 +2577,7 @@
           <a:p>
             <a:fld id="{F999E2B6-E0C8-4E2F-B37B-1FC830B33272}" type="datetimeFigureOut">
               <a:rPr lang="en-US" smtClean="0"/>
-              <a:t>6/12/2022</a:t>
+              <a:t>6/13/2022</a:t>
             </a:fld>
             <a:endParaRPr lang="en-US"/>
           </a:p>
@@ -11767,16 +11767,21 @@
             </a:pPr>
             <a:r>
               <a:rPr lang="he-IL" sz="3200" dirty="0"/>
-              <a:t>על מנת לבחור את התשובה השמאלית לחץ על "</a:t>
-            </a:r>
-            <a:r>
-              <a:rPr lang="en-US" sz="3200" dirty="0"/>
-              <a:t>F</a:t>
-            </a:r>
-            <a:r>
-              <a:rPr lang="he-IL" sz="3200" dirty="0"/>
+              <a:t>על מנת לבחור את התשובה השמאלית לחץ על </a:t>
+            </a:r>
+            <a:r>
+              <a:rPr lang="he-IL" sz="3200" dirty="0" smtClean="0"/>
+              <a:t>"</a:t>
+            </a:r>
+            <a:r>
+              <a:rPr lang="en-US" sz="3200" dirty="0" smtClean="0"/>
+              <a:t>E</a:t>
+            </a:r>
+            <a:r>
+              <a:rPr lang="he-IL" sz="3200" dirty="0" smtClean="0"/>
               <a:t>",</a:t>
             </a:r>
+            <a:endParaRPr lang="he-IL" sz="3200" dirty="0"/>
           </a:p>
           <a:p>
             <a:pPr marL="0" indent="0" algn="ctr" rtl="1">
@@ -11785,14 +11790,18 @@
             </a:pPr>
             <a:r>
               <a:rPr lang="he-IL" sz="3200" dirty="0"/>
-              <a:t>על מנת לבחור את התשובה הימנית לחץ על "</a:t>
-            </a:r>
-            <a:r>
-              <a:rPr lang="en-US" sz="3200" dirty="0"/>
-              <a:t>J</a:t>
-            </a:r>
-            <a:r>
-              <a:rPr lang="he-IL" sz="3200" dirty="0"/>
+              <a:t>על מנת לבחור את התשובה הימנית לחץ על </a:t>
+            </a:r>
+            <a:r>
+              <a:rPr lang="he-IL" sz="3200" dirty="0" smtClean="0"/>
+              <a:t>"</a:t>
+            </a:r>
+            <a:r>
+              <a:rPr lang="en-US" sz="3200" dirty="0" smtClean="0"/>
+              <a:t>Y</a:t>
+            </a:r>
+            <a:r>
+              <a:rPr lang="he-IL" sz="3200" dirty="0" smtClean="0"/>
               <a:t>".</a:t>
             </a:r>
             <a:endParaRPr lang="en-US" sz="2000" dirty="0"/>

</xml_diff>